<commit_message>
Add gitignore und add folien domänenmodell
</commit_message>
<xml_diff>
--- a/EPWS2223HausenKochZimmer Audit 1.pptx
+++ b/EPWS2223HausenKochZimmer Audit 1.pptx
@@ -4,8 +4,18 @@
   <p:sldMasterIdLst>
     <p:sldMasterId id="2147483648" r:id="rId1"/>
   </p:sldMasterIdLst>
+  <p:notesMasterIdLst>
+    <p:notesMasterId r:id="rId10"/>
+  </p:notesMasterIdLst>
   <p:sldIdLst>
     <p:sldId id="256" r:id="rId2"/>
+    <p:sldId id="258" r:id="rId3"/>
+    <p:sldId id="257" r:id="rId4"/>
+    <p:sldId id="259" r:id="rId5"/>
+    <p:sldId id="260" r:id="rId6"/>
+    <p:sldId id="261" r:id="rId7"/>
+    <p:sldId id="262" r:id="rId8"/>
+    <p:sldId id="263" r:id="rId9"/>
   </p:sldIdLst>
   <p:sldSz cx="12192000" cy="6858000"/>
   <p:notesSz cx="6858000" cy="9144000"/>
@@ -104,7 +114,814 @@
       </a:defRPr>
     </a:lvl9pPr>
   </p:defaultTextStyle>
+  <p:extLst>
+    <p:ext uri="{521415D9-36F7-43E2-AB2F-B90AF26B5E84}">
+      <p14:sectionLst xmlns:p14="http://schemas.microsoft.com/office/powerpoint/2010/main">
+        <p14:section name="Standardabschnitt" id="{FE2716BC-FBA1-4CF5-ADA1-DE97E19B0E62}">
+          <p14:sldIdLst>
+            <p14:sldId id="256"/>
+            <p14:sldId id="258"/>
+          </p14:sldIdLst>
+        </p14:section>
+        <p14:section name="Domänenmodell" id="{7C162E14-0EE3-4924-8DA4-BC6CB0A0102C}">
+          <p14:sldIdLst>
+            <p14:sldId id="257"/>
+            <p14:sldId id="259"/>
+            <p14:sldId id="260"/>
+            <p14:sldId id="261"/>
+            <p14:sldId id="262"/>
+            <p14:sldId id="263"/>
+          </p14:sldIdLst>
+        </p14:section>
+      </p14:sectionLst>
+    </p:ext>
+  </p:extLst>
 </p:presentation>
+</file>
+
+<file path=ppt/notesMasters/notesMaster1.xml><?xml version="1.0" encoding="utf-8"?>
+<p:notesMaster xmlns:a="http://schemas.openxmlformats.org/drawingml/2006/main" xmlns:r="http://schemas.openxmlformats.org/officeDocument/2006/relationships" xmlns:p="http://schemas.openxmlformats.org/presentationml/2006/main">
+  <p:cSld>
+    <p:bg>
+      <p:bgRef idx="1001">
+        <a:schemeClr val="bg1"/>
+      </p:bgRef>
+    </p:bg>
+    <p:spTree>
+      <p:nvGrpSpPr>
+        <p:cNvPr id="1" name=""/>
+        <p:cNvGrpSpPr/>
+        <p:nvPr/>
+      </p:nvGrpSpPr>
+      <p:grpSpPr>
+        <a:xfrm>
+          <a:off x="0" y="0"/>
+          <a:ext cx="0" cy="0"/>
+          <a:chOff x="0" y="0"/>
+          <a:chExt cx="0" cy="0"/>
+        </a:xfrm>
+      </p:grpSpPr>
+      <p:sp>
+        <p:nvSpPr>
+          <p:cNvPr id="2" name="Kopfzeilenplatzhalter 1"/>
+          <p:cNvSpPr>
+            <a:spLocks noGrp="1"/>
+          </p:cNvSpPr>
+          <p:nvPr>
+            <p:ph type="hdr" sz="quarter"/>
+          </p:nvPr>
+        </p:nvSpPr>
+        <p:spPr>
+          <a:xfrm>
+            <a:off x="0" y="0"/>
+            <a:ext cx="2971800" cy="458788"/>
+          </a:xfrm>
+          <a:prstGeom prst="rect">
+            <a:avLst/>
+          </a:prstGeom>
+        </p:spPr>
+        <p:txBody>
+          <a:bodyPr vert="horz" lIns="91440" tIns="45720" rIns="91440" bIns="45720" rtlCol="0"/>
+          <a:lstStyle>
+            <a:lvl1pPr algn="l">
+              <a:defRPr sz="1200"/>
+            </a:lvl1pPr>
+          </a:lstStyle>
+          <a:p>
+            <a:endParaRPr lang="de-DE"/>
+          </a:p>
+        </p:txBody>
+      </p:sp>
+      <p:sp>
+        <p:nvSpPr>
+          <p:cNvPr id="3" name="Datumsplatzhalter 2"/>
+          <p:cNvSpPr>
+            <a:spLocks noGrp="1"/>
+          </p:cNvSpPr>
+          <p:nvPr>
+            <p:ph type="dt" idx="1"/>
+          </p:nvPr>
+        </p:nvSpPr>
+        <p:spPr>
+          <a:xfrm>
+            <a:off x="3884613" y="0"/>
+            <a:ext cx="2971800" cy="458788"/>
+          </a:xfrm>
+          <a:prstGeom prst="rect">
+            <a:avLst/>
+          </a:prstGeom>
+        </p:spPr>
+        <p:txBody>
+          <a:bodyPr vert="horz" lIns="91440" tIns="45720" rIns="91440" bIns="45720" rtlCol="0"/>
+          <a:lstStyle>
+            <a:lvl1pPr algn="r">
+              <a:defRPr sz="1200"/>
+            </a:lvl1pPr>
+          </a:lstStyle>
+          <a:p>
+            <a:fld id="{41E4C828-4067-40BA-A80C-83ED33FF2410}" type="datetimeFigureOut">
+              <a:rPr lang="de-DE" smtClean="0"/>
+              <a:t>10.11.2022</a:t>
+            </a:fld>
+            <a:endParaRPr lang="de-DE"/>
+          </a:p>
+        </p:txBody>
+      </p:sp>
+      <p:sp>
+        <p:nvSpPr>
+          <p:cNvPr id="4" name="Folienbildplatzhalter 3"/>
+          <p:cNvSpPr>
+            <a:spLocks noGrp="1" noRot="1" noChangeAspect="1"/>
+          </p:cNvSpPr>
+          <p:nvPr>
+            <p:ph type="sldImg" idx="2"/>
+          </p:nvPr>
+        </p:nvSpPr>
+        <p:spPr>
+          <a:xfrm>
+            <a:off x="685800" y="1143000"/>
+            <a:ext cx="5486400" cy="3086100"/>
+          </a:xfrm>
+          <a:prstGeom prst="rect">
+            <a:avLst/>
+          </a:prstGeom>
+          <a:noFill/>
+          <a:ln w="12700">
+            <a:solidFill>
+              <a:prstClr val="black"/>
+            </a:solidFill>
+          </a:ln>
+        </p:spPr>
+        <p:txBody>
+          <a:bodyPr vert="horz" lIns="91440" tIns="45720" rIns="91440" bIns="45720" rtlCol="0" anchor="ctr"/>
+          <a:lstStyle/>
+          <a:p>
+            <a:endParaRPr lang="de-DE"/>
+          </a:p>
+        </p:txBody>
+      </p:sp>
+      <p:sp>
+        <p:nvSpPr>
+          <p:cNvPr id="5" name="Notizenplatzhalter 4"/>
+          <p:cNvSpPr>
+            <a:spLocks noGrp="1"/>
+          </p:cNvSpPr>
+          <p:nvPr>
+            <p:ph type="body" sz="quarter" idx="3"/>
+          </p:nvPr>
+        </p:nvSpPr>
+        <p:spPr>
+          <a:xfrm>
+            <a:off x="685800" y="4400550"/>
+            <a:ext cx="5486400" cy="3600450"/>
+          </a:xfrm>
+          <a:prstGeom prst="rect">
+            <a:avLst/>
+          </a:prstGeom>
+        </p:spPr>
+        <p:txBody>
+          <a:bodyPr vert="horz" lIns="91440" tIns="45720" rIns="91440" bIns="45720" rtlCol="0"/>
+          <a:lstStyle/>
+          <a:p>
+            <a:pPr lvl="0"/>
+            <a:r>
+              <a:rPr lang="de-DE"/>
+              <a:t>Mastertextformat bearbeiten</a:t>
+            </a:r>
+          </a:p>
+          <a:p>
+            <a:pPr lvl="1"/>
+            <a:r>
+              <a:rPr lang="de-DE"/>
+              <a:t>Zweite Ebene</a:t>
+            </a:r>
+          </a:p>
+          <a:p>
+            <a:pPr lvl="2"/>
+            <a:r>
+              <a:rPr lang="de-DE"/>
+              <a:t>Dritte Ebene</a:t>
+            </a:r>
+          </a:p>
+          <a:p>
+            <a:pPr lvl="3"/>
+            <a:r>
+              <a:rPr lang="de-DE"/>
+              <a:t>Vierte Ebene</a:t>
+            </a:r>
+          </a:p>
+          <a:p>
+            <a:pPr lvl="4"/>
+            <a:r>
+              <a:rPr lang="de-DE"/>
+              <a:t>Fünfte Ebene</a:t>
+            </a:r>
+          </a:p>
+        </p:txBody>
+      </p:sp>
+      <p:sp>
+        <p:nvSpPr>
+          <p:cNvPr id="6" name="Fußzeilenplatzhalter 5"/>
+          <p:cNvSpPr>
+            <a:spLocks noGrp="1"/>
+          </p:cNvSpPr>
+          <p:nvPr>
+            <p:ph type="ftr" sz="quarter" idx="4"/>
+          </p:nvPr>
+        </p:nvSpPr>
+        <p:spPr>
+          <a:xfrm>
+            <a:off x="0" y="8685213"/>
+            <a:ext cx="2971800" cy="458787"/>
+          </a:xfrm>
+          <a:prstGeom prst="rect">
+            <a:avLst/>
+          </a:prstGeom>
+        </p:spPr>
+        <p:txBody>
+          <a:bodyPr vert="horz" lIns="91440" tIns="45720" rIns="91440" bIns="45720" rtlCol="0" anchor="b"/>
+          <a:lstStyle>
+            <a:lvl1pPr algn="l">
+              <a:defRPr sz="1200"/>
+            </a:lvl1pPr>
+          </a:lstStyle>
+          <a:p>
+            <a:endParaRPr lang="de-DE"/>
+          </a:p>
+        </p:txBody>
+      </p:sp>
+      <p:sp>
+        <p:nvSpPr>
+          <p:cNvPr id="7" name="Foliennummernplatzhalter 6"/>
+          <p:cNvSpPr>
+            <a:spLocks noGrp="1"/>
+          </p:cNvSpPr>
+          <p:nvPr>
+            <p:ph type="sldNum" sz="quarter" idx="5"/>
+          </p:nvPr>
+        </p:nvSpPr>
+        <p:spPr>
+          <a:xfrm>
+            <a:off x="3884613" y="8685213"/>
+            <a:ext cx="2971800" cy="458787"/>
+          </a:xfrm>
+          <a:prstGeom prst="rect">
+            <a:avLst/>
+          </a:prstGeom>
+        </p:spPr>
+        <p:txBody>
+          <a:bodyPr vert="horz" lIns="91440" tIns="45720" rIns="91440" bIns="45720" rtlCol="0" anchor="b"/>
+          <a:lstStyle>
+            <a:lvl1pPr algn="r">
+              <a:defRPr sz="1200"/>
+            </a:lvl1pPr>
+          </a:lstStyle>
+          <a:p>
+            <a:fld id="{92DF0825-AC8F-4116-B49B-4A4F75013D61}" type="slidenum">
+              <a:rPr lang="de-DE" smtClean="0"/>
+              <a:t>‹Nr.›</a:t>
+            </a:fld>
+            <a:endParaRPr lang="de-DE"/>
+          </a:p>
+        </p:txBody>
+      </p:sp>
+    </p:spTree>
+    <p:extLst>
+      <p:ext uri="{BB962C8B-B14F-4D97-AF65-F5344CB8AC3E}">
+        <p14:creationId xmlns:p14="http://schemas.microsoft.com/office/powerpoint/2010/main" val="1040734885"/>
+      </p:ext>
+    </p:extLst>
+  </p:cSld>
+  <p:clrMap bg1="lt1" tx1="dk1" bg2="lt2" tx2="dk2" accent1="accent1" accent2="accent2" accent3="accent3" accent4="accent4" accent5="accent5" accent6="accent6" hlink="hlink" folHlink="folHlink"/>
+  <p:notesStyle>
+    <a:lvl1pPr marL="0" algn="l" defTabSz="914400" rtl="0" eaLnBrk="1" latinLnBrk="0" hangingPunct="1">
+      <a:defRPr sz="1200" kern="1200">
+        <a:solidFill>
+          <a:schemeClr val="tx1"/>
+        </a:solidFill>
+        <a:latin typeface="+mn-lt"/>
+        <a:ea typeface="+mn-ea"/>
+        <a:cs typeface="+mn-cs"/>
+      </a:defRPr>
+    </a:lvl1pPr>
+    <a:lvl2pPr marL="457200" algn="l" defTabSz="914400" rtl="0" eaLnBrk="1" latinLnBrk="0" hangingPunct="1">
+      <a:defRPr sz="1200" kern="1200">
+        <a:solidFill>
+          <a:schemeClr val="tx1"/>
+        </a:solidFill>
+        <a:latin typeface="+mn-lt"/>
+        <a:ea typeface="+mn-ea"/>
+        <a:cs typeface="+mn-cs"/>
+      </a:defRPr>
+    </a:lvl2pPr>
+    <a:lvl3pPr marL="914400" algn="l" defTabSz="914400" rtl="0" eaLnBrk="1" latinLnBrk="0" hangingPunct="1">
+      <a:defRPr sz="1200" kern="1200">
+        <a:solidFill>
+          <a:schemeClr val="tx1"/>
+        </a:solidFill>
+        <a:latin typeface="+mn-lt"/>
+        <a:ea typeface="+mn-ea"/>
+        <a:cs typeface="+mn-cs"/>
+      </a:defRPr>
+    </a:lvl3pPr>
+    <a:lvl4pPr marL="1371600" algn="l" defTabSz="914400" rtl="0" eaLnBrk="1" latinLnBrk="0" hangingPunct="1">
+      <a:defRPr sz="1200" kern="1200">
+        <a:solidFill>
+          <a:schemeClr val="tx1"/>
+        </a:solidFill>
+        <a:latin typeface="+mn-lt"/>
+        <a:ea typeface="+mn-ea"/>
+        <a:cs typeface="+mn-cs"/>
+      </a:defRPr>
+    </a:lvl4pPr>
+    <a:lvl5pPr marL="1828800" algn="l" defTabSz="914400" rtl="0" eaLnBrk="1" latinLnBrk="0" hangingPunct="1">
+      <a:defRPr sz="1200" kern="1200">
+        <a:solidFill>
+          <a:schemeClr val="tx1"/>
+        </a:solidFill>
+        <a:latin typeface="+mn-lt"/>
+        <a:ea typeface="+mn-ea"/>
+        <a:cs typeface="+mn-cs"/>
+      </a:defRPr>
+    </a:lvl5pPr>
+    <a:lvl6pPr marL="2286000" algn="l" defTabSz="914400" rtl="0" eaLnBrk="1" latinLnBrk="0" hangingPunct="1">
+      <a:defRPr sz="1200" kern="1200">
+        <a:solidFill>
+          <a:schemeClr val="tx1"/>
+        </a:solidFill>
+        <a:latin typeface="+mn-lt"/>
+        <a:ea typeface="+mn-ea"/>
+        <a:cs typeface="+mn-cs"/>
+      </a:defRPr>
+    </a:lvl6pPr>
+    <a:lvl7pPr marL="2743200" algn="l" defTabSz="914400" rtl="0" eaLnBrk="1" latinLnBrk="0" hangingPunct="1">
+      <a:defRPr sz="1200" kern="1200">
+        <a:solidFill>
+          <a:schemeClr val="tx1"/>
+        </a:solidFill>
+        <a:latin typeface="+mn-lt"/>
+        <a:ea typeface="+mn-ea"/>
+        <a:cs typeface="+mn-cs"/>
+      </a:defRPr>
+    </a:lvl7pPr>
+    <a:lvl8pPr marL="3200400" algn="l" defTabSz="914400" rtl="0" eaLnBrk="1" latinLnBrk="0" hangingPunct="1">
+      <a:defRPr sz="1200" kern="1200">
+        <a:solidFill>
+          <a:schemeClr val="tx1"/>
+        </a:solidFill>
+        <a:latin typeface="+mn-lt"/>
+        <a:ea typeface="+mn-ea"/>
+        <a:cs typeface="+mn-cs"/>
+      </a:defRPr>
+    </a:lvl8pPr>
+    <a:lvl9pPr marL="3657600" algn="l" defTabSz="914400" rtl="0" eaLnBrk="1" latinLnBrk="0" hangingPunct="1">
+      <a:defRPr sz="1200" kern="1200">
+        <a:solidFill>
+          <a:schemeClr val="tx1"/>
+        </a:solidFill>
+        <a:latin typeface="+mn-lt"/>
+        <a:ea typeface="+mn-ea"/>
+        <a:cs typeface="+mn-cs"/>
+      </a:defRPr>
+    </a:lvl9pPr>
+  </p:notesStyle>
+</p:notesMaster>
+</file>
+
+<file path=ppt/notesSlides/notesSlide1.xml><?xml version="1.0" encoding="utf-8"?>
+<p:notes xmlns:a="http://schemas.openxmlformats.org/drawingml/2006/main" xmlns:r="http://schemas.openxmlformats.org/officeDocument/2006/relationships" xmlns:p="http://schemas.openxmlformats.org/presentationml/2006/main">
+  <p:cSld>
+    <p:spTree>
+      <p:nvGrpSpPr>
+        <p:cNvPr id="1" name=""/>
+        <p:cNvGrpSpPr/>
+        <p:nvPr/>
+      </p:nvGrpSpPr>
+      <p:grpSpPr>
+        <a:xfrm>
+          <a:off x="0" y="0"/>
+          <a:ext cx="0" cy="0"/>
+          <a:chOff x="0" y="0"/>
+          <a:chExt cx="0" cy="0"/>
+        </a:xfrm>
+      </p:grpSpPr>
+      <p:sp>
+        <p:nvSpPr>
+          <p:cNvPr id="2" name="Folienbildplatzhalter 1"/>
+          <p:cNvSpPr>
+            <a:spLocks noGrp="1" noRot="1" noChangeAspect="1"/>
+          </p:cNvSpPr>
+          <p:nvPr>
+            <p:ph type="sldImg"/>
+          </p:nvPr>
+        </p:nvSpPr>
+        <p:spPr/>
+      </p:sp>
+      <p:sp>
+        <p:nvSpPr>
+          <p:cNvPr id="3" name="Notizenplatzhalter 2"/>
+          <p:cNvSpPr>
+            <a:spLocks noGrp="1"/>
+          </p:cNvSpPr>
+          <p:nvPr>
+            <p:ph type="body" idx="1"/>
+          </p:nvPr>
+        </p:nvSpPr>
+        <p:spPr/>
+        <p:txBody>
+          <a:bodyPr/>
+          <a:lstStyle/>
+          <a:p>
+            <a:pPr algn="l"/>
+            <a:r>
+              <a:rPr lang="de-DE" dirty="0"/>
+              <a:t>Entstand im Anschluss der Domänenrecherche durch Philipp. Zeigt die ersten Identifizierten Akteure der Domäne und den versuche deren Verbindungen dazustellen. </a:t>
+            </a:r>
+          </a:p>
+        </p:txBody>
+      </p:sp>
+      <p:sp>
+        <p:nvSpPr>
+          <p:cNvPr id="4" name="Foliennummernplatzhalter 3"/>
+          <p:cNvSpPr>
+            <a:spLocks noGrp="1"/>
+          </p:cNvSpPr>
+          <p:nvPr>
+            <p:ph type="sldNum" sz="quarter" idx="5"/>
+          </p:nvPr>
+        </p:nvSpPr>
+        <p:spPr/>
+        <p:txBody>
+          <a:bodyPr/>
+          <a:lstStyle/>
+          <a:p>
+            <a:fld id="{92DF0825-AC8F-4116-B49B-4A4F75013D61}" type="slidenum">
+              <a:rPr lang="de-DE" smtClean="0"/>
+              <a:t>3</a:t>
+            </a:fld>
+            <a:endParaRPr lang="de-DE"/>
+          </a:p>
+        </p:txBody>
+      </p:sp>
+    </p:spTree>
+    <p:extLst>
+      <p:ext uri="{BB962C8B-B14F-4D97-AF65-F5344CB8AC3E}">
+        <p14:creationId xmlns:p14="http://schemas.microsoft.com/office/powerpoint/2010/main" val="759147561"/>
+      </p:ext>
+    </p:extLst>
+  </p:cSld>
+  <p:clrMapOvr>
+    <a:masterClrMapping/>
+  </p:clrMapOvr>
+</p:notes>
+</file>
+
+<file path=ppt/notesSlides/notesSlide2.xml><?xml version="1.0" encoding="utf-8"?>
+<p:notes xmlns:a="http://schemas.openxmlformats.org/drawingml/2006/main" xmlns:r="http://schemas.openxmlformats.org/officeDocument/2006/relationships" xmlns:p="http://schemas.openxmlformats.org/presentationml/2006/main">
+  <p:cSld>
+    <p:spTree>
+      <p:nvGrpSpPr>
+        <p:cNvPr id="1" name=""/>
+        <p:cNvGrpSpPr/>
+        <p:nvPr/>
+      </p:nvGrpSpPr>
+      <p:grpSpPr>
+        <a:xfrm>
+          <a:off x="0" y="0"/>
+          <a:ext cx="0" cy="0"/>
+          <a:chOff x="0" y="0"/>
+          <a:chExt cx="0" cy="0"/>
+        </a:xfrm>
+      </p:grpSpPr>
+      <p:sp>
+        <p:nvSpPr>
+          <p:cNvPr id="2" name="Folienbildplatzhalter 1"/>
+          <p:cNvSpPr>
+            <a:spLocks noGrp="1" noRot="1" noChangeAspect="1"/>
+          </p:cNvSpPr>
+          <p:nvPr>
+            <p:ph type="sldImg"/>
+          </p:nvPr>
+        </p:nvSpPr>
+        <p:spPr/>
+      </p:sp>
+      <p:sp>
+        <p:nvSpPr>
+          <p:cNvPr id="3" name="Notizenplatzhalter 2"/>
+          <p:cNvSpPr>
+            <a:spLocks noGrp="1"/>
+          </p:cNvSpPr>
+          <p:nvPr>
+            <p:ph type="body" idx="1"/>
+          </p:nvPr>
+        </p:nvSpPr>
+        <p:spPr/>
+        <p:txBody>
+          <a:bodyPr/>
+          <a:lstStyle/>
+          <a:p>
+            <a:r>
+              <a:rPr lang="de-DE" dirty="0"/>
+              <a:t>Iteration zum Ordnen und Anpassen der Verbindungen durch Sebastian. Die vorige Modell Iteration war unübersichtlicher und wurde in diesem Schritt dementsprechend verbessert.</a:t>
+            </a:r>
+          </a:p>
+        </p:txBody>
+      </p:sp>
+      <p:sp>
+        <p:nvSpPr>
+          <p:cNvPr id="4" name="Foliennummernplatzhalter 3"/>
+          <p:cNvSpPr>
+            <a:spLocks noGrp="1"/>
+          </p:cNvSpPr>
+          <p:nvPr>
+            <p:ph type="sldNum" sz="quarter" idx="5"/>
+          </p:nvPr>
+        </p:nvSpPr>
+        <p:spPr/>
+        <p:txBody>
+          <a:bodyPr/>
+          <a:lstStyle/>
+          <a:p>
+            <a:fld id="{92DF0825-AC8F-4116-B49B-4A4F75013D61}" type="slidenum">
+              <a:rPr lang="de-DE" smtClean="0"/>
+              <a:t>4</a:t>
+            </a:fld>
+            <a:endParaRPr lang="de-DE"/>
+          </a:p>
+        </p:txBody>
+      </p:sp>
+    </p:spTree>
+    <p:extLst>
+      <p:ext uri="{BB962C8B-B14F-4D97-AF65-F5344CB8AC3E}">
+        <p14:creationId xmlns:p14="http://schemas.microsoft.com/office/powerpoint/2010/main" val="2336962558"/>
+      </p:ext>
+    </p:extLst>
+  </p:cSld>
+  <p:clrMapOvr>
+    <a:masterClrMapping/>
+  </p:clrMapOvr>
+</p:notes>
+</file>
+
+<file path=ppt/notesSlides/notesSlide3.xml><?xml version="1.0" encoding="utf-8"?>
+<p:notes xmlns:a="http://schemas.openxmlformats.org/drawingml/2006/main" xmlns:r="http://schemas.openxmlformats.org/officeDocument/2006/relationships" xmlns:p="http://schemas.openxmlformats.org/presentationml/2006/main">
+  <p:cSld>
+    <p:spTree>
+      <p:nvGrpSpPr>
+        <p:cNvPr id="1" name=""/>
+        <p:cNvGrpSpPr/>
+        <p:nvPr/>
+      </p:nvGrpSpPr>
+      <p:grpSpPr>
+        <a:xfrm>
+          <a:off x="0" y="0"/>
+          <a:ext cx="0" cy="0"/>
+          <a:chOff x="0" y="0"/>
+          <a:chExt cx="0" cy="0"/>
+        </a:xfrm>
+      </p:grpSpPr>
+      <p:sp>
+        <p:nvSpPr>
+          <p:cNvPr id="2" name="Folienbildplatzhalter 1"/>
+          <p:cNvSpPr>
+            <a:spLocks noGrp="1" noRot="1" noChangeAspect="1"/>
+          </p:cNvSpPr>
+          <p:nvPr>
+            <p:ph type="sldImg"/>
+          </p:nvPr>
+        </p:nvSpPr>
+        <p:spPr/>
+      </p:sp>
+      <p:sp>
+        <p:nvSpPr>
+          <p:cNvPr id="3" name="Notizenplatzhalter 2"/>
+          <p:cNvSpPr>
+            <a:spLocks noGrp="1"/>
+          </p:cNvSpPr>
+          <p:nvPr>
+            <p:ph type="body" idx="1"/>
+          </p:nvPr>
+        </p:nvSpPr>
+        <p:spPr/>
+        <p:txBody>
+          <a:bodyPr/>
+          <a:lstStyle/>
+          <a:p>
+            <a:r>
+              <a:rPr lang="de-DE" dirty="0"/>
+              <a:t>Einfügen von Hilfsentitäten und deren Verbindungen durch Sebastian. Nach dem in der vorherigen Modell Iteration die Übersichtlichkeit geschaffen wurde, wurde eine Verbesserung der Akteure durch Hilfsentitäten durchgeführt.</a:t>
+            </a:r>
+          </a:p>
+        </p:txBody>
+      </p:sp>
+      <p:sp>
+        <p:nvSpPr>
+          <p:cNvPr id="4" name="Foliennummernplatzhalter 3"/>
+          <p:cNvSpPr>
+            <a:spLocks noGrp="1"/>
+          </p:cNvSpPr>
+          <p:nvPr>
+            <p:ph type="sldNum" sz="quarter" idx="5"/>
+          </p:nvPr>
+        </p:nvSpPr>
+        <p:spPr/>
+        <p:txBody>
+          <a:bodyPr/>
+          <a:lstStyle/>
+          <a:p>
+            <a:fld id="{92DF0825-AC8F-4116-B49B-4A4F75013D61}" type="slidenum">
+              <a:rPr lang="de-DE" smtClean="0"/>
+              <a:t>5</a:t>
+            </a:fld>
+            <a:endParaRPr lang="de-DE"/>
+          </a:p>
+        </p:txBody>
+      </p:sp>
+    </p:spTree>
+    <p:extLst>
+      <p:ext uri="{BB962C8B-B14F-4D97-AF65-F5344CB8AC3E}">
+        <p14:creationId xmlns:p14="http://schemas.microsoft.com/office/powerpoint/2010/main" val="3201380577"/>
+      </p:ext>
+    </p:extLst>
+  </p:cSld>
+  <p:clrMapOvr>
+    <a:masterClrMapping/>
+  </p:clrMapOvr>
+</p:notes>
+</file>
+
+<file path=ppt/notesSlides/notesSlide4.xml><?xml version="1.0" encoding="utf-8"?>
+<p:notes xmlns:a="http://schemas.openxmlformats.org/drawingml/2006/main" xmlns:r="http://schemas.openxmlformats.org/officeDocument/2006/relationships" xmlns:p="http://schemas.openxmlformats.org/presentationml/2006/main">
+  <p:cSld>
+    <p:spTree>
+      <p:nvGrpSpPr>
+        <p:cNvPr id="1" name=""/>
+        <p:cNvGrpSpPr/>
+        <p:nvPr/>
+      </p:nvGrpSpPr>
+      <p:grpSpPr>
+        <a:xfrm>
+          <a:off x="0" y="0"/>
+          <a:ext cx="0" cy="0"/>
+          <a:chOff x="0" y="0"/>
+          <a:chExt cx="0" cy="0"/>
+        </a:xfrm>
+      </p:grpSpPr>
+      <p:sp>
+        <p:nvSpPr>
+          <p:cNvPr id="2" name="Folienbildplatzhalter 1"/>
+          <p:cNvSpPr>
+            <a:spLocks noGrp="1" noRot="1" noChangeAspect="1"/>
+          </p:cNvSpPr>
+          <p:nvPr>
+            <p:ph type="sldImg"/>
+          </p:nvPr>
+        </p:nvSpPr>
+        <p:spPr/>
+      </p:sp>
+      <p:sp>
+        <p:nvSpPr>
+          <p:cNvPr id="3" name="Notizenplatzhalter 2"/>
+          <p:cNvSpPr>
+            <a:spLocks noGrp="1"/>
+          </p:cNvSpPr>
+          <p:nvPr>
+            <p:ph type="body" idx="1"/>
+          </p:nvPr>
+        </p:nvSpPr>
+        <p:spPr/>
+        <p:txBody>
+          <a:bodyPr/>
+          <a:lstStyle/>
+          <a:p>
+            <a:r>
+              <a:rPr lang="de-DE" dirty="0"/>
+              <a:t>Vereinfachung des Modells und Sortierung zu logischen clustern. In dieser Iteration des Modells wurde die Unübersichtlichkeit der vorherigen Iteration durch Vereinfachung und Clusterung bearbeitet. Bei den Verbindungen die Beziehungen Konkretisiert um kann Beziehungen adäquat darzustellen.</a:t>
+            </a:r>
+          </a:p>
+        </p:txBody>
+      </p:sp>
+      <p:sp>
+        <p:nvSpPr>
+          <p:cNvPr id="4" name="Foliennummernplatzhalter 3"/>
+          <p:cNvSpPr>
+            <a:spLocks noGrp="1"/>
+          </p:cNvSpPr>
+          <p:nvPr>
+            <p:ph type="sldNum" sz="quarter" idx="5"/>
+          </p:nvPr>
+        </p:nvSpPr>
+        <p:spPr/>
+        <p:txBody>
+          <a:bodyPr/>
+          <a:lstStyle/>
+          <a:p>
+            <a:fld id="{92DF0825-AC8F-4116-B49B-4A4F75013D61}" type="slidenum">
+              <a:rPr lang="de-DE" smtClean="0"/>
+              <a:t>6</a:t>
+            </a:fld>
+            <a:endParaRPr lang="de-DE"/>
+          </a:p>
+        </p:txBody>
+      </p:sp>
+    </p:spTree>
+    <p:extLst>
+      <p:ext uri="{BB962C8B-B14F-4D97-AF65-F5344CB8AC3E}">
+        <p14:creationId xmlns:p14="http://schemas.microsoft.com/office/powerpoint/2010/main" val="3630828092"/>
+      </p:ext>
+    </p:extLst>
+  </p:cSld>
+  <p:clrMapOvr>
+    <a:masterClrMapping/>
+  </p:clrMapOvr>
+</p:notes>
+</file>
+
+<file path=ppt/notesSlides/notesSlide5.xml><?xml version="1.0" encoding="utf-8"?>
+<p:notes xmlns:a="http://schemas.openxmlformats.org/drawingml/2006/main" xmlns:r="http://schemas.openxmlformats.org/officeDocument/2006/relationships" xmlns:p="http://schemas.openxmlformats.org/presentationml/2006/main">
+  <p:cSld>
+    <p:spTree>
+      <p:nvGrpSpPr>
+        <p:cNvPr id="1" name=""/>
+        <p:cNvGrpSpPr/>
+        <p:nvPr/>
+      </p:nvGrpSpPr>
+      <p:grpSpPr>
+        <a:xfrm>
+          <a:off x="0" y="0"/>
+          <a:ext cx="0" cy="0"/>
+          <a:chOff x="0" y="0"/>
+          <a:chExt cx="0" cy="0"/>
+        </a:xfrm>
+      </p:grpSpPr>
+      <p:sp>
+        <p:nvSpPr>
+          <p:cNvPr id="2" name="Folienbildplatzhalter 1"/>
+          <p:cNvSpPr>
+            <a:spLocks noGrp="1" noRot="1" noChangeAspect="1"/>
+          </p:cNvSpPr>
+          <p:nvPr>
+            <p:ph type="sldImg"/>
+          </p:nvPr>
+        </p:nvSpPr>
+        <p:spPr/>
+      </p:sp>
+      <p:sp>
+        <p:nvSpPr>
+          <p:cNvPr id="3" name="Notizenplatzhalter 2"/>
+          <p:cNvSpPr>
+            <a:spLocks noGrp="1"/>
+          </p:cNvSpPr>
+          <p:nvPr>
+            <p:ph type="body" idx="1"/>
+          </p:nvPr>
+        </p:nvSpPr>
+        <p:spPr/>
+        <p:txBody>
+          <a:bodyPr/>
+          <a:lstStyle/>
+          <a:p>
+            <a:r>
+              <a:rPr lang="de-DE" dirty="0"/>
+              <a:t>Erweiterung des Modells um weitere Akteure und Hilfsentitäten durch Frederik. Durch Besprechungen der vorigen Iteration sind ein paar weitere Akteure sowie Hilfsidentitäten Identifiziert worden.</a:t>
+            </a:r>
+          </a:p>
+        </p:txBody>
+      </p:sp>
+      <p:sp>
+        <p:nvSpPr>
+          <p:cNvPr id="4" name="Foliennummernplatzhalter 3"/>
+          <p:cNvSpPr>
+            <a:spLocks noGrp="1"/>
+          </p:cNvSpPr>
+          <p:nvPr>
+            <p:ph type="sldNum" sz="quarter" idx="5"/>
+          </p:nvPr>
+        </p:nvSpPr>
+        <p:spPr/>
+        <p:txBody>
+          <a:bodyPr/>
+          <a:lstStyle/>
+          <a:p>
+            <a:fld id="{92DF0825-AC8F-4116-B49B-4A4F75013D61}" type="slidenum">
+              <a:rPr lang="de-DE" smtClean="0"/>
+              <a:t>7</a:t>
+            </a:fld>
+            <a:endParaRPr lang="de-DE"/>
+          </a:p>
+        </p:txBody>
+      </p:sp>
+    </p:spTree>
+    <p:extLst>
+      <p:ext uri="{BB962C8B-B14F-4D97-AF65-F5344CB8AC3E}">
+        <p14:creationId xmlns:p14="http://schemas.microsoft.com/office/powerpoint/2010/main" val="3552961356"/>
+      </p:ext>
+    </p:extLst>
+  </p:cSld>
+  <p:clrMapOvr>
+    <a:masterClrMapping/>
+  </p:clrMapOvr>
+</p:notes>
 </file>
 
 <file path=ppt/slideLayouts/slideLayout1.xml><?xml version="1.0" encoding="utf-8"?>
@@ -3432,6 +4249,661 @@
 </p:sld>
 </file>
 
+<file path=ppt/slides/slide2.xml><?xml version="1.0" encoding="utf-8"?>
+<p:sld xmlns:a="http://schemas.openxmlformats.org/drawingml/2006/main" xmlns:r="http://schemas.openxmlformats.org/officeDocument/2006/relationships" xmlns:p="http://schemas.openxmlformats.org/presentationml/2006/main">
+  <p:cSld>
+    <p:spTree>
+      <p:nvGrpSpPr>
+        <p:cNvPr id="1" name=""/>
+        <p:cNvGrpSpPr/>
+        <p:nvPr/>
+      </p:nvGrpSpPr>
+      <p:grpSpPr>
+        <a:xfrm>
+          <a:off x="0" y="0"/>
+          <a:ext cx="0" cy="0"/>
+          <a:chOff x="0" y="0"/>
+          <a:chExt cx="0" cy="0"/>
+        </a:xfrm>
+      </p:grpSpPr>
+      <p:sp>
+        <p:nvSpPr>
+          <p:cNvPr id="2" name="Titel 1">
+            <a:extLst>
+              <a:ext uri="{FF2B5EF4-FFF2-40B4-BE49-F238E27FC236}">
+                <a16:creationId xmlns:a16="http://schemas.microsoft.com/office/drawing/2014/main" id="{DFC5B796-40B4-D689-B460-7D61AB01AE62}"/>
+              </a:ext>
+            </a:extLst>
+          </p:cNvPr>
+          <p:cNvSpPr>
+            <a:spLocks noGrp="1"/>
+          </p:cNvSpPr>
+          <p:nvPr>
+            <p:ph type="title"/>
+          </p:nvPr>
+        </p:nvSpPr>
+        <p:spPr/>
+        <p:txBody>
+          <a:bodyPr/>
+          <a:lstStyle/>
+          <a:p>
+            <a:pPr algn="ctr"/>
+            <a:r>
+              <a:rPr lang="de-DE" dirty="0">
+                <a:solidFill>
+                  <a:srgbClr val="FF0000"/>
+                </a:solidFill>
+              </a:rPr>
+              <a:t>Domänenrecherche ??</a:t>
+            </a:r>
+          </a:p>
+        </p:txBody>
+      </p:sp>
+      <p:sp>
+        <p:nvSpPr>
+          <p:cNvPr id="3" name="Inhaltsplatzhalter 2">
+            <a:extLst>
+              <a:ext uri="{FF2B5EF4-FFF2-40B4-BE49-F238E27FC236}">
+                <a16:creationId xmlns:a16="http://schemas.microsoft.com/office/drawing/2014/main" id="{C6B80267-8BD3-DDB9-B749-6905671A26BD}"/>
+              </a:ext>
+            </a:extLst>
+          </p:cNvPr>
+          <p:cNvSpPr>
+            <a:spLocks noGrp="1"/>
+          </p:cNvSpPr>
+          <p:nvPr>
+            <p:ph idx="1"/>
+          </p:nvPr>
+        </p:nvSpPr>
+        <p:spPr/>
+        <p:txBody>
+          <a:bodyPr/>
+          <a:lstStyle/>
+          <a:p>
+            <a:endParaRPr lang="de-DE"/>
+          </a:p>
+        </p:txBody>
+      </p:sp>
+    </p:spTree>
+    <p:extLst>
+      <p:ext uri="{BB962C8B-B14F-4D97-AF65-F5344CB8AC3E}">
+        <p14:creationId xmlns:p14="http://schemas.microsoft.com/office/powerpoint/2010/main" val="285372262"/>
+      </p:ext>
+    </p:extLst>
+  </p:cSld>
+  <p:clrMapOvr>
+    <a:masterClrMapping/>
+  </p:clrMapOvr>
+</p:sld>
+</file>
+
+<file path=ppt/slides/slide3.xml><?xml version="1.0" encoding="utf-8"?>
+<p:sld xmlns:a="http://schemas.openxmlformats.org/drawingml/2006/main" xmlns:r="http://schemas.openxmlformats.org/officeDocument/2006/relationships" xmlns:p="http://schemas.openxmlformats.org/presentationml/2006/main">
+  <p:cSld>
+    <p:spTree>
+      <p:nvGrpSpPr>
+        <p:cNvPr id="1" name=""/>
+        <p:cNvGrpSpPr/>
+        <p:nvPr/>
+      </p:nvGrpSpPr>
+      <p:grpSpPr>
+        <a:xfrm>
+          <a:off x="0" y="0"/>
+          <a:ext cx="0" cy="0"/>
+          <a:chOff x="0" y="0"/>
+          <a:chExt cx="0" cy="0"/>
+        </a:xfrm>
+      </p:grpSpPr>
+      <p:sp>
+        <p:nvSpPr>
+          <p:cNvPr id="2" name="Titel 1">
+            <a:extLst>
+              <a:ext uri="{FF2B5EF4-FFF2-40B4-BE49-F238E27FC236}">
+                <a16:creationId xmlns:a16="http://schemas.microsoft.com/office/drawing/2014/main" id="{12DBA99A-E93C-4C9A-FF1F-22FE00729933}"/>
+              </a:ext>
+            </a:extLst>
+          </p:cNvPr>
+          <p:cNvSpPr>
+            <a:spLocks noGrp="1"/>
+          </p:cNvSpPr>
+          <p:nvPr>
+            <p:ph type="title"/>
+          </p:nvPr>
+        </p:nvSpPr>
+        <p:spPr/>
+        <p:txBody>
+          <a:bodyPr/>
+          <a:lstStyle/>
+          <a:p>
+            <a:pPr algn="ctr"/>
+            <a:r>
+              <a:rPr lang="de-DE" dirty="0"/>
+              <a:t>Version 0.8</a:t>
+            </a:r>
+          </a:p>
+        </p:txBody>
+      </p:sp>
+      <p:graphicFrame>
+        <p:nvGraphicFramePr>
+          <p:cNvPr id="3" name="Objekt 2">
+            <a:extLst>
+              <a:ext uri="{FF2B5EF4-FFF2-40B4-BE49-F238E27FC236}">
+                <a16:creationId xmlns:a16="http://schemas.microsoft.com/office/drawing/2014/main" id="{1B3B0154-8915-84BE-5E07-6D269FCFBAC6}"/>
+              </a:ext>
+            </a:extLst>
+          </p:cNvPr>
+          <p:cNvGraphicFramePr>
+            <a:graphicFrameLocks noChangeAspect="1"/>
+          </p:cNvGraphicFramePr>
+          <p:nvPr>
+            <p:extLst>
+              <p:ext uri="{D42A27DB-BD31-4B8C-83A1-F6EECF244321}">
+                <p14:modId xmlns:p14="http://schemas.microsoft.com/office/powerpoint/2010/main" val="1018337064"/>
+              </p:ext>
+            </p:extLst>
+          </p:nvPr>
+        </p:nvGraphicFramePr>
+        <p:xfrm>
+          <a:off x="1897475" y="1848274"/>
+          <a:ext cx="8397049" cy="4817701"/>
+        </p:xfrm>
+        <a:graphic>
+          <a:graphicData uri="http://schemas.openxmlformats.org/presentationml/2006/ole">
+            <mc:AlternateContent xmlns:mc="http://schemas.openxmlformats.org/markup-compatibility/2006">
+              <mc:Choice xmlns:v="urn:schemas-microsoft-com:vml" Requires="v">
+                <p:oleObj name="Acrobat Document" r:id="rId3" imgW="9429630" imgH="5409887" progId="Acrobat.Document.DC">
+                  <p:embed/>
+                </p:oleObj>
+              </mc:Choice>
+              <mc:Fallback>
+                <p:oleObj name="Acrobat Document" r:id="rId3" imgW="9429630" imgH="5409887" progId="Acrobat.Document.DC">
+                  <p:embed/>
+                  <p:pic>
+                    <p:nvPicPr>
+                      <p:cNvPr id="0" name=""/>
+                      <p:cNvPicPr/>
+                      <p:nvPr/>
+                    </p:nvPicPr>
+                    <p:blipFill>
+                      <a:blip r:embed="rId4"/>
+                      <a:stretch>
+                        <a:fillRect/>
+                      </a:stretch>
+                    </p:blipFill>
+                    <p:spPr>
+                      <a:xfrm>
+                        <a:off x="1897475" y="1848274"/>
+                        <a:ext cx="8397049" cy="4817701"/>
+                      </a:xfrm>
+                      <a:prstGeom prst="rect">
+                        <a:avLst/>
+                      </a:prstGeom>
+                    </p:spPr>
+                  </p:pic>
+                </p:oleObj>
+              </mc:Fallback>
+            </mc:AlternateContent>
+          </a:graphicData>
+        </a:graphic>
+      </p:graphicFrame>
+    </p:spTree>
+    <p:extLst>
+      <p:ext uri="{BB962C8B-B14F-4D97-AF65-F5344CB8AC3E}">
+        <p14:creationId xmlns:p14="http://schemas.microsoft.com/office/powerpoint/2010/main" val="2577924692"/>
+      </p:ext>
+    </p:extLst>
+  </p:cSld>
+  <p:clrMapOvr>
+    <a:masterClrMapping/>
+  </p:clrMapOvr>
+</p:sld>
+</file>
+
+<file path=ppt/slides/slide4.xml><?xml version="1.0" encoding="utf-8"?>
+<p:sld xmlns:a="http://schemas.openxmlformats.org/drawingml/2006/main" xmlns:r="http://schemas.openxmlformats.org/officeDocument/2006/relationships" xmlns:p="http://schemas.openxmlformats.org/presentationml/2006/main">
+  <p:cSld>
+    <p:spTree>
+      <p:nvGrpSpPr>
+        <p:cNvPr id="1" name=""/>
+        <p:cNvGrpSpPr/>
+        <p:nvPr/>
+      </p:nvGrpSpPr>
+      <p:grpSpPr>
+        <a:xfrm>
+          <a:off x="0" y="0"/>
+          <a:ext cx="0" cy="0"/>
+          <a:chOff x="0" y="0"/>
+          <a:chExt cx="0" cy="0"/>
+        </a:xfrm>
+      </p:grpSpPr>
+      <p:sp>
+        <p:nvSpPr>
+          <p:cNvPr id="2" name="Titel 1">
+            <a:extLst>
+              <a:ext uri="{FF2B5EF4-FFF2-40B4-BE49-F238E27FC236}">
+                <a16:creationId xmlns:a16="http://schemas.microsoft.com/office/drawing/2014/main" id="{2A3A0AF6-B267-8C2B-9A16-B4C0D7CF7603}"/>
+              </a:ext>
+            </a:extLst>
+          </p:cNvPr>
+          <p:cNvSpPr>
+            <a:spLocks noGrp="1"/>
+          </p:cNvSpPr>
+          <p:nvPr>
+            <p:ph type="title"/>
+          </p:nvPr>
+        </p:nvSpPr>
+        <p:spPr/>
+        <p:txBody>
+          <a:bodyPr/>
+          <a:lstStyle/>
+          <a:p>
+            <a:pPr algn="ctr"/>
+            <a:r>
+              <a:rPr lang="de-DE" dirty="0"/>
+              <a:t>Version 0.85</a:t>
+            </a:r>
+          </a:p>
+        </p:txBody>
+      </p:sp>
+      <p:pic>
+        <p:nvPicPr>
+          <p:cNvPr id="6" name="Grafik 5">
+            <a:extLst>
+              <a:ext uri="{FF2B5EF4-FFF2-40B4-BE49-F238E27FC236}">
+                <a16:creationId xmlns:a16="http://schemas.microsoft.com/office/drawing/2014/main" id="{FFD6EEBB-F57D-482D-7FAE-DFCB47034A91}"/>
+              </a:ext>
+            </a:extLst>
+          </p:cNvPr>
+          <p:cNvPicPr>
+            <a:picLocks noChangeAspect="1"/>
+          </p:cNvPicPr>
+          <p:nvPr/>
+        </p:nvPicPr>
+        <p:blipFill>
+          <a:blip r:embed="rId3"/>
+          <a:stretch>
+            <a:fillRect/>
+          </a:stretch>
+        </p:blipFill>
+        <p:spPr>
+          <a:xfrm>
+            <a:off x="1651517" y="1495191"/>
+            <a:ext cx="8888965" cy="5101552"/>
+          </a:xfrm>
+          <a:prstGeom prst="rect">
+            <a:avLst/>
+          </a:prstGeom>
+        </p:spPr>
+      </p:pic>
+    </p:spTree>
+    <p:extLst>
+      <p:ext uri="{BB962C8B-B14F-4D97-AF65-F5344CB8AC3E}">
+        <p14:creationId xmlns:p14="http://schemas.microsoft.com/office/powerpoint/2010/main" val="4087313282"/>
+      </p:ext>
+    </p:extLst>
+  </p:cSld>
+  <p:clrMapOvr>
+    <a:masterClrMapping/>
+  </p:clrMapOvr>
+</p:sld>
+</file>
+
+<file path=ppt/slides/slide5.xml><?xml version="1.0" encoding="utf-8"?>
+<p:sld xmlns:a="http://schemas.openxmlformats.org/drawingml/2006/main" xmlns:r="http://schemas.openxmlformats.org/officeDocument/2006/relationships" xmlns:p="http://schemas.openxmlformats.org/presentationml/2006/main">
+  <p:cSld>
+    <p:spTree>
+      <p:nvGrpSpPr>
+        <p:cNvPr id="1" name=""/>
+        <p:cNvGrpSpPr/>
+        <p:nvPr/>
+      </p:nvGrpSpPr>
+      <p:grpSpPr>
+        <a:xfrm>
+          <a:off x="0" y="0"/>
+          <a:ext cx="0" cy="0"/>
+          <a:chOff x="0" y="0"/>
+          <a:chExt cx="0" cy="0"/>
+        </a:xfrm>
+      </p:grpSpPr>
+      <p:sp>
+        <p:nvSpPr>
+          <p:cNvPr id="2" name="Titel 1">
+            <a:extLst>
+              <a:ext uri="{FF2B5EF4-FFF2-40B4-BE49-F238E27FC236}">
+                <a16:creationId xmlns:a16="http://schemas.microsoft.com/office/drawing/2014/main" id="{111CE7B0-EAAA-0A0A-5559-AD82A1546E93}"/>
+              </a:ext>
+            </a:extLst>
+          </p:cNvPr>
+          <p:cNvSpPr>
+            <a:spLocks noGrp="1"/>
+          </p:cNvSpPr>
+          <p:nvPr>
+            <p:ph type="title"/>
+          </p:nvPr>
+        </p:nvSpPr>
+        <p:spPr/>
+        <p:txBody>
+          <a:bodyPr/>
+          <a:lstStyle/>
+          <a:p>
+            <a:pPr algn="ctr"/>
+            <a:r>
+              <a:rPr lang="de-DE" dirty="0"/>
+              <a:t>Version 0.8.7</a:t>
+            </a:r>
+          </a:p>
+        </p:txBody>
+      </p:sp>
+      <p:pic>
+        <p:nvPicPr>
+          <p:cNvPr id="4" name="Grafik 3">
+            <a:extLst>
+              <a:ext uri="{FF2B5EF4-FFF2-40B4-BE49-F238E27FC236}">
+                <a16:creationId xmlns:a16="http://schemas.microsoft.com/office/drawing/2014/main" id="{4C4F586D-9911-8887-C71F-EA90B9421591}"/>
+              </a:ext>
+            </a:extLst>
+          </p:cNvPr>
+          <p:cNvPicPr>
+            <a:picLocks noChangeAspect="1"/>
+          </p:cNvPicPr>
+          <p:nvPr/>
+        </p:nvPicPr>
+        <p:blipFill>
+          <a:blip r:embed="rId3"/>
+          <a:stretch>
+            <a:fillRect/>
+          </a:stretch>
+        </p:blipFill>
+        <p:spPr>
+          <a:xfrm>
+            <a:off x="2435289" y="1690688"/>
+            <a:ext cx="8739675" cy="5015871"/>
+          </a:xfrm>
+          <a:prstGeom prst="rect">
+            <a:avLst/>
+          </a:prstGeom>
+        </p:spPr>
+      </p:pic>
+    </p:spTree>
+    <p:extLst>
+      <p:ext uri="{BB962C8B-B14F-4D97-AF65-F5344CB8AC3E}">
+        <p14:creationId xmlns:p14="http://schemas.microsoft.com/office/powerpoint/2010/main" val="2718715793"/>
+      </p:ext>
+    </p:extLst>
+  </p:cSld>
+  <p:clrMapOvr>
+    <a:masterClrMapping/>
+  </p:clrMapOvr>
+</p:sld>
+</file>
+
+<file path=ppt/slides/slide6.xml><?xml version="1.0" encoding="utf-8"?>
+<p:sld xmlns:a="http://schemas.openxmlformats.org/drawingml/2006/main" xmlns:r="http://schemas.openxmlformats.org/officeDocument/2006/relationships" xmlns:p="http://schemas.openxmlformats.org/presentationml/2006/main">
+  <p:cSld>
+    <p:spTree>
+      <p:nvGrpSpPr>
+        <p:cNvPr id="1" name=""/>
+        <p:cNvGrpSpPr/>
+        <p:nvPr/>
+      </p:nvGrpSpPr>
+      <p:grpSpPr>
+        <a:xfrm>
+          <a:off x="0" y="0"/>
+          <a:ext cx="0" cy="0"/>
+          <a:chOff x="0" y="0"/>
+          <a:chExt cx="0" cy="0"/>
+        </a:xfrm>
+      </p:grpSpPr>
+      <p:sp>
+        <p:nvSpPr>
+          <p:cNvPr id="2" name="Titel 1">
+            <a:extLst>
+              <a:ext uri="{FF2B5EF4-FFF2-40B4-BE49-F238E27FC236}">
+                <a16:creationId xmlns:a16="http://schemas.microsoft.com/office/drawing/2014/main" id="{6F9E02DB-F2A0-8153-53F3-E6599863E214}"/>
+              </a:ext>
+            </a:extLst>
+          </p:cNvPr>
+          <p:cNvSpPr>
+            <a:spLocks noGrp="1"/>
+          </p:cNvSpPr>
+          <p:nvPr>
+            <p:ph type="title"/>
+          </p:nvPr>
+        </p:nvSpPr>
+        <p:spPr/>
+        <p:txBody>
+          <a:bodyPr/>
+          <a:lstStyle/>
+          <a:p>
+            <a:pPr algn="ctr"/>
+            <a:r>
+              <a:rPr lang="de-DE" dirty="0"/>
+              <a:t>Version 0.9</a:t>
+            </a:r>
+          </a:p>
+        </p:txBody>
+      </p:sp>
+      <p:pic>
+        <p:nvPicPr>
+          <p:cNvPr id="4" name="Grafik 3">
+            <a:extLst>
+              <a:ext uri="{FF2B5EF4-FFF2-40B4-BE49-F238E27FC236}">
+                <a16:creationId xmlns:a16="http://schemas.microsoft.com/office/drawing/2014/main" id="{6F930390-8741-BF8E-2D7C-F09319C83946}"/>
+              </a:ext>
+            </a:extLst>
+          </p:cNvPr>
+          <p:cNvPicPr>
+            <a:picLocks noChangeAspect="1"/>
+          </p:cNvPicPr>
+          <p:nvPr/>
+        </p:nvPicPr>
+        <p:blipFill>
+          <a:blip r:embed="rId3"/>
+          <a:stretch>
+            <a:fillRect/>
+          </a:stretch>
+        </p:blipFill>
+        <p:spPr>
+          <a:xfrm>
+            <a:off x="3538281" y="1877300"/>
+            <a:ext cx="5115437" cy="4689150"/>
+          </a:xfrm>
+          <a:prstGeom prst="rect">
+            <a:avLst/>
+          </a:prstGeom>
+        </p:spPr>
+      </p:pic>
+    </p:spTree>
+    <p:extLst>
+      <p:ext uri="{BB962C8B-B14F-4D97-AF65-F5344CB8AC3E}">
+        <p14:creationId xmlns:p14="http://schemas.microsoft.com/office/powerpoint/2010/main" val="4156003571"/>
+      </p:ext>
+    </p:extLst>
+  </p:cSld>
+  <p:clrMapOvr>
+    <a:masterClrMapping/>
+  </p:clrMapOvr>
+</p:sld>
+</file>
+
+<file path=ppt/slides/slide7.xml><?xml version="1.0" encoding="utf-8"?>
+<p:sld xmlns:a="http://schemas.openxmlformats.org/drawingml/2006/main" xmlns:r="http://schemas.openxmlformats.org/officeDocument/2006/relationships" xmlns:p="http://schemas.openxmlformats.org/presentationml/2006/main">
+  <p:cSld>
+    <p:spTree>
+      <p:nvGrpSpPr>
+        <p:cNvPr id="1" name=""/>
+        <p:cNvGrpSpPr/>
+        <p:nvPr/>
+      </p:nvGrpSpPr>
+      <p:grpSpPr>
+        <a:xfrm>
+          <a:off x="0" y="0"/>
+          <a:ext cx="0" cy="0"/>
+          <a:chOff x="0" y="0"/>
+          <a:chExt cx="0" cy="0"/>
+        </a:xfrm>
+      </p:grpSpPr>
+      <p:sp>
+        <p:nvSpPr>
+          <p:cNvPr id="2" name="Titel 1">
+            <a:extLst>
+              <a:ext uri="{FF2B5EF4-FFF2-40B4-BE49-F238E27FC236}">
+                <a16:creationId xmlns:a16="http://schemas.microsoft.com/office/drawing/2014/main" id="{7E8204F1-D296-3CE9-0644-6C2978421B6A}"/>
+              </a:ext>
+            </a:extLst>
+          </p:cNvPr>
+          <p:cNvSpPr>
+            <a:spLocks noGrp="1"/>
+          </p:cNvSpPr>
+          <p:nvPr>
+            <p:ph type="title"/>
+          </p:nvPr>
+        </p:nvSpPr>
+        <p:spPr/>
+        <p:txBody>
+          <a:bodyPr/>
+          <a:lstStyle/>
+          <a:p>
+            <a:pPr algn="ctr"/>
+            <a:r>
+              <a:rPr lang="de-DE" dirty="0"/>
+              <a:t>Version 0.10</a:t>
+            </a:r>
+          </a:p>
+        </p:txBody>
+      </p:sp>
+      <p:pic>
+        <p:nvPicPr>
+          <p:cNvPr id="4" name="Grafik 3">
+            <a:extLst>
+              <a:ext uri="{FF2B5EF4-FFF2-40B4-BE49-F238E27FC236}">
+                <a16:creationId xmlns:a16="http://schemas.microsoft.com/office/drawing/2014/main" id="{37285A09-5313-B652-F195-3EF86E9ABD22}"/>
+              </a:ext>
+            </a:extLst>
+          </p:cNvPr>
+          <p:cNvPicPr>
+            <a:picLocks noChangeAspect="1"/>
+          </p:cNvPicPr>
+          <p:nvPr/>
+        </p:nvPicPr>
+        <p:blipFill>
+          <a:blip r:embed="rId3"/>
+          <a:stretch>
+            <a:fillRect/>
+          </a:stretch>
+        </p:blipFill>
+        <p:spPr>
+          <a:xfrm>
+            <a:off x="3502523" y="1690688"/>
+            <a:ext cx="5186953" cy="4943814"/>
+          </a:xfrm>
+          <a:prstGeom prst="rect">
+            <a:avLst/>
+          </a:prstGeom>
+        </p:spPr>
+      </p:pic>
+    </p:spTree>
+    <p:extLst>
+      <p:ext uri="{BB962C8B-B14F-4D97-AF65-F5344CB8AC3E}">
+        <p14:creationId xmlns:p14="http://schemas.microsoft.com/office/powerpoint/2010/main" val="654925431"/>
+      </p:ext>
+    </p:extLst>
+  </p:cSld>
+  <p:clrMapOvr>
+    <a:masterClrMapping/>
+  </p:clrMapOvr>
+</p:sld>
+</file>
+
+<file path=ppt/slides/slide8.xml><?xml version="1.0" encoding="utf-8"?>
+<p:sld xmlns:a="http://schemas.openxmlformats.org/drawingml/2006/main" xmlns:r="http://schemas.openxmlformats.org/officeDocument/2006/relationships" xmlns:p="http://schemas.openxmlformats.org/presentationml/2006/main">
+  <p:cSld>
+    <p:spTree>
+      <p:nvGrpSpPr>
+        <p:cNvPr id="1" name=""/>
+        <p:cNvGrpSpPr/>
+        <p:nvPr/>
+      </p:nvGrpSpPr>
+      <p:grpSpPr>
+        <a:xfrm>
+          <a:off x="0" y="0"/>
+          <a:ext cx="0" cy="0"/>
+          <a:chOff x="0" y="0"/>
+          <a:chExt cx="0" cy="0"/>
+        </a:xfrm>
+      </p:grpSpPr>
+      <p:sp>
+        <p:nvSpPr>
+          <p:cNvPr id="2" name="Titel 1">
+            <a:extLst>
+              <a:ext uri="{FF2B5EF4-FFF2-40B4-BE49-F238E27FC236}">
+                <a16:creationId xmlns:a16="http://schemas.microsoft.com/office/drawing/2014/main" id="{0A402FAF-07B6-FB6C-C0DE-8500FB3F8FC7}"/>
+              </a:ext>
+            </a:extLst>
+          </p:cNvPr>
+          <p:cNvSpPr>
+            <a:spLocks noGrp="1"/>
+          </p:cNvSpPr>
+          <p:nvPr>
+            <p:ph type="title"/>
+          </p:nvPr>
+        </p:nvSpPr>
+        <p:spPr/>
+        <p:txBody>
+          <a:bodyPr/>
+          <a:lstStyle/>
+          <a:p>
+            <a:pPr algn="ctr"/>
+            <a:r>
+              <a:rPr lang="de-DE"/>
+              <a:t>Version 1.0</a:t>
+            </a:r>
+          </a:p>
+        </p:txBody>
+      </p:sp>
+      <p:pic>
+        <p:nvPicPr>
+          <p:cNvPr id="4" name="Grafik 3">
+            <a:extLst>
+              <a:ext uri="{FF2B5EF4-FFF2-40B4-BE49-F238E27FC236}">
+                <a16:creationId xmlns:a16="http://schemas.microsoft.com/office/drawing/2014/main" id="{CCFDA49A-B683-BF9F-03A2-CC51059F9734}"/>
+              </a:ext>
+            </a:extLst>
+          </p:cNvPr>
+          <p:cNvPicPr>
+            <a:picLocks noChangeAspect="1"/>
+          </p:cNvPicPr>
+          <p:nvPr/>
+        </p:nvPicPr>
+        <p:blipFill>
+          <a:blip r:embed="rId2"/>
+          <a:stretch>
+            <a:fillRect/>
+          </a:stretch>
+        </p:blipFill>
+        <p:spPr>
+          <a:xfrm>
+            <a:off x="3535180" y="1776413"/>
+            <a:ext cx="5121639" cy="4881562"/>
+          </a:xfrm>
+          <a:prstGeom prst="rect">
+            <a:avLst/>
+          </a:prstGeom>
+        </p:spPr>
+      </p:pic>
+    </p:spTree>
+    <p:extLst>
+      <p:ext uri="{BB962C8B-B14F-4D97-AF65-F5344CB8AC3E}">
+        <p14:creationId xmlns:p14="http://schemas.microsoft.com/office/powerpoint/2010/main" val="3664826372"/>
+      </p:ext>
+    </p:extLst>
+  </p:cSld>
+  <p:clrMapOvr>
+    <a:masterClrMapping/>
+  </p:clrMapOvr>
+</p:sld>
+</file>
+
 <file path=ppt/theme/theme1.xml><?xml version="1.0" encoding="utf-8"?>
 <a:theme xmlns:a="http://schemas.openxmlformats.org/drawingml/2006/main" name="Office">
   <a:themeElements>
@@ -3725,4 +5197,299 @@
     </a:ext>
   </a:extLst>
 </a:theme>
+</file>
+
+<file path=ppt/theme/theme2.xml><?xml version="1.0" encoding="utf-8"?>
+<a:theme xmlns:a="http://schemas.openxmlformats.org/drawingml/2006/main" name="Office">
+  <a:themeElements>
+    <a:clrScheme name="Office">
+      <a:dk1>
+        <a:sysClr val="windowText" lastClr="000000"/>
+      </a:dk1>
+      <a:lt1>
+        <a:sysClr val="window" lastClr="FFFFFF"/>
+      </a:lt1>
+      <a:dk2>
+        <a:srgbClr val="44546A"/>
+      </a:dk2>
+      <a:lt2>
+        <a:srgbClr val="E7E6E6"/>
+      </a:lt2>
+      <a:accent1>
+        <a:srgbClr val="4472C4"/>
+      </a:accent1>
+      <a:accent2>
+        <a:srgbClr val="ED7D31"/>
+      </a:accent2>
+      <a:accent3>
+        <a:srgbClr val="A5A5A5"/>
+      </a:accent3>
+      <a:accent4>
+        <a:srgbClr val="FFC000"/>
+      </a:accent4>
+      <a:accent5>
+        <a:srgbClr val="5B9BD5"/>
+      </a:accent5>
+      <a:accent6>
+        <a:srgbClr val="70AD47"/>
+      </a:accent6>
+      <a:hlink>
+        <a:srgbClr val="0563C1"/>
+      </a:hlink>
+      <a:folHlink>
+        <a:srgbClr val="954F72"/>
+      </a:folHlink>
+    </a:clrScheme>
+    <a:fontScheme name="Office">
+      <a:majorFont>
+        <a:latin typeface="Calibri Light" panose="020F0302020204030204"/>
+        <a:ea typeface=""/>
+        <a:cs typeface=""/>
+        <a:font script="Jpan" typeface="游ゴシック Light"/>
+        <a:font script="Hang" typeface="맑은 고딕"/>
+        <a:font script="Hans" typeface="等线 Light"/>
+        <a:font script="Hant" typeface="新細明體"/>
+        <a:font script="Arab" typeface="Times New Roman"/>
+        <a:font script="Hebr" typeface="Times New Roman"/>
+        <a:font script="Thai" typeface="Angsana New"/>
+        <a:font script="Ethi" typeface="Nyala"/>
+        <a:font script="Beng" typeface="Vrinda"/>
+        <a:font script="Gujr" typeface="Shruti"/>
+        <a:font script="Khmr" typeface="MoolBoran"/>
+        <a:font script="Knda" typeface="Tunga"/>
+        <a:font script="Guru" typeface="Raavi"/>
+        <a:font script="Cans" typeface="Euphemia"/>
+        <a:font script="Cher" typeface="Plantagenet Cherokee"/>
+        <a:font script="Yiii" typeface="Microsoft Yi Baiti"/>
+        <a:font script="Tibt" typeface="Microsoft Himalaya"/>
+        <a:font script="Thaa" typeface="MV Boli"/>
+        <a:font script="Deva" typeface="Mangal"/>
+        <a:font script="Telu" typeface="Gautami"/>
+        <a:font script="Taml" typeface="Latha"/>
+        <a:font script="Syrc" typeface="Estrangelo Edessa"/>
+        <a:font script="Orya" typeface="Kalinga"/>
+        <a:font script="Mlym" typeface="Kartika"/>
+        <a:font script="Laoo" typeface="DokChampa"/>
+        <a:font script="Sinh" typeface="Iskoola Pota"/>
+        <a:font script="Mong" typeface="Mongolian Baiti"/>
+        <a:font script="Viet" typeface="Times New Roman"/>
+        <a:font script="Uigh" typeface="Microsoft Uighur"/>
+        <a:font script="Geor" typeface="Sylfaen"/>
+        <a:font script="Armn" typeface="Arial"/>
+        <a:font script="Bugi" typeface="Leelawadee UI"/>
+        <a:font script="Bopo" typeface="Microsoft JhengHei"/>
+        <a:font script="Java" typeface="Javanese Text"/>
+        <a:font script="Lisu" typeface="Segoe UI"/>
+        <a:font script="Mymr" typeface="Myanmar Text"/>
+        <a:font script="Nkoo" typeface="Ebrima"/>
+        <a:font script="Olck" typeface="Nirmala UI"/>
+        <a:font script="Osma" typeface="Ebrima"/>
+        <a:font script="Phag" typeface="Phagspa"/>
+        <a:font script="Syrn" typeface="Estrangelo Edessa"/>
+        <a:font script="Syrj" typeface="Estrangelo Edessa"/>
+        <a:font script="Syre" typeface="Estrangelo Edessa"/>
+        <a:font script="Sora" typeface="Nirmala UI"/>
+        <a:font script="Tale" typeface="Microsoft Tai Le"/>
+        <a:font script="Talu" typeface="Microsoft New Tai Lue"/>
+        <a:font script="Tfng" typeface="Ebrima"/>
+      </a:majorFont>
+      <a:minorFont>
+        <a:latin typeface="Calibri" panose="020F0502020204030204"/>
+        <a:ea typeface=""/>
+        <a:cs typeface=""/>
+        <a:font script="Jpan" typeface="游ゴシック"/>
+        <a:font script="Hang" typeface="맑은 고딕"/>
+        <a:font script="Hans" typeface="等线"/>
+        <a:font script="Hant" typeface="新細明體"/>
+        <a:font script="Arab" typeface="Arial"/>
+        <a:font script="Hebr" typeface="Arial"/>
+        <a:font script="Thai" typeface="Cordia New"/>
+        <a:font script="Ethi" typeface="Nyala"/>
+        <a:font script="Beng" typeface="Vrinda"/>
+        <a:font script="Gujr" typeface="Shruti"/>
+        <a:font script="Khmr" typeface="DaunPenh"/>
+        <a:font script="Knda" typeface="Tunga"/>
+        <a:font script="Guru" typeface="Raavi"/>
+        <a:font script="Cans" typeface="Euphemia"/>
+        <a:font script="Cher" typeface="Plantagenet Cherokee"/>
+        <a:font script="Yiii" typeface="Microsoft Yi Baiti"/>
+        <a:font script="Tibt" typeface="Microsoft Himalaya"/>
+        <a:font script="Thaa" typeface="MV Boli"/>
+        <a:font script="Deva" typeface="Mangal"/>
+        <a:font script="Telu" typeface="Gautami"/>
+        <a:font script="Taml" typeface="Latha"/>
+        <a:font script="Syrc" typeface="Estrangelo Edessa"/>
+        <a:font script="Orya" typeface="Kalinga"/>
+        <a:font script="Mlym" typeface="Kartika"/>
+        <a:font script="Laoo" typeface="DokChampa"/>
+        <a:font script="Sinh" typeface="Iskoola Pota"/>
+        <a:font script="Mong" typeface="Mongolian Baiti"/>
+        <a:font script="Viet" typeface="Arial"/>
+        <a:font script="Uigh" typeface="Microsoft Uighur"/>
+        <a:font script="Geor" typeface="Sylfaen"/>
+        <a:font script="Armn" typeface="Arial"/>
+        <a:font script="Bugi" typeface="Leelawadee UI"/>
+        <a:font script="Bopo" typeface="Microsoft JhengHei"/>
+        <a:font script="Java" typeface="Javanese Text"/>
+        <a:font script="Lisu" typeface="Segoe UI"/>
+        <a:font script="Mymr" typeface="Myanmar Text"/>
+        <a:font script="Nkoo" typeface="Ebrima"/>
+        <a:font script="Olck" typeface="Nirmala UI"/>
+        <a:font script="Osma" typeface="Ebrima"/>
+        <a:font script="Phag" typeface="Phagspa"/>
+        <a:font script="Syrn" typeface="Estrangelo Edessa"/>
+        <a:font script="Syrj" typeface="Estrangelo Edessa"/>
+        <a:font script="Syre" typeface="Estrangelo Edessa"/>
+        <a:font script="Sora" typeface="Nirmala UI"/>
+        <a:font script="Tale" typeface="Microsoft Tai Le"/>
+        <a:font script="Talu" typeface="Microsoft New Tai Lue"/>
+        <a:font script="Tfng" typeface="Ebrima"/>
+      </a:minorFont>
+    </a:fontScheme>
+    <a:fmtScheme name="Office">
+      <a:fillStyleLst>
+        <a:solidFill>
+          <a:schemeClr val="phClr"/>
+        </a:solidFill>
+        <a:gradFill rotWithShape="1">
+          <a:gsLst>
+            <a:gs pos="0">
+              <a:schemeClr val="phClr">
+                <a:lumMod val="110000"/>
+                <a:satMod val="105000"/>
+                <a:tint val="67000"/>
+              </a:schemeClr>
+            </a:gs>
+            <a:gs pos="50000">
+              <a:schemeClr val="phClr">
+                <a:lumMod val="105000"/>
+                <a:satMod val="103000"/>
+                <a:tint val="73000"/>
+              </a:schemeClr>
+            </a:gs>
+            <a:gs pos="100000">
+              <a:schemeClr val="phClr">
+                <a:lumMod val="105000"/>
+                <a:satMod val="109000"/>
+                <a:tint val="81000"/>
+              </a:schemeClr>
+            </a:gs>
+          </a:gsLst>
+          <a:lin ang="5400000" scaled="0"/>
+        </a:gradFill>
+        <a:gradFill rotWithShape="1">
+          <a:gsLst>
+            <a:gs pos="0">
+              <a:schemeClr val="phClr">
+                <a:satMod val="103000"/>
+                <a:lumMod val="102000"/>
+                <a:tint val="94000"/>
+              </a:schemeClr>
+            </a:gs>
+            <a:gs pos="50000">
+              <a:schemeClr val="phClr">
+                <a:satMod val="110000"/>
+                <a:lumMod val="100000"/>
+                <a:shade val="100000"/>
+              </a:schemeClr>
+            </a:gs>
+            <a:gs pos="100000">
+              <a:schemeClr val="phClr">
+                <a:lumMod val="99000"/>
+                <a:satMod val="120000"/>
+                <a:shade val="78000"/>
+              </a:schemeClr>
+            </a:gs>
+          </a:gsLst>
+          <a:lin ang="5400000" scaled="0"/>
+        </a:gradFill>
+      </a:fillStyleLst>
+      <a:lnStyleLst>
+        <a:ln w="6350" cap="flat" cmpd="sng" algn="ctr">
+          <a:solidFill>
+            <a:schemeClr val="phClr"/>
+          </a:solidFill>
+          <a:prstDash val="solid"/>
+          <a:miter lim="800000"/>
+        </a:ln>
+        <a:ln w="12700" cap="flat" cmpd="sng" algn="ctr">
+          <a:solidFill>
+            <a:schemeClr val="phClr"/>
+          </a:solidFill>
+          <a:prstDash val="solid"/>
+          <a:miter lim="800000"/>
+        </a:ln>
+        <a:ln w="19050" cap="flat" cmpd="sng" algn="ctr">
+          <a:solidFill>
+            <a:schemeClr val="phClr"/>
+          </a:solidFill>
+          <a:prstDash val="solid"/>
+          <a:miter lim="800000"/>
+        </a:ln>
+      </a:lnStyleLst>
+      <a:effectStyleLst>
+        <a:effectStyle>
+          <a:effectLst/>
+        </a:effectStyle>
+        <a:effectStyle>
+          <a:effectLst/>
+        </a:effectStyle>
+        <a:effectStyle>
+          <a:effectLst>
+            <a:outerShdw blurRad="57150" dist="19050" dir="5400000" algn="ctr" rotWithShape="0">
+              <a:srgbClr val="000000">
+                <a:alpha val="63000"/>
+              </a:srgbClr>
+            </a:outerShdw>
+          </a:effectLst>
+        </a:effectStyle>
+      </a:effectStyleLst>
+      <a:bgFillStyleLst>
+        <a:solidFill>
+          <a:schemeClr val="phClr"/>
+        </a:solidFill>
+        <a:solidFill>
+          <a:schemeClr val="phClr">
+            <a:tint val="95000"/>
+            <a:satMod val="170000"/>
+          </a:schemeClr>
+        </a:solidFill>
+        <a:gradFill rotWithShape="1">
+          <a:gsLst>
+            <a:gs pos="0">
+              <a:schemeClr val="phClr">
+                <a:tint val="93000"/>
+                <a:satMod val="150000"/>
+                <a:shade val="98000"/>
+                <a:lumMod val="102000"/>
+              </a:schemeClr>
+            </a:gs>
+            <a:gs pos="50000">
+              <a:schemeClr val="phClr">
+                <a:tint val="98000"/>
+                <a:satMod val="130000"/>
+                <a:shade val="90000"/>
+                <a:lumMod val="103000"/>
+              </a:schemeClr>
+            </a:gs>
+            <a:gs pos="100000">
+              <a:schemeClr val="phClr">
+                <a:shade val="63000"/>
+                <a:satMod val="120000"/>
+              </a:schemeClr>
+            </a:gs>
+          </a:gsLst>
+          <a:lin ang="5400000" scaled="0"/>
+        </a:gradFill>
+      </a:bgFillStyleLst>
+    </a:fmtScheme>
+  </a:themeElements>
+  <a:objectDefaults/>
+  <a:extraClrSchemeLst/>
+  <a:extLst>
+    <a:ext uri="{05A4C25C-085E-4340-85A3-A5531E510DB2}">
+      <thm15:themeFamily xmlns:thm15="http://schemas.microsoft.com/office/thememl/2012/main" name="Office Theme" id="{62F939B6-93AF-4DB8-9C6B-D6C7DFDC589F}" vid="{4A3C46E8-61CC-4603-A589-7422A47A8E4A}"/>
+    </a:ext>
+  </a:extLst>
+</a:theme>
 </file>
</xml_diff>

<commit_message>
Pojektidee und Recherche ergänzt
</commit_message>
<xml_diff>
--- a/EPWS2223HausenKochZimmer Audit 1.pptx
+++ b/EPWS2223HausenKochZimmer Audit 1.pptx
@@ -5,17 +5,22 @@
     <p:sldMasterId id="2147483648" r:id="rId1"/>
   </p:sldMasterIdLst>
   <p:notesMasterIdLst>
-    <p:notesMasterId r:id="rId10"/>
+    <p:notesMasterId r:id="rId15"/>
   </p:notesMasterIdLst>
   <p:sldIdLst>
     <p:sldId id="256" r:id="rId2"/>
-    <p:sldId id="258" r:id="rId3"/>
-    <p:sldId id="257" r:id="rId4"/>
-    <p:sldId id="259" r:id="rId5"/>
-    <p:sldId id="260" r:id="rId6"/>
-    <p:sldId id="261" r:id="rId7"/>
-    <p:sldId id="262" r:id="rId8"/>
-    <p:sldId id="263" r:id="rId9"/>
+    <p:sldId id="264" r:id="rId3"/>
+    <p:sldId id="265" r:id="rId4"/>
+    <p:sldId id="266" r:id="rId5"/>
+    <p:sldId id="258" r:id="rId6"/>
+    <p:sldId id="267" r:id="rId7"/>
+    <p:sldId id="268" r:id="rId8"/>
+    <p:sldId id="257" r:id="rId9"/>
+    <p:sldId id="259" r:id="rId10"/>
+    <p:sldId id="260" r:id="rId11"/>
+    <p:sldId id="261" r:id="rId12"/>
+    <p:sldId id="262" r:id="rId13"/>
+    <p:sldId id="263" r:id="rId14"/>
   </p:sldIdLst>
   <p:sldSz cx="12192000" cy="6858000"/>
   <p:notesSz cx="6858000" cy="9144000"/>
@@ -120,7 +125,24 @@
         <p14:section name="Standardabschnitt" id="{FE2716BC-FBA1-4CF5-ADA1-DE97E19B0E62}">
           <p14:sldIdLst>
             <p14:sldId id="256"/>
+          </p14:sldIdLst>
+        </p14:section>
+        <p14:section name="Erste Projekt Ideen" id="{4C39790B-862A-4FB0-9200-E8CFAD39A9BC}">
+          <p14:sldIdLst>
+            <p14:sldId id="264"/>
+            <p14:sldId id="265"/>
+            <p14:sldId id="266"/>
+          </p14:sldIdLst>
+        </p14:section>
+        <p14:section name="Domänenrecherche" id="{7C7F5EC0-A930-4C25-8F19-98ED011C63EE}">
+          <p14:sldIdLst>
             <p14:sldId id="258"/>
+            <p14:sldId id="267"/>
+          </p14:sldIdLst>
+        </p14:section>
+        <p14:section name="Aktuelles Expose" id="{ECAE9797-AB5F-4EC6-AE1D-72BE3901F64B}">
+          <p14:sldIdLst>
+            <p14:sldId id="268"/>
           </p14:sldIdLst>
         </p14:section>
         <p14:section name="Domänenmodell" id="{7C162E14-0EE3-4924-8DA4-BC6CB0A0102C}">
@@ -532,10 +554,9 @@
           <a:bodyPr/>
           <a:lstStyle/>
           <a:p>
-            <a:pPr algn="l"/>
             <a:r>
               <a:rPr lang="de-DE" dirty="0"/>
-              <a:t>Entstand im Anschluss der Domänenrecherche durch Philipp. Zeigt die ersten Identifizierten Akteure der Domäne und den versuche deren Verbindungen dazustellen. </a:t>
+              <a:t>Andere Projekt Ideen, welche durch einen Austausch vorgestellt wurden und im Team grob umrissen und bewertet wurden.</a:t>
             </a:r>
           </a:p>
         </p:txBody>
@@ -557,7 +578,7 @@
           <a:p>
             <a:fld id="{92DF0825-AC8F-4116-B49B-4A4F75013D61}" type="slidenum">
               <a:rPr lang="de-DE" smtClean="0"/>
-              <a:t>3</a:t>
+              <a:t>2</a:t>
             </a:fld>
             <a:endParaRPr lang="de-DE"/>
           </a:p>
@@ -566,7 +587,7 @@
     </p:spTree>
     <p:extLst>
       <p:ext uri="{BB962C8B-B14F-4D97-AF65-F5344CB8AC3E}">
-        <p14:creationId xmlns:p14="http://schemas.microsoft.com/office/powerpoint/2010/main" val="759147561"/>
+        <p14:creationId xmlns:p14="http://schemas.microsoft.com/office/powerpoint/2010/main" val="3440827475"/>
       </p:ext>
     </p:extLst>
   </p:cSld>
@@ -622,7 +643,7 @@
           <a:p>
             <a:r>
               <a:rPr lang="de-DE" dirty="0"/>
-              <a:t>Iteration zum Ordnen und Anpassen der Verbindungen durch Sebastian. Die vorige Modell Iteration war unübersichtlicher und wurde in diesem Schritt dementsprechend verbessert.</a:t>
+              <a:t>Bei der ersten Version unsere Projekt Idee konnten wir uns einige unsere Fragen nicht beantworten und einige Punkte waren noch unklar.</a:t>
             </a:r>
           </a:p>
         </p:txBody>
@@ -653,7 +674,7 @@
     </p:spTree>
     <p:extLst>
       <p:ext uri="{BB962C8B-B14F-4D97-AF65-F5344CB8AC3E}">
-        <p14:creationId xmlns:p14="http://schemas.microsoft.com/office/powerpoint/2010/main" val="2336962558"/>
+        <p14:creationId xmlns:p14="http://schemas.microsoft.com/office/powerpoint/2010/main" val="3288880427"/>
       </p:ext>
     </p:extLst>
   </p:cSld>
@@ -709,7 +730,7 @@
           <a:p>
             <a:r>
               <a:rPr lang="de-DE" dirty="0"/>
-              <a:t>Einfügen von Hilfsentitäten und deren Verbindungen durch Sebastian. Nach dem in der vorherigen Modell Iteration die Übersichtlichkeit geschaffen wurde, wurde eine Verbesserung der Akteure durch Hilfsentitäten durchgeführt.</a:t>
+              <a:t>Das Ergebnis der Domänenrecherche war, dass wir nicht an digitale historische Karten für unsere erste Projekt Idee kommen.  Die Karten Anzahl insbesondere für die Stadt Gummersbach haben wir als zu wenig befunden, um einen Einblick über die Jahrhunderte liefern zu können.</a:t>
             </a:r>
           </a:p>
         </p:txBody>
@@ -731,7 +752,7 @@
           <a:p>
             <a:fld id="{92DF0825-AC8F-4116-B49B-4A4F75013D61}" type="slidenum">
               <a:rPr lang="de-DE" smtClean="0"/>
-              <a:t>5</a:t>
+              <a:t>6</a:t>
             </a:fld>
             <a:endParaRPr lang="de-DE"/>
           </a:p>
@@ -740,7 +761,7 @@
     </p:spTree>
     <p:extLst>
       <p:ext uri="{BB962C8B-B14F-4D97-AF65-F5344CB8AC3E}">
-        <p14:creationId xmlns:p14="http://schemas.microsoft.com/office/powerpoint/2010/main" val="3201380577"/>
+        <p14:creationId xmlns:p14="http://schemas.microsoft.com/office/powerpoint/2010/main" val="2171663258"/>
       </p:ext>
     </p:extLst>
   </p:cSld>
@@ -796,7 +817,15 @@
           <a:p>
             <a:r>
               <a:rPr lang="de-DE" dirty="0"/>
-              <a:t>Vereinfachung des Modells und Sortierung zu logischen clustern. In dieser Iteration des Modells wurde die Unübersichtlichkeit der vorherigen Iteration durch Vereinfachung und Clusterung bearbeitet. Bei den Verbindungen die Beziehungen Konkretisiert um kann Beziehungen adäquat darzustellen.</a:t>
+              <a:t>Durch die Domänenrecherche und dem Besprechen im </a:t>
+            </a:r>
+            <a:r>
+              <a:rPr lang="de-DE" dirty="0" err="1"/>
+              <a:t>Openspace</a:t>
+            </a:r>
+            <a:r>
+              <a:rPr lang="de-DE" dirty="0"/>
+              <a:t> haben wir die Problemstellung auf das nicht vorhanden sein von historischen Karten bezogen und eine Anpassung in Hinsicht auf Erhebung von bildlichen und ergänzend textlichen Quellen durchgeführt.</a:t>
             </a:r>
           </a:p>
         </p:txBody>
@@ -818,7 +847,7 @@
           <a:p>
             <a:fld id="{92DF0825-AC8F-4116-B49B-4A4F75013D61}" type="slidenum">
               <a:rPr lang="de-DE" smtClean="0"/>
-              <a:t>6</a:t>
+              <a:t>7</a:t>
             </a:fld>
             <a:endParaRPr lang="de-DE"/>
           </a:p>
@@ -827,7 +856,7 @@
     </p:spTree>
     <p:extLst>
       <p:ext uri="{BB962C8B-B14F-4D97-AF65-F5344CB8AC3E}">
-        <p14:creationId xmlns:p14="http://schemas.microsoft.com/office/powerpoint/2010/main" val="3630828092"/>
+        <p14:creationId xmlns:p14="http://schemas.microsoft.com/office/powerpoint/2010/main" val="2987340625"/>
       </p:ext>
     </p:extLst>
   </p:cSld>
@@ -881,6 +910,355 @@
           <a:bodyPr/>
           <a:lstStyle/>
           <a:p>
+            <a:pPr algn="l"/>
+            <a:r>
+              <a:rPr lang="de-DE" dirty="0"/>
+              <a:t>Entstand im Anschluss der Domänenrecherche durch Philipp. Zeigt die ersten Identifizierten Akteure der Domäne und den versuche deren Verbindungen dazustellen. </a:t>
+            </a:r>
+          </a:p>
+        </p:txBody>
+      </p:sp>
+      <p:sp>
+        <p:nvSpPr>
+          <p:cNvPr id="4" name="Foliennummernplatzhalter 3"/>
+          <p:cNvSpPr>
+            <a:spLocks noGrp="1"/>
+          </p:cNvSpPr>
+          <p:nvPr>
+            <p:ph type="sldNum" sz="quarter" idx="5"/>
+          </p:nvPr>
+        </p:nvSpPr>
+        <p:spPr/>
+        <p:txBody>
+          <a:bodyPr/>
+          <a:lstStyle/>
+          <a:p>
+            <a:fld id="{92DF0825-AC8F-4116-B49B-4A4F75013D61}" type="slidenum">
+              <a:rPr lang="de-DE" smtClean="0"/>
+              <a:t>8</a:t>
+            </a:fld>
+            <a:endParaRPr lang="de-DE"/>
+          </a:p>
+        </p:txBody>
+      </p:sp>
+    </p:spTree>
+    <p:extLst>
+      <p:ext uri="{BB962C8B-B14F-4D97-AF65-F5344CB8AC3E}">
+        <p14:creationId xmlns:p14="http://schemas.microsoft.com/office/powerpoint/2010/main" val="759147561"/>
+      </p:ext>
+    </p:extLst>
+  </p:cSld>
+  <p:clrMapOvr>
+    <a:masterClrMapping/>
+  </p:clrMapOvr>
+</p:notes>
+</file>
+
+<file path=ppt/notesSlides/notesSlide6.xml><?xml version="1.0" encoding="utf-8"?>
+<p:notes xmlns:a="http://schemas.openxmlformats.org/drawingml/2006/main" xmlns:r="http://schemas.openxmlformats.org/officeDocument/2006/relationships" xmlns:p="http://schemas.openxmlformats.org/presentationml/2006/main">
+  <p:cSld>
+    <p:spTree>
+      <p:nvGrpSpPr>
+        <p:cNvPr id="1" name=""/>
+        <p:cNvGrpSpPr/>
+        <p:nvPr/>
+      </p:nvGrpSpPr>
+      <p:grpSpPr>
+        <a:xfrm>
+          <a:off x="0" y="0"/>
+          <a:ext cx="0" cy="0"/>
+          <a:chOff x="0" y="0"/>
+          <a:chExt cx="0" cy="0"/>
+        </a:xfrm>
+      </p:grpSpPr>
+      <p:sp>
+        <p:nvSpPr>
+          <p:cNvPr id="2" name="Folienbildplatzhalter 1"/>
+          <p:cNvSpPr>
+            <a:spLocks noGrp="1" noRot="1" noChangeAspect="1"/>
+          </p:cNvSpPr>
+          <p:nvPr>
+            <p:ph type="sldImg"/>
+          </p:nvPr>
+        </p:nvSpPr>
+        <p:spPr/>
+      </p:sp>
+      <p:sp>
+        <p:nvSpPr>
+          <p:cNvPr id="3" name="Notizenplatzhalter 2"/>
+          <p:cNvSpPr>
+            <a:spLocks noGrp="1"/>
+          </p:cNvSpPr>
+          <p:nvPr>
+            <p:ph type="body" idx="1"/>
+          </p:nvPr>
+        </p:nvSpPr>
+        <p:spPr/>
+        <p:txBody>
+          <a:bodyPr/>
+          <a:lstStyle/>
+          <a:p>
+            <a:r>
+              <a:rPr lang="de-DE" dirty="0"/>
+              <a:t>Iteration zum Ordnen und Anpassen der Verbindungen durch Sebastian. Die vorige Modell Iteration war unübersichtlicher und wurde in diesem Schritt dementsprechend verbessert.</a:t>
+            </a:r>
+          </a:p>
+        </p:txBody>
+      </p:sp>
+      <p:sp>
+        <p:nvSpPr>
+          <p:cNvPr id="4" name="Foliennummernplatzhalter 3"/>
+          <p:cNvSpPr>
+            <a:spLocks noGrp="1"/>
+          </p:cNvSpPr>
+          <p:nvPr>
+            <p:ph type="sldNum" sz="quarter" idx="5"/>
+          </p:nvPr>
+        </p:nvSpPr>
+        <p:spPr/>
+        <p:txBody>
+          <a:bodyPr/>
+          <a:lstStyle/>
+          <a:p>
+            <a:fld id="{92DF0825-AC8F-4116-B49B-4A4F75013D61}" type="slidenum">
+              <a:rPr lang="de-DE" smtClean="0"/>
+              <a:t>9</a:t>
+            </a:fld>
+            <a:endParaRPr lang="de-DE"/>
+          </a:p>
+        </p:txBody>
+      </p:sp>
+    </p:spTree>
+    <p:extLst>
+      <p:ext uri="{BB962C8B-B14F-4D97-AF65-F5344CB8AC3E}">
+        <p14:creationId xmlns:p14="http://schemas.microsoft.com/office/powerpoint/2010/main" val="2336962558"/>
+      </p:ext>
+    </p:extLst>
+  </p:cSld>
+  <p:clrMapOvr>
+    <a:masterClrMapping/>
+  </p:clrMapOvr>
+</p:notes>
+</file>
+
+<file path=ppt/notesSlides/notesSlide7.xml><?xml version="1.0" encoding="utf-8"?>
+<p:notes xmlns:a="http://schemas.openxmlformats.org/drawingml/2006/main" xmlns:r="http://schemas.openxmlformats.org/officeDocument/2006/relationships" xmlns:p="http://schemas.openxmlformats.org/presentationml/2006/main">
+  <p:cSld>
+    <p:spTree>
+      <p:nvGrpSpPr>
+        <p:cNvPr id="1" name=""/>
+        <p:cNvGrpSpPr/>
+        <p:nvPr/>
+      </p:nvGrpSpPr>
+      <p:grpSpPr>
+        <a:xfrm>
+          <a:off x="0" y="0"/>
+          <a:ext cx="0" cy="0"/>
+          <a:chOff x="0" y="0"/>
+          <a:chExt cx="0" cy="0"/>
+        </a:xfrm>
+      </p:grpSpPr>
+      <p:sp>
+        <p:nvSpPr>
+          <p:cNvPr id="2" name="Folienbildplatzhalter 1"/>
+          <p:cNvSpPr>
+            <a:spLocks noGrp="1" noRot="1" noChangeAspect="1"/>
+          </p:cNvSpPr>
+          <p:nvPr>
+            <p:ph type="sldImg"/>
+          </p:nvPr>
+        </p:nvSpPr>
+        <p:spPr/>
+      </p:sp>
+      <p:sp>
+        <p:nvSpPr>
+          <p:cNvPr id="3" name="Notizenplatzhalter 2"/>
+          <p:cNvSpPr>
+            <a:spLocks noGrp="1"/>
+          </p:cNvSpPr>
+          <p:nvPr>
+            <p:ph type="body" idx="1"/>
+          </p:nvPr>
+        </p:nvSpPr>
+        <p:spPr/>
+        <p:txBody>
+          <a:bodyPr/>
+          <a:lstStyle/>
+          <a:p>
+            <a:r>
+              <a:rPr lang="de-DE" dirty="0"/>
+              <a:t>Einfügen von Hilfsentitäten und deren Verbindungen durch Sebastian. Nach dem in der vorherigen Modell Iteration die Übersichtlichkeit geschaffen wurde, wurde eine Verbesserung der Akteure durch Hilfsentitäten durchgeführt.</a:t>
+            </a:r>
+          </a:p>
+        </p:txBody>
+      </p:sp>
+      <p:sp>
+        <p:nvSpPr>
+          <p:cNvPr id="4" name="Foliennummernplatzhalter 3"/>
+          <p:cNvSpPr>
+            <a:spLocks noGrp="1"/>
+          </p:cNvSpPr>
+          <p:nvPr>
+            <p:ph type="sldNum" sz="quarter" idx="5"/>
+          </p:nvPr>
+        </p:nvSpPr>
+        <p:spPr/>
+        <p:txBody>
+          <a:bodyPr/>
+          <a:lstStyle/>
+          <a:p>
+            <a:fld id="{92DF0825-AC8F-4116-B49B-4A4F75013D61}" type="slidenum">
+              <a:rPr lang="de-DE" smtClean="0"/>
+              <a:t>10</a:t>
+            </a:fld>
+            <a:endParaRPr lang="de-DE"/>
+          </a:p>
+        </p:txBody>
+      </p:sp>
+    </p:spTree>
+    <p:extLst>
+      <p:ext uri="{BB962C8B-B14F-4D97-AF65-F5344CB8AC3E}">
+        <p14:creationId xmlns:p14="http://schemas.microsoft.com/office/powerpoint/2010/main" val="3201380577"/>
+      </p:ext>
+    </p:extLst>
+  </p:cSld>
+  <p:clrMapOvr>
+    <a:masterClrMapping/>
+  </p:clrMapOvr>
+</p:notes>
+</file>
+
+<file path=ppt/notesSlides/notesSlide8.xml><?xml version="1.0" encoding="utf-8"?>
+<p:notes xmlns:a="http://schemas.openxmlformats.org/drawingml/2006/main" xmlns:r="http://schemas.openxmlformats.org/officeDocument/2006/relationships" xmlns:p="http://schemas.openxmlformats.org/presentationml/2006/main">
+  <p:cSld>
+    <p:spTree>
+      <p:nvGrpSpPr>
+        <p:cNvPr id="1" name=""/>
+        <p:cNvGrpSpPr/>
+        <p:nvPr/>
+      </p:nvGrpSpPr>
+      <p:grpSpPr>
+        <a:xfrm>
+          <a:off x="0" y="0"/>
+          <a:ext cx="0" cy="0"/>
+          <a:chOff x="0" y="0"/>
+          <a:chExt cx="0" cy="0"/>
+        </a:xfrm>
+      </p:grpSpPr>
+      <p:sp>
+        <p:nvSpPr>
+          <p:cNvPr id="2" name="Folienbildplatzhalter 1"/>
+          <p:cNvSpPr>
+            <a:spLocks noGrp="1" noRot="1" noChangeAspect="1"/>
+          </p:cNvSpPr>
+          <p:nvPr>
+            <p:ph type="sldImg"/>
+          </p:nvPr>
+        </p:nvSpPr>
+        <p:spPr/>
+      </p:sp>
+      <p:sp>
+        <p:nvSpPr>
+          <p:cNvPr id="3" name="Notizenplatzhalter 2"/>
+          <p:cNvSpPr>
+            <a:spLocks noGrp="1"/>
+          </p:cNvSpPr>
+          <p:nvPr>
+            <p:ph type="body" idx="1"/>
+          </p:nvPr>
+        </p:nvSpPr>
+        <p:spPr/>
+        <p:txBody>
+          <a:bodyPr/>
+          <a:lstStyle/>
+          <a:p>
+            <a:r>
+              <a:rPr lang="de-DE" dirty="0"/>
+              <a:t>Vereinfachung des Modells und Sortierung zu logischen clustern. In dieser Iteration des Modells wurde die Unübersichtlichkeit der vorherigen Iteration durch Vereinfachung und Clusterung bearbeitet. Bei den Verbindungen die Beziehungen Konkretisiert um kann Beziehungen adäquat darzustellen.</a:t>
+            </a:r>
+          </a:p>
+        </p:txBody>
+      </p:sp>
+      <p:sp>
+        <p:nvSpPr>
+          <p:cNvPr id="4" name="Foliennummernplatzhalter 3"/>
+          <p:cNvSpPr>
+            <a:spLocks noGrp="1"/>
+          </p:cNvSpPr>
+          <p:nvPr>
+            <p:ph type="sldNum" sz="quarter" idx="5"/>
+          </p:nvPr>
+        </p:nvSpPr>
+        <p:spPr/>
+        <p:txBody>
+          <a:bodyPr/>
+          <a:lstStyle/>
+          <a:p>
+            <a:fld id="{92DF0825-AC8F-4116-B49B-4A4F75013D61}" type="slidenum">
+              <a:rPr lang="de-DE" smtClean="0"/>
+              <a:t>11</a:t>
+            </a:fld>
+            <a:endParaRPr lang="de-DE"/>
+          </a:p>
+        </p:txBody>
+      </p:sp>
+    </p:spTree>
+    <p:extLst>
+      <p:ext uri="{BB962C8B-B14F-4D97-AF65-F5344CB8AC3E}">
+        <p14:creationId xmlns:p14="http://schemas.microsoft.com/office/powerpoint/2010/main" val="3630828092"/>
+      </p:ext>
+    </p:extLst>
+  </p:cSld>
+  <p:clrMapOvr>
+    <a:masterClrMapping/>
+  </p:clrMapOvr>
+</p:notes>
+</file>
+
+<file path=ppt/notesSlides/notesSlide9.xml><?xml version="1.0" encoding="utf-8"?>
+<p:notes xmlns:a="http://schemas.openxmlformats.org/drawingml/2006/main" xmlns:r="http://schemas.openxmlformats.org/officeDocument/2006/relationships" xmlns:p="http://schemas.openxmlformats.org/presentationml/2006/main">
+  <p:cSld>
+    <p:spTree>
+      <p:nvGrpSpPr>
+        <p:cNvPr id="1" name=""/>
+        <p:cNvGrpSpPr/>
+        <p:nvPr/>
+      </p:nvGrpSpPr>
+      <p:grpSpPr>
+        <a:xfrm>
+          <a:off x="0" y="0"/>
+          <a:ext cx="0" cy="0"/>
+          <a:chOff x="0" y="0"/>
+          <a:chExt cx="0" cy="0"/>
+        </a:xfrm>
+      </p:grpSpPr>
+      <p:sp>
+        <p:nvSpPr>
+          <p:cNvPr id="2" name="Folienbildplatzhalter 1"/>
+          <p:cNvSpPr>
+            <a:spLocks noGrp="1" noRot="1" noChangeAspect="1"/>
+          </p:cNvSpPr>
+          <p:nvPr>
+            <p:ph type="sldImg"/>
+          </p:nvPr>
+        </p:nvSpPr>
+        <p:spPr/>
+      </p:sp>
+      <p:sp>
+        <p:nvSpPr>
+          <p:cNvPr id="3" name="Notizenplatzhalter 2"/>
+          <p:cNvSpPr>
+            <a:spLocks noGrp="1"/>
+          </p:cNvSpPr>
+          <p:nvPr>
+            <p:ph type="body" idx="1"/>
+          </p:nvPr>
+        </p:nvSpPr>
+        <p:spPr/>
+        <p:txBody>
+          <a:bodyPr/>
+          <a:lstStyle/>
+          <a:p>
             <a:r>
               <a:rPr lang="de-DE" dirty="0"/>
               <a:t>Erweiterung des Modells um weitere Akteure und Hilfsentitäten durch Frederik. Durch Besprechungen der vorigen Iteration sind ein paar weitere Akteure sowie Hilfsidentitäten Identifiziert worden.</a:t>
@@ -905,7 +1283,7 @@
           <a:p>
             <a:fld id="{92DF0825-AC8F-4116-B49B-4A4F75013D61}" type="slidenum">
               <a:rPr lang="de-DE" smtClean="0"/>
-              <a:t>7</a:t>
+              <a:t>12</a:t>
             </a:fld>
             <a:endParaRPr lang="de-DE"/>
           </a:p>
@@ -4249,6 +4627,362 @@
 </p:sld>
 </file>
 
+<file path=ppt/slides/slide10.xml><?xml version="1.0" encoding="utf-8"?>
+<p:sld xmlns:a="http://schemas.openxmlformats.org/drawingml/2006/main" xmlns:r="http://schemas.openxmlformats.org/officeDocument/2006/relationships" xmlns:p="http://schemas.openxmlformats.org/presentationml/2006/main">
+  <p:cSld>
+    <p:spTree>
+      <p:nvGrpSpPr>
+        <p:cNvPr id="1" name=""/>
+        <p:cNvGrpSpPr/>
+        <p:nvPr/>
+      </p:nvGrpSpPr>
+      <p:grpSpPr>
+        <a:xfrm>
+          <a:off x="0" y="0"/>
+          <a:ext cx="0" cy="0"/>
+          <a:chOff x="0" y="0"/>
+          <a:chExt cx="0" cy="0"/>
+        </a:xfrm>
+      </p:grpSpPr>
+      <p:sp>
+        <p:nvSpPr>
+          <p:cNvPr id="2" name="Titel 1">
+            <a:extLst>
+              <a:ext uri="{FF2B5EF4-FFF2-40B4-BE49-F238E27FC236}">
+                <a16:creationId xmlns:a16="http://schemas.microsoft.com/office/drawing/2014/main" id="{111CE7B0-EAAA-0A0A-5559-AD82A1546E93}"/>
+              </a:ext>
+            </a:extLst>
+          </p:cNvPr>
+          <p:cNvSpPr>
+            <a:spLocks noGrp="1"/>
+          </p:cNvSpPr>
+          <p:nvPr>
+            <p:ph type="title"/>
+          </p:nvPr>
+        </p:nvSpPr>
+        <p:spPr/>
+        <p:txBody>
+          <a:bodyPr/>
+          <a:lstStyle/>
+          <a:p>
+            <a:pPr algn="ctr"/>
+            <a:r>
+              <a:rPr lang="de-DE" dirty="0"/>
+              <a:t>Version 0.8.7</a:t>
+            </a:r>
+          </a:p>
+        </p:txBody>
+      </p:sp>
+      <p:pic>
+        <p:nvPicPr>
+          <p:cNvPr id="4" name="Grafik 3">
+            <a:extLst>
+              <a:ext uri="{FF2B5EF4-FFF2-40B4-BE49-F238E27FC236}">
+                <a16:creationId xmlns:a16="http://schemas.microsoft.com/office/drawing/2014/main" id="{4C4F586D-9911-8887-C71F-EA90B9421591}"/>
+              </a:ext>
+            </a:extLst>
+          </p:cNvPr>
+          <p:cNvPicPr>
+            <a:picLocks noChangeAspect="1"/>
+          </p:cNvPicPr>
+          <p:nvPr/>
+        </p:nvPicPr>
+        <p:blipFill>
+          <a:blip r:embed="rId3"/>
+          <a:stretch>
+            <a:fillRect/>
+          </a:stretch>
+        </p:blipFill>
+        <p:spPr>
+          <a:xfrm>
+            <a:off x="2435289" y="1690688"/>
+            <a:ext cx="8739675" cy="5015871"/>
+          </a:xfrm>
+          <a:prstGeom prst="rect">
+            <a:avLst/>
+          </a:prstGeom>
+        </p:spPr>
+      </p:pic>
+    </p:spTree>
+    <p:extLst>
+      <p:ext uri="{BB962C8B-B14F-4D97-AF65-F5344CB8AC3E}">
+        <p14:creationId xmlns:p14="http://schemas.microsoft.com/office/powerpoint/2010/main" val="2718715793"/>
+      </p:ext>
+    </p:extLst>
+  </p:cSld>
+  <p:clrMapOvr>
+    <a:masterClrMapping/>
+  </p:clrMapOvr>
+</p:sld>
+</file>
+
+<file path=ppt/slides/slide11.xml><?xml version="1.0" encoding="utf-8"?>
+<p:sld xmlns:a="http://schemas.openxmlformats.org/drawingml/2006/main" xmlns:r="http://schemas.openxmlformats.org/officeDocument/2006/relationships" xmlns:p="http://schemas.openxmlformats.org/presentationml/2006/main">
+  <p:cSld>
+    <p:spTree>
+      <p:nvGrpSpPr>
+        <p:cNvPr id="1" name=""/>
+        <p:cNvGrpSpPr/>
+        <p:nvPr/>
+      </p:nvGrpSpPr>
+      <p:grpSpPr>
+        <a:xfrm>
+          <a:off x="0" y="0"/>
+          <a:ext cx="0" cy="0"/>
+          <a:chOff x="0" y="0"/>
+          <a:chExt cx="0" cy="0"/>
+        </a:xfrm>
+      </p:grpSpPr>
+      <p:sp>
+        <p:nvSpPr>
+          <p:cNvPr id="2" name="Titel 1">
+            <a:extLst>
+              <a:ext uri="{FF2B5EF4-FFF2-40B4-BE49-F238E27FC236}">
+                <a16:creationId xmlns:a16="http://schemas.microsoft.com/office/drawing/2014/main" id="{6F9E02DB-F2A0-8153-53F3-E6599863E214}"/>
+              </a:ext>
+            </a:extLst>
+          </p:cNvPr>
+          <p:cNvSpPr>
+            <a:spLocks noGrp="1"/>
+          </p:cNvSpPr>
+          <p:nvPr>
+            <p:ph type="title"/>
+          </p:nvPr>
+        </p:nvSpPr>
+        <p:spPr/>
+        <p:txBody>
+          <a:bodyPr/>
+          <a:lstStyle/>
+          <a:p>
+            <a:pPr algn="ctr"/>
+            <a:r>
+              <a:rPr lang="de-DE" dirty="0"/>
+              <a:t>Version 0.9</a:t>
+            </a:r>
+          </a:p>
+        </p:txBody>
+      </p:sp>
+      <p:pic>
+        <p:nvPicPr>
+          <p:cNvPr id="4" name="Grafik 3">
+            <a:extLst>
+              <a:ext uri="{FF2B5EF4-FFF2-40B4-BE49-F238E27FC236}">
+                <a16:creationId xmlns:a16="http://schemas.microsoft.com/office/drawing/2014/main" id="{6F930390-8741-BF8E-2D7C-F09319C83946}"/>
+              </a:ext>
+            </a:extLst>
+          </p:cNvPr>
+          <p:cNvPicPr>
+            <a:picLocks noChangeAspect="1"/>
+          </p:cNvPicPr>
+          <p:nvPr/>
+        </p:nvPicPr>
+        <p:blipFill>
+          <a:blip r:embed="rId3"/>
+          <a:stretch>
+            <a:fillRect/>
+          </a:stretch>
+        </p:blipFill>
+        <p:spPr>
+          <a:xfrm>
+            <a:off x="3538281" y="1877300"/>
+            <a:ext cx="5115437" cy="4689150"/>
+          </a:xfrm>
+          <a:prstGeom prst="rect">
+            <a:avLst/>
+          </a:prstGeom>
+        </p:spPr>
+      </p:pic>
+    </p:spTree>
+    <p:extLst>
+      <p:ext uri="{BB962C8B-B14F-4D97-AF65-F5344CB8AC3E}">
+        <p14:creationId xmlns:p14="http://schemas.microsoft.com/office/powerpoint/2010/main" val="4156003571"/>
+      </p:ext>
+    </p:extLst>
+  </p:cSld>
+  <p:clrMapOvr>
+    <a:masterClrMapping/>
+  </p:clrMapOvr>
+</p:sld>
+</file>
+
+<file path=ppt/slides/slide12.xml><?xml version="1.0" encoding="utf-8"?>
+<p:sld xmlns:a="http://schemas.openxmlformats.org/drawingml/2006/main" xmlns:r="http://schemas.openxmlformats.org/officeDocument/2006/relationships" xmlns:p="http://schemas.openxmlformats.org/presentationml/2006/main">
+  <p:cSld>
+    <p:spTree>
+      <p:nvGrpSpPr>
+        <p:cNvPr id="1" name=""/>
+        <p:cNvGrpSpPr/>
+        <p:nvPr/>
+      </p:nvGrpSpPr>
+      <p:grpSpPr>
+        <a:xfrm>
+          <a:off x="0" y="0"/>
+          <a:ext cx="0" cy="0"/>
+          <a:chOff x="0" y="0"/>
+          <a:chExt cx="0" cy="0"/>
+        </a:xfrm>
+      </p:grpSpPr>
+      <p:sp>
+        <p:nvSpPr>
+          <p:cNvPr id="2" name="Titel 1">
+            <a:extLst>
+              <a:ext uri="{FF2B5EF4-FFF2-40B4-BE49-F238E27FC236}">
+                <a16:creationId xmlns:a16="http://schemas.microsoft.com/office/drawing/2014/main" id="{7E8204F1-D296-3CE9-0644-6C2978421B6A}"/>
+              </a:ext>
+            </a:extLst>
+          </p:cNvPr>
+          <p:cNvSpPr>
+            <a:spLocks noGrp="1"/>
+          </p:cNvSpPr>
+          <p:nvPr>
+            <p:ph type="title"/>
+          </p:nvPr>
+        </p:nvSpPr>
+        <p:spPr/>
+        <p:txBody>
+          <a:bodyPr/>
+          <a:lstStyle/>
+          <a:p>
+            <a:pPr algn="ctr"/>
+            <a:r>
+              <a:rPr lang="de-DE" dirty="0"/>
+              <a:t>Version 0.10</a:t>
+            </a:r>
+          </a:p>
+        </p:txBody>
+      </p:sp>
+      <p:pic>
+        <p:nvPicPr>
+          <p:cNvPr id="4" name="Grafik 3">
+            <a:extLst>
+              <a:ext uri="{FF2B5EF4-FFF2-40B4-BE49-F238E27FC236}">
+                <a16:creationId xmlns:a16="http://schemas.microsoft.com/office/drawing/2014/main" id="{37285A09-5313-B652-F195-3EF86E9ABD22}"/>
+              </a:ext>
+            </a:extLst>
+          </p:cNvPr>
+          <p:cNvPicPr>
+            <a:picLocks noChangeAspect="1"/>
+          </p:cNvPicPr>
+          <p:nvPr/>
+        </p:nvPicPr>
+        <p:blipFill>
+          <a:blip r:embed="rId3"/>
+          <a:stretch>
+            <a:fillRect/>
+          </a:stretch>
+        </p:blipFill>
+        <p:spPr>
+          <a:xfrm>
+            <a:off x="3502523" y="1690688"/>
+            <a:ext cx="5186953" cy="4943814"/>
+          </a:xfrm>
+          <a:prstGeom prst="rect">
+            <a:avLst/>
+          </a:prstGeom>
+        </p:spPr>
+      </p:pic>
+    </p:spTree>
+    <p:extLst>
+      <p:ext uri="{BB962C8B-B14F-4D97-AF65-F5344CB8AC3E}">
+        <p14:creationId xmlns:p14="http://schemas.microsoft.com/office/powerpoint/2010/main" val="654925431"/>
+      </p:ext>
+    </p:extLst>
+  </p:cSld>
+  <p:clrMapOvr>
+    <a:masterClrMapping/>
+  </p:clrMapOvr>
+</p:sld>
+</file>
+
+<file path=ppt/slides/slide13.xml><?xml version="1.0" encoding="utf-8"?>
+<p:sld xmlns:a="http://schemas.openxmlformats.org/drawingml/2006/main" xmlns:r="http://schemas.openxmlformats.org/officeDocument/2006/relationships" xmlns:p="http://schemas.openxmlformats.org/presentationml/2006/main">
+  <p:cSld>
+    <p:spTree>
+      <p:nvGrpSpPr>
+        <p:cNvPr id="1" name=""/>
+        <p:cNvGrpSpPr/>
+        <p:nvPr/>
+      </p:nvGrpSpPr>
+      <p:grpSpPr>
+        <a:xfrm>
+          <a:off x="0" y="0"/>
+          <a:ext cx="0" cy="0"/>
+          <a:chOff x="0" y="0"/>
+          <a:chExt cx="0" cy="0"/>
+        </a:xfrm>
+      </p:grpSpPr>
+      <p:sp>
+        <p:nvSpPr>
+          <p:cNvPr id="2" name="Titel 1">
+            <a:extLst>
+              <a:ext uri="{FF2B5EF4-FFF2-40B4-BE49-F238E27FC236}">
+                <a16:creationId xmlns:a16="http://schemas.microsoft.com/office/drawing/2014/main" id="{0A402FAF-07B6-FB6C-C0DE-8500FB3F8FC7}"/>
+              </a:ext>
+            </a:extLst>
+          </p:cNvPr>
+          <p:cNvSpPr>
+            <a:spLocks noGrp="1"/>
+          </p:cNvSpPr>
+          <p:nvPr>
+            <p:ph type="title"/>
+          </p:nvPr>
+        </p:nvSpPr>
+        <p:spPr/>
+        <p:txBody>
+          <a:bodyPr/>
+          <a:lstStyle/>
+          <a:p>
+            <a:pPr algn="ctr"/>
+            <a:r>
+              <a:rPr lang="de-DE" dirty="0"/>
+              <a:t>Version 1.0</a:t>
+            </a:r>
+          </a:p>
+        </p:txBody>
+      </p:sp>
+      <p:pic>
+        <p:nvPicPr>
+          <p:cNvPr id="4" name="Grafik 3">
+            <a:extLst>
+              <a:ext uri="{FF2B5EF4-FFF2-40B4-BE49-F238E27FC236}">
+                <a16:creationId xmlns:a16="http://schemas.microsoft.com/office/drawing/2014/main" id="{CCFDA49A-B683-BF9F-03A2-CC51059F9734}"/>
+              </a:ext>
+            </a:extLst>
+          </p:cNvPr>
+          <p:cNvPicPr>
+            <a:picLocks noChangeAspect="1"/>
+          </p:cNvPicPr>
+          <p:nvPr/>
+        </p:nvPicPr>
+        <p:blipFill>
+          <a:blip r:embed="rId2"/>
+          <a:stretch>
+            <a:fillRect/>
+          </a:stretch>
+        </p:blipFill>
+        <p:spPr>
+          <a:xfrm>
+            <a:off x="3535180" y="1776413"/>
+            <a:ext cx="5121639" cy="4881562"/>
+          </a:xfrm>
+          <a:prstGeom prst="rect">
+            <a:avLst/>
+          </a:prstGeom>
+        </p:spPr>
+      </p:pic>
+    </p:spTree>
+    <p:extLst>
+      <p:ext uri="{BB962C8B-B14F-4D97-AF65-F5344CB8AC3E}">
+        <p14:creationId xmlns:p14="http://schemas.microsoft.com/office/powerpoint/2010/main" val="3664826372"/>
+      </p:ext>
+    </p:extLst>
+  </p:cSld>
+  <p:clrMapOvr>
+    <a:masterClrMapping/>
+  </p:clrMapOvr>
+</p:sld>
+</file>
+
 <file path=ppt/slides/slide2.xml><?xml version="1.0" encoding="utf-8"?>
 <p:sld xmlns:a="http://schemas.openxmlformats.org/drawingml/2006/main" xmlns:r="http://schemas.openxmlformats.org/officeDocument/2006/relationships" xmlns:p="http://schemas.openxmlformats.org/presentationml/2006/main">
   <p:cSld>
@@ -4271,7 +5005,7 @@
           <p:cNvPr id="2" name="Titel 1">
             <a:extLst>
               <a:ext uri="{FF2B5EF4-FFF2-40B4-BE49-F238E27FC236}">
-                <a16:creationId xmlns:a16="http://schemas.microsoft.com/office/drawing/2014/main" id="{DFC5B796-40B4-D689-B460-7D61AB01AE62}"/>
+                <a16:creationId xmlns:a16="http://schemas.microsoft.com/office/drawing/2014/main" id="{D4F0595A-7435-C9B7-F66B-A192A834D49B}"/>
               </a:ext>
             </a:extLst>
           </p:cNvPr>
@@ -4289,12 +5023,8 @@
           <a:p>
             <a:pPr algn="ctr"/>
             <a:r>
-              <a:rPr lang="de-DE" dirty="0">
-                <a:solidFill>
-                  <a:srgbClr val="FF0000"/>
-                </a:solidFill>
-              </a:rPr>
-              <a:t>Domänenrecherche ??</a:t>
+              <a:rPr lang="de-DE" dirty="0"/>
+              <a:t>Andere Projekt Ideen</a:t>
             </a:r>
           </a:p>
         </p:txBody>
@@ -4304,7 +5034,7 @@
           <p:cNvPr id="3" name="Inhaltsplatzhalter 2">
             <a:extLst>
               <a:ext uri="{FF2B5EF4-FFF2-40B4-BE49-F238E27FC236}">
-                <a16:creationId xmlns:a16="http://schemas.microsoft.com/office/drawing/2014/main" id="{C6B80267-8BD3-DDB9-B749-6905671A26BD}"/>
+                <a16:creationId xmlns:a16="http://schemas.microsoft.com/office/drawing/2014/main" id="{B3DD9D4B-2089-7D54-ABB6-9FD4CFD0EEDD}"/>
               </a:ext>
             </a:extLst>
           </p:cNvPr>
@@ -4315,19 +5045,104 @@
             <p:ph idx="1"/>
           </p:nvPr>
         </p:nvSpPr>
-        <p:spPr/>
-        <p:txBody>
-          <a:bodyPr/>
-          <a:lstStyle/>
-          <a:p>
-            <a:endParaRPr lang="de-DE"/>
+        <p:spPr>
+          <a:xfrm>
+            <a:off x="838200" y="1825625"/>
+            <a:ext cx="10515600" cy="4667250"/>
+          </a:xfrm>
+        </p:spPr>
+        <p:txBody>
+          <a:bodyPr>
+            <a:noAutofit/>
+          </a:bodyPr>
+          <a:lstStyle/>
+          <a:p>
+            <a:r>
+              <a:rPr lang="de-DE" sz="1200" dirty="0"/>
+              <a:t>Unterstützung durch Plattform</a:t>
+            </a:r>
+          </a:p>
+          <a:p>
+            <a:pPr marL="0" indent="0">
+              <a:buNone/>
+            </a:pPr>
+            <a:r>
+              <a:rPr lang="de-DE" sz="1200" dirty="0"/>
+              <a:t>Das Problem der Digitalisierung ist meist der Benutzer, Alter, Bildung und Einkommen stellen Zugang Hürden da. Mit Hilfe eines softwaregestützten Angebots wollen wir es einigen Benutzer ermöglichen Erklärungen für verschiedene (einige) Probleme zu bekommen. Die Erklärungen sollten möglichst Audio Visuell, gegeben falls mit menschlicher Unterstützung ermöglicht werden.</a:t>
+            </a:r>
+          </a:p>
+          <a:p>
+            <a:pPr marL="0" indent="0">
+              <a:buNone/>
+            </a:pPr>
+            <a:endParaRPr lang="de-DE" sz="1200" dirty="0"/>
+          </a:p>
+          <a:p>
+            <a:r>
+              <a:rPr lang="de-DE" sz="1200" dirty="0"/>
+              <a:t>Lokale Einzelhändler Vernetzung</a:t>
+            </a:r>
+          </a:p>
+          <a:p>
+            <a:pPr marL="0" indent="0">
+              <a:buNone/>
+            </a:pPr>
+            <a:r>
+              <a:rPr lang="de-DE" sz="1200" dirty="0"/>
+              <a:t>Der Online Markt in Deutschland wir fast in alle Sparten von einem internationalen „Monopolisten“ gestimmt. Es gibt keine Plattform die adäquat lokalen Einzelhändler und Unternehmen online mit Kauf interessierten Personen verbindet. Die Idee ist es eine Plattform bereitgestellt, welche den Verkauf von Lokalen Produkten ermöglicht. Es ist zukünftig möglich den Zugang der Plattform in der analogen Welt bereitzustellen. Die Verknüpfung mit der analogen Welt könnte z.B. Senioren für vorteilhaft sein. Außerdem könnte Produkte nach non wirtschaftlichen Gesichtspunkten herausgehoben werden. </a:t>
+            </a:r>
+          </a:p>
+          <a:p>
+            <a:pPr marL="0" indent="0">
+              <a:buNone/>
+            </a:pPr>
+            <a:endParaRPr lang="de-DE" sz="1200" dirty="0"/>
+          </a:p>
+          <a:p>
+            <a:r>
+              <a:rPr lang="de-DE" sz="1200" dirty="0"/>
+              <a:t>Datenschutz: Abfrage bei Unternehmen</a:t>
+            </a:r>
+          </a:p>
+          <a:p>
+            <a:pPr marL="0" indent="0">
+              <a:buNone/>
+            </a:pPr>
+            <a:r>
+              <a:rPr lang="de-DE" sz="1200" dirty="0"/>
+              <a:t>Die Abfrage der gespeicherten Daten bei Unternehmen hat einige Hürden. Es ist möglich verschiedene Vorlagen im Internet zu finden, sowie einige Digitalunternehmen ermöglichen es online oder in Apps eine Auskunft er bekommen. Wir wollen dies zentraler und Benutzer freundlich Softwaregestützt ermöglichen. </a:t>
+            </a:r>
+          </a:p>
+          <a:p>
+            <a:pPr marL="0" indent="0">
+              <a:buNone/>
+            </a:pPr>
+            <a:endParaRPr lang="de-DE" sz="1200" dirty="0"/>
+          </a:p>
+          <a:p>
+            <a:r>
+              <a:rPr lang="de-DE" sz="1200" dirty="0"/>
+              <a:t>Datenschutz: Anleitung bei Einstellen von Apps</a:t>
+            </a:r>
+          </a:p>
+          <a:p>
+            <a:pPr marL="0" indent="0">
+              <a:buNone/>
+            </a:pPr>
+            <a:r>
+              <a:rPr lang="de-DE" sz="1200" dirty="0"/>
+              <a:t>Das Einstellen von Apps mit dem Fokus auf Datenschutz ist eine Herausforderung. Zum einen gibt es viele Apps, die diese in Unterpunkten verschachteln oder es kaum den Benutzer ermöglichen wirklich zu wissen was und wie genau er die Einstellungen des Datenschutzes vornehmen soll. Wir wollen eine Plattform Lösung anbieten, auf welcher mit Audio/visuellen Anleitungen die Einstellung verschiedener(einiger) gängiger Apps erklärt wird.</a:t>
+            </a:r>
+          </a:p>
+          <a:p>
+            <a:endParaRPr lang="de-DE" sz="1200" dirty="0"/>
           </a:p>
         </p:txBody>
       </p:sp>
     </p:spTree>
     <p:extLst>
       <p:ext uri="{BB962C8B-B14F-4D97-AF65-F5344CB8AC3E}">
-        <p14:creationId xmlns:p14="http://schemas.microsoft.com/office/powerpoint/2010/main" val="285372262"/>
+        <p14:creationId xmlns:p14="http://schemas.microsoft.com/office/powerpoint/2010/main" val="2716736366"/>
       </p:ext>
     </p:extLst>
   </p:cSld>
@@ -4359,6 +5174,972 @@
           <p:cNvPr id="2" name="Titel 1">
             <a:extLst>
               <a:ext uri="{FF2B5EF4-FFF2-40B4-BE49-F238E27FC236}">
+                <a16:creationId xmlns:a16="http://schemas.microsoft.com/office/drawing/2014/main" id="{029391F0-7EF8-A5A3-22B4-E6244BFA8160}"/>
+              </a:ext>
+            </a:extLst>
+          </p:cNvPr>
+          <p:cNvSpPr>
+            <a:spLocks noGrp="1"/>
+          </p:cNvSpPr>
+          <p:nvPr>
+            <p:ph type="title"/>
+          </p:nvPr>
+        </p:nvSpPr>
+        <p:spPr/>
+        <p:txBody>
+          <a:bodyPr/>
+          <a:lstStyle/>
+          <a:p>
+            <a:pPr algn="ctr"/>
+            <a:r>
+              <a:rPr lang="de-DE" dirty="0"/>
+              <a:t>Erste Version Projekt Idee</a:t>
+            </a:r>
+          </a:p>
+        </p:txBody>
+      </p:sp>
+      <p:sp>
+        <p:nvSpPr>
+          <p:cNvPr id="3" name="Inhaltsplatzhalter 2">
+            <a:extLst>
+              <a:ext uri="{FF2B5EF4-FFF2-40B4-BE49-F238E27FC236}">
+                <a16:creationId xmlns:a16="http://schemas.microsoft.com/office/drawing/2014/main" id="{C93F4656-F40F-C017-B615-5BC2E3DFCA77}"/>
+              </a:ext>
+            </a:extLst>
+          </p:cNvPr>
+          <p:cNvSpPr>
+            <a:spLocks noGrp="1"/>
+          </p:cNvSpPr>
+          <p:nvPr>
+            <p:ph idx="1"/>
+          </p:nvPr>
+        </p:nvSpPr>
+        <p:spPr>
+          <a:xfrm>
+            <a:off x="838200" y="1825625"/>
+            <a:ext cx="10515600" cy="4746625"/>
+          </a:xfrm>
+        </p:spPr>
+        <p:txBody>
+          <a:bodyPr>
+            <a:noAutofit/>
+          </a:bodyPr>
+          <a:lstStyle/>
+          <a:p>
+            <a:r>
+              <a:rPr lang="de-DE" sz="1200" dirty="0"/>
+              <a:t>Darstellung des Problemraums</a:t>
+            </a:r>
+          </a:p>
+          <a:p>
+            <a:pPr marL="0" indent="0">
+              <a:buNone/>
+            </a:pPr>
+            <a:r>
+              <a:rPr lang="de-DE" sz="1200" dirty="0"/>
+              <a:t>Heutzutage gibt es wenig Möglichkeiten, digital mit alten Karten von Städten zu interagieren. Falls solche Karten vorliegen, ist es jedoch meist nur ein Bild und dem Nutzer ist es meist nicht möglich genau zu erkennen, was geschichtlich bedeutende Orte oder Gebäude auf der Karte sind. Des Weiteren ist es auch schwer nachzuvollziehen, wie sich diese Orte bzw. Gebäude im Verlauf der Zeit verändert haben, so ist es für einen geschichtsinteressierten Menschen schwierig, anhand alter Karten sich selbst Wissen anzueignen oder zu erweitern.</a:t>
+            </a:r>
+          </a:p>
+          <a:p>
+            <a:pPr marL="0" indent="0">
+              <a:buNone/>
+            </a:pPr>
+            <a:r>
+              <a:rPr lang="de-DE" sz="1200" dirty="0"/>
+              <a:t>Die Darstellung von historischen Daten anhand von Karten für eine Stadt wie Gummersbach ist leider nicht realistisch. Die Karten der Region Bergisches Land lassen sich bis 1795 zurückdatieren, jedoch gibt es keine stätischen Karten der Stadt Gummersbach, welche in unsere Recherche aufgefunden wurden. Gegebenenfalls können graphische Darstellung der historischen Daten einzelnen Interessanten Objekten zugeordnet werden.</a:t>
+            </a:r>
+          </a:p>
+          <a:p>
+            <a:pPr marL="0" indent="0">
+              <a:buNone/>
+            </a:pPr>
+            <a:r>
+              <a:rPr lang="de-DE" sz="1200" dirty="0"/>
+              <a:t>Es ist zu diskutieren, wie mit dem Problem der nicht gefundenen Karten umgegangen wird. Die erste Idee ist es keine Karte als Grundlage zum Darstellen der historischen Daten zu verwenden. Die andere Idee ist es Köln als Großstadt, für den POC zu verwenden, da es Karten Material zu finden gibt.</a:t>
+            </a:r>
+          </a:p>
+          <a:p>
+            <a:pPr marL="0" indent="0">
+              <a:buNone/>
+            </a:pPr>
+            <a:endParaRPr lang="de-DE" sz="1200" dirty="0"/>
+          </a:p>
+          <a:p>
+            <a:pPr marL="0" indent="0">
+              <a:buNone/>
+            </a:pPr>
+            <a:r>
+              <a:rPr lang="de-DE" sz="1200" dirty="0"/>
+              <a:t>Anmerkungen:</a:t>
+            </a:r>
+          </a:p>
+          <a:p>
+            <a:pPr marL="0" indent="0">
+              <a:buNone/>
+            </a:pPr>
+            <a:r>
+              <a:rPr lang="de-DE" sz="1200" dirty="0"/>
+              <a:t>Die Darstellung einer Karte als Grundlage ist zu diskutieren.</a:t>
+            </a:r>
+          </a:p>
+          <a:p>
+            <a:pPr marL="0" indent="0">
+              <a:buNone/>
+            </a:pPr>
+            <a:r>
+              <a:rPr lang="de-DE" sz="1200" dirty="0"/>
+              <a:t>Die Darstellung von historischen Daten aus der näheren Umgebung ist meist nur für sehr Interessierte Kenner zugänglich. Die Daten befinden sich in separaten Quellen und gegebenenfalls sind diese nicht bekannt. </a:t>
+            </a:r>
+          </a:p>
+          <a:p>
+            <a:pPr marL="0" indent="0">
+              <a:buNone/>
+            </a:pPr>
+            <a:r>
+              <a:rPr lang="de-DE" sz="1200" dirty="0"/>
+              <a:t>Neben den Langjährigen Bewohnern der Städte Köln/Gummersbach sind ortsfremde wie Studenten oder Touristen mögliche User.</a:t>
+            </a:r>
+          </a:p>
+          <a:p>
+            <a:endParaRPr lang="de-DE" sz="1200" dirty="0"/>
+          </a:p>
+          <a:p>
+            <a:pPr marL="0" indent="0">
+              <a:buNone/>
+            </a:pPr>
+            <a:endParaRPr lang="de-DE" sz="1200" dirty="0"/>
+          </a:p>
+        </p:txBody>
+      </p:sp>
+    </p:spTree>
+    <p:extLst>
+      <p:ext uri="{BB962C8B-B14F-4D97-AF65-F5344CB8AC3E}">
+        <p14:creationId xmlns:p14="http://schemas.microsoft.com/office/powerpoint/2010/main" val="2832196691"/>
+      </p:ext>
+    </p:extLst>
+  </p:cSld>
+  <p:clrMapOvr>
+    <a:masterClrMapping/>
+  </p:clrMapOvr>
+</p:sld>
+</file>
+
+<file path=ppt/slides/slide4.xml><?xml version="1.0" encoding="utf-8"?>
+<p:sld xmlns:a="http://schemas.openxmlformats.org/drawingml/2006/main" xmlns:r="http://schemas.openxmlformats.org/officeDocument/2006/relationships" xmlns:p="http://schemas.openxmlformats.org/presentationml/2006/main">
+  <p:cSld>
+    <p:spTree>
+      <p:nvGrpSpPr>
+        <p:cNvPr id="1" name=""/>
+        <p:cNvGrpSpPr/>
+        <p:nvPr/>
+      </p:nvGrpSpPr>
+      <p:grpSpPr>
+        <a:xfrm>
+          <a:off x="0" y="0"/>
+          <a:ext cx="0" cy="0"/>
+          <a:chOff x="0" y="0"/>
+          <a:chExt cx="0" cy="0"/>
+        </a:xfrm>
+      </p:grpSpPr>
+      <p:sp>
+        <p:nvSpPr>
+          <p:cNvPr id="2" name="Titel 1">
+            <a:extLst>
+              <a:ext uri="{FF2B5EF4-FFF2-40B4-BE49-F238E27FC236}">
+                <a16:creationId xmlns:a16="http://schemas.microsoft.com/office/drawing/2014/main" id="{6533CB18-42D5-3E4C-71F2-344CFE3D3171}"/>
+              </a:ext>
+            </a:extLst>
+          </p:cNvPr>
+          <p:cNvSpPr>
+            <a:spLocks noGrp="1"/>
+          </p:cNvSpPr>
+          <p:nvPr>
+            <p:ph type="title"/>
+          </p:nvPr>
+        </p:nvSpPr>
+        <p:spPr/>
+        <p:txBody>
+          <a:bodyPr/>
+          <a:lstStyle/>
+          <a:p>
+            <a:pPr algn="ctr"/>
+            <a:r>
+              <a:rPr lang="de-DE" dirty="0"/>
+              <a:t>Erste Version Projekt Idee</a:t>
+            </a:r>
+          </a:p>
+        </p:txBody>
+      </p:sp>
+      <p:sp>
+        <p:nvSpPr>
+          <p:cNvPr id="3" name="Inhaltsplatzhalter 2">
+            <a:extLst>
+              <a:ext uri="{FF2B5EF4-FFF2-40B4-BE49-F238E27FC236}">
+                <a16:creationId xmlns:a16="http://schemas.microsoft.com/office/drawing/2014/main" id="{769D374B-3E02-82D0-A6B5-530D62E886BB}"/>
+              </a:ext>
+            </a:extLst>
+          </p:cNvPr>
+          <p:cNvSpPr>
+            <a:spLocks noGrp="1"/>
+          </p:cNvSpPr>
+          <p:nvPr>
+            <p:ph idx="1"/>
+          </p:nvPr>
+        </p:nvSpPr>
+        <p:spPr>
+          <a:xfrm>
+            <a:off x="838200" y="1825624"/>
+            <a:ext cx="10515600" cy="4784725"/>
+          </a:xfrm>
+        </p:spPr>
+        <p:txBody>
+          <a:bodyPr>
+            <a:normAutofit/>
+          </a:bodyPr>
+          <a:lstStyle/>
+          <a:p>
+            <a:r>
+              <a:rPr lang="de-DE" sz="1200" dirty="0"/>
+              <a:t>Zielsetzung / Vision</a:t>
+            </a:r>
+          </a:p>
+          <a:p>
+            <a:pPr marL="0" indent="0">
+              <a:buNone/>
+            </a:pPr>
+            <a:r>
+              <a:rPr lang="de-DE" sz="1200" dirty="0"/>
+              <a:t>Idee ist es nun, dem Nutzer eine Möglichkeit zu schaffen, sich geschichtliches Wissen über bestimmte Orte und den darin verbundenen Gebäuden anzueignen und das erworbene Wissen zu verfestigen. Dies soll erfolgen, indem man eine alte Karte virtuell ablaufen kann und bei bestimmten bedeutenden Punkten sich entsprechende Informationen durchlesen kann. Auch soll man von der jeweiligen alten Karte einen Vergleich zu einer neuen Karte sehen können (?).</a:t>
+            </a:r>
+          </a:p>
+          <a:p>
+            <a:pPr marL="0" indent="0">
+              <a:buNone/>
+            </a:pPr>
+            <a:endParaRPr lang="de-DE" sz="1200" dirty="0"/>
+          </a:p>
+          <a:p>
+            <a:pPr marL="0" indent="0">
+              <a:buNone/>
+            </a:pPr>
+            <a:r>
+              <a:rPr lang="de-DE" sz="1200" dirty="0"/>
+              <a:t>Anmerkung:</a:t>
+            </a:r>
+          </a:p>
+          <a:p>
+            <a:pPr marL="0" indent="0">
+              <a:buNone/>
+            </a:pPr>
+            <a:r>
+              <a:rPr lang="de-DE" sz="1200" dirty="0"/>
+              <a:t>Nachdem man eine Karte erkundet hat, soll man das Gelernte in Form eines Quiz (?) wiedergeben können.</a:t>
+            </a:r>
+          </a:p>
+          <a:p>
+            <a:pPr marL="0" indent="0">
+              <a:buNone/>
+            </a:pPr>
+            <a:r>
+              <a:rPr lang="de-DE" sz="1200" dirty="0"/>
+              <a:t>Die Veränderung des Objektes in der Stadt soll möglichst durch eine bildliche Darstellung verdeutlicht werden.</a:t>
+            </a:r>
+          </a:p>
+          <a:p>
+            <a:pPr marL="0" indent="0">
+              <a:buNone/>
+            </a:pPr>
+            <a:r>
+              <a:rPr lang="de-DE" sz="1200" dirty="0"/>
+              <a:t>Die Software könnte durch Gamification Systeme das Lernen fördern.</a:t>
+            </a:r>
+          </a:p>
+          <a:p>
+            <a:pPr marL="0" indent="0">
+              <a:buNone/>
+            </a:pPr>
+            <a:endParaRPr lang="de-DE" sz="1200" dirty="0"/>
+          </a:p>
+          <a:p>
+            <a:r>
+              <a:rPr lang="de-DE" sz="1200" dirty="0"/>
+              <a:t>Relevanz</a:t>
+            </a:r>
+          </a:p>
+          <a:p>
+            <a:pPr marL="0" indent="0">
+              <a:buNone/>
+            </a:pPr>
+            <a:r>
+              <a:rPr lang="de-DE" sz="1200" dirty="0"/>
+              <a:t>Relevanz, weil keine vergleichbare Plattform besteht (?).</a:t>
+            </a:r>
+          </a:p>
+          <a:p>
+            <a:pPr marL="0" indent="0">
+              <a:buNone/>
+            </a:pPr>
+            <a:r>
+              <a:rPr lang="de-DE" sz="1200" dirty="0"/>
+              <a:t>Tourismus (vielleicht in Gummersbach, dann auch wirtschaftlich vielleicht relevant)</a:t>
+            </a:r>
+          </a:p>
+          <a:p>
+            <a:pPr marL="0" indent="0">
+              <a:buNone/>
+            </a:pPr>
+            <a:r>
+              <a:rPr lang="de-DE" sz="1200" dirty="0"/>
+              <a:t>Bietet einen wissen orientierten Mehrwert durch das Vermitteln von historischem Wissen für die Bürger und Besucher der Stadt Gummersbach/Köln.</a:t>
+            </a:r>
+          </a:p>
+          <a:p>
+            <a:pPr marL="0" indent="0">
+              <a:buNone/>
+            </a:pPr>
+            <a:r>
+              <a:rPr lang="de-DE" sz="1200" dirty="0"/>
+              <a:t>Wissenschaftliche Recherche(wenn möglich)</a:t>
+            </a:r>
+          </a:p>
+          <a:p>
+            <a:pPr marL="0" indent="0">
+              <a:buNone/>
+            </a:pPr>
+            <a:r>
+              <a:rPr lang="de-DE" sz="1200" dirty="0" err="1"/>
+              <a:t>Stakeholdernalyse</a:t>
+            </a:r>
+            <a:r>
+              <a:rPr lang="de-DE" sz="1200" dirty="0"/>
+              <a:t>?</a:t>
+            </a:r>
+          </a:p>
+          <a:p>
+            <a:pPr marL="0" indent="0">
+              <a:buNone/>
+            </a:pPr>
+            <a:r>
+              <a:rPr lang="de-DE" sz="1200" dirty="0" err="1"/>
+              <a:t>Geocatching</a:t>
+            </a:r>
+            <a:r>
+              <a:rPr lang="de-DE" sz="1200" dirty="0"/>
+              <a:t> für neue historische orte</a:t>
+            </a:r>
+          </a:p>
+        </p:txBody>
+      </p:sp>
+    </p:spTree>
+    <p:extLst>
+      <p:ext uri="{BB962C8B-B14F-4D97-AF65-F5344CB8AC3E}">
+        <p14:creationId xmlns:p14="http://schemas.microsoft.com/office/powerpoint/2010/main" val="629208653"/>
+      </p:ext>
+    </p:extLst>
+  </p:cSld>
+  <p:clrMapOvr>
+    <a:masterClrMapping/>
+  </p:clrMapOvr>
+</p:sld>
+</file>
+
+<file path=ppt/slides/slide5.xml><?xml version="1.0" encoding="utf-8"?>
+<p:sld xmlns:a="http://schemas.openxmlformats.org/drawingml/2006/main" xmlns:r="http://schemas.openxmlformats.org/officeDocument/2006/relationships" xmlns:p="http://schemas.openxmlformats.org/presentationml/2006/main">
+  <p:cSld>
+    <p:spTree>
+      <p:nvGrpSpPr>
+        <p:cNvPr id="1" name=""/>
+        <p:cNvGrpSpPr/>
+        <p:nvPr/>
+      </p:nvGrpSpPr>
+      <p:grpSpPr>
+        <a:xfrm>
+          <a:off x="0" y="0"/>
+          <a:ext cx="0" cy="0"/>
+          <a:chOff x="0" y="0"/>
+          <a:chExt cx="0" cy="0"/>
+        </a:xfrm>
+      </p:grpSpPr>
+      <p:sp>
+        <p:nvSpPr>
+          <p:cNvPr id="2" name="Titel 1">
+            <a:extLst>
+              <a:ext uri="{FF2B5EF4-FFF2-40B4-BE49-F238E27FC236}">
+                <a16:creationId xmlns:a16="http://schemas.microsoft.com/office/drawing/2014/main" id="{DFC5B796-40B4-D689-B460-7D61AB01AE62}"/>
+              </a:ext>
+            </a:extLst>
+          </p:cNvPr>
+          <p:cNvSpPr>
+            <a:spLocks noGrp="1"/>
+          </p:cNvSpPr>
+          <p:nvPr>
+            <p:ph type="title"/>
+          </p:nvPr>
+        </p:nvSpPr>
+        <p:spPr/>
+        <p:txBody>
+          <a:bodyPr/>
+          <a:lstStyle/>
+          <a:p>
+            <a:pPr algn="ctr"/>
+            <a:r>
+              <a:rPr lang="de-DE" dirty="0"/>
+              <a:t>Domänenrecherche</a:t>
+            </a:r>
+          </a:p>
+        </p:txBody>
+      </p:sp>
+      <p:sp>
+        <p:nvSpPr>
+          <p:cNvPr id="3" name="Inhaltsplatzhalter 2">
+            <a:extLst>
+              <a:ext uri="{FF2B5EF4-FFF2-40B4-BE49-F238E27FC236}">
+                <a16:creationId xmlns:a16="http://schemas.microsoft.com/office/drawing/2014/main" id="{C6B80267-8BD3-DDB9-B749-6905671A26BD}"/>
+              </a:ext>
+            </a:extLst>
+          </p:cNvPr>
+          <p:cNvSpPr>
+            <a:spLocks noGrp="1"/>
+          </p:cNvSpPr>
+          <p:nvPr>
+            <p:ph idx="1"/>
+          </p:nvPr>
+        </p:nvSpPr>
+        <p:spPr>
+          <a:xfrm>
+            <a:off x="838200" y="1825624"/>
+            <a:ext cx="10515600" cy="4575175"/>
+          </a:xfrm>
+        </p:spPr>
+        <p:txBody>
+          <a:bodyPr>
+            <a:noAutofit/>
+          </a:bodyPr>
+          <a:lstStyle/>
+          <a:p>
+            <a:pPr marL="514350" indent="-514350">
+              <a:buFont typeface="+mj-lt"/>
+              <a:buAutoNum type="arabicPeriod"/>
+            </a:pPr>
+            <a:r>
+              <a:rPr lang="de-DE" sz="1200" dirty="0"/>
+              <a:t>Stadt Führungsapps</a:t>
+            </a:r>
+          </a:p>
+          <a:p>
+            <a:pPr marL="0" indent="0">
+              <a:buNone/>
+            </a:pPr>
+            <a:r>
+              <a:rPr lang="de-DE" sz="1200" dirty="0"/>
+              <a:t>https://www.mydays.de/geschenkidee/digitale-stadtfuehrungen-koeln</a:t>
+            </a:r>
+          </a:p>
+          <a:p>
+            <a:pPr marL="0" indent="0">
+              <a:buNone/>
+            </a:pPr>
+            <a:r>
+              <a:rPr lang="de-DE" sz="1200" dirty="0"/>
+              <a:t>-9,90€</a:t>
+            </a:r>
+          </a:p>
+          <a:p>
+            <a:pPr marL="0" indent="0">
+              <a:buNone/>
+            </a:pPr>
+            <a:r>
+              <a:rPr lang="de-DE" sz="1200" dirty="0"/>
+              <a:t>-führt an unbekanntere und bekanntere Kölner Orte</a:t>
+            </a:r>
+          </a:p>
+          <a:p>
+            <a:pPr marL="0" indent="0">
+              <a:buNone/>
+            </a:pPr>
+            <a:r>
+              <a:rPr lang="de-DE" sz="1200" dirty="0"/>
+              <a:t>-Zielpunkt per E-Mail</a:t>
+            </a:r>
+          </a:p>
+          <a:p>
+            <a:pPr marL="0" indent="0">
+              <a:buNone/>
+            </a:pPr>
+            <a:r>
+              <a:rPr lang="de-DE" sz="1200" dirty="0"/>
+              <a:t>-rätsel lösen für fortschritt</a:t>
+            </a:r>
+          </a:p>
+          <a:p>
+            <a:pPr marL="0" indent="0">
+              <a:buNone/>
+            </a:pPr>
+            <a:r>
+              <a:rPr lang="de-DE" sz="1200" dirty="0"/>
+              <a:t>-Safari-Regionalliga-Tabelle zum vergleichen</a:t>
+            </a:r>
+          </a:p>
+          <a:p>
+            <a:pPr marL="0" indent="0">
+              <a:buNone/>
+            </a:pPr>
+            <a:endParaRPr lang="de-DE" sz="1200" dirty="0"/>
+          </a:p>
+          <a:p>
+            <a:r>
+              <a:rPr lang="de-DE" sz="1200" dirty="0"/>
+              <a:t>https://www.digiwalk.de/</a:t>
+            </a:r>
+          </a:p>
+          <a:p>
+            <a:pPr marL="0" indent="0">
+              <a:buNone/>
+            </a:pPr>
+            <a:r>
+              <a:rPr lang="de-DE" sz="1200" dirty="0"/>
+              <a:t>-eigene Touren erstellen</a:t>
+            </a:r>
+          </a:p>
+          <a:p>
+            <a:pPr marL="0" indent="0">
+              <a:buNone/>
+            </a:pPr>
+            <a:endParaRPr lang="de-DE" sz="1200" dirty="0"/>
+          </a:p>
+          <a:p>
+            <a:r>
+              <a:rPr lang="de-DE" sz="1200" dirty="0"/>
+              <a:t>https://www.stadtfuehrungen-digital.de/</a:t>
+            </a:r>
+          </a:p>
+          <a:p>
+            <a:pPr marL="0" indent="0">
+              <a:buNone/>
+            </a:pPr>
+            <a:r>
+              <a:rPr lang="de-DE" sz="1200" dirty="0"/>
+              <a:t>-Bamberg per App</a:t>
+            </a:r>
+          </a:p>
+          <a:p>
+            <a:pPr marL="0" indent="0">
+              <a:buNone/>
+            </a:pPr>
+            <a:endParaRPr lang="de-DE" sz="1200" dirty="0"/>
+          </a:p>
+          <a:p>
+            <a:r>
+              <a:rPr lang="de-DE" sz="1200" dirty="0"/>
+              <a:t>https://www.rheda-wiedenbrueck.de/kunst-kultur/flora-westfalica/tourismus/stadtfuehrungen/digitale-stadtfuehrung/</a:t>
+            </a:r>
+          </a:p>
+          <a:p>
+            <a:pPr marL="0" indent="0">
+              <a:buNone/>
+            </a:pPr>
+            <a:r>
+              <a:rPr lang="de-DE" sz="1200" dirty="0"/>
+              <a:t>-führungen per App</a:t>
+            </a:r>
+          </a:p>
+          <a:p>
+            <a:endParaRPr lang="de-DE" sz="1200" dirty="0"/>
+          </a:p>
+          <a:p>
+            <a:endParaRPr lang="de-DE" sz="1200" dirty="0"/>
+          </a:p>
+        </p:txBody>
+      </p:sp>
+    </p:spTree>
+    <p:extLst>
+      <p:ext uri="{BB962C8B-B14F-4D97-AF65-F5344CB8AC3E}">
+        <p14:creationId xmlns:p14="http://schemas.microsoft.com/office/powerpoint/2010/main" val="285372262"/>
+      </p:ext>
+    </p:extLst>
+  </p:cSld>
+  <p:clrMapOvr>
+    <a:masterClrMapping/>
+  </p:clrMapOvr>
+</p:sld>
+</file>
+
+<file path=ppt/slides/slide6.xml><?xml version="1.0" encoding="utf-8"?>
+<p:sld xmlns:a="http://schemas.openxmlformats.org/drawingml/2006/main" xmlns:r="http://schemas.openxmlformats.org/officeDocument/2006/relationships" xmlns:p="http://schemas.openxmlformats.org/presentationml/2006/main">
+  <p:cSld>
+    <p:spTree>
+      <p:nvGrpSpPr>
+        <p:cNvPr id="1" name=""/>
+        <p:cNvGrpSpPr/>
+        <p:nvPr/>
+      </p:nvGrpSpPr>
+      <p:grpSpPr>
+        <a:xfrm>
+          <a:off x="0" y="0"/>
+          <a:ext cx="0" cy="0"/>
+          <a:chOff x="0" y="0"/>
+          <a:chExt cx="0" cy="0"/>
+        </a:xfrm>
+      </p:grpSpPr>
+      <p:sp>
+        <p:nvSpPr>
+          <p:cNvPr id="2" name="Titel 1">
+            <a:extLst>
+              <a:ext uri="{FF2B5EF4-FFF2-40B4-BE49-F238E27FC236}">
+                <a16:creationId xmlns:a16="http://schemas.microsoft.com/office/drawing/2014/main" id="{5E0CD186-D670-2321-97A4-ED56A0F76E07}"/>
+              </a:ext>
+            </a:extLst>
+          </p:cNvPr>
+          <p:cNvSpPr>
+            <a:spLocks noGrp="1"/>
+          </p:cNvSpPr>
+          <p:nvPr>
+            <p:ph type="title"/>
+          </p:nvPr>
+        </p:nvSpPr>
+        <p:spPr/>
+        <p:txBody>
+          <a:bodyPr/>
+          <a:lstStyle/>
+          <a:p>
+            <a:pPr algn="ctr"/>
+            <a:r>
+              <a:rPr lang="de-DE" dirty="0"/>
+              <a:t>Domänenrecherche</a:t>
+            </a:r>
+          </a:p>
+        </p:txBody>
+      </p:sp>
+      <p:sp>
+        <p:nvSpPr>
+          <p:cNvPr id="3" name="Inhaltsplatzhalter 2">
+            <a:extLst>
+              <a:ext uri="{FF2B5EF4-FFF2-40B4-BE49-F238E27FC236}">
+                <a16:creationId xmlns:a16="http://schemas.microsoft.com/office/drawing/2014/main" id="{33FD777B-5F33-ADBB-2B6E-5E950C408908}"/>
+              </a:ext>
+            </a:extLst>
+          </p:cNvPr>
+          <p:cNvSpPr>
+            <a:spLocks noGrp="1"/>
+          </p:cNvSpPr>
+          <p:nvPr>
+            <p:ph idx="1"/>
+          </p:nvPr>
+        </p:nvSpPr>
+        <p:spPr/>
+        <p:txBody>
+          <a:bodyPr>
+            <a:noAutofit/>
+          </a:bodyPr>
+          <a:lstStyle/>
+          <a:p>
+            <a:pPr marL="514350" indent="-514350">
+              <a:buFont typeface="+mj-lt"/>
+              <a:buAutoNum type="arabicPeriod" startAt="2"/>
+            </a:pPr>
+            <a:r>
+              <a:rPr lang="de-DE" sz="1200" dirty="0"/>
+              <a:t>Alte Karten</a:t>
+            </a:r>
+          </a:p>
+          <a:p>
+            <a:r>
+              <a:rPr lang="de-DE" sz="1200" dirty="0"/>
+              <a:t>https://maps.arcanum.com/de/</a:t>
+            </a:r>
+          </a:p>
+          <a:p>
+            <a:pPr marL="0" indent="0">
+              <a:buNone/>
+            </a:pPr>
+            <a:r>
+              <a:rPr lang="de-DE" sz="1200" dirty="0"/>
+              <a:t>-verkauft alte karten, WMTS Service</a:t>
+            </a:r>
+          </a:p>
+          <a:p>
+            <a:r>
+              <a:rPr lang="de-DE" sz="1200" dirty="0"/>
+              <a:t>https://www.bezreg-koeln.nrw.de/brk_internet/geobasis/topographische_karten/historisch/index.html</a:t>
+            </a:r>
+          </a:p>
+          <a:p>
+            <a:pPr marL="0" indent="0">
+              <a:buNone/>
+            </a:pPr>
+            <a:r>
+              <a:rPr lang="de-DE" sz="1200" dirty="0"/>
+              <a:t>-1795-gegenwart, nochmal anschauen</a:t>
+            </a:r>
+          </a:p>
+          <a:p>
+            <a:r>
+              <a:rPr lang="de-DE" sz="1200" dirty="0"/>
+              <a:t>https://rio.obk.de/Service/historischekarten.php</a:t>
+            </a:r>
+          </a:p>
+          <a:p>
+            <a:pPr marL="0" indent="0">
+              <a:buNone/>
+            </a:pPr>
+            <a:r>
+              <a:rPr lang="de-DE" sz="1200" dirty="0"/>
+              <a:t>-historische Karten Oberberg, Landrat </a:t>
+            </a:r>
+          </a:p>
+          <a:p>
+            <a:endParaRPr lang="de-DE" sz="1200" dirty="0"/>
+          </a:p>
+          <a:p>
+            <a:pPr marL="514350" indent="-514350">
+              <a:buFont typeface="+mj-lt"/>
+              <a:buAutoNum type="arabicPeriod" startAt="3"/>
+            </a:pPr>
+            <a:r>
+              <a:rPr lang="de-DE" sz="1200" dirty="0"/>
+              <a:t>Geschichte</a:t>
+            </a:r>
+          </a:p>
+          <a:p>
+            <a:r>
+              <a:rPr lang="de-DE" sz="1200" dirty="0" err="1"/>
+              <a:t>gummersbach</a:t>
+            </a:r>
+            <a:r>
+              <a:rPr lang="de-DE" sz="1200" dirty="0"/>
+              <a:t> </a:t>
+            </a:r>
+            <a:r>
+              <a:rPr lang="de-DE" sz="1200" dirty="0" err="1"/>
+              <a:t>wikipedia</a:t>
+            </a:r>
+            <a:endParaRPr lang="de-DE" sz="1200" dirty="0"/>
+          </a:p>
+          <a:p>
+            <a:r>
+              <a:rPr lang="de-DE" sz="1200" dirty="0" err="1"/>
+              <a:t>seite</a:t>
+            </a:r>
+            <a:r>
+              <a:rPr lang="de-DE" sz="1200" dirty="0"/>
+              <a:t> der </a:t>
+            </a:r>
+            <a:r>
+              <a:rPr lang="de-DE" sz="1200" dirty="0" err="1"/>
+              <a:t>stadt</a:t>
+            </a:r>
+            <a:endParaRPr lang="de-DE" sz="1200" dirty="0"/>
+          </a:p>
+          <a:p>
+            <a:pPr marL="0" indent="0">
+              <a:buNone/>
+            </a:pPr>
+            <a:r>
+              <a:rPr lang="de-DE" sz="1200" dirty="0"/>
+              <a:t>https://www.archive.nrw.de/kreisarchiv-rheinisch-bergischer-kreis/der-rheinisch-bergische-kreis-und-seine-geschichte</a:t>
+            </a:r>
+          </a:p>
+          <a:p>
+            <a:endParaRPr lang="de-DE" sz="1200" dirty="0"/>
+          </a:p>
+          <a:p>
+            <a:r>
+              <a:rPr lang="de-DE" sz="1200" dirty="0"/>
+              <a:t>mittelalterliche Karten vom Bergischen existieren</a:t>
+            </a:r>
+          </a:p>
+        </p:txBody>
+      </p:sp>
+    </p:spTree>
+    <p:extLst>
+      <p:ext uri="{BB962C8B-B14F-4D97-AF65-F5344CB8AC3E}">
+        <p14:creationId xmlns:p14="http://schemas.microsoft.com/office/powerpoint/2010/main" val="2170497804"/>
+      </p:ext>
+    </p:extLst>
+  </p:cSld>
+  <p:clrMapOvr>
+    <a:masterClrMapping/>
+  </p:clrMapOvr>
+</p:sld>
+</file>
+
+<file path=ppt/slides/slide7.xml><?xml version="1.0" encoding="utf-8"?>
+<p:sld xmlns:a="http://schemas.openxmlformats.org/drawingml/2006/main" xmlns:r="http://schemas.openxmlformats.org/officeDocument/2006/relationships" xmlns:p="http://schemas.openxmlformats.org/presentationml/2006/main">
+  <p:cSld>
+    <p:spTree>
+      <p:nvGrpSpPr>
+        <p:cNvPr id="1" name=""/>
+        <p:cNvGrpSpPr/>
+        <p:nvPr/>
+      </p:nvGrpSpPr>
+      <p:grpSpPr>
+        <a:xfrm>
+          <a:off x="0" y="0"/>
+          <a:ext cx="0" cy="0"/>
+          <a:chOff x="0" y="0"/>
+          <a:chExt cx="0" cy="0"/>
+        </a:xfrm>
+      </p:grpSpPr>
+      <p:sp>
+        <p:nvSpPr>
+          <p:cNvPr id="2" name="Titel 1">
+            <a:extLst>
+              <a:ext uri="{FF2B5EF4-FFF2-40B4-BE49-F238E27FC236}">
+                <a16:creationId xmlns:a16="http://schemas.microsoft.com/office/drawing/2014/main" id="{47271DE8-74D3-4AD2-D1C9-9F65F75B46B8}"/>
+              </a:ext>
+            </a:extLst>
+          </p:cNvPr>
+          <p:cNvSpPr>
+            <a:spLocks noGrp="1"/>
+          </p:cNvSpPr>
+          <p:nvPr>
+            <p:ph type="title"/>
+          </p:nvPr>
+        </p:nvSpPr>
+        <p:spPr/>
+        <p:txBody>
+          <a:bodyPr/>
+          <a:lstStyle/>
+          <a:p>
+            <a:pPr algn="ctr"/>
+            <a:r>
+              <a:rPr lang="de-DE" dirty="0"/>
+              <a:t>Aktuelles </a:t>
+            </a:r>
+            <a:r>
+              <a:rPr lang="de-DE" dirty="0" err="1"/>
+              <a:t>Expose</a:t>
+            </a:r>
+            <a:endParaRPr lang="de-DE" dirty="0"/>
+          </a:p>
+        </p:txBody>
+      </p:sp>
+      <p:sp>
+        <p:nvSpPr>
+          <p:cNvPr id="3" name="Inhaltsplatzhalter 2">
+            <a:extLst>
+              <a:ext uri="{FF2B5EF4-FFF2-40B4-BE49-F238E27FC236}">
+                <a16:creationId xmlns:a16="http://schemas.microsoft.com/office/drawing/2014/main" id="{909AAE2F-199C-32F8-0C2A-3EDB6E7AB5CC}"/>
+              </a:ext>
+            </a:extLst>
+          </p:cNvPr>
+          <p:cNvSpPr>
+            <a:spLocks noGrp="1"/>
+          </p:cNvSpPr>
+          <p:nvPr>
+            <p:ph idx="1"/>
+          </p:nvPr>
+        </p:nvSpPr>
+        <p:spPr>
+          <a:xfrm>
+            <a:off x="838200" y="1689100"/>
+            <a:ext cx="10515600" cy="4803775"/>
+          </a:xfrm>
+        </p:spPr>
+        <p:txBody>
+          <a:bodyPr>
+            <a:noAutofit/>
+          </a:bodyPr>
+          <a:lstStyle/>
+          <a:p>
+            <a:r>
+              <a:rPr lang="de-DE" sz="1200" dirty="0"/>
+              <a:t>Darstellung des Problemraums</a:t>
+            </a:r>
+          </a:p>
+          <a:p>
+            <a:r>
+              <a:rPr lang="de-DE" sz="1200" dirty="0"/>
+              <a:t>Für einige kleine Städte und Ortschaften gibt es nur wenige Möglichkeiten, sich über die Stadtgeschichte im Netz zu informieren. Meist gibt es nur einen Wikipedia Eintrag sowie eine Webpage auf der städtischen Website. In beiden Fällen wird die Information geringfügig mit Bildern unterstützt und es fehlt oft der Kontext zu den vorhandenen Bildern, wie z.B. wo ein gezeigtes Gebäude stand oder sogar noch steht. Es ist demnach schwer sich ein Bild davon zu machen, wie das Stadtbild zu bestimmten Zeiten ausgesehen hat. (https://www.gummersbach.de/de/hier-zu-hause/stadtgeschichte.html)</a:t>
+            </a:r>
+          </a:p>
+          <a:p>
+            <a:r>
+              <a:rPr lang="de-DE" sz="1200" dirty="0"/>
+              <a:t>Außerdem gibt es nur begrenzt Kartenmaterial aus früheren Jahrzehnten. Bleibt man an dem Beispiel Gummersbach gibt es nur Karten der gesamten rheinländischen/westfälischen Region, die bis 1795 zurückgehen. Karten der oberbergischen Region oder gar Stadtkarten gibt es nicht. (https://rio.obk.de/mapbender3/app.php/application/RIO_Hist_Karten?#75000@7.59760/51.03487r0@EPSG:25832)</a:t>
+            </a:r>
+          </a:p>
+          <a:p>
+            <a:r>
+              <a:rPr lang="de-DE" sz="1200" dirty="0"/>
+              <a:t>Vieles historisches Material liegt analog bei Heimatvereinen, Heimatmuseen oder bei Bewohnern der Stadt Gummersbach. Die Digitalisierung an einer gesammelten Stelle wird geringfügig durchgeführt.</a:t>
+            </a:r>
+          </a:p>
+          <a:p>
+            <a:endParaRPr lang="de-DE" sz="1200" dirty="0"/>
+          </a:p>
+          <a:p>
+            <a:r>
+              <a:rPr lang="de-DE" sz="1200" dirty="0"/>
+              <a:t>Zielsetzung / Vision</a:t>
+            </a:r>
+          </a:p>
+          <a:p>
+            <a:r>
+              <a:rPr lang="de-DE" sz="1200" dirty="0"/>
+              <a:t>Es soll ein System entwickelt werden, das Bewohnern die Möglichkeit gibt, Bildmaterial hochzuladen und zeit- sowie ortsbezogen einzuordnen. Hierdurch soll eine Bilder- und Wissenssammlung über eine bestimmte Ortschaft aufgebaut werden. Die Motivation, an diesem Vorhaben teilzunehmen, soll für die Bewohner aus sozialem Hintergrund durch den kollaborativen Vorgang entstehen. Dies soll durch Gamification unterstützt werden.</a:t>
+            </a:r>
+          </a:p>
+          <a:p>
+            <a:endParaRPr lang="de-DE" sz="1200" dirty="0"/>
+          </a:p>
+          <a:p>
+            <a:r>
+              <a:rPr lang="de-DE" sz="1200" dirty="0"/>
+              <a:t>Relevanz</a:t>
+            </a:r>
+          </a:p>
+          <a:p>
+            <a:r>
+              <a:rPr lang="de-DE" sz="1200" dirty="0"/>
+              <a:t>Schließt die Wissenslücke über das Erscheinungsbild der Stadt Gummersbach bei den Bürgern und Besuchern. Das Ansammeln der “Familienfotos” vertieft die Stadtgeschichte und trägt durch das Hervorbringen von neuem Material auch </a:t>
+            </a:r>
+            <a:r>
+              <a:rPr lang="de-DE" sz="1200" dirty="0" err="1"/>
+              <a:t>geschichtwissenschaftliche</a:t>
+            </a:r>
+            <a:r>
+              <a:rPr lang="de-DE" sz="1200" dirty="0"/>
+              <a:t> Relevanz.</a:t>
+            </a:r>
+          </a:p>
+        </p:txBody>
+      </p:sp>
+    </p:spTree>
+    <p:extLst>
+      <p:ext uri="{BB962C8B-B14F-4D97-AF65-F5344CB8AC3E}">
+        <p14:creationId xmlns:p14="http://schemas.microsoft.com/office/powerpoint/2010/main" val="3784318147"/>
+      </p:ext>
+    </p:extLst>
+  </p:cSld>
+  <p:clrMapOvr>
+    <a:masterClrMapping/>
+  </p:clrMapOvr>
+</p:sld>
+</file>
+
+<file path=ppt/slides/slide8.xml><?xml version="1.0" encoding="utf-8"?>
+<p:sld xmlns:a="http://schemas.openxmlformats.org/drawingml/2006/main" xmlns:r="http://schemas.openxmlformats.org/officeDocument/2006/relationships" xmlns:p="http://schemas.openxmlformats.org/presentationml/2006/main">
+  <p:cSld>
+    <p:spTree>
+      <p:nvGrpSpPr>
+        <p:cNvPr id="1" name=""/>
+        <p:cNvGrpSpPr/>
+        <p:nvPr/>
+      </p:nvGrpSpPr>
+      <p:grpSpPr>
+        <a:xfrm>
+          <a:off x="0" y="0"/>
+          <a:ext cx="0" cy="0"/>
+          <a:chOff x="0" y="0"/>
+          <a:chExt cx="0" cy="0"/>
+        </a:xfrm>
+      </p:grpSpPr>
+      <p:sp>
+        <p:nvSpPr>
+          <p:cNvPr id="2" name="Titel 1">
+            <a:extLst>
+              <a:ext uri="{FF2B5EF4-FFF2-40B4-BE49-F238E27FC236}">
                 <a16:creationId xmlns:a16="http://schemas.microsoft.com/office/drawing/2014/main" id="{12DBA99A-E93C-4C9A-FF1F-22FE00729933}"/>
               </a:ext>
             </a:extLst>
@@ -4398,7 +6179,7 @@
           <p:nvPr>
             <p:extLst>
               <p:ext uri="{D42A27DB-BD31-4B8C-83A1-F6EECF244321}">
-                <p14:modId xmlns:p14="http://schemas.microsoft.com/office/powerpoint/2010/main" val="1018337064"/>
+                <p14:modId xmlns:p14="http://schemas.microsoft.com/office/powerpoint/2010/main" val="4280985730"/>
               </p:ext>
             </p:extLst>
           </p:nvPr>
@@ -4459,7 +6240,7 @@
 </p:sld>
 </file>
 
-<file path=ppt/slides/slide4.xml><?xml version="1.0" encoding="utf-8"?>
+<file path=ppt/slides/slide9.xml><?xml version="1.0" encoding="utf-8"?>
 <p:sld xmlns:a="http://schemas.openxmlformats.org/drawingml/2006/main" xmlns:r="http://schemas.openxmlformats.org/officeDocument/2006/relationships" xmlns:p="http://schemas.openxmlformats.org/presentationml/2006/main">
   <p:cSld>
     <p:spTree>
@@ -4539,362 +6320,6 @@
     <p:extLst>
       <p:ext uri="{BB962C8B-B14F-4D97-AF65-F5344CB8AC3E}">
         <p14:creationId xmlns:p14="http://schemas.microsoft.com/office/powerpoint/2010/main" val="4087313282"/>
-      </p:ext>
-    </p:extLst>
-  </p:cSld>
-  <p:clrMapOvr>
-    <a:masterClrMapping/>
-  </p:clrMapOvr>
-</p:sld>
-</file>
-
-<file path=ppt/slides/slide5.xml><?xml version="1.0" encoding="utf-8"?>
-<p:sld xmlns:a="http://schemas.openxmlformats.org/drawingml/2006/main" xmlns:r="http://schemas.openxmlformats.org/officeDocument/2006/relationships" xmlns:p="http://schemas.openxmlformats.org/presentationml/2006/main">
-  <p:cSld>
-    <p:spTree>
-      <p:nvGrpSpPr>
-        <p:cNvPr id="1" name=""/>
-        <p:cNvGrpSpPr/>
-        <p:nvPr/>
-      </p:nvGrpSpPr>
-      <p:grpSpPr>
-        <a:xfrm>
-          <a:off x="0" y="0"/>
-          <a:ext cx="0" cy="0"/>
-          <a:chOff x="0" y="0"/>
-          <a:chExt cx="0" cy="0"/>
-        </a:xfrm>
-      </p:grpSpPr>
-      <p:sp>
-        <p:nvSpPr>
-          <p:cNvPr id="2" name="Titel 1">
-            <a:extLst>
-              <a:ext uri="{FF2B5EF4-FFF2-40B4-BE49-F238E27FC236}">
-                <a16:creationId xmlns:a16="http://schemas.microsoft.com/office/drawing/2014/main" id="{111CE7B0-EAAA-0A0A-5559-AD82A1546E93}"/>
-              </a:ext>
-            </a:extLst>
-          </p:cNvPr>
-          <p:cNvSpPr>
-            <a:spLocks noGrp="1"/>
-          </p:cNvSpPr>
-          <p:nvPr>
-            <p:ph type="title"/>
-          </p:nvPr>
-        </p:nvSpPr>
-        <p:spPr/>
-        <p:txBody>
-          <a:bodyPr/>
-          <a:lstStyle/>
-          <a:p>
-            <a:pPr algn="ctr"/>
-            <a:r>
-              <a:rPr lang="de-DE" dirty="0"/>
-              <a:t>Version 0.8.7</a:t>
-            </a:r>
-          </a:p>
-        </p:txBody>
-      </p:sp>
-      <p:pic>
-        <p:nvPicPr>
-          <p:cNvPr id="4" name="Grafik 3">
-            <a:extLst>
-              <a:ext uri="{FF2B5EF4-FFF2-40B4-BE49-F238E27FC236}">
-                <a16:creationId xmlns:a16="http://schemas.microsoft.com/office/drawing/2014/main" id="{4C4F586D-9911-8887-C71F-EA90B9421591}"/>
-              </a:ext>
-            </a:extLst>
-          </p:cNvPr>
-          <p:cNvPicPr>
-            <a:picLocks noChangeAspect="1"/>
-          </p:cNvPicPr>
-          <p:nvPr/>
-        </p:nvPicPr>
-        <p:blipFill>
-          <a:blip r:embed="rId3"/>
-          <a:stretch>
-            <a:fillRect/>
-          </a:stretch>
-        </p:blipFill>
-        <p:spPr>
-          <a:xfrm>
-            <a:off x="2435289" y="1690688"/>
-            <a:ext cx="8739675" cy="5015871"/>
-          </a:xfrm>
-          <a:prstGeom prst="rect">
-            <a:avLst/>
-          </a:prstGeom>
-        </p:spPr>
-      </p:pic>
-    </p:spTree>
-    <p:extLst>
-      <p:ext uri="{BB962C8B-B14F-4D97-AF65-F5344CB8AC3E}">
-        <p14:creationId xmlns:p14="http://schemas.microsoft.com/office/powerpoint/2010/main" val="2718715793"/>
-      </p:ext>
-    </p:extLst>
-  </p:cSld>
-  <p:clrMapOvr>
-    <a:masterClrMapping/>
-  </p:clrMapOvr>
-</p:sld>
-</file>
-
-<file path=ppt/slides/slide6.xml><?xml version="1.0" encoding="utf-8"?>
-<p:sld xmlns:a="http://schemas.openxmlformats.org/drawingml/2006/main" xmlns:r="http://schemas.openxmlformats.org/officeDocument/2006/relationships" xmlns:p="http://schemas.openxmlformats.org/presentationml/2006/main">
-  <p:cSld>
-    <p:spTree>
-      <p:nvGrpSpPr>
-        <p:cNvPr id="1" name=""/>
-        <p:cNvGrpSpPr/>
-        <p:nvPr/>
-      </p:nvGrpSpPr>
-      <p:grpSpPr>
-        <a:xfrm>
-          <a:off x="0" y="0"/>
-          <a:ext cx="0" cy="0"/>
-          <a:chOff x="0" y="0"/>
-          <a:chExt cx="0" cy="0"/>
-        </a:xfrm>
-      </p:grpSpPr>
-      <p:sp>
-        <p:nvSpPr>
-          <p:cNvPr id="2" name="Titel 1">
-            <a:extLst>
-              <a:ext uri="{FF2B5EF4-FFF2-40B4-BE49-F238E27FC236}">
-                <a16:creationId xmlns:a16="http://schemas.microsoft.com/office/drawing/2014/main" id="{6F9E02DB-F2A0-8153-53F3-E6599863E214}"/>
-              </a:ext>
-            </a:extLst>
-          </p:cNvPr>
-          <p:cNvSpPr>
-            <a:spLocks noGrp="1"/>
-          </p:cNvSpPr>
-          <p:nvPr>
-            <p:ph type="title"/>
-          </p:nvPr>
-        </p:nvSpPr>
-        <p:spPr/>
-        <p:txBody>
-          <a:bodyPr/>
-          <a:lstStyle/>
-          <a:p>
-            <a:pPr algn="ctr"/>
-            <a:r>
-              <a:rPr lang="de-DE" dirty="0"/>
-              <a:t>Version 0.9</a:t>
-            </a:r>
-          </a:p>
-        </p:txBody>
-      </p:sp>
-      <p:pic>
-        <p:nvPicPr>
-          <p:cNvPr id="4" name="Grafik 3">
-            <a:extLst>
-              <a:ext uri="{FF2B5EF4-FFF2-40B4-BE49-F238E27FC236}">
-                <a16:creationId xmlns:a16="http://schemas.microsoft.com/office/drawing/2014/main" id="{6F930390-8741-BF8E-2D7C-F09319C83946}"/>
-              </a:ext>
-            </a:extLst>
-          </p:cNvPr>
-          <p:cNvPicPr>
-            <a:picLocks noChangeAspect="1"/>
-          </p:cNvPicPr>
-          <p:nvPr/>
-        </p:nvPicPr>
-        <p:blipFill>
-          <a:blip r:embed="rId3"/>
-          <a:stretch>
-            <a:fillRect/>
-          </a:stretch>
-        </p:blipFill>
-        <p:spPr>
-          <a:xfrm>
-            <a:off x="3538281" y="1877300"/>
-            <a:ext cx="5115437" cy="4689150"/>
-          </a:xfrm>
-          <a:prstGeom prst="rect">
-            <a:avLst/>
-          </a:prstGeom>
-        </p:spPr>
-      </p:pic>
-    </p:spTree>
-    <p:extLst>
-      <p:ext uri="{BB962C8B-B14F-4D97-AF65-F5344CB8AC3E}">
-        <p14:creationId xmlns:p14="http://schemas.microsoft.com/office/powerpoint/2010/main" val="4156003571"/>
-      </p:ext>
-    </p:extLst>
-  </p:cSld>
-  <p:clrMapOvr>
-    <a:masterClrMapping/>
-  </p:clrMapOvr>
-</p:sld>
-</file>
-
-<file path=ppt/slides/slide7.xml><?xml version="1.0" encoding="utf-8"?>
-<p:sld xmlns:a="http://schemas.openxmlformats.org/drawingml/2006/main" xmlns:r="http://schemas.openxmlformats.org/officeDocument/2006/relationships" xmlns:p="http://schemas.openxmlformats.org/presentationml/2006/main">
-  <p:cSld>
-    <p:spTree>
-      <p:nvGrpSpPr>
-        <p:cNvPr id="1" name=""/>
-        <p:cNvGrpSpPr/>
-        <p:nvPr/>
-      </p:nvGrpSpPr>
-      <p:grpSpPr>
-        <a:xfrm>
-          <a:off x="0" y="0"/>
-          <a:ext cx="0" cy="0"/>
-          <a:chOff x="0" y="0"/>
-          <a:chExt cx="0" cy="0"/>
-        </a:xfrm>
-      </p:grpSpPr>
-      <p:sp>
-        <p:nvSpPr>
-          <p:cNvPr id="2" name="Titel 1">
-            <a:extLst>
-              <a:ext uri="{FF2B5EF4-FFF2-40B4-BE49-F238E27FC236}">
-                <a16:creationId xmlns:a16="http://schemas.microsoft.com/office/drawing/2014/main" id="{7E8204F1-D296-3CE9-0644-6C2978421B6A}"/>
-              </a:ext>
-            </a:extLst>
-          </p:cNvPr>
-          <p:cNvSpPr>
-            <a:spLocks noGrp="1"/>
-          </p:cNvSpPr>
-          <p:nvPr>
-            <p:ph type="title"/>
-          </p:nvPr>
-        </p:nvSpPr>
-        <p:spPr/>
-        <p:txBody>
-          <a:bodyPr/>
-          <a:lstStyle/>
-          <a:p>
-            <a:pPr algn="ctr"/>
-            <a:r>
-              <a:rPr lang="de-DE" dirty="0"/>
-              <a:t>Version 0.10</a:t>
-            </a:r>
-          </a:p>
-        </p:txBody>
-      </p:sp>
-      <p:pic>
-        <p:nvPicPr>
-          <p:cNvPr id="4" name="Grafik 3">
-            <a:extLst>
-              <a:ext uri="{FF2B5EF4-FFF2-40B4-BE49-F238E27FC236}">
-                <a16:creationId xmlns:a16="http://schemas.microsoft.com/office/drawing/2014/main" id="{37285A09-5313-B652-F195-3EF86E9ABD22}"/>
-              </a:ext>
-            </a:extLst>
-          </p:cNvPr>
-          <p:cNvPicPr>
-            <a:picLocks noChangeAspect="1"/>
-          </p:cNvPicPr>
-          <p:nvPr/>
-        </p:nvPicPr>
-        <p:blipFill>
-          <a:blip r:embed="rId3"/>
-          <a:stretch>
-            <a:fillRect/>
-          </a:stretch>
-        </p:blipFill>
-        <p:spPr>
-          <a:xfrm>
-            <a:off x="3502523" y="1690688"/>
-            <a:ext cx="5186953" cy="4943814"/>
-          </a:xfrm>
-          <a:prstGeom prst="rect">
-            <a:avLst/>
-          </a:prstGeom>
-        </p:spPr>
-      </p:pic>
-    </p:spTree>
-    <p:extLst>
-      <p:ext uri="{BB962C8B-B14F-4D97-AF65-F5344CB8AC3E}">
-        <p14:creationId xmlns:p14="http://schemas.microsoft.com/office/powerpoint/2010/main" val="654925431"/>
-      </p:ext>
-    </p:extLst>
-  </p:cSld>
-  <p:clrMapOvr>
-    <a:masterClrMapping/>
-  </p:clrMapOvr>
-</p:sld>
-</file>
-
-<file path=ppt/slides/slide8.xml><?xml version="1.0" encoding="utf-8"?>
-<p:sld xmlns:a="http://schemas.openxmlformats.org/drawingml/2006/main" xmlns:r="http://schemas.openxmlformats.org/officeDocument/2006/relationships" xmlns:p="http://schemas.openxmlformats.org/presentationml/2006/main">
-  <p:cSld>
-    <p:spTree>
-      <p:nvGrpSpPr>
-        <p:cNvPr id="1" name=""/>
-        <p:cNvGrpSpPr/>
-        <p:nvPr/>
-      </p:nvGrpSpPr>
-      <p:grpSpPr>
-        <a:xfrm>
-          <a:off x="0" y="0"/>
-          <a:ext cx="0" cy="0"/>
-          <a:chOff x="0" y="0"/>
-          <a:chExt cx="0" cy="0"/>
-        </a:xfrm>
-      </p:grpSpPr>
-      <p:sp>
-        <p:nvSpPr>
-          <p:cNvPr id="2" name="Titel 1">
-            <a:extLst>
-              <a:ext uri="{FF2B5EF4-FFF2-40B4-BE49-F238E27FC236}">
-                <a16:creationId xmlns:a16="http://schemas.microsoft.com/office/drawing/2014/main" id="{0A402FAF-07B6-FB6C-C0DE-8500FB3F8FC7}"/>
-              </a:ext>
-            </a:extLst>
-          </p:cNvPr>
-          <p:cNvSpPr>
-            <a:spLocks noGrp="1"/>
-          </p:cNvSpPr>
-          <p:nvPr>
-            <p:ph type="title"/>
-          </p:nvPr>
-        </p:nvSpPr>
-        <p:spPr/>
-        <p:txBody>
-          <a:bodyPr/>
-          <a:lstStyle/>
-          <a:p>
-            <a:pPr algn="ctr"/>
-            <a:r>
-              <a:rPr lang="de-DE"/>
-              <a:t>Version 1.0</a:t>
-            </a:r>
-          </a:p>
-        </p:txBody>
-      </p:sp>
-      <p:pic>
-        <p:nvPicPr>
-          <p:cNvPr id="4" name="Grafik 3">
-            <a:extLst>
-              <a:ext uri="{FF2B5EF4-FFF2-40B4-BE49-F238E27FC236}">
-                <a16:creationId xmlns:a16="http://schemas.microsoft.com/office/drawing/2014/main" id="{CCFDA49A-B683-BF9F-03A2-CC51059F9734}"/>
-              </a:ext>
-            </a:extLst>
-          </p:cNvPr>
-          <p:cNvPicPr>
-            <a:picLocks noChangeAspect="1"/>
-          </p:cNvPicPr>
-          <p:nvPr/>
-        </p:nvPicPr>
-        <p:blipFill>
-          <a:blip r:embed="rId2"/>
-          <a:stretch>
-            <a:fillRect/>
-          </a:stretch>
-        </p:blipFill>
-        <p:spPr>
-          <a:xfrm>
-            <a:off x="3535180" y="1776413"/>
-            <a:ext cx="5121639" cy="4881562"/>
-          </a:xfrm>
-          <a:prstGeom prst="rect">
-            <a:avLst/>
-          </a:prstGeom>
-        </p:spPr>
-      </p:pic>
-    </p:spTree>
-    <p:extLst>
-      <p:ext uri="{BB962C8B-B14F-4D97-AF65-F5344CB8AC3E}">
-        <p14:creationId xmlns:p14="http://schemas.microsoft.com/office/powerpoint/2010/main" val="3664826372"/>
       </p:ext>
     </p:extLst>
   </p:cSld>

</xml_diff>

<commit_message>
add folien projektplan link
</commit_message>
<xml_diff>
--- a/EPWS2223HausenKochZimmer Audit 1.pptx
+++ b/EPWS2223HausenKochZimmer Audit 1.pptx
@@ -5,22 +5,23 @@
     <p:sldMasterId id="2147483648" r:id="rId1"/>
   </p:sldMasterIdLst>
   <p:notesMasterIdLst>
-    <p:notesMasterId r:id="rId15"/>
+    <p:notesMasterId r:id="rId16"/>
   </p:notesMasterIdLst>
   <p:sldIdLst>
     <p:sldId id="256" r:id="rId2"/>
-    <p:sldId id="264" r:id="rId3"/>
-    <p:sldId id="265" r:id="rId4"/>
-    <p:sldId id="266" r:id="rId5"/>
-    <p:sldId id="258" r:id="rId6"/>
-    <p:sldId id="267" r:id="rId7"/>
-    <p:sldId id="268" r:id="rId8"/>
-    <p:sldId id="257" r:id="rId9"/>
-    <p:sldId id="259" r:id="rId10"/>
-    <p:sldId id="260" r:id="rId11"/>
-    <p:sldId id="261" r:id="rId12"/>
-    <p:sldId id="262" r:id="rId13"/>
-    <p:sldId id="263" r:id="rId14"/>
+    <p:sldId id="269" r:id="rId3"/>
+    <p:sldId id="264" r:id="rId4"/>
+    <p:sldId id="265" r:id="rId5"/>
+    <p:sldId id="266" r:id="rId6"/>
+    <p:sldId id="258" r:id="rId7"/>
+    <p:sldId id="267" r:id="rId8"/>
+    <p:sldId id="268" r:id="rId9"/>
+    <p:sldId id="257" r:id="rId10"/>
+    <p:sldId id="259" r:id="rId11"/>
+    <p:sldId id="260" r:id="rId12"/>
+    <p:sldId id="261" r:id="rId13"/>
+    <p:sldId id="262" r:id="rId14"/>
+    <p:sldId id="263" r:id="rId15"/>
   </p:sldIdLst>
   <p:sldSz cx="12192000" cy="6858000"/>
   <p:notesSz cx="6858000" cy="9144000"/>
@@ -125,6 +126,7 @@
         <p14:section name="Standardabschnitt" id="{FE2716BC-FBA1-4CF5-ADA1-DE97E19B0E62}">
           <p14:sldIdLst>
             <p14:sldId id="256"/>
+            <p14:sldId id="269"/>
           </p14:sldIdLst>
         </p14:section>
         <p14:section name="Erste Projekt Ideen" id="{4C39790B-862A-4FB0-9200-E8CFAD39A9BC}">
@@ -156,6 +158,9 @@
           </p14:sldIdLst>
         </p14:section>
       </p14:sectionLst>
+    </p:ext>
+    <p:ext uri="{EFAFB233-063F-42B5-8137-9DF3F51BA10A}">
+      <p15:sldGuideLst xmlns:p15="http://schemas.microsoft.com/office/powerpoint/2012/main"/>
     </p:ext>
   </p:extLst>
 </p:presentation>
@@ -578,7 +583,7 @@
           <a:p>
             <a:fld id="{92DF0825-AC8F-4116-B49B-4A4F75013D61}" type="slidenum">
               <a:rPr lang="de-DE" smtClean="0"/>
-              <a:t>2</a:t>
+              <a:t>3</a:t>
             </a:fld>
             <a:endParaRPr lang="de-DE"/>
           </a:p>
@@ -665,7 +670,7 @@
           <a:p>
             <a:fld id="{92DF0825-AC8F-4116-B49B-4A4F75013D61}" type="slidenum">
               <a:rPr lang="de-DE" smtClean="0"/>
-              <a:t>4</a:t>
+              <a:t>5</a:t>
             </a:fld>
             <a:endParaRPr lang="de-DE"/>
           </a:p>
@@ -752,7 +757,7 @@
           <a:p>
             <a:fld id="{92DF0825-AC8F-4116-B49B-4A4F75013D61}" type="slidenum">
               <a:rPr lang="de-DE" smtClean="0"/>
-              <a:t>6</a:t>
+              <a:t>7</a:t>
             </a:fld>
             <a:endParaRPr lang="de-DE"/>
           </a:p>
@@ -847,7 +852,7 @@
           <a:p>
             <a:fld id="{92DF0825-AC8F-4116-B49B-4A4F75013D61}" type="slidenum">
               <a:rPr lang="de-DE" smtClean="0"/>
-              <a:t>7</a:t>
+              <a:t>8</a:t>
             </a:fld>
             <a:endParaRPr lang="de-DE"/>
           </a:p>
@@ -935,7 +940,7 @@
           <a:p>
             <a:fld id="{92DF0825-AC8F-4116-B49B-4A4F75013D61}" type="slidenum">
               <a:rPr lang="de-DE" smtClean="0"/>
-              <a:t>8</a:t>
+              <a:t>9</a:t>
             </a:fld>
             <a:endParaRPr lang="de-DE"/>
           </a:p>
@@ -1022,7 +1027,7 @@
           <a:p>
             <a:fld id="{92DF0825-AC8F-4116-B49B-4A4F75013D61}" type="slidenum">
               <a:rPr lang="de-DE" smtClean="0"/>
-              <a:t>9</a:t>
+              <a:t>10</a:t>
             </a:fld>
             <a:endParaRPr lang="de-DE"/>
           </a:p>
@@ -1109,7 +1114,7 @@
           <a:p>
             <a:fld id="{92DF0825-AC8F-4116-B49B-4A4F75013D61}" type="slidenum">
               <a:rPr lang="de-DE" smtClean="0"/>
-              <a:t>10</a:t>
+              <a:t>11</a:t>
             </a:fld>
             <a:endParaRPr lang="de-DE"/>
           </a:p>
@@ -1196,7 +1201,7 @@
           <a:p>
             <a:fld id="{92DF0825-AC8F-4116-B49B-4A4F75013D61}" type="slidenum">
               <a:rPr lang="de-DE" smtClean="0"/>
-              <a:t>11</a:t>
+              <a:t>12</a:t>
             </a:fld>
             <a:endParaRPr lang="de-DE"/>
           </a:p>
@@ -1283,7 +1288,7 @@
           <a:p>
             <a:fld id="{92DF0825-AC8F-4116-B49B-4A4F75013D61}" type="slidenum">
               <a:rPr lang="de-DE" smtClean="0"/>
-              <a:t>12</a:t>
+              <a:t>13</a:t>
             </a:fld>
             <a:endParaRPr lang="de-DE"/>
           </a:p>
@@ -4649,6 +4654,95 @@
           <p:cNvPr id="2" name="Titel 1">
             <a:extLst>
               <a:ext uri="{FF2B5EF4-FFF2-40B4-BE49-F238E27FC236}">
+                <a16:creationId xmlns:a16="http://schemas.microsoft.com/office/drawing/2014/main" id="{2A3A0AF6-B267-8C2B-9A16-B4C0D7CF7603}"/>
+              </a:ext>
+            </a:extLst>
+          </p:cNvPr>
+          <p:cNvSpPr>
+            <a:spLocks noGrp="1"/>
+          </p:cNvSpPr>
+          <p:nvPr>
+            <p:ph type="title"/>
+          </p:nvPr>
+        </p:nvSpPr>
+        <p:spPr/>
+        <p:txBody>
+          <a:bodyPr/>
+          <a:lstStyle/>
+          <a:p>
+            <a:pPr algn="ctr"/>
+            <a:r>
+              <a:rPr lang="de-DE" dirty="0"/>
+              <a:t>Version 0.85</a:t>
+            </a:r>
+          </a:p>
+        </p:txBody>
+      </p:sp>
+      <p:pic>
+        <p:nvPicPr>
+          <p:cNvPr id="6" name="Grafik 5">
+            <a:extLst>
+              <a:ext uri="{FF2B5EF4-FFF2-40B4-BE49-F238E27FC236}">
+                <a16:creationId xmlns:a16="http://schemas.microsoft.com/office/drawing/2014/main" id="{FFD6EEBB-F57D-482D-7FAE-DFCB47034A91}"/>
+              </a:ext>
+            </a:extLst>
+          </p:cNvPr>
+          <p:cNvPicPr>
+            <a:picLocks noChangeAspect="1"/>
+          </p:cNvPicPr>
+          <p:nvPr/>
+        </p:nvPicPr>
+        <p:blipFill>
+          <a:blip r:embed="rId3"/>
+          <a:stretch>
+            <a:fillRect/>
+          </a:stretch>
+        </p:blipFill>
+        <p:spPr>
+          <a:xfrm>
+            <a:off x="1651517" y="1495191"/>
+            <a:ext cx="8888965" cy="5101552"/>
+          </a:xfrm>
+          <a:prstGeom prst="rect">
+            <a:avLst/>
+          </a:prstGeom>
+        </p:spPr>
+      </p:pic>
+    </p:spTree>
+    <p:extLst>
+      <p:ext uri="{BB962C8B-B14F-4D97-AF65-F5344CB8AC3E}">
+        <p14:creationId xmlns:p14="http://schemas.microsoft.com/office/powerpoint/2010/main" val="4087313282"/>
+      </p:ext>
+    </p:extLst>
+  </p:cSld>
+  <p:clrMapOvr>
+    <a:masterClrMapping/>
+  </p:clrMapOvr>
+</p:sld>
+</file>
+
+<file path=ppt/slides/slide11.xml><?xml version="1.0" encoding="utf-8"?>
+<p:sld xmlns:a="http://schemas.openxmlformats.org/drawingml/2006/main" xmlns:r="http://schemas.openxmlformats.org/officeDocument/2006/relationships" xmlns:p="http://schemas.openxmlformats.org/presentationml/2006/main">
+  <p:cSld>
+    <p:spTree>
+      <p:nvGrpSpPr>
+        <p:cNvPr id="1" name=""/>
+        <p:cNvGrpSpPr/>
+        <p:nvPr/>
+      </p:nvGrpSpPr>
+      <p:grpSpPr>
+        <a:xfrm>
+          <a:off x="0" y="0"/>
+          <a:ext cx="0" cy="0"/>
+          <a:chOff x="0" y="0"/>
+          <a:chExt cx="0" cy="0"/>
+        </a:xfrm>
+      </p:grpSpPr>
+      <p:sp>
+        <p:nvSpPr>
+          <p:cNvPr id="2" name="Titel 1">
+            <a:extLst>
+              <a:ext uri="{FF2B5EF4-FFF2-40B4-BE49-F238E27FC236}">
                 <a16:creationId xmlns:a16="http://schemas.microsoft.com/office/drawing/2014/main" id="{111CE7B0-EAAA-0A0A-5559-AD82A1546E93}"/>
               </a:ext>
             </a:extLst>
@@ -4716,7 +4810,7 @@
 </p:sld>
 </file>
 
-<file path=ppt/slides/slide11.xml><?xml version="1.0" encoding="utf-8"?>
+<file path=ppt/slides/slide12.xml><?xml version="1.0" encoding="utf-8"?>
 <p:sld xmlns:a="http://schemas.openxmlformats.org/drawingml/2006/main" xmlns:r="http://schemas.openxmlformats.org/officeDocument/2006/relationships" xmlns:p="http://schemas.openxmlformats.org/presentationml/2006/main">
   <p:cSld>
     <p:spTree>
@@ -4805,7 +4899,7 @@
 </p:sld>
 </file>
 
-<file path=ppt/slides/slide12.xml><?xml version="1.0" encoding="utf-8"?>
+<file path=ppt/slides/slide13.xml><?xml version="1.0" encoding="utf-8"?>
 <p:sld xmlns:a="http://schemas.openxmlformats.org/drawingml/2006/main" xmlns:r="http://schemas.openxmlformats.org/officeDocument/2006/relationships" xmlns:p="http://schemas.openxmlformats.org/presentationml/2006/main">
   <p:cSld>
     <p:spTree>
@@ -4894,7 +4988,7 @@
 </p:sld>
 </file>
 
-<file path=ppt/slides/slide13.xml><?xml version="1.0" encoding="utf-8"?>
+<file path=ppt/slides/slide14.xml><?xml version="1.0" encoding="utf-8"?>
 <p:sld xmlns:a="http://schemas.openxmlformats.org/drawingml/2006/main" xmlns:r="http://schemas.openxmlformats.org/officeDocument/2006/relationships" xmlns:p="http://schemas.openxmlformats.org/presentationml/2006/main">
   <p:cSld>
     <p:spTree>
@@ -5005,7 +5099,7 @@
           <p:cNvPr id="2" name="Titel 1">
             <a:extLst>
               <a:ext uri="{FF2B5EF4-FFF2-40B4-BE49-F238E27FC236}">
-                <a16:creationId xmlns:a16="http://schemas.microsoft.com/office/drawing/2014/main" id="{D4F0595A-7435-C9B7-F66B-A192A834D49B}"/>
+                <a16:creationId xmlns:a16="http://schemas.microsoft.com/office/drawing/2014/main" id="{6D5803E1-3061-3D98-55DF-DA65409D0477}"/>
               </a:ext>
             </a:extLst>
           </p:cNvPr>
@@ -5024,7 +5118,7 @@
             <a:pPr algn="ctr"/>
             <a:r>
               <a:rPr lang="de-DE" dirty="0"/>
-              <a:t>Andere Projekt Ideen</a:t>
+              <a:t>Projektplan</a:t>
             </a:r>
           </a:p>
         </p:txBody>
@@ -5034,7 +5128,7 @@
           <p:cNvPr id="3" name="Inhaltsplatzhalter 2">
             <a:extLst>
               <a:ext uri="{FF2B5EF4-FFF2-40B4-BE49-F238E27FC236}">
-                <a16:creationId xmlns:a16="http://schemas.microsoft.com/office/drawing/2014/main" id="{B3DD9D4B-2089-7D54-ABB6-9FD4CFD0EEDD}"/>
+                <a16:creationId xmlns:a16="http://schemas.microsoft.com/office/drawing/2014/main" id="{A827AFA2-A2E7-A253-12EC-D3BB40886ABE}"/>
               </a:ext>
             </a:extLst>
           </p:cNvPr>
@@ -5045,104 +5139,38 @@
             <p:ph idx="1"/>
           </p:nvPr>
         </p:nvSpPr>
-        <p:spPr>
-          <a:xfrm>
-            <a:off x="838200" y="1825625"/>
-            <a:ext cx="10515600" cy="4667250"/>
-          </a:xfrm>
-        </p:spPr>
+        <p:spPr/>
         <p:txBody>
           <a:bodyPr>
-            <a:noAutofit/>
+            <a:normAutofit/>
           </a:bodyPr>
           <a:lstStyle/>
           <a:p>
             <a:r>
-              <a:rPr lang="de-DE" sz="1200" dirty="0"/>
-              <a:t>Unterstützung durch Plattform</a:t>
-            </a:r>
-          </a:p>
-          <a:p>
-            <a:pPr marL="0" indent="0">
-              <a:buNone/>
-            </a:pPr>
-            <a:r>
-              <a:rPr lang="de-DE" sz="1200" dirty="0"/>
-              <a:t>Das Problem der Digitalisierung ist meist der Benutzer, Alter, Bildung und Einkommen stellen Zugang Hürden da. Mit Hilfe eines softwaregestützten Angebots wollen wir es einigen Benutzer ermöglichen Erklärungen für verschiedene (einige) Probleme zu bekommen. Die Erklärungen sollten möglichst Audio Visuell, gegeben falls mit menschlicher Unterstützung ermöglicht werden.</a:t>
-            </a:r>
-          </a:p>
-          <a:p>
-            <a:pPr marL="0" indent="0">
-              <a:buNone/>
-            </a:pPr>
-            <a:endParaRPr lang="de-DE" sz="1200" dirty="0"/>
-          </a:p>
-          <a:p>
-            <a:r>
-              <a:rPr lang="de-DE" sz="1200" dirty="0"/>
-              <a:t>Lokale Einzelhändler Vernetzung</a:t>
-            </a:r>
-          </a:p>
-          <a:p>
-            <a:pPr marL="0" indent="0">
-              <a:buNone/>
-            </a:pPr>
-            <a:r>
-              <a:rPr lang="de-DE" sz="1200" dirty="0"/>
-              <a:t>Der Online Markt in Deutschland wir fast in alle Sparten von einem internationalen „Monopolisten“ gestimmt. Es gibt keine Plattform die adäquat lokalen Einzelhändler und Unternehmen online mit Kauf interessierten Personen verbindet. Die Idee ist es eine Plattform bereitgestellt, welche den Verkauf von Lokalen Produkten ermöglicht. Es ist zukünftig möglich den Zugang der Plattform in der analogen Welt bereitzustellen. Die Verknüpfung mit der analogen Welt könnte z.B. Senioren für vorteilhaft sein. Außerdem könnte Produkte nach non wirtschaftlichen Gesichtspunkten herausgehoben werden. </a:t>
-            </a:r>
-          </a:p>
-          <a:p>
-            <a:pPr marL="0" indent="0">
-              <a:buNone/>
-            </a:pPr>
-            <a:endParaRPr lang="de-DE" sz="1200" dirty="0"/>
-          </a:p>
-          <a:p>
-            <a:r>
-              <a:rPr lang="de-DE" sz="1200" dirty="0"/>
-              <a:t>Datenschutz: Abfrage bei Unternehmen</a:t>
-            </a:r>
-          </a:p>
-          <a:p>
-            <a:pPr marL="0" indent="0">
-              <a:buNone/>
-            </a:pPr>
-            <a:r>
-              <a:rPr lang="de-DE" sz="1200" dirty="0"/>
-              <a:t>Die Abfrage der gespeicherten Daten bei Unternehmen hat einige Hürden. Es ist möglich verschiedene Vorlagen im Internet zu finden, sowie einige Digitalunternehmen ermöglichen es online oder in Apps eine Auskunft er bekommen. Wir wollen dies zentraler und Benutzer freundlich Softwaregestützt ermöglichen. </a:t>
-            </a:r>
-          </a:p>
-          <a:p>
-            <a:pPr marL="0" indent="0">
-              <a:buNone/>
-            </a:pPr>
-            <a:endParaRPr lang="de-DE" sz="1200" dirty="0"/>
-          </a:p>
-          <a:p>
-            <a:r>
-              <a:rPr lang="de-DE" sz="1200" dirty="0"/>
-              <a:t>Datenschutz: Anleitung bei Einstellen von Apps</a:t>
-            </a:r>
-          </a:p>
-          <a:p>
-            <a:pPr marL="0" indent="0">
-              <a:buNone/>
-            </a:pPr>
-            <a:r>
-              <a:rPr lang="de-DE" sz="1200" dirty="0"/>
-              <a:t>Das Einstellen von Apps mit dem Fokus auf Datenschutz ist eine Herausforderung. Zum einen gibt es viele Apps, die diese in Unterpunkten verschachteln oder es kaum den Benutzer ermöglichen wirklich zu wissen was und wie genau er die Einstellungen des Datenschutzes vornehmen soll. Wir wollen eine Plattform Lösung anbieten, auf welcher mit Audio/visuellen Anleitungen die Einstellung verschiedener(einiger) gängiger Apps erklärt wird.</a:t>
-            </a:r>
-          </a:p>
-          <a:p>
-            <a:endParaRPr lang="de-DE" sz="1200" dirty="0"/>
+              <a:rPr lang="de-DE" sz="1800" dirty="0"/>
+              <a:t>Im </a:t>
+            </a:r>
+            <a:r>
+              <a:rPr lang="de-DE" sz="1800" dirty="0" err="1"/>
+              <a:t>Github</a:t>
+            </a:r>
+            <a:r>
+              <a:rPr lang="de-DE" sz="1800" dirty="0"/>
+              <a:t> Wiki</a:t>
+            </a:r>
+          </a:p>
+          <a:p>
+            <a:r>
+              <a:rPr lang="de-DE" sz="1600" dirty="0"/>
+              <a:t>https://github.com/sebastiankoch10/EPWS2223HausenKochZimmer/wiki/Ausf%C3%BChrlicher-Projektplan</a:t>
+            </a:r>
           </a:p>
         </p:txBody>
       </p:sp>
     </p:spTree>
     <p:extLst>
       <p:ext uri="{BB962C8B-B14F-4D97-AF65-F5344CB8AC3E}">
-        <p14:creationId xmlns:p14="http://schemas.microsoft.com/office/powerpoint/2010/main" val="2716736366"/>
+        <p14:creationId xmlns:p14="http://schemas.microsoft.com/office/powerpoint/2010/main" val="1441618072"/>
       </p:ext>
     </p:extLst>
   </p:cSld>
@@ -5174,7 +5202,7 @@
           <p:cNvPr id="2" name="Titel 1">
             <a:extLst>
               <a:ext uri="{FF2B5EF4-FFF2-40B4-BE49-F238E27FC236}">
-                <a16:creationId xmlns:a16="http://schemas.microsoft.com/office/drawing/2014/main" id="{029391F0-7EF8-A5A3-22B4-E6244BFA8160}"/>
+                <a16:creationId xmlns:a16="http://schemas.microsoft.com/office/drawing/2014/main" id="{D4F0595A-7435-C9B7-F66B-A192A834D49B}"/>
               </a:ext>
             </a:extLst>
           </p:cNvPr>
@@ -5193,7 +5221,7 @@
             <a:pPr algn="ctr"/>
             <a:r>
               <a:rPr lang="de-DE" dirty="0"/>
-              <a:t>Erste Version Projekt Idee</a:t>
+              <a:t>Andere Projekt Ideen</a:t>
             </a:r>
           </a:p>
         </p:txBody>
@@ -5203,7 +5231,7 @@
           <p:cNvPr id="3" name="Inhaltsplatzhalter 2">
             <a:extLst>
               <a:ext uri="{FF2B5EF4-FFF2-40B4-BE49-F238E27FC236}">
-                <a16:creationId xmlns:a16="http://schemas.microsoft.com/office/drawing/2014/main" id="{C93F4656-F40F-C017-B615-5BC2E3DFCA77}"/>
+                <a16:creationId xmlns:a16="http://schemas.microsoft.com/office/drawing/2014/main" id="{B3DD9D4B-2089-7D54-ABB6-9FD4CFD0EEDD}"/>
               </a:ext>
             </a:extLst>
           </p:cNvPr>
@@ -5217,7 +5245,7 @@
         <p:spPr>
           <a:xfrm>
             <a:off x="838200" y="1825625"/>
-            <a:ext cx="10515600" cy="4746625"/>
+            <a:ext cx="10515600" cy="4667250"/>
           </a:xfrm>
         </p:spPr>
         <p:txBody>
@@ -5228,7 +5256,7 @@
           <a:p>
             <a:r>
               <a:rPr lang="de-DE" sz="1200" dirty="0"/>
-              <a:t>Darstellung des Problemraums</a:t>
+              <a:t>Unterstützung durch Plattform</a:t>
             </a:r>
           </a:p>
           <a:p>
@@ -5237,25 +5265,7 @@
             </a:pPr>
             <a:r>
               <a:rPr lang="de-DE" sz="1200" dirty="0"/>
-              <a:t>Heutzutage gibt es wenig Möglichkeiten, digital mit alten Karten von Städten zu interagieren. Falls solche Karten vorliegen, ist es jedoch meist nur ein Bild und dem Nutzer ist es meist nicht möglich genau zu erkennen, was geschichtlich bedeutende Orte oder Gebäude auf der Karte sind. Des Weiteren ist es auch schwer nachzuvollziehen, wie sich diese Orte bzw. Gebäude im Verlauf der Zeit verändert haben, so ist es für einen geschichtsinteressierten Menschen schwierig, anhand alter Karten sich selbst Wissen anzueignen oder zu erweitern.</a:t>
-            </a:r>
-          </a:p>
-          <a:p>
-            <a:pPr marL="0" indent="0">
-              <a:buNone/>
-            </a:pPr>
-            <a:r>
-              <a:rPr lang="de-DE" sz="1200" dirty="0"/>
-              <a:t>Die Darstellung von historischen Daten anhand von Karten für eine Stadt wie Gummersbach ist leider nicht realistisch. Die Karten der Region Bergisches Land lassen sich bis 1795 zurückdatieren, jedoch gibt es keine stätischen Karten der Stadt Gummersbach, welche in unsere Recherche aufgefunden wurden. Gegebenenfalls können graphische Darstellung der historischen Daten einzelnen Interessanten Objekten zugeordnet werden.</a:t>
-            </a:r>
-          </a:p>
-          <a:p>
-            <a:pPr marL="0" indent="0">
-              <a:buNone/>
-            </a:pPr>
-            <a:r>
-              <a:rPr lang="de-DE" sz="1200" dirty="0"/>
-              <a:t>Es ist zu diskutieren, wie mit dem Problem der nicht gefundenen Karten umgegangen wird. Die erste Idee ist es keine Karte als Grundlage zum Darstellen der historischen Daten zu verwenden. Die andere Idee ist es Köln als Großstadt, für den POC zu verwenden, da es Karten Material zu finden gibt.</a:t>
+              <a:t>Das Problem der Digitalisierung ist meist der Benutzer, Alter, Bildung und Einkommen stellen Zugang Hürden da. Mit Hilfe eines softwaregestützten Angebots wollen wir es einigen Benutzer ermöglichen Erklärungen für verschiedene (einige) Probleme zu bekommen. Die Erklärungen sollten möglichst Audio Visuell, gegeben falls mit menschlicher Unterstützung ermöglicht werden.</a:t>
             </a:r>
           </a:p>
           <a:p>
@@ -5265,21 +5275,30 @@
             <a:endParaRPr lang="de-DE" sz="1200" dirty="0"/>
           </a:p>
           <a:p>
+            <a:r>
+              <a:rPr lang="de-DE" sz="1200" dirty="0"/>
+              <a:t>Lokale Einzelhändler Vernetzung</a:t>
+            </a:r>
+          </a:p>
+          <a:p>
             <a:pPr marL="0" indent="0">
               <a:buNone/>
             </a:pPr>
             <a:r>
               <a:rPr lang="de-DE" sz="1200" dirty="0"/>
-              <a:t>Anmerkungen:</a:t>
+              <a:t>Der Online Markt in Deutschland wir fast in alle Sparten von einem internationalen „Monopolisten“ gestimmt. Es gibt keine Plattform die adäquat lokalen Einzelhändler und Unternehmen online mit Kauf interessierten Personen verbindet. Die Idee ist es eine Plattform bereitgestellt, welche den Verkauf von Lokalen Produkten ermöglicht. Es ist zukünftig möglich den Zugang der Plattform in der analogen Welt bereitzustellen. Die Verknüpfung mit der analogen Welt könnte z.B. Senioren für vorteilhaft sein. Außerdem könnte Produkte nach non wirtschaftlichen Gesichtspunkten herausgehoben werden. </a:t>
             </a:r>
           </a:p>
           <a:p>
             <a:pPr marL="0" indent="0">
               <a:buNone/>
             </a:pPr>
+            <a:endParaRPr lang="de-DE" sz="1200" dirty="0"/>
+          </a:p>
+          <a:p>
             <a:r>
               <a:rPr lang="de-DE" sz="1200" dirty="0"/>
-              <a:t>Die Darstellung einer Karte als Grundlage ist zu diskutieren.</a:t>
+              <a:t>Datenschutz: Abfrage bei Unternehmen</a:t>
             </a:r>
           </a:p>
           <a:p>
@@ -5288,25 +5307,31 @@
             </a:pPr>
             <a:r>
               <a:rPr lang="de-DE" sz="1200" dirty="0"/>
-              <a:t>Die Darstellung von historischen Daten aus der näheren Umgebung ist meist nur für sehr Interessierte Kenner zugänglich. Die Daten befinden sich in separaten Quellen und gegebenenfalls sind diese nicht bekannt. </a:t>
+              <a:t>Die Abfrage der gespeicherten Daten bei Unternehmen hat einige Hürden. Es ist möglich verschiedene Vorlagen im Internet zu finden, sowie einige Digitalunternehmen ermöglichen es online oder in Apps eine Auskunft er bekommen. Wir wollen dies zentraler und Benutzer freundlich Softwaregestützt ermöglichen. </a:t>
             </a:r>
           </a:p>
           <a:p>
             <a:pPr marL="0" indent="0">
               <a:buNone/>
             </a:pPr>
+            <a:endParaRPr lang="de-DE" sz="1200" dirty="0"/>
+          </a:p>
+          <a:p>
             <a:r>
               <a:rPr lang="de-DE" sz="1200" dirty="0"/>
-              <a:t>Neben den Langjährigen Bewohnern der Städte Köln/Gummersbach sind ortsfremde wie Studenten oder Touristen mögliche User.</a:t>
-            </a:r>
-          </a:p>
-          <a:p>
-            <a:endParaRPr lang="de-DE" sz="1200" dirty="0"/>
+              <a:t>Datenschutz: Anleitung bei Einstellen von Apps</a:t>
+            </a:r>
           </a:p>
           <a:p>
             <a:pPr marL="0" indent="0">
               <a:buNone/>
             </a:pPr>
+            <a:r>
+              <a:rPr lang="de-DE" sz="1200" dirty="0"/>
+              <a:t>Das Einstellen von Apps mit dem Fokus auf Datenschutz ist eine Herausforderung. Zum einen gibt es viele Apps, die diese in Unterpunkten verschachteln oder es kaum den Benutzer ermöglichen wirklich zu wissen was und wie genau er die Einstellungen des Datenschutzes vornehmen soll. Wir wollen eine Plattform Lösung anbieten, auf welcher mit Audio/visuellen Anleitungen die Einstellung verschiedener(einiger) gängiger Apps erklärt wird.</a:t>
+            </a:r>
+          </a:p>
+          <a:p>
             <a:endParaRPr lang="de-DE" sz="1200" dirty="0"/>
           </a:p>
         </p:txBody>
@@ -5314,7 +5339,7 @@
     </p:spTree>
     <p:extLst>
       <p:ext uri="{BB962C8B-B14F-4D97-AF65-F5344CB8AC3E}">
-        <p14:creationId xmlns:p14="http://schemas.microsoft.com/office/powerpoint/2010/main" val="2832196691"/>
+        <p14:creationId xmlns:p14="http://schemas.microsoft.com/office/powerpoint/2010/main" val="2716736366"/>
       </p:ext>
     </p:extLst>
   </p:cSld>
@@ -5346,7 +5371,7 @@
           <p:cNvPr id="2" name="Titel 1">
             <a:extLst>
               <a:ext uri="{FF2B5EF4-FFF2-40B4-BE49-F238E27FC236}">
-                <a16:creationId xmlns:a16="http://schemas.microsoft.com/office/drawing/2014/main" id="{6533CB18-42D5-3E4C-71F2-344CFE3D3171}"/>
+                <a16:creationId xmlns:a16="http://schemas.microsoft.com/office/drawing/2014/main" id="{029391F0-7EF8-A5A3-22B4-E6244BFA8160}"/>
               </a:ext>
             </a:extLst>
           </p:cNvPr>
@@ -5375,7 +5400,7 @@
           <p:cNvPr id="3" name="Inhaltsplatzhalter 2">
             <a:extLst>
               <a:ext uri="{FF2B5EF4-FFF2-40B4-BE49-F238E27FC236}">
-                <a16:creationId xmlns:a16="http://schemas.microsoft.com/office/drawing/2014/main" id="{769D374B-3E02-82D0-A6B5-530D62E886BB}"/>
+                <a16:creationId xmlns:a16="http://schemas.microsoft.com/office/drawing/2014/main" id="{C93F4656-F40F-C017-B615-5BC2E3DFCA77}"/>
               </a:ext>
             </a:extLst>
           </p:cNvPr>
@@ -5388,19 +5413,19 @@
         </p:nvSpPr>
         <p:spPr>
           <a:xfrm>
-            <a:off x="838200" y="1825624"/>
-            <a:ext cx="10515600" cy="4784725"/>
+            <a:off x="838200" y="1825625"/>
+            <a:ext cx="10515600" cy="4746625"/>
           </a:xfrm>
         </p:spPr>
         <p:txBody>
           <a:bodyPr>
-            <a:normAutofit/>
+            <a:noAutofit/>
           </a:bodyPr>
           <a:lstStyle/>
           <a:p>
             <a:r>
               <a:rPr lang="de-DE" sz="1200" dirty="0"/>
-              <a:t>Zielsetzung / Vision</a:t>
+              <a:t>Darstellung des Problemraums</a:t>
             </a:r>
           </a:p>
           <a:p>
@@ -5409,7 +5434,25 @@
             </a:pPr>
             <a:r>
               <a:rPr lang="de-DE" sz="1200" dirty="0"/>
-              <a:t>Idee ist es nun, dem Nutzer eine Möglichkeit zu schaffen, sich geschichtliches Wissen über bestimmte Orte und den darin verbundenen Gebäuden anzueignen und das erworbene Wissen zu verfestigen. Dies soll erfolgen, indem man eine alte Karte virtuell ablaufen kann und bei bestimmten bedeutenden Punkten sich entsprechende Informationen durchlesen kann. Auch soll man von der jeweiligen alten Karte einen Vergleich zu einer neuen Karte sehen können (?).</a:t>
+              <a:t>Heutzutage gibt es wenig Möglichkeiten, digital mit alten Karten von Städten zu interagieren. Falls solche Karten vorliegen, ist es jedoch meist nur ein Bild und dem Nutzer ist es meist nicht möglich genau zu erkennen, was geschichtlich bedeutende Orte oder Gebäude auf der Karte sind. Des Weiteren ist es auch schwer nachzuvollziehen, wie sich diese Orte bzw. Gebäude im Verlauf der Zeit verändert haben, so ist es für einen geschichtsinteressierten Menschen schwierig, anhand alter Karten sich selbst Wissen anzueignen oder zu erweitern.</a:t>
+            </a:r>
+          </a:p>
+          <a:p>
+            <a:pPr marL="0" indent="0">
+              <a:buNone/>
+            </a:pPr>
+            <a:r>
+              <a:rPr lang="de-DE" sz="1200" dirty="0"/>
+              <a:t>Die Darstellung von historischen Daten anhand von Karten für eine Stadt wie Gummersbach ist leider nicht realistisch. Die Karten der Region Bergisches Land lassen sich bis 1795 zurückdatieren, jedoch gibt es keine stätischen Karten der Stadt Gummersbach, welche in unsere Recherche aufgefunden wurden. Gegebenenfalls können graphische Darstellung der historischen Daten einzelnen Interessanten Objekten zugeordnet werden.</a:t>
+            </a:r>
+          </a:p>
+          <a:p>
+            <a:pPr marL="0" indent="0">
+              <a:buNone/>
+            </a:pPr>
+            <a:r>
+              <a:rPr lang="de-DE" sz="1200" dirty="0"/>
+              <a:t>Es ist zu diskutieren, wie mit dem Problem der nicht gefundenen Karten umgegangen wird. Die erste Idee ist es keine Karte als Grundlage zum Darstellen der historischen Daten zu verwenden. Die andere Idee ist es Köln als Großstadt, für den POC zu verwenden, da es Karten Material zu finden gibt.</a:t>
             </a:r>
           </a:p>
           <a:p>
@@ -5424,7 +5467,7 @@
             </a:pPr>
             <a:r>
               <a:rPr lang="de-DE" sz="1200" dirty="0"/>
-              <a:t>Anmerkung:</a:t>
+              <a:t>Anmerkungen:</a:t>
             </a:r>
           </a:p>
           <a:p>
@@ -5433,7 +5476,7 @@
             </a:pPr>
             <a:r>
               <a:rPr lang="de-DE" sz="1200" dirty="0"/>
-              <a:t>Nachdem man eine Karte erkundet hat, soll man das Gelernte in Form eines Quiz (?) wiedergeben können.</a:t>
+              <a:t>Die Darstellung einer Karte als Grundlage ist zu diskutieren.</a:t>
             </a:r>
           </a:p>
           <a:p>
@@ -5442,7 +5485,7 @@
             </a:pPr>
             <a:r>
               <a:rPr lang="de-DE" sz="1200" dirty="0"/>
-              <a:t>Die Veränderung des Objektes in der Stadt soll möglichst durch eine bildliche Darstellung verdeutlicht werden.</a:t>
+              <a:t>Die Darstellung von historischen Daten aus der näheren Umgebung ist meist nur für sehr Interessierte Kenner zugänglich. Die Daten befinden sich in separaten Quellen und gegebenenfalls sind diese nicht bekannt. </a:t>
             </a:r>
           </a:p>
           <a:p>
@@ -5451,89 +5494,24 @@
             </a:pPr>
             <a:r>
               <a:rPr lang="de-DE" sz="1200" dirty="0"/>
-              <a:t>Die Software könnte durch Gamification Systeme das Lernen fördern.</a:t>
-            </a:r>
+              <a:t>Neben den Langjährigen Bewohnern der Städte Köln/Gummersbach sind ortsfremde wie Studenten oder Touristen mögliche User.</a:t>
+            </a:r>
+          </a:p>
+          <a:p>
+            <a:endParaRPr lang="de-DE" sz="1200" dirty="0"/>
           </a:p>
           <a:p>
             <a:pPr marL="0" indent="0">
               <a:buNone/>
             </a:pPr>
             <a:endParaRPr lang="de-DE" sz="1200" dirty="0"/>
-          </a:p>
-          <a:p>
-            <a:r>
-              <a:rPr lang="de-DE" sz="1200" dirty="0"/>
-              <a:t>Relevanz</a:t>
-            </a:r>
-          </a:p>
-          <a:p>
-            <a:pPr marL="0" indent="0">
-              <a:buNone/>
-            </a:pPr>
-            <a:r>
-              <a:rPr lang="de-DE" sz="1200" dirty="0"/>
-              <a:t>Relevanz, weil keine vergleichbare Plattform besteht (?).</a:t>
-            </a:r>
-          </a:p>
-          <a:p>
-            <a:pPr marL="0" indent="0">
-              <a:buNone/>
-            </a:pPr>
-            <a:r>
-              <a:rPr lang="de-DE" sz="1200" dirty="0"/>
-              <a:t>Tourismus (vielleicht in Gummersbach, dann auch wirtschaftlich vielleicht relevant)</a:t>
-            </a:r>
-          </a:p>
-          <a:p>
-            <a:pPr marL="0" indent="0">
-              <a:buNone/>
-            </a:pPr>
-            <a:r>
-              <a:rPr lang="de-DE" sz="1200" dirty="0"/>
-              <a:t>Bietet einen wissen orientierten Mehrwert durch das Vermitteln von historischem Wissen für die Bürger und Besucher der Stadt Gummersbach/Köln.</a:t>
-            </a:r>
-          </a:p>
-          <a:p>
-            <a:pPr marL="0" indent="0">
-              <a:buNone/>
-            </a:pPr>
-            <a:r>
-              <a:rPr lang="de-DE" sz="1200" dirty="0"/>
-              <a:t>Wissenschaftliche Recherche(wenn möglich)</a:t>
-            </a:r>
-          </a:p>
-          <a:p>
-            <a:pPr marL="0" indent="0">
-              <a:buNone/>
-            </a:pPr>
-            <a:r>
-              <a:rPr lang="de-DE" sz="1200" dirty="0" err="1"/>
-              <a:t>Stakeholdernalyse</a:t>
-            </a:r>
-            <a:r>
-              <a:rPr lang="de-DE" sz="1200" dirty="0"/>
-              <a:t>?</a:t>
-            </a:r>
-          </a:p>
-          <a:p>
-            <a:pPr marL="0" indent="0">
-              <a:buNone/>
-            </a:pPr>
-            <a:r>
-              <a:rPr lang="de-DE" sz="1200" dirty="0" err="1"/>
-              <a:t>Geocatching</a:t>
-            </a:r>
-            <a:r>
-              <a:rPr lang="de-DE" sz="1200" dirty="0"/>
-              <a:t> für neue historische orte</a:t>
-            </a:r>
           </a:p>
         </p:txBody>
       </p:sp>
     </p:spTree>
     <p:extLst>
       <p:ext uri="{BB962C8B-B14F-4D97-AF65-F5344CB8AC3E}">
-        <p14:creationId xmlns:p14="http://schemas.microsoft.com/office/powerpoint/2010/main" val="629208653"/>
+        <p14:creationId xmlns:p14="http://schemas.microsoft.com/office/powerpoint/2010/main" val="2832196691"/>
       </p:ext>
     </p:extLst>
   </p:cSld>
@@ -5565,7 +5543,7 @@
           <p:cNvPr id="2" name="Titel 1">
             <a:extLst>
               <a:ext uri="{FF2B5EF4-FFF2-40B4-BE49-F238E27FC236}">
-                <a16:creationId xmlns:a16="http://schemas.microsoft.com/office/drawing/2014/main" id="{DFC5B796-40B4-D689-B460-7D61AB01AE62}"/>
+                <a16:creationId xmlns:a16="http://schemas.microsoft.com/office/drawing/2014/main" id="{6533CB18-42D5-3E4C-71F2-344CFE3D3171}"/>
               </a:ext>
             </a:extLst>
           </p:cNvPr>
@@ -5584,7 +5562,7 @@
             <a:pPr algn="ctr"/>
             <a:r>
               <a:rPr lang="de-DE" dirty="0"/>
-              <a:t>Domänenrecherche</a:t>
+              <a:t>Erste Version Projekt Idee</a:t>
             </a:r>
           </a:p>
         </p:txBody>
@@ -5594,7 +5572,7 @@
           <p:cNvPr id="3" name="Inhaltsplatzhalter 2">
             <a:extLst>
               <a:ext uri="{FF2B5EF4-FFF2-40B4-BE49-F238E27FC236}">
-                <a16:creationId xmlns:a16="http://schemas.microsoft.com/office/drawing/2014/main" id="{C6B80267-8BD3-DDB9-B749-6905671A26BD}"/>
+                <a16:creationId xmlns:a16="http://schemas.microsoft.com/office/drawing/2014/main" id="{769D374B-3E02-82D0-A6B5-530D62E886BB}"/>
               </a:ext>
             </a:extLst>
           </p:cNvPr>
@@ -5608,76 +5586,27 @@
         <p:spPr>
           <a:xfrm>
             <a:off x="838200" y="1825624"/>
-            <a:ext cx="10515600" cy="4575175"/>
+            <a:ext cx="10515600" cy="4784725"/>
           </a:xfrm>
         </p:spPr>
         <p:txBody>
           <a:bodyPr>
-            <a:noAutofit/>
+            <a:normAutofit/>
           </a:bodyPr>
           <a:lstStyle/>
           <a:p>
-            <a:pPr marL="514350" indent="-514350">
-              <a:buFont typeface="+mj-lt"/>
-              <a:buAutoNum type="arabicPeriod"/>
+            <a:r>
+              <a:rPr lang="de-DE" sz="1200" dirty="0"/>
+              <a:t>Zielsetzung / Vision</a:t>
+            </a:r>
+          </a:p>
+          <a:p>
+            <a:pPr marL="0" indent="0">
+              <a:buNone/>
             </a:pPr>
             <a:r>
               <a:rPr lang="de-DE" sz="1200" dirty="0"/>
-              <a:t>Stadt Führungsapps</a:t>
-            </a:r>
-          </a:p>
-          <a:p>
-            <a:pPr marL="0" indent="0">
-              <a:buNone/>
-            </a:pPr>
-            <a:r>
-              <a:rPr lang="de-DE" sz="1200" dirty="0"/>
-              <a:t>https://www.mydays.de/geschenkidee/digitale-stadtfuehrungen-koeln</a:t>
-            </a:r>
-          </a:p>
-          <a:p>
-            <a:pPr marL="0" indent="0">
-              <a:buNone/>
-            </a:pPr>
-            <a:r>
-              <a:rPr lang="de-DE" sz="1200" dirty="0"/>
-              <a:t>-9,90€</a:t>
-            </a:r>
-          </a:p>
-          <a:p>
-            <a:pPr marL="0" indent="0">
-              <a:buNone/>
-            </a:pPr>
-            <a:r>
-              <a:rPr lang="de-DE" sz="1200" dirty="0"/>
-              <a:t>-führt an unbekanntere und bekanntere Kölner Orte</a:t>
-            </a:r>
-          </a:p>
-          <a:p>
-            <a:pPr marL="0" indent="0">
-              <a:buNone/>
-            </a:pPr>
-            <a:r>
-              <a:rPr lang="de-DE" sz="1200" dirty="0"/>
-              <a:t>-Zielpunkt per E-Mail</a:t>
-            </a:r>
-          </a:p>
-          <a:p>
-            <a:pPr marL="0" indent="0">
-              <a:buNone/>
-            </a:pPr>
-            <a:r>
-              <a:rPr lang="de-DE" sz="1200" dirty="0"/>
-              <a:t>-rätsel lösen für fortschritt</a:t>
-            </a:r>
-          </a:p>
-          <a:p>
-            <a:pPr marL="0" indent="0">
-              <a:buNone/>
-            </a:pPr>
-            <a:r>
-              <a:rPr lang="de-DE" sz="1200" dirty="0"/>
-              <a:t>-Safari-Regionalliga-Tabelle zum vergleichen</a:t>
+              <a:t>Idee ist es nun, dem Nutzer eine Möglichkeit zu schaffen, sich geschichtliches Wissen über bestimmte Orte und den darin verbundenen Gebäuden anzueignen und das erworbene Wissen zu verfestigen. Dies soll erfolgen, indem man eine alte Karte virtuell ablaufen kann und bei bestimmten bedeutenden Punkten sich entsprechende Informationen durchlesen kann. Auch soll man von der jeweiligen alten Karte einen Vergleich zu einer neuen Karte sehen können (?).</a:t>
             </a:r>
           </a:p>
           <a:p>
@@ -5687,9 +5616,12 @@
             <a:endParaRPr lang="de-DE" sz="1200" dirty="0"/>
           </a:p>
           <a:p>
+            <a:pPr marL="0" indent="0">
+              <a:buNone/>
+            </a:pPr>
             <a:r>
               <a:rPr lang="de-DE" sz="1200" dirty="0"/>
-              <a:t>https://www.digiwalk.de/</a:t>
+              <a:t>Anmerkung:</a:t>
             </a:r>
           </a:p>
           <a:p>
@@ -5698,7 +5630,25 @@
             </a:pPr>
             <a:r>
               <a:rPr lang="de-DE" sz="1200" dirty="0"/>
-              <a:t>-eigene Touren erstellen</a:t>
+              <a:t>Nachdem man eine Karte erkundet hat, soll man das Gelernte in Form eines Quiz (?) wiedergeben können.</a:t>
+            </a:r>
+          </a:p>
+          <a:p>
+            <a:pPr marL="0" indent="0">
+              <a:buNone/>
+            </a:pPr>
+            <a:r>
+              <a:rPr lang="de-DE" sz="1200" dirty="0"/>
+              <a:t>Die Veränderung des Objektes in der Stadt soll möglichst durch eine bildliche Darstellung verdeutlicht werden.</a:t>
+            </a:r>
+          </a:p>
+          <a:p>
+            <a:pPr marL="0" indent="0">
+              <a:buNone/>
+            </a:pPr>
+            <a:r>
+              <a:rPr lang="de-DE" sz="1200" dirty="0"/>
+              <a:t>Die Software könnte durch Gamification Systeme das Lernen fördern.</a:t>
             </a:r>
           </a:p>
           <a:p>
@@ -5710,7 +5660,7 @@
           <a:p>
             <a:r>
               <a:rPr lang="de-DE" sz="1200" dirty="0"/>
-              <a:t>https://www.stadtfuehrungen-digital.de/</a:t>
+              <a:t>Relevanz</a:t>
             </a:r>
           </a:p>
           <a:p>
@@ -5719,19 +5669,16 @@
             </a:pPr>
             <a:r>
               <a:rPr lang="de-DE" sz="1200" dirty="0"/>
-              <a:t>-Bamberg per App</a:t>
+              <a:t>Relevanz, weil keine vergleichbare Plattform besteht (?).</a:t>
             </a:r>
           </a:p>
           <a:p>
             <a:pPr marL="0" indent="0">
               <a:buNone/>
             </a:pPr>
-            <a:endParaRPr lang="de-DE" sz="1200" dirty="0"/>
-          </a:p>
-          <a:p>
             <a:r>
               <a:rPr lang="de-DE" sz="1200" dirty="0"/>
-              <a:t>https://www.rheda-wiedenbrueck.de/kunst-kultur/flora-westfalica/tourismus/stadtfuehrungen/digitale-stadtfuehrung/</a:t>
+              <a:t>Tourismus (vielleicht in Gummersbach, dann auch wirtschaftlich vielleicht relevant)</a:t>
             </a:r>
           </a:p>
           <a:p>
@@ -5740,21 +5687,50 @@
             </a:pPr>
             <a:r>
               <a:rPr lang="de-DE" sz="1200" dirty="0"/>
-              <a:t>-führungen per App</a:t>
-            </a:r>
-          </a:p>
-          <a:p>
-            <a:endParaRPr lang="de-DE" sz="1200" dirty="0"/>
-          </a:p>
-          <a:p>
-            <a:endParaRPr lang="de-DE" sz="1200" dirty="0"/>
+              <a:t>Bietet einen wissen orientierten Mehrwert durch das Vermitteln von historischem Wissen für die Bürger und Besucher der Stadt Gummersbach/Köln.</a:t>
+            </a:r>
+          </a:p>
+          <a:p>
+            <a:pPr marL="0" indent="0">
+              <a:buNone/>
+            </a:pPr>
+            <a:r>
+              <a:rPr lang="de-DE" sz="1200" dirty="0"/>
+              <a:t>Wissenschaftliche Recherche(wenn möglich)</a:t>
+            </a:r>
+          </a:p>
+          <a:p>
+            <a:pPr marL="0" indent="0">
+              <a:buNone/>
+            </a:pPr>
+            <a:r>
+              <a:rPr lang="de-DE" sz="1200" dirty="0" err="1"/>
+              <a:t>Stakeholdernalyse</a:t>
+            </a:r>
+            <a:r>
+              <a:rPr lang="de-DE" sz="1200" dirty="0"/>
+              <a:t>?</a:t>
+            </a:r>
+          </a:p>
+          <a:p>
+            <a:pPr marL="0" indent="0">
+              <a:buNone/>
+            </a:pPr>
+            <a:r>
+              <a:rPr lang="de-DE" sz="1200" dirty="0" err="1"/>
+              <a:t>Geocatching</a:t>
+            </a:r>
+            <a:r>
+              <a:rPr lang="de-DE" sz="1200" dirty="0"/>
+              <a:t> für neue historische orte</a:t>
+            </a:r>
           </a:p>
         </p:txBody>
       </p:sp>
     </p:spTree>
     <p:extLst>
       <p:ext uri="{BB962C8B-B14F-4D97-AF65-F5344CB8AC3E}">
-        <p14:creationId xmlns:p14="http://schemas.microsoft.com/office/powerpoint/2010/main" val="285372262"/>
+        <p14:creationId xmlns:p14="http://schemas.microsoft.com/office/powerpoint/2010/main" val="629208653"/>
       </p:ext>
     </p:extLst>
   </p:cSld>
@@ -5786,7 +5762,7 @@
           <p:cNvPr id="2" name="Titel 1">
             <a:extLst>
               <a:ext uri="{FF2B5EF4-FFF2-40B4-BE49-F238E27FC236}">
-                <a16:creationId xmlns:a16="http://schemas.microsoft.com/office/drawing/2014/main" id="{5E0CD186-D670-2321-97A4-ED56A0F76E07}"/>
+                <a16:creationId xmlns:a16="http://schemas.microsoft.com/office/drawing/2014/main" id="{DFC5B796-40B4-D689-B460-7D61AB01AE62}"/>
               </a:ext>
             </a:extLst>
           </p:cNvPr>
@@ -5815,7 +5791,7 @@
           <p:cNvPr id="3" name="Inhaltsplatzhalter 2">
             <a:extLst>
               <a:ext uri="{FF2B5EF4-FFF2-40B4-BE49-F238E27FC236}">
-                <a16:creationId xmlns:a16="http://schemas.microsoft.com/office/drawing/2014/main" id="{33FD777B-5F33-ADBB-2B6E-5E950C408908}"/>
+                <a16:creationId xmlns:a16="http://schemas.microsoft.com/office/drawing/2014/main" id="{C6B80267-8BD3-DDB9-B749-6905671A26BD}"/>
               </a:ext>
             </a:extLst>
           </p:cNvPr>
@@ -5826,7 +5802,12 @@
             <p:ph idx="1"/>
           </p:nvPr>
         </p:nvSpPr>
-        <p:spPr/>
+        <p:spPr>
+          <a:xfrm>
+            <a:off x="838200" y="1825624"/>
+            <a:ext cx="10515600" cy="4575175"/>
+          </a:xfrm>
+        </p:spPr>
         <p:txBody>
           <a:bodyPr>
             <a:noAutofit/>
@@ -5835,17 +5816,20 @@
           <a:p>
             <a:pPr marL="514350" indent="-514350">
               <a:buFont typeface="+mj-lt"/>
-              <a:buAutoNum type="arabicPeriod" startAt="2"/>
+              <a:buAutoNum type="arabicPeriod"/>
             </a:pPr>
             <a:r>
               <a:rPr lang="de-DE" sz="1200" dirty="0"/>
-              <a:t>Alte Karten</a:t>
-            </a:r>
-          </a:p>
-          <a:p>
+              <a:t>Stadt Führungsapps</a:t>
+            </a:r>
+          </a:p>
+          <a:p>
+            <a:pPr marL="0" indent="0">
+              <a:buNone/>
+            </a:pPr>
             <a:r>
               <a:rPr lang="de-DE" sz="1200" dirty="0"/>
-              <a:t>https://maps.arcanum.com/de/</a:t>
+              <a:t>https://www.mydays.de/geschenkidee/digitale-stadtfuehrungen-koeln</a:t>
             </a:r>
           </a:p>
           <a:p>
@@ -5854,13 +5838,16 @@
             </a:pPr>
             <a:r>
               <a:rPr lang="de-DE" sz="1200" dirty="0"/>
-              <a:t>-verkauft alte karten, WMTS Service</a:t>
-            </a:r>
-          </a:p>
-          <a:p>
+              <a:t>-9,90€</a:t>
+            </a:r>
+          </a:p>
+          <a:p>
+            <a:pPr marL="0" indent="0">
+              <a:buNone/>
+            </a:pPr>
             <a:r>
               <a:rPr lang="de-DE" sz="1200" dirty="0"/>
-              <a:t>https://www.bezreg-koeln.nrw.de/brk_internet/geobasis/topographische_karten/historisch/index.html</a:t>
+              <a:t>-führt an unbekanntere und bekanntere Kölner Orte</a:t>
             </a:r>
           </a:p>
           <a:p>
@@ -5869,13 +5856,16 @@
             </a:pPr>
             <a:r>
               <a:rPr lang="de-DE" sz="1200" dirty="0"/>
-              <a:t>-1795-gegenwart, nochmal anschauen</a:t>
-            </a:r>
-          </a:p>
-          <a:p>
+              <a:t>-Zielpunkt per E-Mail</a:t>
+            </a:r>
+          </a:p>
+          <a:p>
+            <a:pPr marL="0" indent="0">
+              <a:buNone/>
+            </a:pPr>
             <a:r>
               <a:rPr lang="de-DE" sz="1200" dirty="0"/>
-              <a:t>https://rio.obk.de/Service/historischekarten.php</a:t>
+              <a:t>-rätsel lösen für fortschritt</a:t>
             </a:r>
           </a:p>
           <a:p>
@@ -5884,76 +5874,84 @@
             </a:pPr>
             <a:r>
               <a:rPr lang="de-DE" sz="1200" dirty="0"/>
-              <a:t>-historische Karten Oberberg, Landrat </a:t>
-            </a:r>
-          </a:p>
-          <a:p>
+              <a:t>-Safari-Regionalliga-Tabelle zum vergleichen</a:t>
+            </a:r>
+          </a:p>
+          <a:p>
+            <a:pPr marL="0" indent="0">
+              <a:buNone/>
+            </a:pPr>
             <a:endParaRPr lang="de-DE" sz="1200" dirty="0"/>
           </a:p>
           <a:p>
-            <a:pPr marL="514350" indent="-514350">
-              <a:buFont typeface="+mj-lt"/>
-              <a:buAutoNum type="arabicPeriod" startAt="3"/>
+            <a:r>
+              <a:rPr lang="de-DE" sz="1200" dirty="0"/>
+              <a:t>https://www.digiwalk.de/</a:t>
+            </a:r>
+          </a:p>
+          <a:p>
+            <a:pPr marL="0" indent="0">
+              <a:buNone/>
             </a:pPr>
             <a:r>
               <a:rPr lang="de-DE" sz="1200" dirty="0"/>
-              <a:t>Geschichte</a:t>
-            </a:r>
-          </a:p>
-          <a:p>
-            <a:r>
-              <a:rPr lang="de-DE" sz="1200" dirty="0" err="1"/>
-              <a:t>gummersbach</a:t>
-            </a:r>
+              <a:t>-eigene Touren erstellen</a:t>
+            </a:r>
+          </a:p>
+          <a:p>
+            <a:pPr marL="0" indent="0">
+              <a:buNone/>
+            </a:pPr>
+            <a:endParaRPr lang="de-DE" sz="1200" dirty="0"/>
+          </a:p>
+          <a:p>
             <a:r>
               <a:rPr lang="de-DE" sz="1200" dirty="0"/>
-              <a:t> </a:t>
-            </a:r>
-            <a:r>
-              <a:rPr lang="de-DE" sz="1200" dirty="0" err="1"/>
-              <a:t>wikipedia</a:t>
-            </a:r>
+              <a:t>https://www.stadtfuehrungen-digital.de/</a:t>
+            </a:r>
+          </a:p>
+          <a:p>
+            <a:pPr marL="0" indent="0">
+              <a:buNone/>
+            </a:pPr>
+            <a:r>
+              <a:rPr lang="de-DE" sz="1200" dirty="0"/>
+              <a:t>-Bamberg per App</a:t>
+            </a:r>
+          </a:p>
+          <a:p>
+            <a:pPr marL="0" indent="0">
+              <a:buNone/>
+            </a:pPr>
             <a:endParaRPr lang="de-DE" sz="1200" dirty="0"/>
           </a:p>
           <a:p>
             <a:r>
-              <a:rPr lang="de-DE" sz="1200" dirty="0" err="1"/>
-              <a:t>seite</a:t>
-            </a:r>
-            <a:r>
               <a:rPr lang="de-DE" sz="1200" dirty="0"/>
-              <a:t> der </a:t>
-            </a:r>
-            <a:r>
-              <a:rPr lang="de-DE" sz="1200" dirty="0" err="1"/>
-              <a:t>stadt</a:t>
-            </a:r>
+              <a:t>https://www.rheda-wiedenbrueck.de/kunst-kultur/flora-westfalica/tourismus/stadtfuehrungen/digitale-stadtfuehrung/</a:t>
+            </a:r>
+          </a:p>
+          <a:p>
+            <a:pPr marL="0" indent="0">
+              <a:buNone/>
+            </a:pPr>
+            <a:r>
+              <a:rPr lang="de-DE" sz="1200" dirty="0"/>
+              <a:t>-führungen per App</a:t>
+            </a:r>
+          </a:p>
+          <a:p>
             <a:endParaRPr lang="de-DE" sz="1200" dirty="0"/>
           </a:p>
           <a:p>
-            <a:pPr marL="0" indent="0">
-              <a:buNone/>
-            </a:pPr>
-            <a:r>
-              <a:rPr lang="de-DE" sz="1200" dirty="0"/>
-              <a:t>https://www.archive.nrw.de/kreisarchiv-rheinisch-bergischer-kreis/der-rheinisch-bergische-kreis-und-seine-geschichte</a:t>
-            </a:r>
-          </a:p>
-          <a:p>
             <a:endParaRPr lang="de-DE" sz="1200" dirty="0"/>
-          </a:p>
-          <a:p>
-            <a:r>
-              <a:rPr lang="de-DE" sz="1200" dirty="0"/>
-              <a:t>mittelalterliche Karten vom Bergischen existieren</a:t>
-            </a:r>
           </a:p>
         </p:txBody>
       </p:sp>
     </p:spTree>
     <p:extLst>
       <p:ext uri="{BB962C8B-B14F-4D97-AF65-F5344CB8AC3E}">
-        <p14:creationId xmlns:p14="http://schemas.microsoft.com/office/powerpoint/2010/main" val="2170497804"/>
+        <p14:creationId xmlns:p14="http://schemas.microsoft.com/office/powerpoint/2010/main" val="285372262"/>
       </p:ext>
     </p:extLst>
   </p:cSld>
@@ -5985,6 +5983,205 @@
           <p:cNvPr id="2" name="Titel 1">
             <a:extLst>
               <a:ext uri="{FF2B5EF4-FFF2-40B4-BE49-F238E27FC236}">
+                <a16:creationId xmlns:a16="http://schemas.microsoft.com/office/drawing/2014/main" id="{5E0CD186-D670-2321-97A4-ED56A0F76E07}"/>
+              </a:ext>
+            </a:extLst>
+          </p:cNvPr>
+          <p:cNvSpPr>
+            <a:spLocks noGrp="1"/>
+          </p:cNvSpPr>
+          <p:nvPr>
+            <p:ph type="title"/>
+          </p:nvPr>
+        </p:nvSpPr>
+        <p:spPr/>
+        <p:txBody>
+          <a:bodyPr/>
+          <a:lstStyle/>
+          <a:p>
+            <a:pPr algn="ctr"/>
+            <a:r>
+              <a:rPr lang="de-DE" dirty="0"/>
+              <a:t>Domänenrecherche</a:t>
+            </a:r>
+          </a:p>
+        </p:txBody>
+      </p:sp>
+      <p:sp>
+        <p:nvSpPr>
+          <p:cNvPr id="3" name="Inhaltsplatzhalter 2">
+            <a:extLst>
+              <a:ext uri="{FF2B5EF4-FFF2-40B4-BE49-F238E27FC236}">
+                <a16:creationId xmlns:a16="http://schemas.microsoft.com/office/drawing/2014/main" id="{33FD777B-5F33-ADBB-2B6E-5E950C408908}"/>
+              </a:ext>
+            </a:extLst>
+          </p:cNvPr>
+          <p:cNvSpPr>
+            <a:spLocks noGrp="1"/>
+          </p:cNvSpPr>
+          <p:nvPr>
+            <p:ph idx="1"/>
+          </p:nvPr>
+        </p:nvSpPr>
+        <p:spPr/>
+        <p:txBody>
+          <a:bodyPr>
+            <a:noAutofit/>
+          </a:bodyPr>
+          <a:lstStyle/>
+          <a:p>
+            <a:pPr marL="514350" indent="-514350">
+              <a:buFont typeface="+mj-lt"/>
+              <a:buAutoNum type="arabicPeriod" startAt="2"/>
+            </a:pPr>
+            <a:r>
+              <a:rPr lang="de-DE" sz="1200" dirty="0"/>
+              <a:t>Alte Karten</a:t>
+            </a:r>
+          </a:p>
+          <a:p>
+            <a:r>
+              <a:rPr lang="de-DE" sz="1200" dirty="0"/>
+              <a:t>https://maps.arcanum.com/de/</a:t>
+            </a:r>
+          </a:p>
+          <a:p>
+            <a:pPr marL="0" indent="0">
+              <a:buNone/>
+            </a:pPr>
+            <a:r>
+              <a:rPr lang="de-DE" sz="1200" dirty="0"/>
+              <a:t>-verkauft alte karten, WMTS Service</a:t>
+            </a:r>
+          </a:p>
+          <a:p>
+            <a:r>
+              <a:rPr lang="de-DE" sz="1200" dirty="0"/>
+              <a:t>https://www.bezreg-koeln.nrw.de/brk_internet/geobasis/topographische_karten/historisch/index.html</a:t>
+            </a:r>
+          </a:p>
+          <a:p>
+            <a:pPr marL="0" indent="0">
+              <a:buNone/>
+            </a:pPr>
+            <a:r>
+              <a:rPr lang="de-DE" sz="1200" dirty="0"/>
+              <a:t>-1795-gegenwart, nochmal anschauen</a:t>
+            </a:r>
+          </a:p>
+          <a:p>
+            <a:r>
+              <a:rPr lang="de-DE" sz="1200" dirty="0"/>
+              <a:t>https://rio.obk.de/Service/historischekarten.php</a:t>
+            </a:r>
+          </a:p>
+          <a:p>
+            <a:pPr marL="0" indent="0">
+              <a:buNone/>
+            </a:pPr>
+            <a:r>
+              <a:rPr lang="de-DE" sz="1200" dirty="0"/>
+              <a:t>-historische Karten Oberberg, Landrat </a:t>
+            </a:r>
+          </a:p>
+          <a:p>
+            <a:endParaRPr lang="de-DE" sz="1200" dirty="0"/>
+          </a:p>
+          <a:p>
+            <a:pPr marL="514350" indent="-514350">
+              <a:buFont typeface="+mj-lt"/>
+              <a:buAutoNum type="arabicPeriod" startAt="3"/>
+            </a:pPr>
+            <a:r>
+              <a:rPr lang="de-DE" sz="1200" dirty="0"/>
+              <a:t>Geschichte</a:t>
+            </a:r>
+          </a:p>
+          <a:p>
+            <a:r>
+              <a:rPr lang="de-DE" sz="1200" dirty="0" err="1"/>
+              <a:t>gummersbach</a:t>
+            </a:r>
+            <a:r>
+              <a:rPr lang="de-DE" sz="1200" dirty="0"/>
+              <a:t> </a:t>
+            </a:r>
+            <a:r>
+              <a:rPr lang="de-DE" sz="1200" dirty="0" err="1"/>
+              <a:t>wikipedia</a:t>
+            </a:r>
+            <a:endParaRPr lang="de-DE" sz="1200" dirty="0"/>
+          </a:p>
+          <a:p>
+            <a:r>
+              <a:rPr lang="de-DE" sz="1200" dirty="0" err="1"/>
+              <a:t>seite</a:t>
+            </a:r>
+            <a:r>
+              <a:rPr lang="de-DE" sz="1200" dirty="0"/>
+              <a:t> der </a:t>
+            </a:r>
+            <a:r>
+              <a:rPr lang="de-DE" sz="1200" dirty="0" err="1"/>
+              <a:t>stadt</a:t>
+            </a:r>
+            <a:endParaRPr lang="de-DE" sz="1200" dirty="0"/>
+          </a:p>
+          <a:p>
+            <a:pPr marL="0" indent="0">
+              <a:buNone/>
+            </a:pPr>
+            <a:r>
+              <a:rPr lang="de-DE" sz="1200" dirty="0"/>
+              <a:t>https://www.archive.nrw.de/kreisarchiv-rheinisch-bergischer-kreis/der-rheinisch-bergische-kreis-und-seine-geschichte</a:t>
+            </a:r>
+          </a:p>
+          <a:p>
+            <a:endParaRPr lang="de-DE" sz="1200" dirty="0"/>
+          </a:p>
+          <a:p>
+            <a:r>
+              <a:rPr lang="de-DE" sz="1200" dirty="0"/>
+              <a:t>mittelalterliche Karten vom Bergischen existieren</a:t>
+            </a:r>
+          </a:p>
+        </p:txBody>
+      </p:sp>
+    </p:spTree>
+    <p:extLst>
+      <p:ext uri="{BB962C8B-B14F-4D97-AF65-F5344CB8AC3E}">
+        <p14:creationId xmlns:p14="http://schemas.microsoft.com/office/powerpoint/2010/main" val="2170497804"/>
+      </p:ext>
+    </p:extLst>
+  </p:cSld>
+  <p:clrMapOvr>
+    <a:masterClrMapping/>
+  </p:clrMapOvr>
+</p:sld>
+</file>
+
+<file path=ppt/slides/slide8.xml><?xml version="1.0" encoding="utf-8"?>
+<p:sld xmlns:a="http://schemas.openxmlformats.org/drawingml/2006/main" xmlns:r="http://schemas.openxmlformats.org/officeDocument/2006/relationships" xmlns:p="http://schemas.openxmlformats.org/presentationml/2006/main">
+  <p:cSld>
+    <p:spTree>
+      <p:nvGrpSpPr>
+        <p:cNvPr id="1" name=""/>
+        <p:cNvGrpSpPr/>
+        <p:nvPr/>
+      </p:nvGrpSpPr>
+      <p:grpSpPr>
+        <a:xfrm>
+          <a:off x="0" y="0"/>
+          <a:ext cx="0" cy="0"/>
+          <a:chOff x="0" y="0"/>
+          <a:chExt cx="0" cy="0"/>
+        </a:xfrm>
+      </p:grpSpPr>
+      <p:sp>
+        <p:nvSpPr>
+          <p:cNvPr id="2" name="Titel 1">
+            <a:extLst>
+              <a:ext uri="{FF2B5EF4-FFF2-40B4-BE49-F238E27FC236}">
                 <a16:creationId xmlns:a16="http://schemas.microsoft.com/office/drawing/2014/main" id="{47271DE8-74D3-4AD2-D1C9-9F65F75B46B8}"/>
               </a:ext>
             </a:extLst>
@@ -6118,7 +6315,7 @@
 </p:sld>
 </file>
 
-<file path=ppt/slides/slide8.xml><?xml version="1.0" encoding="utf-8"?>
+<file path=ppt/slides/slide9.xml><?xml version="1.0" encoding="utf-8"?>
 <p:sld xmlns:a="http://schemas.openxmlformats.org/drawingml/2006/main" xmlns:r="http://schemas.openxmlformats.org/officeDocument/2006/relationships" xmlns:p="http://schemas.openxmlformats.org/presentationml/2006/main">
   <p:cSld>
     <p:spTree>
@@ -6231,95 +6428,6 @@
     <p:extLst>
       <p:ext uri="{BB962C8B-B14F-4D97-AF65-F5344CB8AC3E}">
         <p14:creationId xmlns:p14="http://schemas.microsoft.com/office/powerpoint/2010/main" val="2577924692"/>
-      </p:ext>
-    </p:extLst>
-  </p:cSld>
-  <p:clrMapOvr>
-    <a:masterClrMapping/>
-  </p:clrMapOvr>
-</p:sld>
-</file>
-
-<file path=ppt/slides/slide9.xml><?xml version="1.0" encoding="utf-8"?>
-<p:sld xmlns:a="http://schemas.openxmlformats.org/drawingml/2006/main" xmlns:r="http://schemas.openxmlformats.org/officeDocument/2006/relationships" xmlns:p="http://schemas.openxmlformats.org/presentationml/2006/main">
-  <p:cSld>
-    <p:spTree>
-      <p:nvGrpSpPr>
-        <p:cNvPr id="1" name=""/>
-        <p:cNvGrpSpPr/>
-        <p:nvPr/>
-      </p:nvGrpSpPr>
-      <p:grpSpPr>
-        <a:xfrm>
-          <a:off x="0" y="0"/>
-          <a:ext cx="0" cy="0"/>
-          <a:chOff x="0" y="0"/>
-          <a:chExt cx="0" cy="0"/>
-        </a:xfrm>
-      </p:grpSpPr>
-      <p:sp>
-        <p:nvSpPr>
-          <p:cNvPr id="2" name="Titel 1">
-            <a:extLst>
-              <a:ext uri="{FF2B5EF4-FFF2-40B4-BE49-F238E27FC236}">
-                <a16:creationId xmlns:a16="http://schemas.microsoft.com/office/drawing/2014/main" id="{2A3A0AF6-B267-8C2B-9A16-B4C0D7CF7603}"/>
-              </a:ext>
-            </a:extLst>
-          </p:cNvPr>
-          <p:cNvSpPr>
-            <a:spLocks noGrp="1"/>
-          </p:cNvSpPr>
-          <p:nvPr>
-            <p:ph type="title"/>
-          </p:nvPr>
-        </p:nvSpPr>
-        <p:spPr/>
-        <p:txBody>
-          <a:bodyPr/>
-          <a:lstStyle/>
-          <a:p>
-            <a:pPr algn="ctr"/>
-            <a:r>
-              <a:rPr lang="de-DE" dirty="0"/>
-              <a:t>Version 0.85</a:t>
-            </a:r>
-          </a:p>
-        </p:txBody>
-      </p:sp>
-      <p:pic>
-        <p:nvPicPr>
-          <p:cNvPr id="6" name="Grafik 5">
-            <a:extLst>
-              <a:ext uri="{FF2B5EF4-FFF2-40B4-BE49-F238E27FC236}">
-                <a16:creationId xmlns:a16="http://schemas.microsoft.com/office/drawing/2014/main" id="{FFD6EEBB-F57D-482D-7FAE-DFCB47034A91}"/>
-              </a:ext>
-            </a:extLst>
-          </p:cNvPr>
-          <p:cNvPicPr>
-            <a:picLocks noChangeAspect="1"/>
-          </p:cNvPicPr>
-          <p:nvPr/>
-        </p:nvPicPr>
-        <p:blipFill>
-          <a:blip r:embed="rId3"/>
-          <a:stretch>
-            <a:fillRect/>
-          </a:stretch>
-        </p:blipFill>
-        <p:spPr>
-          <a:xfrm>
-            <a:off x="1651517" y="1495191"/>
-            <a:ext cx="8888965" cy="5101552"/>
-          </a:xfrm>
-          <a:prstGeom prst="rect">
-            <a:avLst/>
-          </a:prstGeom>
-        </p:spPr>
-      </p:pic>
-    </p:spTree>
-    <p:extLst>
-      <p:ext uri="{BB962C8B-B14F-4D97-AF65-F5344CB8AC3E}">
-        <p14:creationId xmlns:p14="http://schemas.microsoft.com/office/powerpoint/2010/main" val="4087313282"/>
       </p:ext>
     </p:extLst>
   </p:cSld>

</xml_diff>

<commit_message>
Update EPWS2223HausenKochZimmer Audit 1.pptx
add Folien Zielhierarchie u. Alleinstellungsmerkmale sowie Kommentare DM 1.0
</commit_message>
<xml_diff>
--- a/EPWS2223HausenKochZimmer Audit 1.pptx
+++ b/EPWS2223HausenKochZimmer Audit 1.pptx
@@ -5,7 +5,7 @@
     <p:sldMasterId id="2147483648" r:id="rId1"/>
   </p:sldMasterIdLst>
   <p:notesMasterIdLst>
-    <p:notesMasterId r:id="rId16"/>
+    <p:notesMasterId r:id="rId18"/>
   </p:notesMasterIdLst>
   <p:sldIdLst>
     <p:sldId id="256" r:id="rId2"/>
@@ -22,6 +22,8 @@
     <p:sldId id="261" r:id="rId13"/>
     <p:sldId id="262" r:id="rId14"/>
     <p:sldId id="263" r:id="rId15"/>
+    <p:sldId id="272" r:id="rId16"/>
+    <p:sldId id="271" r:id="rId17"/>
   </p:sldIdLst>
   <p:sldSz cx="12192000" cy="6858000"/>
   <p:notesSz cx="6858000" cy="9144000"/>
@@ -155,6 +157,8 @@
             <p14:sldId id="261"/>
             <p14:sldId id="262"/>
             <p14:sldId id="263"/>
+            <p14:sldId id="272"/>
+            <p14:sldId id="271"/>
           </p14:sldIdLst>
         </p14:section>
       </p14:sectionLst>
@@ -406,7 +410,7 @@
           <a:p>
             <a:fld id="{92DF0825-AC8F-4116-B49B-4A4F75013D61}" type="slidenum">
               <a:rPr lang="de-DE" smtClean="0"/>
-              <a:t>‹Nr.›</a:t>
+              <a:t>‹#›</a:t>
             </a:fld>
             <a:endParaRPr lang="de-DE"/>
           </a:p>
@@ -602,6 +606,419 @@
 </p:notes>
 </file>
 
+<file path=ppt/notesSlides/notesSlide10.xml><?xml version="1.0" encoding="utf-8"?>
+<p:notes xmlns:a="http://schemas.openxmlformats.org/drawingml/2006/main" xmlns:r="http://schemas.openxmlformats.org/officeDocument/2006/relationships" xmlns:p="http://schemas.openxmlformats.org/presentationml/2006/main">
+  <p:cSld>
+    <p:spTree>
+      <p:nvGrpSpPr>
+        <p:cNvPr id="1" name=""/>
+        <p:cNvGrpSpPr/>
+        <p:nvPr/>
+      </p:nvGrpSpPr>
+      <p:grpSpPr>
+        <a:xfrm>
+          <a:off x="0" y="0"/>
+          <a:ext cx="0" cy="0"/>
+          <a:chOff x="0" y="0"/>
+          <a:chExt cx="0" cy="0"/>
+        </a:xfrm>
+      </p:grpSpPr>
+      <p:sp>
+        <p:nvSpPr>
+          <p:cNvPr id="2" name="Slide Image Placeholder 1"/>
+          <p:cNvSpPr>
+            <a:spLocks noGrp="1" noRot="1" noChangeAspect="1"/>
+          </p:cNvSpPr>
+          <p:nvPr>
+            <p:ph type="sldImg"/>
+          </p:nvPr>
+        </p:nvSpPr>
+        <p:spPr/>
+      </p:sp>
+      <p:sp>
+        <p:nvSpPr>
+          <p:cNvPr id="3" name="Notes Placeholder 2"/>
+          <p:cNvSpPr>
+            <a:spLocks noGrp="1"/>
+          </p:cNvSpPr>
+          <p:nvPr>
+            <p:ph type="body" idx="1"/>
+          </p:nvPr>
+        </p:nvSpPr>
+        <p:spPr/>
+        <p:txBody>
+          <a:bodyPr/>
+          <a:lstStyle/>
+          <a:p>
+            <a:r>
+              <a:rPr lang="en-GB" dirty="0"/>
+              <a:t>Neue </a:t>
+            </a:r>
+            <a:r>
+              <a:rPr lang="en-GB" dirty="0" err="1"/>
+              <a:t>Anordnung</a:t>
+            </a:r>
+            <a:r>
+              <a:rPr lang="en-GB" dirty="0"/>
+              <a:t> der </a:t>
+            </a:r>
+            <a:r>
+              <a:rPr lang="en-GB" dirty="0" err="1"/>
+              <a:t>Elemente</a:t>
+            </a:r>
+            <a:r>
+              <a:rPr lang="en-GB" dirty="0"/>
+              <a:t> </a:t>
+            </a:r>
+            <a:r>
+              <a:rPr lang="en-GB" dirty="0" err="1"/>
+              <a:t>zur</a:t>
+            </a:r>
+            <a:r>
+              <a:rPr lang="en-GB" dirty="0"/>
+              <a:t> </a:t>
+            </a:r>
+            <a:r>
+              <a:rPr lang="en-GB" dirty="0" err="1"/>
+              <a:t>besseren</a:t>
+            </a:r>
+            <a:r>
+              <a:rPr lang="en-GB" dirty="0"/>
+              <a:t> </a:t>
+            </a:r>
+            <a:r>
+              <a:rPr lang="en-GB" dirty="0" err="1"/>
+              <a:t>Übersicht</a:t>
+            </a:r>
+            <a:r>
+              <a:rPr lang="en-GB" dirty="0"/>
+              <a:t>. </a:t>
+            </a:r>
+            <a:r>
+              <a:rPr lang="en-GB" dirty="0" err="1"/>
+              <a:t>Verbindungen</a:t>
+            </a:r>
+            <a:r>
+              <a:rPr lang="en-GB" dirty="0"/>
+              <a:t> an die </a:t>
+            </a:r>
+            <a:r>
+              <a:rPr lang="en-GB" dirty="0" err="1"/>
+              <a:t>Markierung</a:t>
+            </a:r>
+            <a:r>
+              <a:rPr lang="en-GB" dirty="0"/>
+              <a:t> um die 3 </a:t>
+            </a:r>
+            <a:r>
+              <a:rPr lang="en-GB" dirty="0" err="1"/>
+              <a:t>Wissenquellen</a:t>
+            </a:r>
+            <a:r>
+              <a:rPr lang="en-GB" dirty="0"/>
+              <a:t> </a:t>
+            </a:r>
+            <a:r>
+              <a:rPr lang="en-GB" dirty="0" err="1"/>
+              <a:t>beziehen</a:t>
+            </a:r>
+            <a:r>
+              <a:rPr lang="en-GB" dirty="0"/>
+              <a:t> </a:t>
+            </a:r>
+            <a:r>
+              <a:rPr lang="en-GB" dirty="0" err="1"/>
+              <a:t>sich</a:t>
+            </a:r>
+            <a:r>
+              <a:rPr lang="en-GB" dirty="0"/>
+              <a:t> auf alle 3. </a:t>
+            </a:r>
+            <a:r>
+              <a:rPr lang="en-GB" dirty="0" err="1"/>
+              <a:t>Verbindungen</a:t>
+            </a:r>
+            <a:r>
+              <a:rPr lang="en-GB" dirty="0"/>
+              <a:t>, die in den Kasten </a:t>
+            </a:r>
+            <a:r>
+              <a:rPr lang="en-GB" dirty="0" err="1"/>
+              <a:t>hinein</a:t>
+            </a:r>
+            <a:r>
+              <a:rPr lang="en-GB" dirty="0"/>
+              <a:t> </a:t>
+            </a:r>
+            <a:r>
+              <a:rPr lang="en-GB" dirty="0" err="1"/>
+              <a:t>direkt</a:t>
+            </a:r>
+            <a:r>
+              <a:rPr lang="en-GB" dirty="0"/>
+              <a:t> an </a:t>
+            </a:r>
+            <a:r>
+              <a:rPr lang="en-GB" dirty="0" err="1"/>
+              <a:t>ein</a:t>
+            </a:r>
+            <a:r>
+              <a:rPr lang="en-GB" dirty="0"/>
+              <a:t> Post-it </a:t>
+            </a:r>
+            <a:r>
+              <a:rPr lang="en-GB" dirty="0" err="1"/>
+              <a:t>gehen</a:t>
+            </a:r>
+            <a:r>
+              <a:rPr lang="en-GB" dirty="0"/>
+              <a:t>, </a:t>
+            </a:r>
+            <a:r>
+              <a:rPr lang="en-GB" dirty="0" err="1"/>
+              <a:t>beziehen</a:t>
+            </a:r>
+            <a:r>
+              <a:rPr lang="en-GB" dirty="0"/>
+              <a:t> </a:t>
+            </a:r>
+            <a:r>
+              <a:rPr lang="en-GB" dirty="0" err="1"/>
+              <a:t>sich</a:t>
+            </a:r>
+            <a:r>
+              <a:rPr lang="en-GB" dirty="0"/>
+              <a:t> </a:t>
+            </a:r>
+            <a:r>
+              <a:rPr lang="en-GB" dirty="0" err="1"/>
+              <a:t>spezifisch</a:t>
+            </a:r>
+            <a:r>
+              <a:rPr lang="en-GB" dirty="0"/>
+              <a:t> </a:t>
+            </a:r>
+            <a:r>
+              <a:rPr lang="en-GB" dirty="0" err="1"/>
+              <a:t>darauf</a:t>
+            </a:r>
+            <a:r>
+              <a:rPr lang="en-GB" dirty="0"/>
+              <a:t>.</a:t>
+            </a:r>
+          </a:p>
+        </p:txBody>
+      </p:sp>
+      <p:sp>
+        <p:nvSpPr>
+          <p:cNvPr id="4" name="Slide Number Placeholder 3"/>
+          <p:cNvSpPr>
+            <a:spLocks noGrp="1"/>
+          </p:cNvSpPr>
+          <p:nvPr>
+            <p:ph type="sldNum" sz="quarter" idx="5"/>
+          </p:nvPr>
+        </p:nvSpPr>
+        <p:spPr/>
+        <p:txBody>
+          <a:bodyPr/>
+          <a:lstStyle/>
+          <a:p>
+            <a:fld id="{92DF0825-AC8F-4116-B49B-4A4F75013D61}" type="slidenum">
+              <a:rPr lang="de-DE" smtClean="0"/>
+              <a:t>14</a:t>
+            </a:fld>
+            <a:endParaRPr lang="de-DE"/>
+          </a:p>
+        </p:txBody>
+      </p:sp>
+    </p:spTree>
+    <p:extLst>
+      <p:ext uri="{BB962C8B-B14F-4D97-AF65-F5344CB8AC3E}">
+        <p14:creationId xmlns:p14="http://schemas.microsoft.com/office/powerpoint/2010/main" val="1647995684"/>
+      </p:ext>
+    </p:extLst>
+  </p:cSld>
+  <p:clrMapOvr>
+    <a:masterClrMapping/>
+  </p:clrMapOvr>
+</p:notes>
+</file>
+
+<file path=ppt/notesSlides/notesSlide11.xml><?xml version="1.0" encoding="utf-8"?>
+<p:notes xmlns:a="http://schemas.openxmlformats.org/drawingml/2006/main" xmlns:r="http://schemas.openxmlformats.org/officeDocument/2006/relationships" xmlns:p="http://schemas.openxmlformats.org/presentationml/2006/main">
+  <p:cSld>
+    <p:spTree>
+      <p:nvGrpSpPr>
+        <p:cNvPr id="1" name=""/>
+        <p:cNvGrpSpPr/>
+        <p:nvPr/>
+      </p:nvGrpSpPr>
+      <p:grpSpPr>
+        <a:xfrm>
+          <a:off x="0" y="0"/>
+          <a:ext cx="0" cy="0"/>
+          <a:chOff x="0" y="0"/>
+          <a:chExt cx="0" cy="0"/>
+        </a:xfrm>
+      </p:grpSpPr>
+      <p:sp>
+        <p:nvSpPr>
+          <p:cNvPr id="2" name="Folienbildplatzhalter 1"/>
+          <p:cNvSpPr>
+            <a:spLocks noGrp="1" noRot="1" noChangeAspect="1"/>
+          </p:cNvSpPr>
+          <p:nvPr>
+            <p:ph type="sldImg"/>
+          </p:nvPr>
+        </p:nvSpPr>
+        <p:spPr/>
+      </p:sp>
+      <p:sp>
+        <p:nvSpPr>
+          <p:cNvPr id="3" name="Notizenplatzhalter 2"/>
+          <p:cNvSpPr>
+            <a:spLocks noGrp="1"/>
+          </p:cNvSpPr>
+          <p:nvPr>
+            <p:ph type="body" idx="1"/>
+          </p:nvPr>
+        </p:nvSpPr>
+        <p:spPr/>
+        <p:txBody>
+          <a:bodyPr/>
+          <a:lstStyle/>
+          <a:p>
+            <a:r>
+              <a:rPr lang="de-DE" dirty="0"/>
+              <a:t>Der Aufbau der Community soll im Verlauf des Projekts im Vordergrund stehen und die diesbezüglichen Ziele heben sich mit einem „muss“ von der historischen Wissensvermittlung ab. </a:t>
+            </a:r>
+          </a:p>
+        </p:txBody>
+      </p:sp>
+      <p:sp>
+        <p:nvSpPr>
+          <p:cNvPr id="4" name="Foliennummernplatzhalter 3"/>
+          <p:cNvSpPr>
+            <a:spLocks noGrp="1"/>
+          </p:cNvSpPr>
+          <p:nvPr>
+            <p:ph type="sldNum" sz="quarter" idx="5"/>
+          </p:nvPr>
+        </p:nvSpPr>
+        <p:spPr/>
+        <p:txBody>
+          <a:bodyPr/>
+          <a:lstStyle/>
+          <a:p>
+            <a:fld id="{92DF0825-AC8F-4116-B49B-4A4F75013D61}" type="slidenum">
+              <a:rPr lang="de-DE" smtClean="0"/>
+              <a:t>15</a:t>
+            </a:fld>
+            <a:endParaRPr lang="de-DE"/>
+          </a:p>
+        </p:txBody>
+      </p:sp>
+    </p:spTree>
+    <p:extLst>
+      <p:ext uri="{BB962C8B-B14F-4D97-AF65-F5344CB8AC3E}">
+        <p14:creationId xmlns:p14="http://schemas.microsoft.com/office/powerpoint/2010/main" val="5546279"/>
+      </p:ext>
+    </p:extLst>
+  </p:cSld>
+  <p:clrMapOvr>
+    <a:masterClrMapping/>
+  </p:clrMapOvr>
+</p:notes>
+</file>
+
+<file path=ppt/notesSlides/notesSlide12.xml><?xml version="1.0" encoding="utf-8"?>
+<p:notes xmlns:a="http://schemas.openxmlformats.org/drawingml/2006/main" xmlns:r="http://schemas.openxmlformats.org/officeDocument/2006/relationships" xmlns:p="http://schemas.openxmlformats.org/presentationml/2006/main">
+  <p:cSld>
+    <p:spTree>
+      <p:nvGrpSpPr>
+        <p:cNvPr id="1" name=""/>
+        <p:cNvGrpSpPr/>
+        <p:nvPr/>
+      </p:nvGrpSpPr>
+      <p:grpSpPr>
+        <a:xfrm>
+          <a:off x="0" y="0"/>
+          <a:ext cx="0" cy="0"/>
+          <a:chOff x="0" y="0"/>
+          <a:chExt cx="0" cy="0"/>
+        </a:xfrm>
+      </p:grpSpPr>
+      <p:sp>
+        <p:nvSpPr>
+          <p:cNvPr id="2" name="Folienbildplatzhalter 1"/>
+          <p:cNvSpPr>
+            <a:spLocks noGrp="1" noRot="1" noChangeAspect="1"/>
+          </p:cNvSpPr>
+          <p:nvPr>
+            <p:ph type="sldImg"/>
+          </p:nvPr>
+        </p:nvSpPr>
+        <p:spPr/>
+      </p:sp>
+      <p:sp>
+        <p:nvSpPr>
+          <p:cNvPr id="3" name="Notizenplatzhalter 2"/>
+          <p:cNvSpPr>
+            <a:spLocks noGrp="1"/>
+          </p:cNvSpPr>
+          <p:nvPr>
+            <p:ph type="body" idx="1"/>
+          </p:nvPr>
+        </p:nvSpPr>
+        <p:spPr/>
+        <p:txBody>
+          <a:bodyPr/>
+          <a:lstStyle/>
+          <a:p>
+            <a:r>
+              <a:rPr lang="de-DE" dirty="0"/>
+              <a:t>Die Digitalisierung der Bestände von Archiven ist ein langsam voranschreitendes Projekt, da unter dem Archivgut nicht nur Bilder und Fotos sind sondern zahlreiche Akten, Bücher und sonstige Unterlagen. Insgesamt handelt es sich dabei um viele Millionen an Seiten und dementsprechend genau so viele Scans. Weiterhin erschwert wird die Sache dadurch, dass einige der bereits digitalisierten Bestände nicht online einsehbar sind. Diese Bestände können durchaus in digitaler Form im Archiv vor Ort einsehbar sein. Die Verwendung einer Kopie dieser Scans ist in der Regel kostenpflichtig.</a:t>
+            </a:r>
+          </a:p>
+        </p:txBody>
+      </p:sp>
+      <p:sp>
+        <p:nvSpPr>
+          <p:cNvPr id="4" name="Foliennummernplatzhalter 3"/>
+          <p:cNvSpPr>
+            <a:spLocks noGrp="1"/>
+          </p:cNvSpPr>
+          <p:nvPr>
+            <p:ph type="sldNum" sz="quarter" idx="5"/>
+          </p:nvPr>
+        </p:nvSpPr>
+        <p:spPr/>
+        <p:txBody>
+          <a:bodyPr/>
+          <a:lstStyle/>
+          <a:p>
+            <a:fld id="{92DF0825-AC8F-4116-B49B-4A4F75013D61}" type="slidenum">
+              <a:rPr lang="de-DE" smtClean="0"/>
+              <a:t>16</a:t>
+            </a:fld>
+            <a:endParaRPr lang="de-DE"/>
+          </a:p>
+        </p:txBody>
+      </p:sp>
+    </p:spTree>
+    <p:extLst>
+      <p:ext uri="{BB962C8B-B14F-4D97-AF65-F5344CB8AC3E}">
+        <p14:creationId xmlns:p14="http://schemas.microsoft.com/office/powerpoint/2010/main" val="2868451909"/>
+      </p:ext>
+    </p:extLst>
+  </p:cSld>
+  <p:clrMapOvr>
+    <a:masterClrMapping/>
+  </p:clrMapOvr>
+</p:notes>
+</file>
+
 <file path=ppt/notesSlides/notesSlide2.xml><?xml version="1.0" encoding="utf-8"?>
 <p:notes xmlns:a="http://schemas.openxmlformats.org/drawingml/2006/main" xmlns:r="http://schemas.openxmlformats.org/officeDocument/2006/relationships" xmlns:p="http://schemas.openxmlformats.org/presentationml/2006/main">
   <p:cSld>
@@ -1266,7 +1683,7 @@
           <a:p>
             <a:r>
               <a:rPr lang="de-DE" dirty="0"/>
-              <a:t>Erweiterung des Modells um weitere Akteure und Hilfsentitäten durch Frederik. Durch Besprechungen der vorigen Iteration sind ein paar weitere Akteure sowie Hilfsidentitäten Identifiziert worden.</a:t>
+              <a:t>Erweiterung des Modells um weitere Akteure und Hilfsentitäten durch Frederik. Durch Besprechungen der vorigen Iteration sind ein paar weitere Akteure sowie Hilfsidentitäten Identifiziert worden. Die Cluster wurden für direkte farbige Markierung der Post-its aufgegeben, da die neue Anordnung und die neuen Verbindungen clustering schwierig machten.</a:t>
             </a:r>
           </a:p>
         </p:txBody>
@@ -1508,7 +1925,7 @@
           <a:p>
             <a:fld id="{4F3947B8-8C5A-4761-A8FC-91A470F27CDE}" type="slidenum">
               <a:rPr lang="de-DE" smtClean="0"/>
-              <a:t>‹Nr.›</a:t>
+              <a:t>‹#›</a:t>
             </a:fld>
             <a:endParaRPr lang="de-DE"/>
           </a:p>
@@ -1706,7 +2123,7 @@
           <a:p>
             <a:fld id="{4F3947B8-8C5A-4761-A8FC-91A470F27CDE}" type="slidenum">
               <a:rPr lang="de-DE" smtClean="0"/>
-              <a:t>‹Nr.›</a:t>
+              <a:t>‹#›</a:t>
             </a:fld>
             <a:endParaRPr lang="de-DE"/>
           </a:p>
@@ -1914,7 +2331,7 @@
           <a:p>
             <a:fld id="{4F3947B8-8C5A-4761-A8FC-91A470F27CDE}" type="slidenum">
               <a:rPr lang="de-DE" smtClean="0"/>
-              <a:t>‹Nr.›</a:t>
+              <a:t>‹#›</a:t>
             </a:fld>
             <a:endParaRPr lang="de-DE"/>
           </a:p>
@@ -2112,7 +2529,7 @@
           <a:p>
             <a:fld id="{4F3947B8-8C5A-4761-A8FC-91A470F27CDE}" type="slidenum">
               <a:rPr lang="de-DE" smtClean="0"/>
-              <a:t>‹Nr.›</a:t>
+              <a:t>‹#›</a:t>
             </a:fld>
             <a:endParaRPr lang="de-DE"/>
           </a:p>
@@ -2387,7 +2804,7 @@
           <a:p>
             <a:fld id="{4F3947B8-8C5A-4761-A8FC-91A470F27CDE}" type="slidenum">
               <a:rPr lang="de-DE" smtClean="0"/>
-              <a:t>‹Nr.›</a:t>
+              <a:t>‹#›</a:t>
             </a:fld>
             <a:endParaRPr lang="de-DE"/>
           </a:p>
@@ -2652,7 +3069,7 @@
           <a:p>
             <a:fld id="{4F3947B8-8C5A-4761-A8FC-91A470F27CDE}" type="slidenum">
               <a:rPr lang="de-DE" smtClean="0"/>
-              <a:t>‹Nr.›</a:t>
+              <a:t>‹#›</a:t>
             </a:fld>
             <a:endParaRPr lang="de-DE"/>
           </a:p>
@@ -3064,7 +3481,7 @@
           <a:p>
             <a:fld id="{4F3947B8-8C5A-4761-A8FC-91A470F27CDE}" type="slidenum">
               <a:rPr lang="de-DE" smtClean="0"/>
-              <a:t>‹Nr.›</a:t>
+              <a:t>‹#›</a:t>
             </a:fld>
             <a:endParaRPr lang="de-DE"/>
           </a:p>
@@ -3205,7 +3622,7 @@
           <a:p>
             <a:fld id="{4F3947B8-8C5A-4761-A8FC-91A470F27CDE}" type="slidenum">
               <a:rPr lang="de-DE" smtClean="0"/>
-              <a:t>‹Nr.›</a:t>
+              <a:t>‹#›</a:t>
             </a:fld>
             <a:endParaRPr lang="de-DE"/>
           </a:p>
@@ -3318,7 +3735,7 @@
           <a:p>
             <a:fld id="{4F3947B8-8C5A-4761-A8FC-91A470F27CDE}" type="slidenum">
               <a:rPr lang="de-DE" smtClean="0"/>
-              <a:t>‹Nr.›</a:t>
+              <a:t>‹#›</a:t>
             </a:fld>
             <a:endParaRPr lang="de-DE"/>
           </a:p>
@@ -3629,7 +4046,7 @@
           <a:p>
             <a:fld id="{4F3947B8-8C5A-4761-A8FC-91A470F27CDE}" type="slidenum">
               <a:rPr lang="de-DE" smtClean="0"/>
-              <a:t>‹Nr.›</a:t>
+              <a:t>‹#›</a:t>
             </a:fld>
             <a:endParaRPr lang="de-DE"/>
           </a:p>
@@ -3917,7 +4334,7 @@
           <a:p>
             <a:fld id="{4F3947B8-8C5A-4761-A8FC-91A470F27CDE}" type="slidenum">
               <a:rPr lang="de-DE" smtClean="0"/>
-              <a:t>‹Nr.›</a:t>
+              <a:t>‹#›</a:t>
             </a:fld>
             <a:endParaRPr lang="de-DE"/>
           </a:p>
@@ -4194,7 +4611,7 @@
           <a:p>
             <a:fld id="{4F3947B8-8C5A-4761-A8FC-91A470F27CDE}" type="slidenum">
               <a:rPr lang="de-DE" smtClean="0"/>
-              <a:t>‹Nr.›</a:t>
+              <a:t>‹#›</a:t>
             </a:fld>
             <a:endParaRPr lang="de-DE"/>
           </a:p>
@@ -5049,7 +5466,7 @@
           <p:nvPr/>
         </p:nvPicPr>
         <p:blipFill>
-          <a:blip r:embed="rId2"/>
+          <a:blip r:embed="rId3"/>
           <a:stretch>
             <a:fillRect/>
           </a:stretch>
@@ -5068,6 +5485,394 @@
     <p:extLst>
       <p:ext uri="{BB962C8B-B14F-4D97-AF65-F5344CB8AC3E}">
         <p14:creationId xmlns:p14="http://schemas.microsoft.com/office/powerpoint/2010/main" val="3664826372"/>
+      </p:ext>
+    </p:extLst>
+  </p:cSld>
+  <p:clrMapOvr>
+    <a:masterClrMapping/>
+  </p:clrMapOvr>
+</p:sld>
+</file>
+
+<file path=ppt/slides/slide15.xml><?xml version="1.0" encoding="utf-8"?>
+<p:sld xmlns:a="http://schemas.openxmlformats.org/drawingml/2006/main" xmlns:r="http://schemas.openxmlformats.org/officeDocument/2006/relationships" xmlns:p="http://schemas.openxmlformats.org/presentationml/2006/main">
+  <p:cSld>
+    <p:spTree>
+      <p:nvGrpSpPr>
+        <p:cNvPr id="1" name=""/>
+        <p:cNvGrpSpPr/>
+        <p:nvPr/>
+      </p:nvGrpSpPr>
+      <p:grpSpPr>
+        <a:xfrm>
+          <a:off x="0" y="0"/>
+          <a:ext cx="0" cy="0"/>
+          <a:chOff x="0" y="0"/>
+          <a:chExt cx="0" cy="0"/>
+        </a:xfrm>
+      </p:grpSpPr>
+      <p:sp>
+        <p:nvSpPr>
+          <p:cNvPr id="2" name="Titel 1">
+            <a:extLst>
+              <a:ext uri="{FF2B5EF4-FFF2-40B4-BE49-F238E27FC236}">
+                <a16:creationId xmlns:a16="http://schemas.microsoft.com/office/drawing/2014/main" id="{5E0CD186-D670-2321-97A4-ED56A0F76E07}"/>
+              </a:ext>
+            </a:extLst>
+          </p:cNvPr>
+          <p:cNvSpPr>
+            <a:spLocks noGrp="1"/>
+          </p:cNvSpPr>
+          <p:nvPr>
+            <p:ph type="title"/>
+          </p:nvPr>
+        </p:nvSpPr>
+        <p:spPr/>
+        <p:txBody>
+          <a:bodyPr/>
+          <a:lstStyle/>
+          <a:p>
+            <a:pPr algn="ctr"/>
+            <a:r>
+              <a:rPr lang="de-DE" dirty="0"/>
+              <a:t>Zielhierarchie</a:t>
+            </a:r>
+          </a:p>
+        </p:txBody>
+      </p:sp>
+      <p:sp>
+        <p:nvSpPr>
+          <p:cNvPr id="3" name="Inhaltsplatzhalter 2">
+            <a:extLst>
+              <a:ext uri="{FF2B5EF4-FFF2-40B4-BE49-F238E27FC236}">
+                <a16:creationId xmlns:a16="http://schemas.microsoft.com/office/drawing/2014/main" id="{33FD777B-5F33-ADBB-2B6E-5E950C408908}"/>
+              </a:ext>
+            </a:extLst>
+          </p:cNvPr>
+          <p:cNvSpPr>
+            <a:spLocks noGrp="1"/>
+          </p:cNvSpPr>
+          <p:nvPr>
+            <p:ph idx="1"/>
+          </p:nvPr>
+        </p:nvSpPr>
+        <p:spPr>
+          <a:xfrm>
+            <a:off x="511946" y="1198485"/>
+            <a:ext cx="11168108" cy="4916334"/>
+          </a:xfrm>
+        </p:spPr>
+        <p:txBody>
+          <a:bodyPr>
+            <a:noAutofit/>
+          </a:bodyPr>
+          <a:lstStyle/>
+          <a:p>
+            <a:r>
+              <a:rPr lang="de-DE" sz="1200" b="1" dirty="0"/>
+              <a:t>Strategische Ziele</a:t>
+            </a:r>
+          </a:p>
+          <a:p>
+            <a:pPr>
+              <a:buFont typeface="Arial" panose="020B0604020202020204" pitchFamily="34" charset="0"/>
+              <a:buChar char="•"/>
+            </a:pPr>
+            <a:r>
+              <a:rPr lang="de-DE" sz="1200" dirty="0"/>
+              <a:t>Es muss eine Community geschaffen werden.</a:t>
+            </a:r>
+          </a:p>
+          <a:p>
+            <a:pPr>
+              <a:buFont typeface="Arial" panose="020B0604020202020204" pitchFamily="34" charset="0"/>
+              <a:buChar char="•"/>
+            </a:pPr>
+            <a:r>
+              <a:rPr lang="de-DE" sz="1200" dirty="0"/>
+              <a:t>Es soll historisches Material digital gesammelt werden.</a:t>
+            </a:r>
+          </a:p>
+          <a:p>
+            <a:pPr>
+              <a:buFont typeface="Arial" panose="020B0604020202020204" pitchFamily="34" charset="0"/>
+              <a:buChar char="•"/>
+            </a:pPr>
+            <a:r>
+              <a:rPr lang="de-DE" sz="1200" dirty="0"/>
+              <a:t>Es soll möglich sein sich ein Bild von einer Ortschaft (Gummersbach) zu bestimmten Zeitperioden zu machen.</a:t>
+            </a:r>
+          </a:p>
+          <a:p>
+            <a:r>
+              <a:rPr lang="de-DE" sz="1200" b="1" dirty="0"/>
+              <a:t>Taktische Ziele</a:t>
+            </a:r>
+          </a:p>
+          <a:p>
+            <a:pPr>
+              <a:buFont typeface="Arial" panose="020B0604020202020204" pitchFamily="34" charset="0"/>
+              <a:buChar char="•"/>
+            </a:pPr>
+            <a:r>
+              <a:rPr lang="de-DE" sz="1200" dirty="0"/>
+              <a:t>Es müssen Bilder hochgeladen werden können.</a:t>
+            </a:r>
+          </a:p>
+          <a:p>
+            <a:pPr>
+              <a:buFont typeface="Arial" panose="020B0604020202020204" pitchFamily="34" charset="0"/>
+              <a:buChar char="•"/>
+            </a:pPr>
+            <a:r>
+              <a:rPr lang="de-DE" sz="1200" dirty="0"/>
+              <a:t>Es soll die Möglichkeit geben die Bilder ort- und zeitbezogen einzuordnen.</a:t>
+            </a:r>
+          </a:p>
+          <a:p>
+            <a:pPr>
+              <a:buFont typeface="Arial" panose="020B0604020202020204" pitchFamily="34" charset="0"/>
+              <a:buChar char="•"/>
+            </a:pPr>
+            <a:r>
+              <a:rPr lang="de-DE" sz="1200" dirty="0"/>
+              <a:t>Es müssen Kommentare und Geschichten zu den Bildern und Orten hinterlassen werden können.</a:t>
+            </a:r>
+          </a:p>
+          <a:p>
+            <a:pPr>
+              <a:buFont typeface="Arial" panose="020B0604020202020204" pitchFamily="34" charset="0"/>
+              <a:buChar char="•"/>
+            </a:pPr>
+            <a:r>
+              <a:rPr lang="de-DE" sz="1200" dirty="0"/>
+              <a:t>Es könnte daraus eine Karte enstehen.</a:t>
+            </a:r>
+          </a:p>
+          <a:p>
+            <a:pPr>
+              <a:buFont typeface="Arial" panose="020B0604020202020204" pitchFamily="34" charset="0"/>
+              <a:buChar char="•"/>
+            </a:pPr>
+            <a:r>
+              <a:rPr lang="de-DE" sz="1200" dirty="0"/>
+              <a:t>Die User müssen identifizierbar sein.</a:t>
+            </a:r>
+          </a:p>
+          <a:p>
+            <a:pPr>
+              <a:buFont typeface="Arial" panose="020B0604020202020204" pitchFamily="34" charset="0"/>
+              <a:buChar char="•"/>
+            </a:pPr>
+            <a:r>
+              <a:rPr lang="de-DE" sz="1200" dirty="0"/>
+              <a:t>Das System soll gamifiziert werden.</a:t>
+            </a:r>
+          </a:p>
+          <a:p>
+            <a:pPr>
+              <a:buFont typeface="Arial" panose="020B0604020202020204" pitchFamily="34" charset="0"/>
+              <a:buChar char="•"/>
+            </a:pPr>
+            <a:r>
+              <a:rPr lang="de-DE" sz="1200" dirty="0"/>
+              <a:t>Neue Bewohner und Ortsfremde sollen auch an dem System und der Community teilhaben können.</a:t>
+            </a:r>
+          </a:p>
+          <a:p>
+            <a:r>
+              <a:rPr lang="de-DE" sz="1200" b="1" dirty="0"/>
+              <a:t>Operative Ziele</a:t>
+            </a:r>
+          </a:p>
+          <a:p>
+            <a:pPr>
+              <a:buFont typeface="Arial" panose="020B0604020202020204" pitchFamily="34" charset="0"/>
+              <a:buChar char="•"/>
+            </a:pPr>
+            <a:r>
+              <a:rPr lang="de-DE" sz="1200" dirty="0"/>
+              <a:t>Es muss eine Datenstruktur entwickelt werden.</a:t>
+            </a:r>
+          </a:p>
+          <a:p>
+            <a:pPr>
+              <a:buFont typeface="Arial" panose="020B0604020202020204" pitchFamily="34" charset="0"/>
+              <a:buChar char="•"/>
+            </a:pPr>
+            <a:r>
+              <a:rPr lang="de-DE" sz="1200" dirty="0"/>
+              <a:t>Es sollte ein bestimmter Zeitrahmen, der betrachtet werden soll, bestimmt werden.</a:t>
+            </a:r>
+          </a:p>
+          <a:p>
+            <a:pPr>
+              <a:buFont typeface="Arial" panose="020B0604020202020204" pitchFamily="34" charset="0"/>
+              <a:buChar char="•"/>
+            </a:pPr>
+            <a:r>
+              <a:rPr lang="de-DE" sz="1200" dirty="0"/>
+              <a:t>Die Zielgruppe und Stakeholder müssen genau untersucht und verstanden werden.</a:t>
+            </a:r>
+          </a:p>
+          <a:p>
+            <a:pPr>
+              <a:buFont typeface="Arial" panose="020B0604020202020204" pitchFamily="34" charset="0"/>
+              <a:buChar char="•"/>
+            </a:pPr>
+            <a:r>
+              <a:rPr lang="de-DE" sz="1200" dirty="0"/>
+              <a:t>Es soll eine passende Gamification Idee gefunden und implementiert werden.</a:t>
+            </a:r>
+          </a:p>
+          <a:p>
+            <a:pPr>
+              <a:buFont typeface="Arial" panose="020B0604020202020204" pitchFamily="34" charset="0"/>
+              <a:buChar char="•"/>
+            </a:pPr>
+            <a:r>
+              <a:rPr lang="de-DE" sz="1200" dirty="0"/>
+              <a:t>Es muss ein benutzungsfreundliches UI entwickelt werden.</a:t>
+            </a:r>
+          </a:p>
+          <a:p>
+            <a:pPr>
+              <a:buFont typeface="Arial" panose="020B0604020202020204" pitchFamily="34" charset="0"/>
+              <a:buChar char="•"/>
+            </a:pPr>
+            <a:r>
+              <a:rPr lang="de-DE" sz="1200" dirty="0"/>
+              <a:t>Es kann eine Grundkarte gewählt werden oder es kann den Usern die Möglichkeit gegeben werden die Karte kollaborativ selber zu zeichnen</a:t>
+            </a:r>
+          </a:p>
+        </p:txBody>
+      </p:sp>
+    </p:spTree>
+    <p:extLst>
+      <p:ext uri="{BB962C8B-B14F-4D97-AF65-F5344CB8AC3E}">
+        <p14:creationId xmlns:p14="http://schemas.microsoft.com/office/powerpoint/2010/main" val="2608407678"/>
+      </p:ext>
+    </p:extLst>
+  </p:cSld>
+  <p:clrMapOvr>
+    <a:masterClrMapping/>
+  </p:clrMapOvr>
+</p:sld>
+</file>
+
+<file path=ppt/slides/slide16.xml><?xml version="1.0" encoding="utf-8"?>
+<p:sld xmlns:a="http://schemas.openxmlformats.org/drawingml/2006/main" xmlns:r="http://schemas.openxmlformats.org/officeDocument/2006/relationships" xmlns:p="http://schemas.openxmlformats.org/presentationml/2006/main">
+  <p:cSld>
+    <p:spTree>
+      <p:nvGrpSpPr>
+        <p:cNvPr id="1" name=""/>
+        <p:cNvGrpSpPr/>
+        <p:nvPr/>
+      </p:nvGrpSpPr>
+      <p:grpSpPr>
+        <a:xfrm>
+          <a:off x="0" y="0"/>
+          <a:ext cx="0" cy="0"/>
+          <a:chOff x="0" y="0"/>
+          <a:chExt cx="0" cy="0"/>
+        </a:xfrm>
+      </p:grpSpPr>
+      <p:sp>
+        <p:nvSpPr>
+          <p:cNvPr id="2" name="Titel 1">
+            <a:extLst>
+              <a:ext uri="{FF2B5EF4-FFF2-40B4-BE49-F238E27FC236}">
+                <a16:creationId xmlns:a16="http://schemas.microsoft.com/office/drawing/2014/main" id="{5E0CD186-D670-2321-97A4-ED56A0F76E07}"/>
+              </a:ext>
+            </a:extLst>
+          </p:cNvPr>
+          <p:cNvSpPr>
+            <a:spLocks noGrp="1"/>
+          </p:cNvSpPr>
+          <p:nvPr>
+            <p:ph type="title"/>
+          </p:nvPr>
+        </p:nvSpPr>
+        <p:spPr/>
+        <p:txBody>
+          <a:bodyPr/>
+          <a:lstStyle/>
+          <a:p>
+            <a:pPr algn="ctr"/>
+            <a:r>
+              <a:rPr lang="de-DE" dirty="0"/>
+              <a:t>Alleinstellungsmerkmale</a:t>
+            </a:r>
+          </a:p>
+        </p:txBody>
+      </p:sp>
+      <p:sp>
+        <p:nvSpPr>
+          <p:cNvPr id="3" name="Inhaltsplatzhalter 2">
+            <a:extLst>
+              <a:ext uri="{FF2B5EF4-FFF2-40B4-BE49-F238E27FC236}">
+                <a16:creationId xmlns:a16="http://schemas.microsoft.com/office/drawing/2014/main" id="{33FD777B-5F33-ADBB-2B6E-5E950C408908}"/>
+              </a:ext>
+            </a:extLst>
+          </p:cNvPr>
+          <p:cNvSpPr>
+            <a:spLocks noGrp="1"/>
+          </p:cNvSpPr>
+          <p:nvPr>
+            <p:ph idx="1"/>
+          </p:nvPr>
+        </p:nvSpPr>
+        <p:spPr>
+          <a:xfrm>
+            <a:off x="603682" y="1491449"/>
+            <a:ext cx="11168108" cy="4916334"/>
+          </a:xfrm>
+        </p:spPr>
+        <p:txBody>
+          <a:bodyPr>
+            <a:noAutofit/>
+          </a:bodyPr>
+          <a:lstStyle/>
+          <a:p>
+            <a:r>
+              <a:rPr lang="de-DE" sz="1400" dirty="0"/>
+              <a:t>Bester Vergleichspunkt: Historisch thematisierte Facebook Gruppen</a:t>
+            </a:r>
+          </a:p>
+          <a:p>
+            <a:r>
+              <a:rPr lang="de-DE" sz="1400" dirty="0"/>
+              <a:t>Posts stehen für sich allein. Es gibt keine kontextuelle Übersicht.</a:t>
+            </a:r>
+          </a:p>
+          <a:p>
+            <a:r>
+              <a:rPr lang="de-DE" sz="1400" dirty="0"/>
+              <a:t>Sehr viel historisches Material in Archiven, nur bedingt digitalisiert</a:t>
+            </a:r>
+          </a:p>
+          <a:p>
+            <a:r>
+              <a:rPr lang="de-DE" sz="1400" dirty="0"/>
+              <a:t>Digitalisate je nach Archiv nur für Entgeld verfügbar</a:t>
+            </a:r>
+          </a:p>
+          <a:p>
+            <a:endParaRPr lang="de-DE" sz="1400" dirty="0"/>
+          </a:p>
+          <a:p>
+            <a:r>
+              <a:rPr lang="de-DE" sz="1400" dirty="0"/>
+              <a:t>System bietet den gesellschaftlichen Austausch von historischem Material, der auch auf Facebook stattfinden kann, an und ermöglicht, dass die Beiträge zueinander kontextualisiert werden können.  Außerdem soll die Nutzung als Teilhabe an einem Projekt empfunden werden, was bei einer Facebook Gruppe eher nicht der Fall ist.</a:t>
+            </a:r>
+            <a:endParaRPr lang="de-DE" sz="900" dirty="0"/>
+          </a:p>
+        </p:txBody>
+      </p:sp>
+    </p:spTree>
+    <p:extLst>
+      <p:ext uri="{BB962C8B-B14F-4D97-AF65-F5344CB8AC3E}">
+        <p14:creationId xmlns:p14="http://schemas.microsoft.com/office/powerpoint/2010/main" val="3088528906"/>
       </p:ext>
     </p:extLst>
   </p:cSld>

</xml_diff>

<commit_message>
Stakeholder verbessert, Folien ergänzt
</commit_message>
<xml_diff>
--- a/EPWS2223HausenKochZimmer Audit 1.pptx
+++ b/EPWS2223HausenKochZimmer Audit 1.pptx
@@ -5,7 +5,7 @@
     <p:sldMasterId id="2147483648" r:id="rId1"/>
   </p:sldMasterIdLst>
   <p:notesMasterIdLst>
-    <p:notesMasterId r:id="rId18"/>
+    <p:notesMasterId r:id="rId23"/>
   </p:notesMasterIdLst>
   <p:sldIdLst>
     <p:sldId id="256" r:id="rId2"/>
@@ -22,8 +22,13 @@
     <p:sldId id="261" r:id="rId13"/>
     <p:sldId id="262" r:id="rId14"/>
     <p:sldId id="263" r:id="rId15"/>
-    <p:sldId id="272" r:id="rId16"/>
-    <p:sldId id="271" r:id="rId17"/>
+    <p:sldId id="273" r:id="rId16"/>
+    <p:sldId id="272" r:id="rId17"/>
+    <p:sldId id="274" r:id="rId18"/>
+    <p:sldId id="271" r:id="rId19"/>
+    <p:sldId id="275" r:id="rId20"/>
+    <p:sldId id="276" r:id="rId21"/>
+    <p:sldId id="277" r:id="rId22"/>
   </p:sldIdLst>
   <p:sldSz cx="12192000" cy="6858000"/>
   <p:notesSz cx="6858000" cy="9144000"/>
@@ -125,7 +130,7 @@
   <p:extLst>
     <p:ext uri="{521415D9-36F7-43E2-AB2F-B90AF26B5E84}">
       <p14:sectionLst xmlns:p14="http://schemas.microsoft.com/office/powerpoint/2010/main">
-        <p14:section name="Standardabschnitt" id="{FE2716BC-FBA1-4CF5-ADA1-DE97E19B0E62}">
+        <p14:section name="Deckblatt und Projektplan" id="{FE2716BC-FBA1-4CF5-ADA1-DE97E19B0E62}">
           <p14:sldIdLst>
             <p14:sldId id="256"/>
             <p14:sldId id="269"/>
@@ -157,8 +162,17 @@
             <p14:sldId id="261"/>
             <p14:sldId id="262"/>
             <p14:sldId id="263"/>
+          </p14:sldIdLst>
+        </p14:section>
+        <p14:section name="andere Methoden" id="{C9BBE42E-3113-4BC9-9DE2-FE7C353C7A0E}">
+          <p14:sldIdLst>
+            <p14:sldId id="273"/>
             <p14:sldId id="272"/>
+            <p14:sldId id="274"/>
             <p14:sldId id="271"/>
+            <p14:sldId id="275"/>
+            <p14:sldId id="276"/>
+            <p14:sldId id="277"/>
           </p14:sldIdLst>
         </p14:section>
       </p14:sectionLst>
@@ -410,7 +424,7 @@
           <a:p>
             <a:fld id="{92DF0825-AC8F-4116-B49B-4A4F75013D61}" type="slidenum">
               <a:rPr lang="de-DE" smtClean="0"/>
-              <a:t>‹#›</a:t>
+              <a:t>‹Nr.›</a:t>
             </a:fld>
             <a:endParaRPr lang="de-DE"/>
           </a:p>
@@ -625,7 +639,7 @@
       </p:grpSpPr>
       <p:sp>
         <p:nvSpPr>
-          <p:cNvPr id="2" name="Slide Image Placeholder 1"/>
+          <p:cNvPr id="2" name="Folienbildplatzhalter 1"/>
           <p:cNvSpPr>
             <a:spLocks noGrp="1" noRot="1" noChangeAspect="1"/>
           </p:cNvSpPr>
@@ -637,7 +651,7 @@
       </p:sp>
       <p:sp>
         <p:nvSpPr>
-          <p:cNvPr id="3" name="Notes Placeholder 2"/>
+          <p:cNvPr id="3" name="Notizenplatzhalter 2"/>
           <p:cNvSpPr>
             <a:spLocks noGrp="1"/>
           </p:cNvSpPr>
@@ -651,167 +665,15 @@
           <a:lstStyle/>
           <a:p>
             <a:r>
-              <a:rPr lang="en-GB" dirty="0"/>
-              <a:t>Neue </a:t>
-            </a:r>
-            <a:r>
-              <a:rPr lang="en-GB" dirty="0" err="1"/>
-              <a:t>Anordnung</a:t>
-            </a:r>
-            <a:r>
-              <a:rPr lang="en-GB" dirty="0"/>
-              <a:t> der </a:t>
-            </a:r>
-            <a:r>
-              <a:rPr lang="en-GB" dirty="0" err="1"/>
-              <a:t>Elemente</a:t>
-            </a:r>
-            <a:r>
-              <a:rPr lang="en-GB" dirty="0"/>
-              <a:t> </a:t>
-            </a:r>
-            <a:r>
-              <a:rPr lang="en-GB" dirty="0" err="1"/>
-              <a:t>zur</a:t>
-            </a:r>
-            <a:r>
-              <a:rPr lang="en-GB" dirty="0"/>
-              <a:t> </a:t>
-            </a:r>
-            <a:r>
-              <a:rPr lang="en-GB" dirty="0" err="1"/>
-              <a:t>besseren</a:t>
-            </a:r>
-            <a:r>
-              <a:rPr lang="en-GB" dirty="0"/>
-              <a:t> </a:t>
-            </a:r>
-            <a:r>
-              <a:rPr lang="en-GB" dirty="0" err="1"/>
-              <a:t>Übersicht</a:t>
-            </a:r>
-            <a:r>
-              <a:rPr lang="en-GB" dirty="0"/>
-              <a:t>. </a:t>
-            </a:r>
-            <a:r>
-              <a:rPr lang="en-GB" dirty="0" err="1"/>
-              <a:t>Verbindungen</a:t>
-            </a:r>
-            <a:r>
-              <a:rPr lang="en-GB" dirty="0"/>
-              <a:t> an die </a:t>
-            </a:r>
-            <a:r>
-              <a:rPr lang="en-GB" dirty="0" err="1"/>
-              <a:t>Markierung</a:t>
-            </a:r>
-            <a:r>
-              <a:rPr lang="en-GB" dirty="0"/>
-              <a:t> um die 3 </a:t>
-            </a:r>
-            <a:r>
-              <a:rPr lang="en-GB" dirty="0" err="1"/>
-              <a:t>Wissenquellen</a:t>
-            </a:r>
-            <a:r>
-              <a:rPr lang="en-GB" dirty="0"/>
-              <a:t> </a:t>
-            </a:r>
-            <a:r>
-              <a:rPr lang="en-GB" dirty="0" err="1"/>
-              <a:t>beziehen</a:t>
-            </a:r>
-            <a:r>
-              <a:rPr lang="en-GB" dirty="0"/>
-              <a:t> </a:t>
-            </a:r>
-            <a:r>
-              <a:rPr lang="en-GB" dirty="0" err="1"/>
-              <a:t>sich</a:t>
-            </a:r>
-            <a:r>
-              <a:rPr lang="en-GB" dirty="0"/>
-              <a:t> auf alle 3. </a:t>
-            </a:r>
-            <a:r>
-              <a:rPr lang="en-GB" dirty="0" err="1"/>
-              <a:t>Verbindungen</a:t>
-            </a:r>
-            <a:r>
-              <a:rPr lang="en-GB" dirty="0"/>
-              <a:t>, die in den Kasten </a:t>
-            </a:r>
-            <a:r>
-              <a:rPr lang="en-GB" dirty="0" err="1"/>
-              <a:t>hinein</a:t>
-            </a:r>
-            <a:r>
-              <a:rPr lang="en-GB" dirty="0"/>
-              <a:t> </a:t>
-            </a:r>
-            <a:r>
-              <a:rPr lang="en-GB" dirty="0" err="1"/>
-              <a:t>direkt</a:t>
-            </a:r>
-            <a:r>
-              <a:rPr lang="en-GB" dirty="0"/>
-              <a:t> an </a:t>
-            </a:r>
-            <a:r>
-              <a:rPr lang="en-GB" dirty="0" err="1"/>
-              <a:t>ein</a:t>
-            </a:r>
-            <a:r>
-              <a:rPr lang="en-GB" dirty="0"/>
-              <a:t> Post-it </a:t>
-            </a:r>
-            <a:r>
-              <a:rPr lang="en-GB" dirty="0" err="1"/>
-              <a:t>gehen</a:t>
-            </a:r>
-            <a:r>
-              <a:rPr lang="en-GB" dirty="0"/>
-              <a:t>, </a:t>
-            </a:r>
-            <a:r>
-              <a:rPr lang="en-GB" dirty="0" err="1"/>
-              <a:t>beziehen</a:t>
-            </a:r>
-            <a:r>
-              <a:rPr lang="en-GB" dirty="0"/>
-              <a:t> </a:t>
-            </a:r>
-            <a:r>
-              <a:rPr lang="en-GB" dirty="0" err="1"/>
-              <a:t>sich</a:t>
-            </a:r>
-            <a:r>
-              <a:rPr lang="en-GB" dirty="0"/>
-              <a:t> </a:t>
-            </a:r>
-            <a:r>
-              <a:rPr lang="en-GB" dirty="0" err="1"/>
-              <a:t>spezifisch</a:t>
-            </a:r>
-            <a:r>
-              <a:rPr lang="en-GB" dirty="0"/>
-              <a:t> </a:t>
-            </a:r>
-            <a:r>
-              <a:rPr lang="en-GB" dirty="0" err="1"/>
-              <a:t>darauf</a:t>
-            </a:r>
-            <a:r>
-              <a:rPr lang="en-GB" dirty="0"/>
-              <a:t>.</a:t>
-            </a:r>
-          </a:p>
-        </p:txBody>
-      </p:sp>
-      <p:sp>
-        <p:nvSpPr>
-          <p:cNvPr id="4" name="Slide Number Placeholder 3"/>
+              <a:rPr lang="de-DE" dirty="0"/>
+              <a:t>Vereinfachung des Modells und Sortierung zu logischen clustern. In dieser Iteration des Modells wurde die Unübersichtlichkeit der vorherigen Iteration durch Vereinfachung und Clusterung bearbeitet. Bei den Verbindungen die Beziehungen Konkretisiert um kann Beziehungen adäquat darzustellen.</a:t>
+            </a:r>
+          </a:p>
+        </p:txBody>
+      </p:sp>
+      <p:sp>
+        <p:nvSpPr>
+          <p:cNvPr id="4" name="Foliennummernplatzhalter 3"/>
           <p:cNvSpPr>
             <a:spLocks noGrp="1"/>
           </p:cNvSpPr>
@@ -826,7 +688,7 @@
           <a:p>
             <a:fld id="{92DF0825-AC8F-4116-B49B-4A4F75013D61}" type="slidenum">
               <a:rPr lang="de-DE" smtClean="0"/>
-              <a:t>14</a:t>
+              <a:t>12</a:t>
             </a:fld>
             <a:endParaRPr lang="de-DE"/>
           </a:p>
@@ -835,7 +697,7 @@
     </p:spTree>
     <p:extLst>
       <p:ext uri="{BB962C8B-B14F-4D97-AF65-F5344CB8AC3E}">
-        <p14:creationId xmlns:p14="http://schemas.microsoft.com/office/powerpoint/2010/main" val="1647995684"/>
+        <p14:creationId xmlns:p14="http://schemas.microsoft.com/office/powerpoint/2010/main" val="3630828092"/>
       </p:ext>
     </p:extLst>
   </p:cSld>
@@ -891,7 +753,7 @@
           <a:p>
             <a:r>
               <a:rPr lang="de-DE" dirty="0"/>
-              <a:t>Der Aufbau der Community soll im Verlauf des Projekts im Vordergrund stehen und die diesbezüglichen Ziele heben sich mit einem „muss“ von der historischen Wissensvermittlung ab. </a:t>
+              <a:t>Erweiterung des Modells um weitere Akteure und Hilfsentitäten durch Frederik. Durch Besprechungen der vorigen Iteration sind ein paar weitere Akteure sowie Hilfsidentitäten Identifiziert worden. Die Cluster wurden für direkte farbige Markierung der Post-its aufgegeben, da die neue Anordnung und die neuen Verbindungen clustering schwierig machten.</a:t>
             </a:r>
           </a:p>
         </p:txBody>
@@ -913,7 +775,7 @@
           <a:p>
             <a:fld id="{92DF0825-AC8F-4116-B49B-4A4F75013D61}" type="slidenum">
               <a:rPr lang="de-DE" smtClean="0"/>
-              <a:t>15</a:t>
+              <a:t>13</a:t>
             </a:fld>
             <a:endParaRPr lang="de-DE"/>
           </a:p>
@@ -922,7 +784,7 @@
     </p:spTree>
     <p:extLst>
       <p:ext uri="{BB962C8B-B14F-4D97-AF65-F5344CB8AC3E}">
-        <p14:creationId xmlns:p14="http://schemas.microsoft.com/office/powerpoint/2010/main" val="5546279"/>
+        <p14:creationId xmlns:p14="http://schemas.microsoft.com/office/powerpoint/2010/main" val="3552961356"/>
       </p:ext>
     </p:extLst>
   </p:cSld>
@@ -951,6 +813,245 @@
       </p:grpSpPr>
       <p:sp>
         <p:nvSpPr>
+          <p:cNvPr id="2" name="Slide Image Placeholder 1"/>
+          <p:cNvSpPr>
+            <a:spLocks noGrp="1" noRot="1" noChangeAspect="1"/>
+          </p:cNvSpPr>
+          <p:nvPr>
+            <p:ph type="sldImg"/>
+          </p:nvPr>
+        </p:nvSpPr>
+        <p:spPr/>
+      </p:sp>
+      <p:sp>
+        <p:nvSpPr>
+          <p:cNvPr id="3" name="Notes Placeholder 2"/>
+          <p:cNvSpPr>
+            <a:spLocks noGrp="1"/>
+          </p:cNvSpPr>
+          <p:nvPr>
+            <p:ph type="body" idx="1"/>
+          </p:nvPr>
+        </p:nvSpPr>
+        <p:spPr/>
+        <p:txBody>
+          <a:bodyPr/>
+          <a:lstStyle/>
+          <a:p>
+            <a:r>
+              <a:rPr lang="en-GB" dirty="0"/>
+              <a:t>Neue </a:t>
+            </a:r>
+            <a:r>
+              <a:rPr lang="en-GB" dirty="0" err="1"/>
+              <a:t>Anordnung</a:t>
+            </a:r>
+            <a:r>
+              <a:rPr lang="en-GB" dirty="0"/>
+              <a:t> der </a:t>
+            </a:r>
+            <a:r>
+              <a:rPr lang="en-GB" dirty="0" err="1"/>
+              <a:t>Elemente</a:t>
+            </a:r>
+            <a:r>
+              <a:rPr lang="en-GB" dirty="0"/>
+              <a:t> </a:t>
+            </a:r>
+            <a:r>
+              <a:rPr lang="en-GB" dirty="0" err="1"/>
+              <a:t>zur</a:t>
+            </a:r>
+            <a:r>
+              <a:rPr lang="en-GB" dirty="0"/>
+              <a:t> </a:t>
+            </a:r>
+            <a:r>
+              <a:rPr lang="en-GB" dirty="0" err="1"/>
+              <a:t>besseren</a:t>
+            </a:r>
+            <a:r>
+              <a:rPr lang="en-GB" dirty="0"/>
+              <a:t> </a:t>
+            </a:r>
+            <a:r>
+              <a:rPr lang="en-GB" dirty="0" err="1"/>
+              <a:t>Übersicht</a:t>
+            </a:r>
+            <a:r>
+              <a:rPr lang="en-GB" dirty="0"/>
+              <a:t>. </a:t>
+            </a:r>
+            <a:r>
+              <a:rPr lang="en-GB" dirty="0" err="1"/>
+              <a:t>Verbindungen</a:t>
+            </a:r>
+            <a:r>
+              <a:rPr lang="en-GB" dirty="0"/>
+              <a:t> an die </a:t>
+            </a:r>
+            <a:r>
+              <a:rPr lang="en-GB" dirty="0" err="1"/>
+              <a:t>Markierung</a:t>
+            </a:r>
+            <a:r>
+              <a:rPr lang="en-GB" dirty="0"/>
+              <a:t> um die 3 </a:t>
+            </a:r>
+            <a:r>
+              <a:rPr lang="en-GB" dirty="0" err="1"/>
+              <a:t>Wissenquellen</a:t>
+            </a:r>
+            <a:r>
+              <a:rPr lang="en-GB" dirty="0"/>
+              <a:t> </a:t>
+            </a:r>
+            <a:r>
+              <a:rPr lang="en-GB" dirty="0" err="1"/>
+              <a:t>beziehen</a:t>
+            </a:r>
+            <a:r>
+              <a:rPr lang="en-GB" dirty="0"/>
+              <a:t> </a:t>
+            </a:r>
+            <a:r>
+              <a:rPr lang="en-GB" dirty="0" err="1"/>
+              <a:t>sich</a:t>
+            </a:r>
+            <a:r>
+              <a:rPr lang="en-GB" dirty="0"/>
+              <a:t> auf alle 3. </a:t>
+            </a:r>
+            <a:r>
+              <a:rPr lang="en-GB" dirty="0" err="1"/>
+              <a:t>Verbindungen</a:t>
+            </a:r>
+            <a:r>
+              <a:rPr lang="en-GB" dirty="0"/>
+              <a:t>, die in den Kasten </a:t>
+            </a:r>
+            <a:r>
+              <a:rPr lang="en-GB" dirty="0" err="1"/>
+              <a:t>hinein</a:t>
+            </a:r>
+            <a:r>
+              <a:rPr lang="en-GB" dirty="0"/>
+              <a:t> </a:t>
+            </a:r>
+            <a:r>
+              <a:rPr lang="en-GB" dirty="0" err="1"/>
+              <a:t>direkt</a:t>
+            </a:r>
+            <a:r>
+              <a:rPr lang="en-GB" dirty="0"/>
+              <a:t> an </a:t>
+            </a:r>
+            <a:r>
+              <a:rPr lang="en-GB" dirty="0" err="1"/>
+              <a:t>ein</a:t>
+            </a:r>
+            <a:r>
+              <a:rPr lang="en-GB" dirty="0"/>
+              <a:t> Post-it </a:t>
+            </a:r>
+            <a:r>
+              <a:rPr lang="en-GB" dirty="0" err="1"/>
+              <a:t>gehen</a:t>
+            </a:r>
+            <a:r>
+              <a:rPr lang="en-GB" dirty="0"/>
+              <a:t>, </a:t>
+            </a:r>
+            <a:r>
+              <a:rPr lang="en-GB" dirty="0" err="1"/>
+              <a:t>beziehen</a:t>
+            </a:r>
+            <a:r>
+              <a:rPr lang="en-GB" dirty="0"/>
+              <a:t> </a:t>
+            </a:r>
+            <a:r>
+              <a:rPr lang="en-GB" dirty="0" err="1"/>
+              <a:t>sich</a:t>
+            </a:r>
+            <a:r>
+              <a:rPr lang="en-GB" dirty="0"/>
+              <a:t> </a:t>
+            </a:r>
+            <a:r>
+              <a:rPr lang="en-GB" dirty="0" err="1"/>
+              <a:t>spezifisch</a:t>
+            </a:r>
+            <a:r>
+              <a:rPr lang="en-GB" dirty="0"/>
+              <a:t> </a:t>
+            </a:r>
+            <a:r>
+              <a:rPr lang="en-GB" dirty="0" err="1"/>
+              <a:t>darauf</a:t>
+            </a:r>
+            <a:r>
+              <a:rPr lang="en-GB" dirty="0"/>
+              <a:t>.</a:t>
+            </a:r>
+          </a:p>
+        </p:txBody>
+      </p:sp>
+      <p:sp>
+        <p:nvSpPr>
+          <p:cNvPr id="4" name="Slide Number Placeholder 3"/>
+          <p:cNvSpPr>
+            <a:spLocks noGrp="1"/>
+          </p:cNvSpPr>
+          <p:nvPr>
+            <p:ph type="sldNum" sz="quarter" idx="5"/>
+          </p:nvPr>
+        </p:nvSpPr>
+        <p:spPr/>
+        <p:txBody>
+          <a:bodyPr/>
+          <a:lstStyle/>
+          <a:p>
+            <a:fld id="{92DF0825-AC8F-4116-B49B-4A4F75013D61}" type="slidenum">
+              <a:rPr lang="de-DE" smtClean="0"/>
+              <a:t>14</a:t>
+            </a:fld>
+            <a:endParaRPr lang="de-DE"/>
+          </a:p>
+        </p:txBody>
+      </p:sp>
+    </p:spTree>
+    <p:extLst>
+      <p:ext uri="{BB962C8B-B14F-4D97-AF65-F5344CB8AC3E}">
+        <p14:creationId xmlns:p14="http://schemas.microsoft.com/office/powerpoint/2010/main" val="1647995684"/>
+      </p:ext>
+    </p:extLst>
+  </p:cSld>
+  <p:clrMapOvr>
+    <a:masterClrMapping/>
+  </p:clrMapOvr>
+</p:notes>
+</file>
+
+<file path=ppt/notesSlides/notesSlide13.xml><?xml version="1.0" encoding="utf-8"?>
+<p:notes xmlns:a="http://schemas.openxmlformats.org/drawingml/2006/main" xmlns:r="http://schemas.openxmlformats.org/officeDocument/2006/relationships" xmlns:p="http://schemas.openxmlformats.org/presentationml/2006/main">
+  <p:cSld>
+    <p:spTree>
+      <p:nvGrpSpPr>
+        <p:cNvPr id="1" name=""/>
+        <p:cNvGrpSpPr/>
+        <p:nvPr/>
+      </p:nvGrpSpPr>
+      <p:grpSpPr>
+        <a:xfrm>
+          <a:off x="0" y="0"/>
+          <a:ext cx="0" cy="0"/>
+          <a:chOff x="0" y="0"/>
+          <a:chExt cx="0" cy="0"/>
+        </a:xfrm>
+      </p:grpSpPr>
+      <p:sp>
+        <p:nvSpPr>
           <p:cNvPr id="2" name="Folienbildplatzhalter 1"/>
           <p:cNvSpPr>
             <a:spLocks noGrp="1" noRot="1" noChangeAspect="1"/>
@@ -978,7 +1079,7 @@
           <a:p>
             <a:r>
               <a:rPr lang="de-DE" dirty="0"/>
-              <a:t>Die Digitalisierung der Bestände von Archiven ist ein langsam voranschreitendes Projekt, da unter dem Archivgut nicht nur Bilder und Fotos sind sondern zahlreiche Akten, Bücher und sonstige Unterlagen. Insgesamt handelt es sich dabei um viele Millionen an Seiten und dementsprechend genau so viele Scans. Weiterhin erschwert wird die Sache dadurch, dass einige der bereits digitalisierten Bestände nicht online einsehbar sind. Diese Bestände können durchaus in digitaler Form im Archiv vor Ort einsehbar sein. Die Verwendung einer Kopie dieser Scans ist in der Regel kostenpflichtig.</a:t>
+              <a:t>Der Aufbau der Community soll im Verlauf des Projekts im Vordergrund stehen und die diesbezüglichen Ziele heben sich mit einem „muss“ von der historischen Wissensvermittlung ab. </a:t>
             </a:r>
           </a:p>
         </p:txBody>
@@ -1009,7 +1110,399 @@
     </p:spTree>
     <p:extLst>
       <p:ext uri="{BB962C8B-B14F-4D97-AF65-F5344CB8AC3E}">
+        <p14:creationId xmlns:p14="http://schemas.microsoft.com/office/powerpoint/2010/main" val="5546279"/>
+      </p:ext>
+    </p:extLst>
+  </p:cSld>
+  <p:clrMapOvr>
+    <a:masterClrMapping/>
+  </p:clrMapOvr>
+</p:notes>
+</file>
+
+<file path=ppt/notesSlides/notesSlide14.xml><?xml version="1.0" encoding="utf-8"?>
+<p:notes xmlns:a="http://schemas.openxmlformats.org/drawingml/2006/main" xmlns:r="http://schemas.openxmlformats.org/officeDocument/2006/relationships" xmlns:p="http://schemas.openxmlformats.org/presentationml/2006/main">
+  <p:cSld>
+    <p:spTree>
+      <p:nvGrpSpPr>
+        <p:cNvPr id="1" name=""/>
+        <p:cNvGrpSpPr/>
+        <p:nvPr/>
+      </p:nvGrpSpPr>
+      <p:grpSpPr>
+        <a:xfrm>
+          <a:off x="0" y="0"/>
+          <a:ext cx="0" cy="0"/>
+          <a:chOff x="0" y="0"/>
+          <a:chExt cx="0" cy="0"/>
+        </a:xfrm>
+      </p:grpSpPr>
+      <p:sp>
+        <p:nvSpPr>
+          <p:cNvPr id="2" name="Folienbildplatzhalter 1"/>
+          <p:cNvSpPr>
+            <a:spLocks noGrp="1" noRot="1" noChangeAspect="1"/>
+          </p:cNvSpPr>
+          <p:nvPr>
+            <p:ph type="sldImg"/>
+          </p:nvPr>
+        </p:nvSpPr>
+        <p:spPr/>
+      </p:sp>
+      <p:sp>
+        <p:nvSpPr>
+          <p:cNvPr id="3" name="Notizenplatzhalter 2"/>
+          <p:cNvSpPr>
+            <a:spLocks noGrp="1"/>
+          </p:cNvSpPr>
+          <p:nvPr>
+            <p:ph type="body" idx="1"/>
+          </p:nvPr>
+        </p:nvSpPr>
+        <p:spPr/>
+        <p:txBody>
+          <a:bodyPr/>
+          <a:lstStyle/>
+          <a:p>
+            <a:r>
+              <a:rPr lang="de-DE" dirty="0"/>
+              <a:t>Die Digitalisierung der Bestände von Archiven ist ein langsam voranschreitendes Projekt, da unter dem Archivgut nicht nur Bilder und Fotos sind sondern zahlreiche Akten, Bücher und sonstige Unterlagen. Insgesamt handelt es sich dabei um viele Millionen an Seiten und dementsprechend genau so viele Scans. Weiterhin erschwert wird die Sache dadurch, dass einige der bereits digitalisierten Bestände nicht online einsehbar sind. Diese Bestände können durchaus in digitaler Form im Archiv vor Ort einsehbar sein. Die Verwendung einer Kopie dieser Scans ist in der Regel kostenpflichtig.</a:t>
+            </a:r>
+          </a:p>
+        </p:txBody>
+      </p:sp>
+      <p:sp>
+        <p:nvSpPr>
+          <p:cNvPr id="4" name="Foliennummernplatzhalter 3"/>
+          <p:cNvSpPr>
+            <a:spLocks noGrp="1"/>
+          </p:cNvSpPr>
+          <p:nvPr>
+            <p:ph type="sldNum" sz="quarter" idx="5"/>
+          </p:nvPr>
+        </p:nvSpPr>
+        <p:spPr/>
+        <p:txBody>
+          <a:bodyPr/>
+          <a:lstStyle/>
+          <a:p>
+            <a:fld id="{92DF0825-AC8F-4116-B49B-4A4F75013D61}" type="slidenum">
+              <a:rPr lang="de-DE" smtClean="0"/>
+              <a:t>18</a:t>
+            </a:fld>
+            <a:endParaRPr lang="de-DE"/>
+          </a:p>
+        </p:txBody>
+      </p:sp>
+    </p:spTree>
+    <p:extLst>
+      <p:ext uri="{BB962C8B-B14F-4D97-AF65-F5344CB8AC3E}">
         <p14:creationId xmlns:p14="http://schemas.microsoft.com/office/powerpoint/2010/main" val="2868451909"/>
+      </p:ext>
+    </p:extLst>
+  </p:cSld>
+  <p:clrMapOvr>
+    <a:masterClrMapping/>
+  </p:clrMapOvr>
+</p:notes>
+</file>
+
+<file path=ppt/notesSlides/notesSlide15.xml><?xml version="1.0" encoding="utf-8"?>
+<p:notes xmlns:a="http://schemas.openxmlformats.org/drawingml/2006/main" xmlns:r="http://schemas.openxmlformats.org/officeDocument/2006/relationships" xmlns:p="http://schemas.openxmlformats.org/presentationml/2006/main">
+  <p:cSld>
+    <p:spTree>
+      <p:nvGrpSpPr>
+        <p:cNvPr id="1" name=""/>
+        <p:cNvGrpSpPr/>
+        <p:nvPr/>
+      </p:nvGrpSpPr>
+      <p:grpSpPr>
+        <a:xfrm>
+          <a:off x="0" y="0"/>
+          <a:ext cx="0" cy="0"/>
+          <a:chOff x="0" y="0"/>
+          <a:chExt cx="0" cy="0"/>
+        </a:xfrm>
+      </p:grpSpPr>
+      <p:sp>
+        <p:nvSpPr>
+          <p:cNvPr id="2" name="Folienbildplatzhalter 1"/>
+          <p:cNvSpPr>
+            <a:spLocks noGrp="1" noRot="1" noChangeAspect="1"/>
+          </p:cNvSpPr>
+          <p:nvPr>
+            <p:ph type="sldImg"/>
+          </p:nvPr>
+        </p:nvSpPr>
+        <p:spPr/>
+      </p:sp>
+      <p:sp>
+        <p:nvSpPr>
+          <p:cNvPr id="3" name="Notizenplatzhalter 2"/>
+          <p:cNvSpPr>
+            <a:spLocks noGrp="1"/>
+          </p:cNvSpPr>
+          <p:nvPr>
+            <p:ph type="body" idx="1"/>
+          </p:nvPr>
+        </p:nvSpPr>
+        <p:spPr/>
+        <p:txBody>
+          <a:bodyPr/>
+          <a:lstStyle/>
+          <a:p>
+            <a:r>
+              <a:rPr lang="de-DE" dirty="0"/>
+              <a:t>Bei der Erstellung der Anforderungsermittlung ist uns klar geworden, dass diese noch mal Iteriert werden müssen. Die Planung der Gamification Systeme wird die bisherige Anforderungsermittlung Erweiterung und es werden voraussichtlich bei der weiteren Planung des Systems weitere Anforderungen hinzugefügt.</a:t>
+            </a:r>
+          </a:p>
+        </p:txBody>
+      </p:sp>
+      <p:sp>
+        <p:nvSpPr>
+          <p:cNvPr id="4" name="Foliennummernplatzhalter 3"/>
+          <p:cNvSpPr>
+            <a:spLocks noGrp="1"/>
+          </p:cNvSpPr>
+          <p:nvPr>
+            <p:ph type="sldNum" sz="quarter" idx="5"/>
+          </p:nvPr>
+        </p:nvSpPr>
+        <p:spPr/>
+        <p:txBody>
+          <a:bodyPr/>
+          <a:lstStyle/>
+          <a:p>
+            <a:fld id="{92DF0825-AC8F-4116-B49B-4A4F75013D61}" type="slidenum">
+              <a:rPr lang="de-DE" smtClean="0"/>
+              <a:t>19</a:t>
+            </a:fld>
+            <a:endParaRPr lang="de-DE"/>
+          </a:p>
+        </p:txBody>
+      </p:sp>
+    </p:spTree>
+    <p:extLst>
+      <p:ext uri="{BB962C8B-B14F-4D97-AF65-F5344CB8AC3E}">
+        <p14:creationId xmlns:p14="http://schemas.microsoft.com/office/powerpoint/2010/main" val="2884470058"/>
+      </p:ext>
+    </p:extLst>
+  </p:cSld>
+  <p:clrMapOvr>
+    <a:masterClrMapping/>
+  </p:clrMapOvr>
+</p:notes>
+</file>
+
+<file path=ppt/notesSlides/notesSlide16.xml><?xml version="1.0" encoding="utf-8"?>
+<p:notes xmlns:a="http://schemas.openxmlformats.org/drawingml/2006/main" xmlns:r="http://schemas.openxmlformats.org/officeDocument/2006/relationships" xmlns:p="http://schemas.openxmlformats.org/presentationml/2006/main">
+  <p:cSld>
+    <p:spTree>
+      <p:nvGrpSpPr>
+        <p:cNvPr id="1" name=""/>
+        <p:cNvGrpSpPr/>
+        <p:nvPr/>
+      </p:nvGrpSpPr>
+      <p:grpSpPr>
+        <a:xfrm>
+          <a:off x="0" y="0"/>
+          <a:ext cx="0" cy="0"/>
+          <a:chOff x="0" y="0"/>
+          <a:chExt cx="0" cy="0"/>
+        </a:xfrm>
+      </p:grpSpPr>
+      <p:sp>
+        <p:nvSpPr>
+          <p:cNvPr id="2" name="Folienbildplatzhalter 1"/>
+          <p:cNvSpPr>
+            <a:spLocks noGrp="1" noRot="1" noChangeAspect="1"/>
+          </p:cNvSpPr>
+          <p:nvPr>
+            <p:ph type="sldImg"/>
+          </p:nvPr>
+        </p:nvSpPr>
+        <p:spPr/>
+      </p:sp>
+      <p:sp>
+        <p:nvSpPr>
+          <p:cNvPr id="3" name="Notizenplatzhalter 2"/>
+          <p:cNvSpPr>
+            <a:spLocks noGrp="1"/>
+          </p:cNvSpPr>
+          <p:nvPr>
+            <p:ph type="body" idx="1"/>
+          </p:nvPr>
+        </p:nvSpPr>
+        <p:spPr/>
+        <p:txBody>
+          <a:bodyPr/>
+          <a:lstStyle/>
+          <a:p>
+            <a:pPr marL="0" marR="0" lvl="0" indent="0" algn="l" defTabSz="914400" rtl="0" eaLnBrk="1" fontAlgn="auto" latinLnBrk="0" hangingPunct="1">
+              <a:lnSpc>
+                <a:spcPct val="100000"/>
+              </a:lnSpc>
+              <a:spcBef>
+                <a:spcPts val="0"/>
+              </a:spcBef>
+              <a:spcAft>
+                <a:spcPts val="0"/>
+              </a:spcAft>
+              <a:buClrTx/>
+              <a:buSzTx/>
+              <a:buFontTx/>
+              <a:buNone/>
+              <a:tabLst/>
+              <a:defRPr/>
+            </a:pPr>
+            <a:r>
+              <a:rPr lang="de-DE" dirty="0"/>
+              <a:t>Bei der Erstellung der Anforderungsermittlung ist uns klar geworden, dass diese noch mal Iteriert werden müssen. Die Planung der Gamification Systeme wird die bisherige Anforderungsermittlung Erweiterung und es werden voraussichtlich bei der weiteren Planung des Systems weitere Anforderungen hinzugefügt.</a:t>
+            </a:r>
+          </a:p>
+          <a:p>
+            <a:endParaRPr lang="de-DE" dirty="0"/>
+          </a:p>
+        </p:txBody>
+      </p:sp>
+      <p:sp>
+        <p:nvSpPr>
+          <p:cNvPr id="4" name="Foliennummernplatzhalter 3"/>
+          <p:cNvSpPr>
+            <a:spLocks noGrp="1"/>
+          </p:cNvSpPr>
+          <p:nvPr>
+            <p:ph type="sldNum" sz="quarter" idx="5"/>
+          </p:nvPr>
+        </p:nvSpPr>
+        <p:spPr/>
+        <p:txBody>
+          <a:bodyPr/>
+          <a:lstStyle/>
+          <a:p>
+            <a:fld id="{92DF0825-AC8F-4116-B49B-4A4F75013D61}" type="slidenum">
+              <a:rPr lang="de-DE" smtClean="0"/>
+              <a:t>20</a:t>
+            </a:fld>
+            <a:endParaRPr lang="de-DE"/>
+          </a:p>
+        </p:txBody>
+      </p:sp>
+    </p:spTree>
+    <p:extLst>
+      <p:ext uri="{BB962C8B-B14F-4D97-AF65-F5344CB8AC3E}">
+        <p14:creationId xmlns:p14="http://schemas.microsoft.com/office/powerpoint/2010/main" val="541262336"/>
+      </p:ext>
+    </p:extLst>
+  </p:cSld>
+  <p:clrMapOvr>
+    <a:masterClrMapping/>
+  </p:clrMapOvr>
+</p:notes>
+</file>
+
+<file path=ppt/notesSlides/notesSlide17.xml><?xml version="1.0" encoding="utf-8"?>
+<p:notes xmlns:a="http://schemas.openxmlformats.org/drawingml/2006/main" xmlns:r="http://schemas.openxmlformats.org/officeDocument/2006/relationships" xmlns:p="http://schemas.openxmlformats.org/presentationml/2006/main">
+  <p:cSld>
+    <p:spTree>
+      <p:nvGrpSpPr>
+        <p:cNvPr id="1" name=""/>
+        <p:cNvGrpSpPr/>
+        <p:nvPr/>
+      </p:nvGrpSpPr>
+      <p:grpSpPr>
+        <a:xfrm>
+          <a:off x="0" y="0"/>
+          <a:ext cx="0" cy="0"/>
+          <a:chOff x="0" y="0"/>
+          <a:chExt cx="0" cy="0"/>
+        </a:xfrm>
+      </p:grpSpPr>
+      <p:sp>
+        <p:nvSpPr>
+          <p:cNvPr id="2" name="Folienbildplatzhalter 1"/>
+          <p:cNvSpPr>
+            <a:spLocks noGrp="1" noRot="1" noChangeAspect="1"/>
+          </p:cNvSpPr>
+          <p:nvPr>
+            <p:ph type="sldImg"/>
+          </p:nvPr>
+        </p:nvSpPr>
+        <p:spPr/>
+      </p:sp>
+      <p:sp>
+        <p:nvSpPr>
+          <p:cNvPr id="3" name="Notizenplatzhalter 2"/>
+          <p:cNvSpPr>
+            <a:spLocks noGrp="1"/>
+          </p:cNvSpPr>
+          <p:nvPr>
+            <p:ph type="body" idx="1"/>
+          </p:nvPr>
+        </p:nvSpPr>
+        <p:spPr/>
+        <p:txBody>
+          <a:bodyPr/>
+          <a:lstStyle/>
+          <a:p>
+            <a:pPr marL="0" marR="0" lvl="0" indent="0" algn="l" defTabSz="914400" rtl="0" eaLnBrk="1" fontAlgn="auto" latinLnBrk="0" hangingPunct="1">
+              <a:lnSpc>
+                <a:spcPct val="100000"/>
+              </a:lnSpc>
+              <a:spcBef>
+                <a:spcPts val="0"/>
+              </a:spcBef>
+              <a:spcAft>
+                <a:spcPts val="0"/>
+              </a:spcAft>
+              <a:buClrTx/>
+              <a:buSzTx/>
+              <a:buFontTx/>
+              <a:buNone/>
+              <a:tabLst/>
+              <a:defRPr/>
+            </a:pPr>
+            <a:r>
+              <a:rPr lang="de-DE" dirty="0"/>
+              <a:t>Bei der Erstellung der Anforderungsermittlung ist uns klar geworden, dass diese noch mal Iteriert werden müssen. </a:t>
+            </a:r>
+            <a:r>
+              <a:rPr lang="de-DE"/>
+              <a:t>Die Planung der Gamification Systeme wird die bisherige Anforderungsermittlung Erweiterung und es werden voraussichtlich bei der weiteren Planung des Systems weitere Anforderungen hinzugefügt.</a:t>
+            </a:r>
+          </a:p>
+          <a:p>
+            <a:endParaRPr lang="de-DE" dirty="0"/>
+          </a:p>
+        </p:txBody>
+      </p:sp>
+      <p:sp>
+        <p:nvSpPr>
+          <p:cNvPr id="4" name="Foliennummernplatzhalter 3"/>
+          <p:cNvSpPr>
+            <a:spLocks noGrp="1"/>
+          </p:cNvSpPr>
+          <p:nvPr>
+            <p:ph type="sldNum" sz="quarter" idx="5"/>
+          </p:nvPr>
+        </p:nvSpPr>
+        <p:spPr/>
+        <p:txBody>
+          <a:bodyPr/>
+          <a:lstStyle/>
+          <a:p>
+            <a:fld id="{92DF0825-AC8F-4116-B49B-4A4F75013D61}" type="slidenum">
+              <a:rPr lang="de-DE" smtClean="0"/>
+              <a:t>21</a:t>
+            </a:fld>
+            <a:endParaRPr lang="de-DE"/>
+          </a:p>
+        </p:txBody>
+      </p:sp>
+    </p:spTree>
+    <p:extLst>
+      <p:ext uri="{BB962C8B-B14F-4D97-AF65-F5344CB8AC3E}">
+        <p14:creationId xmlns:p14="http://schemas.microsoft.com/office/powerpoint/2010/main" val="1479119623"/>
       </p:ext>
     </p:extLst>
   </p:cSld>
@@ -1063,6 +1556,23 @@
           <a:bodyPr/>
           <a:lstStyle/>
           <a:p>
+            <a:pPr marL="0" marR="0" lvl="0" indent="0" algn="l" defTabSz="914400" rtl="0" eaLnBrk="1" fontAlgn="auto" latinLnBrk="0" hangingPunct="1">
+              <a:lnSpc>
+                <a:spcPct val="100000"/>
+              </a:lnSpc>
+              <a:spcBef>
+                <a:spcPts val="0"/>
+              </a:spcBef>
+              <a:spcAft>
+                <a:spcPts val="0"/>
+              </a:spcAft>
+              <a:buClrTx/>
+              <a:buSzTx/>
+              <a:buFontTx/>
+              <a:buNone/>
+              <a:tabLst/>
+              <a:defRPr/>
+            </a:pPr>
             <a:r>
               <a:rPr lang="de-DE" dirty="0"/>
               <a:t>Bei der ersten Version unsere Projekt Idee konnten wir uns einige unsere Fragen nicht beantworten und einige Punkte waren noch unklar.</a:t>
@@ -1087,7 +1597,7 @@
           <a:p>
             <a:fld id="{92DF0825-AC8F-4116-B49B-4A4F75013D61}" type="slidenum">
               <a:rPr lang="de-DE" smtClean="0"/>
-              <a:t>5</a:t>
+              <a:t>4</a:t>
             </a:fld>
             <a:endParaRPr lang="de-DE"/>
           </a:p>
@@ -1096,7 +1606,7 @@
     </p:spTree>
     <p:extLst>
       <p:ext uri="{BB962C8B-B14F-4D97-AF65-F5344CB8AC3E}">
-        <p14:creationId xmlns:p14="http://schemas.microsoft.com/office/powerpoint/2010/main" val="3288880427"/>
+        <p14:creationId xmlns:p14="http://schemas.microsoft.com/office/powerpoint/2010/main" val="4069349368"/>
       </p:ext>
     </p:extLst>
   </p:cSld>
@@ -1152,7 +1662,7 @@
           <a:p>
             <a:r>
               <a:rPr lang="de-DE" dirty="0"/>
-              <a:t>Das Ergebnis der Domänenrecherche war, dass wir nicht an digitale historische Karten für unsere erste Projekt Idee kommen.  Die Karten Anzahl insbesondere für die Stadt Gummersbach haben wir als zu wenig befunden, um einen Einblick über die Jahrhunderte liefern zu können.</a:t>
+              <a:t>Bei der ersten Version unsere Projekt Idee konnten wir uns einige unsere Fragen nicht beantworten und einige Punkte waren noch unklar.</a:t>
             </a:r>
           </a:p>
         </p:txBody>
@@ -1174,7 +1684,7 @@
           <a:p>
             <a:fld id="{92DF0825-AC8F-4116-B49B-4A4F75013D61}" type="slidenum">
               <a:rPr lang="de-DE" smtClean="0"/>
-              <a:t>7</a:t>
+              <a:t>5</a:t>
             </a:fld>
             <a:endParaRPr lang="de-DE"/>
           </a:p>
@@ -1183,7 +1693,7 @@
     </p:spTree>
     <p:extLst>
       <p:ext uri="{BB962C8B-B14F-4D97-AF65-F5344CB8AC3E}">
-        <p14:creationId xmlns:p14="http://schemas.microsoft.com/office/powerpoint/2010/main" val="2171663258"/>
+        <p14:creationId xmlns:p14="http://schemas.microsoft.com/office/powerpoint/2010/main" val="3288880427"/>
       </p:ext>
     </p:extLst>
   </p:cSld>
@@ -1237,18 +1747,30 @@
           <a:bodyPr/>
           <a:lstStyle/>
           <a:p>
+            <a:pPr marL="0" marR="0" lvl="0" indent="0" algn="l" defTabSz="914400" rtl="0" eaLnBrk="1" fontAlgn="auto" latinLnBrk="0" hangingPunct="1">
+              <a:lnSpc>
+                <a:spcPct val="100000"/>
+              </a:lnSpc>
+              <a:spcBef>
+                <a:spcPts val="0"/>
+              </a:spcBef>
+              <a:spcAft>
+                <a:spcPts val="0"/>
+              </a:spcAft>
+              <a:buClrTx/>
+              <a:buSzTx/>
+              <a:buFontTx/>
+              <a:buNone/>
+              <a:tabLst/>
+              <a:defRPr/>
+            </a:pPr>
             <a:r>
               <a:rPr lang="de-DE" dirty="0"/>
-              <a:t>Durch die Domänenrecherche und dem Besprechen im </a:t>
-            </a:r>
-            <a:r>
-              <a:rPr lang="de-DE" dirty="0" err="1"/>
-              <a:t>Openspace</a:t>
-            </a:r>
-            <a:r>
-              <a:rPr lang="de-DE" dirty="0"/>
-              <a:t> haben wir die Problemstellung auf das nicht vorhanden sein von historischen Karten bezogen und eine Anpassung in Hinsicht auf Erhebung von bildlichen und ergänzend textlichen Quellen durchgeführt.</a:t>
-            </a:r>
+              <a:t>Das Ergebnis der Domänenrecherche war, dass wir nicht an digitale historische Karten für unsere erste Projekt Idee kommen.  Die Karten Anzahl insbesondere für die Stadt Gummersbach haben wir als zu wenig befunden, um einen Einblick über die Jahrhunderte liefern zu können.</a:t>
+            </a:r>
+          </a:p>
+          <a:p>
+            <a:endParaRPr lang="de-DE" dirty="0"/>
           </a:p>
         </p:txBody>
       </p:sp>
@@ -1269,7 +1791,7 @@
           <a:p>
             <a:fld id="{92DF0825-AC8F-4116-B49B-4A4F75013D61}" type="slidenum">
               <a:rPr lang="de-DE" smtClean="0"/>
-              <a:t>8</a:t>
+              <a:t>6</a:t>
             </a:fld>
             <a:endParaRPr lang="de-DE"/>
           </a:p>
@@ -1278,7 +1800,7 @@
     </p:spTree>
     <p:extLst>
       <p:ext uri="{BB962C8B-B14F-4D97-AF65-F5344CB8AC3E}">
-        <p14:creationId xmlns:p14="http://schemas.microsoft.com/office/powerpoint/2010/main" val="2987340625"/>
+        <p14:creationId xmlns:p14="http://schemas.microsoft.com/office/powerpoint/2010/main" val="3254294953"/>
       </p:ext>
     </p:extLst>
   </p:cSld>
@@ -1332,10 +1854,9 @@
           <a:bodyPr/>
           <a:lstStyle/>
           <a:p>
-            <a:pPr algn="l"/>
             <a:r>
               <a:rPr lang="de-DE" dirty="0"/>
-              <a:t>Entstand im Anschluss der Domänenrecherche durch Philipp. Zeigt die ersten Identifizierten Akteure der Domäne und den versuche deren Verbindungen dazustellen. </a:t>
+              <a:t>Das Ergebnis der Domänenrecherche war, dass wir nicht an digitale historische Karten für unsere erste Projekt Idee kommen.  Die Karten Anzahl insbesondere für die Stadt Gummersbach haben wir als zu wenig befunden, um einen Einblick über die Jahrhunderte liefern zu können.</a:t>
             </a:r>
           </a:p>
         </p:txBody>
@@ -1357,7 +1878,7 @@
           <a:p>
             <a:fld id="{92DF0825-AC8F-4116-B49B-4A4F75013D61}" type="slidenum">
               <a:rPr lang="de-DE" smtClean="0"/>
-              <a:t>9</a:t>
+              <a:t>7</a:t>
             </a:fld>
             <a:endParaRPr lang="de-DE"/>
           </a:p>
@@ -1366,7 +1887,7 @@
     </p:spTree>
     <p:extLst>
       <p:ext uri="{BB962C8B-B14F-4D97-AF65-F5344CB8AC3E}">
-        <p14:creationId xmlns:p14="http://schemas.microsoft.com/office/powerpoint/2010/main" val="759147561"/>
+        <p14:creationId xmlns:p14="http://schemas.microsoft.com/office/powerpoint/2010/main" val="2171663258"/>
       </p:ext>
     </p:extLst>
   </p:cSld>
@@ -1422,7 +1943,15 @@
           <a:p>
             <a:r>
               <a:rPr lang="de-DE" dirty="0"/>
-              <a:t>Iteration zum Ordnen und Anpassen der Verbindungen durch Sebastian. Die vorige Modell Iteration war unübersichtlicher und wurde in diesem Schritt dementsprechend verbessert.</a:t>
+              <a:t>Durch die Domänenrecherche und dem Besprechen im </a:t>
+            </a:r>
+            <a:r>
+              <a:rPr lang="de-DE" dirty="0" err="1"/>
+              <a:t>Openspace</a:t>
+            </a:r>
+            <a:r>
+              <a:rPr lang="de-DE" dirty="0"/>
+              <a:t> haben wir die Problemstellung auf das nicht vorhanden sein von historischen Karten bezogen und eine Anpassung in Hinsicht auf Erhebung von bildlichen und ergänzend textlichen Quellen durchgeführt.</a:t>
             </a:r>
           </a:p>
         </p:txBody>
@@ -1444,7 +1973,7 @@
           <a:p>
             <a:fld id="{92DF0825-AC8F-4116-B49B-4A4F75013D61}" type="slidenum">
               <a:rPr lang="de-DE" smtClean="0"/>
-              <a:t>10</a:t>
+              <a:t>8</a:t>
             </a:fld>
             <a:endParaRPr lang="de-DE"/>
           </a:p>
@@ -1453,7 +1982,7 @@
     </p:spTree>
     <p:extLst>
       <p:ext uri="{BB962C8B-B14F-4D97-AF65-F5344CB8AC3E}">
-        <p14:creationId xmlns:p14="http://schemas.microsoft.com/office/powerpoint/2010/main" val="2336962558"/>
+        <p14:creationId xmlns:p14="http://schemas.microsoft.com/office/powerpoint/2010/main" val="2987340625"/>
       </p:ext>
     </p:extLst>
   </p:cSld>
@@ -1507,9 +2036,10 @@
           <a:bodyPr/>
           <a:lstStyle/>
           <a:p>
+            <a:pPr algn="l"/>
             <a:r>
               <a:rPr lang="de-DE" dirty="0"/>
-              <a:t>Einfügen von Hilfsentitäten und deren Verbindungen durch Sebastian. Nach dem in der vorherigen Modell Iteration die Übersichtlichkeit geschaffen wurde, wurde eine Verbesserung der Akteure durch Hilfsentitäten durchgeführt.</a:t>
+              <a:t>Entstand im Anschluss der Domänenrecherche durch Philipp. Zeigt die ersten Identifizierten Akteure der Domäne und den versuche deren Verbindungen dazustellen. </a:t>
             </a:r>
           </a:p>
         </p:txBody>
@@ -1531,7 +2061,7 @@
           <a:p>
             <a:fld id="{92DF0825-AC8F-4116-B49B-4A4F75013D61}" type="slidenum">
               <a:rPr lang="de-DE" smtClean="0"/>
-              <a:t>11</a:t>
+              <a:t>9</a:t>
             </a:fld>
             <a:endParaRPr lang="de-DE"/>
           </a:p>
@@ -1540,7 +2070,7 @@
     </p:spTree>
     <p:extLst>
       <p:ext uri="{BB962C8B-B14F-4D97-AF65-F5344CB8AC3E}">
-        <p14:creationId xmlns:p14="http://schemas.microsoft.com/office/powerpoint/2010/main" val="3201380577"/>
+        <p14:creationId xmlns:p14="http://schemas.microsoft.com/office/powerpoint/2010/main" val="759147561"/>
       </p:ext>
     </p:extLst>
   </p:cSld>
@@ -1596,7 +2126,7 @@
           <a:p>
             <a:r>
               <a:rPr lang="de-DE" dirty="0"/>
-              <a:t>Vereinfachung des Modells und Sortierung zu logischen clustern. In dieser Iteration des Modells wurde die Unübersichtlichkeit der vorherigen Iteration durch Vereinfachung und Clusterung bearbeitet. Bei den Verbindungen die Beziehungen Konkretisiert um kann Beziehungen adäquat darzustellen.</a:t>
+              <a:t>Iteration zum Ordnen und Anpassen der Verbindungen durch Sebastian. Die vorige Modell Iteration war unübersichtlicher und wurde in diesem Schritt dementsprechend verbessert.</a:t>
             </a:r>
           </a:p>
         </p:txBody>
@@ -1618,7 +2148,7 @@
           <a:p>
             <a:fld id="{92DF0825-AC8F-4116-B49B-4A4F75013D61}" type="slidenum">
               <a:rPr lang="de-DE" smtClean="0"/>
-              <a:t>12</a:t>
+              <a:t>10</a:t>
             </a:fld>
             <a:endParaRPr lang="de-DE"/>
           </a:p>
@@ -1627,7 +2157,7 @@
     </p:spTree>
     <p:extLst>
       <p:ext uri="{BB962C8B-B14F-4D97-AF65-F5344CB8AC3E}">
-        <p14:creationId xmlns:p14="http://schemas.microsoft.com/office/powerpoint/2010/main" val="3630828092"/>
+        <p14:creationId xmlns:p14="http://schemas.microsoft.com/office/powerpoint/2010/main" val="2336962558"/>
       </p:ext>
     </p:extLst>
   </p:cSld>
@@ -1683,7 +2213,7 @@
           <a:p>
             <a:r>
               <a:rPr lang="de-DE" dirty="0"/>
-              <a:t>Erweiterung des Modells um weitere Akteure und Hilfsentitäten durch Frederik. Durch Besprechungen der vorigen Iteration sind ein paar weitere Akteure sowie Hilfsidentitäten Identifiziert worden. Die Cluster wurden für direkte farbige Markierung der Post-its aufgegeben, da die neue Anordnung und die neuen Verbindungen clustering schwierig machten.</a:t>
+              <a:t>Einfügen von Hilfsentitäten und deren Verbindungen durch Sebastian. Nach dem in der vorherigen Modell Iteration die Übersichtlichkeit geschaffen wurde, wurde eine Verbesserung der Akteure durch Hilfsentitäten durchgeführt.</a:t>
             </a:r>
           </a:p>
         </p:txBody>
@@ -1705,7 +2235,7 @@
           <a:p>
             <a:fld id="{92DF0825-AC8F-4116-B49B-4A4F75013D61}" type="slidenum">
               <a:rPr lang="de-DE" smtClean="0"/>
-              <a:t>13</a:t>
+              <a:t>11</a:t>
             </a:fld>
             <a:endParaRPr lang="de-DE"/>
           </a:p>
@@ -1714,7 +2244,7 @@
     </p:spTree>
     <p:extLst>
       <p:ext uri="{BB962C8B-B14F-4D97-AF65-F5344CB8AC3E}">
-        <p14:creationId xmlns:p14="http://schemas.microsoft.com/office/powerpoint/2010/main" val="3552961356"/>
+        <p14:creationId xmlns:p14="http://schemas.microsoft.com/office/powerpoint/2010/main" val="3201380577"/>
       </p:ext>
     </p:extLst>
   </p:cSld>
@@ -1925,7 +2455,7 @@
           <a:p>
             <a:fld id="{4F3947B8-8C5A-4761-A8FC-91A470F27CDE}" type="slidenum">
               <a:rPr lang="de-DE" smtClean="0"/>
-              <a:t>‹#›</a:t>
+              <a:t>‹Nr.›</a:t>
             </a:fld>
             <a:endParaRPr lang="de-DE"/>
           </a:p>
@@ -2123,7 +2653,7 @@
           <a:p>
             <a:fld id="{4F3947B8-8C5A-4761-A8FC-91A470F27CDE}" type="slidenum">
               <a:rPr lang="de-DE" smtClean="0"/>
-              <a:t>‹#›</a:t>
+              <a:t>‹Nr.›</a:t>
             </a:fld>
             <a:endParaRPr lang="de-DE"/>
           </a:p>
@@ -2331,7 +2861,7 @@
           <a:p>
             <a:fld id="{4F3947B8-8C5A-4761-A8FC-91A470F27CDE}" type="slidenum">
               <a:rPr lang="de-DE" smtClean="0"/>
-              <a:t>‹#›</a:t>
+              <a:t>‹Nr.›</a:t>
             </a:fld>
             <a:endParaRPr lang="de-DE"/>
           </a:p>
@@ -2529,7 +3059,7 @@
           <a:p>
             <a:fld id="{4F3947B8-8C5A-4761-A8FC-91A470F27CDE}" type="slidenum">
               <a:rPr lang="de-DE" smtClean="0"/>
-              <a:t>‹#›</a:t>
+              <a:t>‹Nr.›</a:t>
             </a:fld>
             <a:endParaRPr lang="de-DE"/>
           </a:p>
@@ -2804,7 +3334,7 @@
           <a:p>
             <a:fld id="{4F3947B8-8C5A-4761-A8FC-91A470F27CDE}" type="slidenum">
               <a:rPr lang="de-DE" smtClean="0"/>
-              <a:t>‹#›</a:t>
+              <a:t>‹Nr.›</a:t>
             </a:fld>
             <a:endParaRPr lang="de-DE"/>
           </a:p>
@@ -3069,7 +3599,7 @@
           <a:p>
             <a:fld id="{4F3947B8-8C5A-4761-A8FC-91A470F27CDE}" type="slidenum">
               <a:rPr lang="de-DE" smtClean="0"/>
-              <a:t>‹#›</a:t>
+              <a:t>‹Nr.›</a:t>
             </a:fld>
             <a:endParaRPr lang="de-DE"/>
           </a:p>
@@ -3481,7 +4011,7 @@
           <a:p>
             <a:fld id="{4F3947B8-8C5A-4761-A8FC-91A470F27CDE}" type="slidenum">
               <a:rPr lang="de-DE" smtClean="0"/>
-              <a:t>‹#›</a:t>
+              <a:t>‹Nr.›</a:t>
             </a:fld>
             <a:endParaRPr lang="de-DE"/>
           </a:p>
@@ -3622,7 +4152,7 @@
           <a:p>
             <a:fld id="{4F3947B8-8C5A-4761-A8FC-91A470F27CDE}" type="slidenum">
               <a:rPr lang="de-DE" smtClean="0"/>
-              <a:t>‹#›</a:t>
+              <a:t>‹Nr.›</a:t>
             </a:fld>
             <a:endParaRPr lang="de-DE"/>
           </a:p>
@@ -3735,7 +4265,7 @@
           <a:p>
             <a:fld id="{4F3947B8-8C5A-4761-A8FC-91A470F27CDE}" type="slidenum">
               <a:rPr lang="de-DE" smtClean="0"/>
-              <a:t>‹#›</a:t>
+              <a:t>‹Nr.›</a:t>
             </a:fld>
             <a:endParaRPr lang="de-DE"/>
           </a:p>
@@ -4046,7 +4576,7 @@
           <a:p>
             <a:fld id="{4F3947B8-8C5A-4761-A8FC-91A470F27CDE}" type="slidenum">
               <a:rPr lang="de-DE" smtClean="0"/>
-              <a:t>‹#›</a:t>
+              <a:t>‹Nr.›</a:t>
             </a:fld>
             <a:endParaRPr lang="de-DE"/>
           </a:p>
@@ -4334,7 +4864,7 @@
           <a:p>
             <a:fld id="{4F3947B8-8C5A-4761-A8FC-91A470F27CDE}" type="slidenum">
               <a:rPr lang="de-DE" smtClean="0"/>
-              <a:t>‹#›</a:t>
+              <a:t>‹Nr.›</a:t>
             </a:fld>
             <a:endParaRPr lang="de-DE"/>
           </a:p>
@@ -4611,7 +5141,7 @@
           <a:p>
             <a:fld id="{4F3947B8-8C5A-4761-A8FC-91A470F27CDE}" type="slidenum">
               <a:rPr lang="de-DE" smtClean="0"/>
-              <a:t>‹#›</a:t>
+              <a:t>‹Nr.›</a:t>
             </a:fld>
             <a:endParaRPr lang="de-DE"/>
           </a:p>
@@ -5516,7 +6046,7 @@
           <p:cNvPr id="2" name="Titel 1">
             <a:extLst>
               <a:ext uri="{FF2B5EF4-FFF2-40B4-BE49-F238E27FC236}">
-                <a16:creationId xmlns:a16="http://schemas.microsoft.com/office/drawing/2014/main" id="{5E0CD186-D670-2321-97A4-ED56A0F76E07}"/>
+                <a16:creationId xmlns:a16="http://schemas.microsoft.com/office/drawing/2014/main" id="{049B44E4-C9D2-3E6A-DCF0-43C6110C408A}"/>
               </a:ext>
             </a:extLst>
           </p:cNvPr>
@@ -5534,223 +6064,46 @@
           <a:p>
             <a:pPr algn="ctr"/>
             <a:r>
-              <a:rPr lang="de-DE" dirty="0"/>
-              <a:t>Zielhierarchie</a:t>
-            </a:r>
-          </a:p>
-        </p:txBody>
-      </p:sp>
-      <p:sp>
-        <p:nvSpPr>
-          <p:cNvPr id="3" name="Inhaltsplatzhalter 2">
-            <a:extLst>
-              <a:ext uri="{FF2B5EF4-FFF2-40B4-BE49-F238E27FC236}">
-                <a16:creationId xmlns:a16="http://schemas.microsoft.com/office/drawing/2014/main" id="{33FD777B-5F33-ADBB-2B6E-5E950C408908}"/>
-              </a:ext>
-            </a:extLst>
-          </p:cNvPr>
-          <p:cNvSpPr>
-            <a:spLocks noGrp="1"/>
-          </p:cNvSpPr>
+              <a:rPr lang="de-DE" dirty="0" err="1"/>
+              <a:t>Stakeholderanalyse</a:t>
+            </a:r>
+            <a:endParaRPr lang="de-DE" dirty="0"/>
+          </a:p>
+        </p:txBody>
+      </p:sp>
+      <p:pic>
+        <p:nvPicPr>
+          <p:cNvPr id="5" name="Inhaltsplatzhalter 4">
+            <a:extLst>
+              <a:ext uri="{FF2B5EF4-FFF2-40B4-BE49-F238E27FC236}">
+                <a16:creationId xmlns:a16="http://schemas.microsoft.com/office/drawing/2014/main" id="{06003440-E59E-907B-1B50-ECC6117AB86D}"/>
+              </a:ext>
+            </a:extLst>
+          </p:cNvPr>
+          <p:cNvPicPr>
+            <a:picLocks noGrp="1" noChangeAspect="1"/>
+          </p:cNvPicPr>
           <p:nvPr>
             <p:ph idx="1"/>
           </p:nvPr>
-        </p:nvSpPr>
+        </p:nvPicPr>
+        <p:blipFill>
+          <a:blip r:embed="rId2"/>
+          <a:stretch>
+            <a:fillRect/>
+          </a:stretch>
+        </p:blipFill>
         <p:spPr>
           <a:xfrm>
-            <a:off x="511946" y="1198485"/>
-            <a:ext cx="11168108" cy="4916334"/>
+            <a:off x="2998070" y="1825625"/>
+            <a:ext cx="6195859" cy="4351338"/>
           </a:xfrm>
         </p:spPr>
-        <p:txBody>
-          <a:bodyPr>
-            <a:noAutofit/>
-          </a:bodyPr>
-          <a:lstStyle/>
-          <a:p>
-            <a:r>
-              <a:rPr lang="de-DE" sz="1200" b="1" dirty="0"/>
-              <a:t>Strategische Ziele</a:t>
-            </a:r>
-          </a:p>
-          <a:p>
-            <a:pPr>
-              <a:buFont typeface="Arial" panose="020B0604020202020204" pitchFamily="34" charset="0"/>
-              <a:buChar char="•"/>
-            </a:pPr>
-            <a:r>
-              <a:rPr lang="de-DE" sz="1200" dirty="0"/>
-              <a:t>Es muss eine Community geschaffen werden.</a:t>
-            </a:r>
-          </a:p>
-          <a:p>
-            <a:pPr>
-              <a:buFont typeface="Arial" panose="020B0604020202020204" pitchFamily="34" charset="0"/>
-              <a:buChar char="•"/>
-            </a:pPr>
-            <a:r>
-              <a:rPr lang="de-DE" sz="1200" dirty="0"/>
-              <a:t>Es soll historisches Material digital gesammelt werden.</a:t>
-            </a:r>
-          </a:p>
-          <a:p>
-            <a:pPr>
-              <a:buFont typeface="Arial" panose="020B0604020202020204" pitchFamily="34" charset="0"/>
-              <a:buChar char="•"/>
-            </a:pPr>
-            <a:r>
-              <a:rPr lang="de-DE" sz="1200" dirty="0"/>
-              <a:t>Es soll möglich sein sich ein Bild von einer Ortschaft (Gummersbach) zu bestimmten Zeitperioden zu machen.</a:t>
-            </a:r>
-          </a:p>
-          <a:p>
-            <a:r>
-              <a:rPr lang="de-DE" sz="1200" b="1" dirty="0"/>
-              <a:t>Taktische Ziele</a:t>
-            </a:r>
-          </a:p>
-          <a:p>
-            <a:pPr>
-              <a:buFont typeface="Arial" panose="020B0604020202020204" pitchFamily="34" charset="0"/>
-              <a:buChar char="•"/>
-            </a:pPr>
-            <a:r>
-              <a:rPr lang="de-DE" sz="1200" dirty="0"/>
-              <a:t>Es müssen Bilder hochgeladen werden können.</a:t>
-            </a:r>
-          </a:p>
-          <a:p>
-            <a:pPr>
-              <a:buFont typeface="Arial" panose="020B0604020202020204" pitchFamily="34" charset="0"/>
-              <a:buChar char="•"/>
-            </a:pPr>
-            <a:r>
-              <a:rPr lang="de-DE" sz="1200" dirty="0"/>
-              <a:t>Es soll die Möglichkeit geben die Bilder ort- und zeitbezogen einzuordnen.</a:t>
-            </a:r>
-          </a:p>
-          <a:p>
-            <a:pPr>
-              <a:buFont typeface="Arial" panose="020B0604020202020204" pitchFamily="34" charset="0"/>
-              <a:buChar char="•"/>
-            </a:pPr>
-            <a:r>
-              <a:rPr lang="de-DE" sz="1200" dirty="0"/>
-              <a:t>Es müssen Kommentare und Geschichten zu den Bildern und Orten hinterlassen werden können.</a:t>
-            </a:r>
-          </a:p>
-          <a:p>
-            <a:pPr>
-              <a:buFont typeface="Arial" panose="020B0604020202020204" pitchFamily="34" charset="0"/>
-              <a:buChar char="•"/>
-            </a:pPr>
-            <a:r>
-              <a:rPr lang="de-DE" sz="1200" dirty="0"/>
-              <a:t>Es könnte daraus eine Karte enstehen.</a:t>
-            </a:r>
-          </a:p>
-          <a:p>
-            <a:pPr>
-              <a:buFont typeface="Arial" panose="020B0604020202020204" pitchFamily="34" charset="0"/>
-              <a:buChar char="•"/>
-            </a:pPr>
-            <a:r>
-              <a:rPr lang="de-DE" sz="1200" dirty="0"/>
-              <a:t>Die User müssen identifizierbar sein.</a:t>
-            </a:r>
-          </a:p>
-          <a:p>
-            <a:pPr>
-              <a:buFont typeface="Arial" panose="020B0604020202020204" pitchFamily="34" charset="0"/>
-              <a:buChar char="•"/>
-            </a:pPr>
-            <a:r>
-              <a:rPr lang="de-DE" sz="1200" dirty="0"/>
-              <a:t>Das System soll gamifiziert werden.</a:t>
-            </a:r>
-          </a:p>
-          <a:p>
-            <a:pPr>
-              <a:buFont typeface="Arial" panose="020B0604020202020204" pitchFamily="34" charset="0"/>
-              <a:buChar char="•"/>
-            </a:pPr>
-            <a:r>
-              <a:rPr lang="de-DE" sz="1200" dirty="0"/>
-              <a:t>Neue Bewohner und Ortsfremde sollen auch an dem System und der Community teilhaben können.</a:t>
-            </a:r>
-          </a:p>
-          <a:p>
-            <a:r>
-              <a:rPr lang="de-DE" sz="1200" b="1" dirty="0"/>
-              <a:t>Operative Ziele</a:t>
-            </a:r>
-          </a:p>
-          <a:p>
-            <a:pPr>
-              <a:buFont typeface="Arial" panose="020B0604020202020204" pitchFamily="34" charset="0"/>
-              <a:buChar char="•"/>
-            </a:pPr>
-            <a:r>
-              <a:rPr lang="de-DE" sz="1200" dirty="0"/>
-              <a:t>Es muss eine Datenstruktur entwickelt werden.</a:t>
-            </a:r>
-          </a:p>
-          <a:p>
-            <a:pPr>
-              <a:buFont typeface="Arial" panose="020B0604020202020204" pitchFamily="34" charset="0"/>
-              <a:buChar char="•"/>
-            </a:pPr>
-            <a:r>
-              <a:rPr lang="de-DE" sz="1200" dirty="0"/>
-              <a:t>Es sollte ein bestimmter Zeitrahmen, der betrachtet werden soll, bestimmt werden.</a:t>
-            </a:r>
-          </a:p>
-          <a:p>
-            <a:pPr>
-              <a:buFont typeface="Arial" panose="020B0604020202020204" pitchFamily="34" charset="0"/>
-              <a:buChar char="•"/>
-            </a:pPr>
-            <a:r>
-              <a:rPr lang="de-DE" sz="1200" dirty="0"/>
-              <a:t>Die Zielgruppe und Stakeholder müssen genau untersucht und verstanden werden.</a:t>
-            </a:r>
-          </a:p>
-          <a:p>
-            <a:pPr>
-              <a:buFont typeface="Arial" panose="020B0604020202020204" pitchFamily="34" charset="0"/>
-              <a:buChar char="•"/>
-            </a:pPr>
-            <a:r>
-              <a:rPr lang="de-DE" sz="1200" dirty="0"/>
-              <a:t>Es soll eine passende Gamification Idee gefunden und implementiert werden.</a:t>
-            </a:r>
-          </a:p>
-          <a:p>
-            <a:pPr>
-              <a:buFont typeface="Arial" panose="020B0604020202020204" pitchFamily="34" charset="0"/>
-              <a:buChar char="•"/>
-            </a:pPr>
-            <a:r>
-              <a:rPr lang="de-DE" sz="1200" dirty="0"/>
-              <a:t>Es muss ein benutzungsfreundliches UI entwickelt werden.</a:t>
-            </a:r>
-          </a:p>
-          <a:p>
-            <a:pPr>
-              <a:buFont typeface="Arial" panose="020B0604020202020204" pitchFamily="34" charset="0"/>
-              <a:buChar char="•"/>
-            </a:pPr>
-            <a:r>
-              <a:rPr lang="de-DE" sz="1200" dirty="0"/>
-              <a:t>Es kann eine Grundkarte gewählt werden oder es kann den Usern die Möglichkeit gegeben werden die Karte kollaborativ selber zu zeichnen</a:t>
-            </a:r>
-          </a:p>
-        </p:txBody>
-      </p:sp>
+      </p:pic>
     </p:spTree>
     <p:extLst>
       <p:ext uri="{BB962C8B-B14F-4D97-AF65-F5344CB8AC3E}">
-        <p14:creationId xmlns:p14="http://schemas.microsoft.com/office/powerpoint/2010/main" val="2608407678"/>
+        <p14:creationId xmlns:p14="http://schemas.microsoft.com/office/powerpoint/2010/main" val="3372399478"/>
       </p:ext>
     </p:extLst>
   </p:cSld>
@@ -5801,6 +6154,360 @@
             <a:pPr algn="ctr"/>
             <a:r>
               <a:rPr lang="de-DE" dirty="0"/>
+              <a:t>Zielhierarchie</a:t>
+            </a:r>
+          </a:p>
+        </p:txBody>
+      </p:sp>
+      <p:sp>
+        <p:nvSpPr>
+          <p:cNvPr id="3" name="Inhaltsplatzhalter 2">
+            <a:extLst>
+              <a:ext uri="{FF2B5EF4-FFF2-40B4-BE49-F238E27FC236}">
+                <a16:creationId xmlns:a16="http://schemas.microsoft.com/office/drawing/2014/main" id="{33FD777B-5F33-ADBB-2B6E-5E950C408908}"/>
+              </a:ext>
+            </a:extLst>
+          </p:cNvPr>
+          <p:cNvSpPr>
+            <a:spLocks noGrp="1"/>
+          </p:cNvSpPr>
+          <p:nvPr>
+            <p:ph idx="1"/>
+          </p:nvPr>
+        </p:nvSpPr>
+        <p:spPr>
+          <a:xfrm>
+            <a:off x="511946" y="1198485"/>
+            <a:ext cx="11168108" cy="4916334"/>
+          </a:xfrm>
+        </p:spPr>
+        <p:txBody>
+          <a:bodyPr>
+            <a:noAutofit/>
+          </a:bodyPr>
+          <a:lstStyle/>
+          <a:p>
+            <a:r>
+              <a:rPr lang="de-DE" sz="1200" b="1" dirty="0"/>
+              <a:t>Strategische Ziele</a:t>
+            </a:r>
+          </a:p>
+          <a:p>
+            <a:pPr>
+              <a:buFont typeface="Arial" panose="020B0604020202020204" pitchFamily="34" charset="0"/>
+              <a:buChar char="•"/>
+            </a:pPr>
+            <a:r>
+              <a:rPr lang="de-DE" sz="1200" dirty="0"/>
+              <a:t>Es muss eine Community geschaffen werden.</a:t>
+            </a:r>
+          </a:p>
+          <a:p>
+            <a:pPr>
+              <a:buFont typeface="Arial" panose="020B0604020202020204" pitchFamily="34" charset="0"/>
+              <a:buChar char="•"/>
+            </a:pPr>
+            <a:r>
+              <a:rPr lang="de-DE" sz="1200" dirty="0"/>
+              <a:t>Es soll historisches Material digital gesammelt werden.</a:t>
+            </a:r>
+          </a:p>
+          <a:p>
+            <a:pPr>
+              <a:buFont typeface="Arial" panose="020B0604020202020204" pitchFamily="34" charset="0"/>
+              <a:buChar char="•"/>
+            </a:pPr>
+            <a:r>
+              <a:rPr lang="de-DE" sz="1200" dirty="0"/>
+              <a:t>Es soll möglich sein sich ein Bild von einer Ortschaft (Gummersbach) zu bestimmten Zeitperioden zu machen.</a:t>
+            </a:r>
+          </a:p>
+          <a:p>
+            <a:r>
+              <a:rPr lang="de-DE" sz="1200" b="1" dirty="0"/>
+              <a:t>Taktische Ziele</a:t>
+            </a:r>
+          </a:p>
+          <a:p>
+            <a:pPr>
+              <a:buFont typeface="Arial" panose="020B0604020202020204" pitchFamily="34" charset="0"/>
+              <a:buChar char="•"/>
+            </a:pPr>
+            <a:r>
+              <a:rPr lang="de-DE" sz="1200" dirty="0"/>
+              <a:t>Es müssen Bilder hochgeladen werden können.</a:t>
+            </a:r>
+          </a:p>
+          <a:p>
+            <a:pPr>
+              <a:buFont typeface="Arial" panose="020B0604020202020204" pitchFamily="34" charset="0"/>
+              <a:buChar char="•"/>
+            </a:pPr>
+            <a:r>
+              <a:rPr lang="de-DE" sz="1200" dirty="0"/>
+              <a:t>Es soll die Möglichkeit geben die Bilder ort- und zeitbezogen einzuordnen.</a:t>
+            </a:r>
+          </a:p>
+          <a:p>
+            <a:pPr>
+              <a:buFont typeface="Arial" panose="020B0604020202020204" pitchFamily="34" charset="0"/>
+              <a:buChar char="•"/>
+            </a:pPr>
+            <a:r>
+              <a:rPr lang="de-DE" sz="1200" dirty="0"/>
+              <a:t>Es müssen Kommentare und Geschichten zu den Bildern und Orten hinterlassen werden können.</a:t>
+            </a:r>
+          </a:p>
+          <a:p>
+            <a:pPr>
+              <a:buFont typeface="Arial" panose="020B0604020202020204" pitchFamily="34" charset="0"/>
+              <a:buChar char="•"/>
+            </a:pPr>
+            <a:r>
+              <a:rPr lang="de-DE" sz="1200" dirty="0"/>
+              <a:t>Es könnte daraus eine Karte enstehen.</a:t>
+            </a:r>
+          </a:p>
+          <a:p>
+            <a:pPr>
+              <a:buFont typeface="Arial" panose="020B0604020202020204" pitchFamily="34" charset="0"/>
+              <a:buChar char="•"/>
+            </a:pPr>
+            <a:r>
+              <a:rPr lang="de-DE" sz="1200" dirty="0"/>
+              <a:t>Die User müssen identifizierbar sein.</a:t>
+            </a:r>
+          </a:p>
+          <a:p>
+            <a:pPr>
+              <a:buFont typeface="Arial" panose="020B0604020202020204" pitchFamily="34" charset="0"/>
+              <a:buChar char="•"/>
+            </a:pPr>
+            <a:r>
+              <a:rPr lang="de-DE" sz="1200" dirty="0"/>
+              <a:t>Das System soll gamifiziert werden.</a:t>
+            </a:r>
+          </a:p>
+          <a:p>
+            <a:pPr>
+              <a:buFont typeface="Arial" panose="020B0604020202020204" pitchFamily="34" charset="0"/>
+              <a:buChar char="•"/>
+            </a:pPr>
+            <a:r>
+              <a:rPr lang="de-DE" sz="1200" dirty="0"/>
+              <a:t>Neue Bewohner und Ortsfremde sollen auch an dem System und der Community teilhaben können.</a:t>
+            </a:r>
+          </a:p>
+          <a:p>
+            <a:r>
+              <a:rPr lang="de-DE" sz="1200" b="1" dirty="0"/>
+              <a:t>Operative Ziele</a:t>
+            </a:r>
+          </a:p>
+          <a:p>
+            <a:pPr>
+              <a:buFont typeface="Arial" panose="020B0604020202020204" pitchFamily="34" charset="0"/>
+              <a:buChar char="•"/>
+            </a:pPr>
+            <a:r>
+              <a:rPr lang="de-DE" sz="1200" dirty="0"/>
+              <a:t>Es muss eine Datenstruktur entwickelt werden.</a:t>
+            </a:r>
+          </a:p>
+          <a:p>
+            <a:pPr>
+              <a:buFont typeface="Arial" panose="020B0604020202020204" pitchFamily="34" charset="0"/>
+              <a:buChar char="•"/>
+            </a:pPr>
+            <a:r>
+              <a:rPr lang="de-DE" sz="1200" dirty="0"/>
+              <a:t>Es sollte ein bestimmter Zeitrahmen, der betrachtet werden soll, bestimmt werden.</a:t>
+            </a:r>
+          </a:p>
+          <a:p>
+            <a:pPr>
+              <a:buFont typeface="Arial" panose="020B0604020202020204" pitchFamily="34" charset="0"/>
+              <a:buChar char="•"/>
+            </a:pPr>
+            <a:r>
+              <a:rPr lang="de-DE" sz="1200" dirty="0"/>
+              <a:t>Die Zielgruppe und Stakeholder müssen genau untersucht und verstanden werden.</a:t>
+            </a:r>
+          </a:p>
+          <a:p>
+            <a:pPr>
+              <a:buFont typeface="Arial" panose="020B0604020202020204" pitchFamily="34" charset="0"/>
+              <a:buChar char="•"/>
+            </a:pPr>
+            <a:r>
+              <a:rPr lang="de-DE" sz="1200" dirty="0"/>
+              <a:t>Es soll eine passende Gamification Idee gefunden und implementiert werden.</a:t>
+            </a:r>
+          </a:p>
+          <a:p>
+            <a:pPr>
+              <a:buFont typeface="Arial" panose="020B0604020202020204" pitchFamily="34" charset="0"/>
+              <a:buChar char="•"/>
+            </a:pPr>
+            <a:r>
+              <a:rPr lang="de-DE" sz="1200" dirty="0"/>
+              <a:t>Es muss ein benutzungsfreundliches UI entwickelt werden.</a:t>
+            </a:r>
+          </a:p>
+          <a:p>
+            <a:pPr>
+              <a:buFont typeface="Arial" panose="020B0604020202020204" pitchFamily="34" charset="0"/>
+              <a:buChar char="•"/>
+            </a:pPr>
+            <a:r>
+              <a:rPr lang="de-DE" sz="1200" dirty="0"/>
+              <a:t>Es kann eine Grundkarte gewählt werden oder es kann den Usern die Möglichkeit gegeben werden die Karte kollaborativ selber zu zeichnen</a:t>
+            </a:r>
+          </a:p>
+        </p:txBody>
+      </p:sp>
+    </p:spTree>
+    <p:extLst>
+      <p:ext uri="{BB962C8B-B14F-4D97-AF65-F5344CB8AC3E}">
+        <p14:creationId xmlns:p14="http://schemas.microsoft.com/office/powerpoint/2010/main" val="2608407678"/>
+      </p:ext>
+    </p:extLst>
+  </p:cSld>
+  <p:clrMapOvr>
+    <a:masterClrMapping/>
+  </p:clrMapOvr>
+</p:sld>
+</file>
+
+<file path=ppt/slides/slide17.xml><?xml version="1.0" encoding="utf-8"?>
+<p:sld xmlns:a="http://schemas.openxmlformats.org/drawingml/2006/main" xmlns:r="http://schemas.openxmlformats.org/officeDocument/2006/relationships" xmlns:p="http://schemas.openxmlformats.org/presentationml/2006/main">
+  <p:cSld>
+    <p:spTree>
+      <p:nvGrpSpPr>
+        <p:cNvPr id="1" name=""/>
+        <p:cNvGrpSpPr/>
+        <p:nvPr/>
+      </p:nvGrpSpPr>
+      <p:grpSpPr>
+        <a:xfrm>
+          <a:off x="0" y="0"/>
+          <a:ext cx="0" cy="0"/>
+          <a:chOff x="0" y="0"/>
+          <a:chExt cx="0" cy="0"/>
+        </a:xfrm>
+      </p:grpSpPr>
+      <p:sp>
+        <p:nvSpPr>
+          <p:cNvPr id="2" name="Titel 1">
+            <a:extLst>
+              <a:ext uri="{FF2B5EF4-FFF2-40B4-BE49-F238E27FC236}">
+                <a16:creationId xmlns:a16="http://schemas.microsoft.com/office/drawing/2014/main" id="{D785F142-0A14-416D-64EF-9882153D1F58}"/>
+              </a:ext>
+            </a:extLst>
+          </p:cNvPr>
+          <p:cNvSpPr>
+            <a:spLocks noGrp="1"/>
+          </p:cNvSpPr>
+          <p:nvPr>
+            <p:ph type="title"/>
+          </p:nvPr>
+        </p:nvSpPr>
+        <p:spPr/>
+        <p:txBody>
+          <a:bodyPr/>
+          <a:lstStyle/>
+          <a:p>
+            <a:pPr algn="ctr"/>
+            <a:r>
+              <a:rPr lang="de-DE" dirty="0"/>
+              <a:t>Risikoanalyse</a:t>
+            </a:r>
+          </a:p>
+        </p:txBody>
+      </p:sp>
+      <p:pic>
+        <p:nvPicPr>
+          <p:cNvPr id="5" name="Inhaltsplatzhalter 4">
+            <a:extLst>
+              <a:ext uri="{FF2B5EF4-FFF2-40B4-BE49-F238E27FC236}">
+                <a16:creationId xmlns:a16="http://schemas.microsoft.com/office/drawing/2014/main" id="{C5307F74-B217-7065-964B-B3B31A94D7C3}"/>
+              </a:ext>
+            </a:extLst>
+          </p:cNvPr>
+          <p:cNvPicPr>
+            <a:picLocks noGrp="1" noChangeAspect="1"/>
+          </p:cNvPicPr>
+          <p:nvPr>
+            <p:ph idx="1"/>
+          </p:nvPr>
+        </p:nvPicPr>
+        <p:blipFill>
+          <a:blip r:embed="rId2"/>
+          <a:stretch>
+            <a:fillRect/>
+          </a:stretch>
+        </p:blipFill>
+        <p:spPr>
+          <a:xfrm>
+            <a:off x="838200" y="2614622"/>
+            <a:ext cx="10515600" cy="2773344"/>
+          </a:xfrm>
+        </p:spPr>
+      </p:pic>
+    </p:spTree>
+    <p:extLst>
+      <p:ext uri="{BB962C8B-B14F-4D97-AF65-F5344CB8AC3E}">
+        <p14:creationId xmlns:p14="http://schemas.microsoft.com/office/powerpoint/2010/main" val="1268930230"/>
+      </p:ext>
+    </p:extLst>
+  </p:cSld>
+  <p:clrMapOvr>
+    <a:masterClrMapping/>
+  </p:clrMapOvr>
+</p:sld>
+</file>
+
+<file path=ppt/slides/slide18.xml><?xml version="1.0" encoding="utf-8"?>
+<p:sld xmlns:a="http://schemas.openxmlformats.org/drawingml/2006/main" xmlns:r="http://schemas.openxmlformats.org/officeDocument/2006/relationships" xmlns:p="http://schemas.openxmlformats.org/presentationml/2006/main">
+  <p:cSld>
+    <p:spTree>
+      <p:nvGrpSpPr>
+        <p:cNvPr id="1" name=""/>
+        <p:cNvGrpSpPr/>
+        <p:nvPr/>
+      </p:nvGrpSpPr>
+      <p:grpSpPr>
+        <a:xfrm>
+          <a:off x="0" y="0"/>
+          <a:ext cx="0" cy="0"/>
+          <a:chOff x="0" y="0"/>
+          <a:chExt cx="0" cy="0"/>
+        </a:xfrm>
+      </p:grpSpPr>
+      <p:sp>
+        <p:nvSpPr>
+          <p:cNvPr id="2" name="Titel 1">
+            <a:extLst>
+              <a:ext uri="{FF2B5EF4-FFF2-40B4-BE49-F238E27FC236}">
+                <a16:creationId xmlns:a16="http://schemas.microsoft.com/office/drawing/2014/main" id="{5E0CD186-D670-2321-97A4-ED56A0F76E07}"/>
+              </a:ext>
+            </a:extLst>
+          </p:cNvPr>
+          <p:cNvSpPr>
+            <a:spLocks noGrp="1"/>
+          </p:cNvSpPr>
+          <p:nvPr>
+            <p:ph type="title"/>
+          </p:nvPr>
+        </p:nvSpPr>
+        <p:spPr/>
+        <p:txBody>
+          <a:bodyPr/>
+          <a:lstStyle/>
+          <a:p>
+            <a:pPr algn="ctr"/>
+            <a:r>
+              <a:rPr lang="de-DE" dirty="0"/>
               <a:t>Alleinstellungsmerkmale</a:t>
             </a:r>
           </a:p>
@@ -5873,6 +6580,432 @@
     <p:extLst>
       <p:ext uri="{BB962C8B-B14F-4D97-AF65-F5344CB8AC3E}">
         <p14:creationId xmlns:p14="http://schemas.microsoft.com/office/powerpoint/2010/main" val="3088528906"/>
+      </p:ext>
+    </p:extLst>
+  </p:cSld>
+  <p:clrMapOvr>
+    <a:masterClrMapping/>
+  </p:clrMapOvr>
+</p:sld>
+</file>
+
+<file path=ppt/slides/slide19.xml><?xml version="1.0" encoding="utf-8"?>
+<p:sld xmlns:a="http://schemas.openxmlformats.org/drawingml/2006/main" xmlns:r="http://schemas.openxmlformats.org/officeDocument/2006/relationships" xmlns:p="http://schemas.openxmlformats.org/presentationml/2006/main">
+  <p:cSld>
+    <p:spTree>
+      <p:nvGrpSpPr>
+        <p:cNvPr id="1" name=""/>
+        <p:cNvGrpSpPr/>
+        <p:nvPr/>
+      </p:nvGrpSpPr>
+      <p:grpSpPr>
+        <a:xfrm>
+          <a:off x="0" y="0"/>
+          <a:ext cx="0" cy="0"/>
+          <a:chOff x="0" y="0"/>
+          <a:chExt cx="0" cy="0"/>
+        </a:xfrm>
+      </p:grpSpPr>
+      <p:sp>
+        <p:nvSpPr>
+          <p:cNvPr id="2" name="Titel 1">
+            <a:extLst>
+              <a:ext uri="{FF2B5EF4-FFF2-40B4-BE49-F238E27FC236}">
+                <a16:creationId xmlns:a16="http://schemas.microsoft.com/office/drawing/2014/main" id="{F1C854DB-BDF9-7AF3-8A84-2911B0F7D4A6}"/>
+              </a:ext>
+            </a:extLst>
+          </p:cNvPr>
+          <p:cNvSpPr>
+            <a:spLocks noGrp="1"/>
+          </p:cNvSpPr>
+          <p:nvPr>
+            <p:ph type="title"/>
+          </p:nvPr>
+        </p:nvSpPr>
+        <p:spPr/>
+        <p:txBody>
+          <a:bodyPr/>
+          <a:lstStyle/>
+          <a:p>
+            <a:pPr algn="ctr"/>
+            <a:r>
+              <a:rPr lang="de-DE" dirty="0"/>
+              <a:t>Anforderungsermittlung</a:t>
+            </a:r>
+          </a:p>
+        </p:txBody>
+      </p:sp>
+      <p:sp>
+        <p:nvSpPr>
+          <p:cNvPr id="3" name="Inhaltsplatzhalter 2">
+            <a:extLst>
+              <a:ext uri="{FF2B5EF4-FFF2-40B4-BE49-F238E27FC236}">
+                <a16:creationId xmlns:a16="http://schemas.microsoft.com/office/drawing/2014/main" id="{069C4B34-2C51-2566-2958-DFE40AC14195}"/>
+              </a:ext>
+            </a:extLst>
+          </p:cNvPr>
+          <p:cNvSpPr>
+            <a:spLocks noGrp="1"/>
+          </p:cNvSpPr>
+          <p:nvPr>
+            <p:ph idx="1"/>
+          </p:nvPr>
+        </p:nvSpPr>
+        <p:spPr>
+          <a:xfrm>
+            <a:off x="838200" y="1825624"/>
+            <a:ext cx="10515600" cy="4575175"/>
+          </a:xfrm>
+        </p:spPr>
+        <p:txBody>
+          <a:bodyPr>
+            <a:noAutofit/>
+          </a:bodyPr>
+          <a:lstStyle/>
+          <a:p>
+            <a:pPr marL="0" indent="0">
+              <a:lnSpc>
+                <a:spcPct val="107000"/>
+              </a:lnSpc>
+              <a:spcAft>
+                <a:spcPts val="800"/>
+              </a:spcAft>
+              <a:buNone/>
+            </a:pPr>
+            <a:r>
+              <a:rPr lang="de-DE" sz="1400" dirty="0">
+                <a:effectLst/>
+                <a:latin typeface="Calibri" panose="020F0502020204030204" pitchFamily="34" charset="0"/>
+                <a:ea typeface="Calibri" panose="020F0502020204030204" pitchFamily="34" charset="0"/>
+                <a:cs typeface="Times New Roman" panose="02020603050405020304" pitchFamily="18" charset="0"/>
+              </a:rPr>
+              <a:t>• Funktionale Anforderungen</a:t>
+            </a:r>
+          </a:p>
+          <a:p>
+            <a:pPr marL="0" indent="0">
+              <a:lnSpc>
+                <a:spcPct val="107000"/>
+              </a:lnSpc>
+              <a:spcAft>
+                <a:spcPts val="800"/>
+              </a:spcAft>
+              <a:buNone/>
+            </a:pPr>
+            <a:r>
+              <a:rPr lang="de-DE" sz="1200" dirty="0">
+                <a:effectLst/>
+                <a:latin typeface="Calibri" panose="020F0502020204030204" pitchFamily="34" charset="0"/>
+                <a:ea typeface="Calibri" panose="020F0502020204030204" pitchFamily="34" charset="0"/>
+                <a:cs typeface="Times New Roman" panose="02020603050405020304" pitchFamily="18" charset="0"/>
+              </a:rPr>
+              <a:t>[F10] Das System muss dem Bewohner / Familien Gummersbach Upload von User Content in Form von Bildern und Beschreibungen ermöglichen.</a:t>
+            </a:r>
+          </a:p>
+          <a:p>
+            <a:pPr marL="0" indent="0">
+              <a:lnSpc>
+                <a:spcPct val="107000"/>
+              </a:lnSpc>
+              <a:spcAft>
+                <a:spcPts val="800"/>
+              </a:spcAft>
+              <a:buNone/>
+            </a:pPr>
+            <a:r>
+              <a:rPr lang="de-DE" sz="1200" dirty="0">
+                <a:solidFill>
+                  <a:srgbClr val="000000"/>
+                </a:solidFill>
+                <a:effectLst/>
+                <a:latin typeface="Calibri" panose="020F0502020204030204" pitchFamily="34" charset="0"/>
+                <a:ea typeface="Calibri" panose="020F0502020204030204" pitchFamily="34" charset="0"/>
+                <a:cs typeface="Calibri" panose="020F0502020204030204" pitchFamily="34" charset="0"/>
+              </a:rPr>
+              <a:t>[F20]</a:t>
+            </a:r>
+            <a:r>
+              <a:rPr lang="de-DE" sz="1200" dirty="0">
+                <a:effectLst/>
+                <a:latin typeface="Calibri" panose="020F0502020204030204" pitchFamily="34" charset="0"/>
+                <a:ea typeface="Calibri" panose="020F0502020204030204" pitchFamily="34" charset="0"/>
+                <a:cs typeface="Calibri" panose="020F0502020204030204" pitchFamily="34" charset="0"/>
+              </a:rPr>
+              <a:t> </a:t>
+            </a:r>
+            <a:r>
+              <a:rPr lang="de-DE" sz="1200" dirty="0">
+                <a:effectLst/>
+                <a:latin typeface="Calibri" panose="020F0502020204030204" pitchFamily="34" charset="0"/>
+                <a:ea typeface="Calibri" panose="020F0502020204030204" pitchFamily="34" charset="0"/>
+                <a:cs typeface="Times New Roman" panose="02020603050405020304" pitchFamily="18" charset="0"/>
+              </a:rPr>
+              <a:t>Das System sollte dem Besucher / Touristen das Betrachten von Content in Form von Bildern und Beschreibungen ermöglichen.</a:t>
+            </a:r>
+          </a:p>
+          <a:p>
+            <a:pPr marL="0" indent="0">
+              <a:lnSpc>
+                <a:spcPct val="107000"/>
+              </a:lnSpc>
+              <a:spcAft>
+                <a:spcPts val="800"/>
+              </a:spcAft>
+              <a:buNone/>
+            </a:pPr>
+            <a:r>
+              <a:rPr lang="de-DE" sz="1200" dirty="0">
+                <a:solidFill>
+                  <a:srgbClr val="000000"/>
+                </a:solidFill>
+                <a:effectLst/>
+                <a:latin typeface="Calibri" panose="020F0502020204030204" pitchFamily="34" charset="0"/>
+                <a:ea typeface="Calibri" panose="020F0502020204030204" pitchFamily="34" charset="0"/>
+                <a:cs typeface="Calibri" panose="020F0502020204030204" pitchFamily="34" charset="0"/>
+              </a:rPr>
+              <a:t>[F30]</a:t>
+            </a:r>
+            <a:r>
+              <a:rPr lang="de-DE" sz="1200" dirty="0">
+                <a:effectLst/>
+                <a:latin typeface="Calibri" panose="020F0502020204030204" pitchFamily="34" charset="0"/>
+                <a:ea typeface="Calibri" panose="020F0502020204030204" pitchFamily="34" charset="0"/>
+                <a:cs typeface="Times New Roman" panose="02020603050405020304" pitchFamily="18" charset="0"/>
+              </a:rPr>
+              <a:t> Das System sollte dem Wissenschaftlich Interessierten das Betrachten von Content in Form von Bildern und Beschreibungen ermöglichen.</a:t>
+            </a:r>
+          </a:p>
+          <a:p>
+            <a:pPr marL="0" indent="0">
+              <a:lnSpc>
+                <a:spcPct val="107000"/>
+              </a:lnSpc>
+              <a:spcAft>
+                <a:spcPts val="800"/>
+              </a:spcAft>
+              <a:buNone/>
+            </a:pPr>
+            <a:r>
+              <a:rPr lang="de-DE" sz="1200" dirty="0">
+                <a:solidFill>
+                  <a:srgbClr val="000000"/>
+                </a:solidFill>
+                <a:effectLst/>
+                <a:latin typeface="Calibri" panose="020F0502020204030204" pitchFamily="34" charset="0"/>
+                <a:ea typeface="Calibri" panose="020F0502020204030204" pitchFamily="34" charset="0"/>
+                <a:cs typeface="Calibri" panose="020F0502020204030204" pitchFamily="34" charset="0"/>
+              </a:rPr>
+              <a:t>[F40] </a:t>
+            </a:r>
+            <a:r>
+              <a:rPr lang="de-DE" sz="1200" dirty="0">
+                <a:effectLst/>
+                <a:latin typeface="Calibri" panose="020F0502020204030204" pitchFamily="34" charset="0"/>
+                <a:ea typeface="Calibri" panose="020F0502020204030204" pitchFamily="34" charset="0"/>
+                <a:cs typeface="Times New Roman" panose="02020603050405020304" pitchFamily="18" charset="0"/>
+              </a:rPr>
+              <a:t>Das System sollte dem Facebook Mitglied das Betrachten von Content in Form von Bildern und Beschreibungen ermöglichen.</a:t>
+            </a:r>
+          </a:p>
+          <a:p>
+            <a:pPr marL="0" indent="0">
+              <a:lnSpc>
+                <a:spcPct val="107000"/>
+              </a:lnSpc>
+              <a:spcAft>
+                <a:spcPts val="800"/>
+              </a:spcAft>
+              <a:buNone/>
+            </a:pPr>
+            <a:r>
+              <a:rPr lang="de-DE" sz="1200" dirty="0">
+                <a:solidFill>
+                  <a:srgbClr val="000000"/>
+                </a:solidFill>
+                <a:effectLst/>
+                <a:latin typeface="Calibri" panose="020F0502020204030204" pitchFamily="34" charset="0"/>
+                <a:ea typeface="Calibri" panose="020F0502020204030204" pitchFamily="34" charset="0"/>
+                <a:cs typeface="Calibri" panose="020F0502020204030204" pitchFamily="34" charset="0"/>
+              </a:rPr>
+              <a:t>[F50]</a:t>
+            </a:r>
+            <a:r>
+              <a:rPr lang="de-DE" sz="1200" dirty="0">
+                <a:effectLst/>
+                <a:latin typeface="Calibri" panose="020F0502020204030204" pitchFamily="34" charset="0"/>
+                <a:ea typeface="Calibri" panose="020F0502020204030204" pitchFamily="34" charset="0"/>
+                <a:cs typeface="Times New Roman" panose="02020603050405020304" pitchFamily="18" charset="0"/>
+              </a:rPr>
+              <a:t> Das System sollte dem Bildungsvermittler das Betrachten von Content in Form von Bildern und Beschreibungen ermöglichen.</a:t>
+            </a:r>
+          </a:p>
+          <a:p>
+            <a:pPr marL="0" indent="0">
+              <a:lnSpc>
+                <a:spcPct val="107000"/>
+              </a:lnSpc>
+              <a:spcAft>
+                <a:spcPts val="800"/>
+              </a:spcAft>
+              <a:buNone/>
+            </a:pPr>
+            <a:r>
+              <a:rPr lang="de-DE" sz="1200" dirty="0">
+                <a:solidFill>
+                  <a:srgbClr val="000000"/>
+                </a:solidFill>
+                <a:effectLst/>
+                <a:latin typeface="Calibri" panose="020F0502020204030204" pitchFamily="34" charset="0"/>
+                <a:ea typeface="Calibri" panose="020F0502020204030204" pitchFamily="34" charset="0"/>
+                <a:cs typeface="Calibri" panose="020F0502020204030204" pitchFamily="34" charset="0"/>
+              </a:rPr>
+              <a:t>[F60] Das System sollte dem Stadtarchiv Gummersbach </a:t>
+            </a:r>
+            <a:r>
+              <a:rPr lang="de-DE" sz="1200" dirty="0">
+                <a:effectLst/>
+                <a:latin typeface="Calibri" panose="020F0502020204030204" pitchFamily="34" charset="0"/>
+                <a:ea typeface="Calibri" panose="020F0502020204030204" pitchFamily="34" charset="0"/>
+                <a:cs typeface="Times New Roman" panose="02020603050405020304" pitchFamily="18" charset="0"/>
+              </a:rPr>
+              <a:t>das Betrachten von Content in Form von Bildern und Beschreibungen ermöglichen.</a:t>
+            </a:r>
+          </a:p>
+          <a:p>
+            <a:pPr marL="0" indent="0">
+              <a:lnSpc>
+                <a:spcPct val="107000"/>
+              </a:lnSpc>
+              <a:spcAft>
+                <a:spcPts val="800"/>
+              </a:spcAft>
+              <a:buNone/>
+            </a:pPr>
+            <a:r>
+              <a:rPr lang="de-DE" sz="1200" dirty="0">
+                <a:solidFill>
+                  <a:srgbClr val="000000"/>
+                </a:solidFill>
+                <a:effectLst/>
+                <a:latin typeface="Calibri" panose="020F0502020204030204" pitchFamily="34" charset="0"/>
+                <a:ea typeface="Calibri" panose="020F0502020204030204" pitchFamily="34" charset="0"/>
+                <a:cs typeface="Calibri" panose="020F0502020204030204" pitchFamily="34" charset="0"/>
+              </a:rPr>
+              <a:t>[F70] Das System sollte dem Landesarchiv NRW </a:t>
+            </a:r>
+            <a:r>
+              <a:rPr lang="de-DE" sz="1200" dirty="0">
+                <a:effectLst/>
+                <a:latin typeface="Calibri" panose="020F0502020204030204" pitchFamily="34" charset="0"/>
+                <a:ea typeface="Calibri" panose="020F0502020204030204" pitchFamily="34" charset="0"/>
+                <a:cs typeface="Times New Roman" panose="02020603050405020304" pitchFamily="18" charset="0"/>
+              </a:rPr>
+              <a:t>das Betrachten von Content in Form von Bildern und Beschreibungen ermöglichen.</a:t>
+            </a:r>
+          </a:p>
+          <a:p>
+            <a:pPr marL="0" indent="0">
+              <a:lnSpc>
+                <a:spcPct val="107000"/>
+              </a:lnSpc>
+              <a:spcAft>
+                <a:spcPts val="800"/>
+              </a:spcAft>
+              <a:buNone/>
+            </a:pPr>
+            <a:r>
+              <a:rPr lang="de-DE" sz="1200" dirty="0">
+                <a:solidFill>
+                  <a:srgbClr val="000000"/>
+                </a:solidFill>
+                <a:effectLst/>
+                <a:latin typeface="Calibri" panose="020F0502020204030204" pitchFamily="34" charset="0"/>
+                <a:ea typeface="Calibri" panose="020F0502020204030204" pitchFamily="34" charset="0"/>
+                <a:cs typeface="Calibri" panose="020F0502020204030204" pitchFamily="34" charset="0"/>
+              </a:rPr>
+              <a:t>[F80] Das System sollte den Museen </a:t>
+            </a:r>
+            <a:r>
+              <a:rPr lang="de-DE" sz="1200" dirty="0">
+                <a:effectLst/>
+                <a:latin typeface="Calibri" panose="020F0502020204030204" pitchFamily="34" charset="0"/>
+                <a:ea typeface="Calibri" panose="020F0502020204030204" pitchFamily="34" charset="0"/>
+                <a:cs typeface="Times New Roman" panose="02020603050405020304" pitchFamily="18" charset="0"/>
+              </a:rPr>
+              <a:t>das Betrachten von Content in Form von Bildern und Beschreibungen ermöglichen.</a:t>
+            </a:r>
+          </a:p>
+          <a:p>
+            <a:pPr marL="0" indent="0">
+              <a:lnSpc>
+                <a:spcPct val="107000"/>
+              </a:lnSpc>
+              <a:spcAft>
+                <a:spcPts val="800"/>
+              </a:spcAft>
+              <a:buNone/>
+            </a:pPr>
+            <a:r>
+              <a:rPr lang="de-DE" sz="1200" dirty="0">
+                <a:solidFill>
+                  <a:srgbClr val="000000"/>
+                </a:solidFill>
+                <a:effectLst/>
+                <a:latin typeface="Calibri" panose="020F0502020204030204" pitchFamily="34" charset="0"/>
+                <a:ea typeface="Calibri" panose="020F0502020204030204" pitchFamily="34" charset="0"/>
+                <a:cs typeface="Calibri" panose="020F0502020204030204" pitchFamily="34" charset="0"/>
+              </a:rPr>
+              <a:t>[F80] Das System sollte dem Heimatsbilderarchiv Oberbergischer Kreis </a:t>
+            </a:r>
+            <a:r>
+              <a:rPr lang="de-DE" sz="1200" dirty="0">
+                <a:effectLst/>
+                <a:latin typeface="Calibri" panose="020F0502020204030204" pitchFamily="34" charset="0"/>
+                <a:ea typeface="Calibri" panose="020F0502020204030204" pitchFamily="34" charset="0"/>
+                <a:cs typeface="Times New Roman" panose="02020603050405020304" pitchFamily="18" charset="0"/>
+              </a:rPr>
+              <a:t>das Betrachten von Content in Form von Bildern und Beschreibungen ermöglichen.</a:t>
+            </a:r>
+          </a:p>
+          <a:p>
+            <a:pPr marL="0" indent="0">
+              <a:lnSpc>
+                <a:spcPct val="107000"/>
+              </a:lnSpc>
+              <a:spcAft>
+                <a:spcPts val="800"/>
+              </a:spcAft>
+              <a:buNone/>
+            </a:pPr>
+            <a:r>
+              <a:rPr lang="de-DE" sz="1200" dirty="0">
+                <a:solidFill>
+                  <a:srgbClr val="000000"/>
+                </a:solidFill>
+                <a:effectLst/>
+                <a:latin typeface="Calibri" panose="020F0502020204030204" pitchFamily="34" charset="0"/>
+                <a:ea typeface="Calibri" panose="020F0502020204030204" pitchFamily="34" charset="0"/>
+                <a:cs typeface="Calibri" panose="020F0502020204030204" pitchFamily="34" charset="0"/>
+              </a:rPr>
+              <a:t>[F90] Das System sollte Schulen </a:t>
+            </a:r>
+            <a:r>
+              <a:rPr lang="de-DE" sz="1200" dirty="0">
+                <a:effectLst/>
+                <a:latin typeface="Calibri" panose="020F0502020204030204" pitchFamily="34" charset="0"/>
+                <a:ea typeface="Calibri" panose="020F0502020204030204" pitchFamily="34" charset="0"/>
+                <a:cs typeface="Times New Roman" panose="02020603050405020304" pitchFamily="18" charset="0"/>
+              </a:rPr>
+              <a:t>das Betrachten von Content in Form von Bildern und Beschreibungen ermöglichen.</a:t>
+            </a:r>
+            <a:endParaRPr lang="de-DE" sz="1200" dirty="0"/>
+          </a:p>
+        </p:txBody>
+      </p:sp>
+    </p:spTree>
+    <p:extLst>
+      <p:ext uri="{BB962C8B-B14F-4D97-AF65-F5344CB8AC3E}">
+        <p14:creationId xmlns:p14="http://schemas.microsoft.com/office/powerpoint/2010/main" val="3075951861"/>
       </p:ext>
     </p:extLst>
   </p:cSld>
@@ -5976,6 +7109,465 @@
     <p:extLst>
       <p:ext uri="{BB962C8B-B14F-4D97-AF65-F5344CB8AC3E}">
         <p14:creationId xmlns:p14="http://schemas.microsoft.com/office/powerpoint/2010/main" val="1441618072"/>
+      </p:ext>
+    </p:extLst>
+  </p:cSld>
+  <p:clrMapOvr>
+    <a:masterClrMapping/>
+  </p:clrMapOvr>
+</p:sld>
+</file>
+
+<file path=ppt/slides/slide20.xml><?xml version="1.0" encoding="utf-8"?>
+<p:sld xmlns:a="http://schemas.openxmlformats.org/drawingml/2006/main" xmlns:r="http://schemas.openxmlformats.org/officeDocument/2006/relationships" xmlns:p="http://schemas.openxmlformats.org/presentationml/2006/main">
+  <p:cSld>
+    <p:spTree>
+      <p:nvGrpSpPr>
+        <p:cNvPr id="1" name=""/>
+        <p:cNvGrpSpPr/>
+        <p:nvPr/>
+      </p:nvGrpSpPr>
+      <p:grpSpPr>
+        <a:xfrm>
+          <a:off x="0" y="0"/>
+          <a:ext cx="0" cy="0"/>
+          <a:chOff x="0" y="0"/>
+          <a:chExt cx="0" cy="0"/>
+        </a:xfrm>
+      </p:grpSpPr>
+      <p:sp>
+        <p:nvSpPr>
+          <p:cNvPr id="2" name="Titel 1">
+            <a:extLst>
+              <a:ext uri="{FF2B5EF4-FFF2-40B4-BE49-F238E27FC236}">
+                <a16:creationId xmlns:a16="http://schemas.microsoft.com/office/drawing/2014/main" id="{DBAC920D-A45D-D6BE-BD42-62DD89B953A4}"/>
+              </a:ext>
+            </a:extLst>
+          </p:cNvPr>
+          <p:cNvSpPr>
+            <a:spLocks noGrp="1"/>
+          </p:cNvSpPr>
+          <p:nvPr>
+            <p:ph type="title"/>
+          </p:nvPr>
+        </p:nvSpPr>
+        <p:spPr/>
+        <p:txBody>
+          <a:bodyPr/>
+          <a:lstStyle/>
+          <a:p>
+            <a:pPr algn="ctr"/>
+            <a:r>
+              <a:rPr lang="de-DE" dirty="0"/>
+              <a:t>Anforderungsermittlung</a:t>
+            </a:r>
+          </a:p>
+        </p:txBody>
+      </p:sp>
+      <p:sp>
+        <p:nvSpPr>
+          <p:cNvPr id="3" name="Inhaltsplatzhalter 2">
+            <a:extLst>
+              <a:ext uri="{FF2B5EF4-FFF2-40B4-BE49-F238E27FC236}">
+                <a16:creationId xmlns:a16="http://schemas.microsoft.com/office/drawing/2014/main" id="{DE6011DD-34F8-0353-FE44-1BDD10BA1616}"/>
+              </a:ext>
+            </a:extLst>
+          </p:cNvPr>
+          <p:cNvSpPr>
+            <a:spLocks noGrp="1"/>
+          </p:cNvSpPr>
+          <p:nvPr>
+            <p:ph idx="1"/>
+          </p:nvPr>
+        </p:nvSpPr>
+        <p:spPr/>
+        <p:txBody>
+          <a:bodyPr>
+            <a:normAutofit/>
+          </a:bodyPr>
+          <a:lstStyle/>
+          <a:p>
+            <a:pPr marL="0" indent="0">
+              <a:lnSpc>
+                <a:spcPct val="107000"/>
+              </a:lnSpc>
+              <a:spcAft>
+                <a:spcPts val="800"/>
+              </a:spcAft>
+              <a:buNone/>
+            </a:pPr>
+            <a:r>
+              <a:rPr lang="de-DE" sz="1200" dirty="0">
+                <a:solidFill>
+                  <a:srgbClr val="000000"/>
+                </a:solidFill>
+                <a:effectLst/>
+                <a:latin typeface="Calibri" panose="020F0502020204030204" pitchFamily="34" charset="0"/>
+                <a:ea typeface="Calibri" panose="020F0502020204030204" pitchFamily="34" charset="0"/>
+                <a:cs typeface="Calibri" panose="020F0502020204030204" pitchFamily="34" charset="0"/>
+              </a:rPr>
+              <a:t>[F100] Das System sollte der Stadtführungen </a:t>
+            </a:r>
+            <a:r>
+              <a:rPr lang="de-DE" sz="1200" dirty="0">
+                <a:effectLst/>
+                <a:latin typeface="Calibri" panose="020F0502020204030204" pitchFamily="34" charset="0"/>
+                <a:ea typeface="Calibri" panose="020F0502020204030204" pitchFamily="34" charset="0"/>
+                <a:cs typeface="Times New Roman" panose="02020603050405020304" pitchFamily="18" charset="0"/>
+              </a:rPr>
+              <a:t>das Betrachten von Content in Form von Bildern und Beschreibungen ermöglichen.</a:t>
+            </a:r>
+          </a:p>
+          <a:p>
+            <a:pPr marL="0" indent="0">
+              <a:lnSpc>
+                <a:spcPct val="107000"/>
+              </a:lnSpc>
+              <a:spcAft>
+                <a:spcPts val="800"/>
+              </a:spcAft>
+              <a:buNone/>
+            </a:pPr>
+            <a:r>
+              <a:rPr lang="de-DE" sz="1200" dirty="0">
+                <a:solidFill>
+                  <a:srgbClr val="000000"/>
+                </a:solidFill>
+                <a:effectLst/>
+                <a:latin typeface="Calibri" panose="020F0502020204030204" pitchFamily="34" charset="0"/>
+                <a:ea typeface="Calibri" panose="020F0502020204030204" pitchFamily="34" charset="0"/>
+                <a:cs typeface="Calibri" panose="020F0502020204030204" pitchFamily="34" charset="0"/>
+              </a:rPr>
+              <a:t>[F110] Das System sollte Lokale Vereine</a:t>
+            </a:r>
+            <a:r>
+              <a:rPr lang="de-DE" sz="1200" dirty="0">
+                <a:effectLst/>
+                <a:latin typeface="Calibri" panose="020F0502020204030204" pitchFamily="34" charset="0"/>
+                <a:ea typeface="Calibri" panose="020F0502020204030204" pitchFamily="34" charset="0"/>
+                <a:cs typeface="Times New Roman" panose="02020603050405020304" pitchFamily="18" charset="0"/>
+              </a:rPr>
+              <a:t> das Betrachten von Content in Form von Bildern und Beschreibungen ermöglichen.</a:t>
+            </a:r>
+          </a:p>
+          <a:p>
+            <a:pPr marL="0" indent="0">
+              <a:lnSpc>
+                <a:spcPct val="107000"/>
+              </a:lnSpc>
+              <a:spcAft>
+                <a:spcPts val="800"/>
+              </a:spcAft>
+              <a:buNone/>
+            </a:pPr>
+            <a:r>
+              <a:rPr lang="de-DE" sz="1200" dirty="0">
+                <a:solidFill>
+                  <a:srgbClr val="000000"/>
+                </a:solidFill>
+                <a:effectLst/>
+                <a:latin typeface="Calibri" panose="020F0502020204030204" pitchFamily="34" charset="0"/>
+                <a:ea typeface="Calibri" panose="020F0502020204030204" pitchFamily="34" charset="0"/>
+                <a:cs typeface="Calibri" panose="020F0502020204030204" pitchFamily="34" charset="0"/>
+              </a:rPr>
+              <a:t>[F120] Das System sollte der Facebookgruppe 5270 Gummersbach </a:t>
+            </a:r>
+            <a:r>
+              <a:rPr lang="de-DE" sz="1200" dirty="0">
+                <a:effectLst/>
+                <a:latin typeface="Calibri" panose="020F0502020204030204" pitchFamily="34" charset="0"/>
+                <a:ea typeface="Calibri" panose="020F0502020204030204" pitchFamily="34" charset="0"/>
+                <a:cs typeface="Times New Roman" panose="02020603050405020304" pitchFamily="18" charset="0"/>
+              </a:rPr>
+              <a:t>das Betrachten von Content in Form von Bildern und Beschreibungen ermöglichen.</a:t>
+            </a:r>
+          </a:p>
+          <a:p>
+            <a:pPr marL="0" indent="0">
+              <a:lnSpc>
+                <a:spcPct val="107000"/>
+              </a:lnSpc>
+              <a:spcAft>
+                <a:spcPts val="800"/>
+              </a:spcAft>
+              <a:buNone/>
+            </a:pPr>
+            <a:r>
+              <a:rPr lang="de-DE" sz="1200" dirty="0">
+                <a:solidFill>
+                  <a:srgbClr val="000000"/>
+                </a:solidFill>
+                <a:effectLst/>
+                <a:latin typeface="Calibri" panose="020F0502020204030204" pitchFamily="34" charset="0"/>
+                <a:ea typeface="Calibri" panose="020F0502020204030204" pitchFamily="34" charset="0"/>
+                <a:cs typeface="Calibri" panose="020F0502020204030204" pitchFamily="34" charset="0"/>
+              </a:rPr>
+              <a:t>[F130] Das System sollte dem Amt für Schule und Bildung </a:t>
+            </a:r>
+            <a:r>
+              <a:rPr lang="de-DE" sz="1200" dirty="0">
+                <a:effectLst/>
+                <a:latin typeface="Calibri" panose="020F0502020204030204" pitchFamily="34" charset="0"/>
+                <a:ea typeface="Calibri" panose="020F0502020204030204" pitchFamily="34" charset="0"/>
+                <a:cs typeface="Times New Roman" panose="02020603050405020304" pitchFamily="18" charset="0"/>
+              </a:rPr>
+              <a:t>das Betrachten von Content in Form von Bildern und Beschreibungen ermöglichen.</a:t>
+            </a:r>
+          </a:p>
+          <a:p>
+            <a:endParaRPr lang="de-DE" dirty="0"/>
+          </a:p>
+          <a:p>
+            <a:pPr marL="0" indent="0">
+              <a:lnSpc>
+                <a:spcPct val="107000"/>
+              </a:lnSpc>
+              <a:spcAft>
+                <a:spcPts val="800"/>
+              </a:spcAft>
+              <a:buNone/>
+            </a:pPr>
+            <a:r>
+              <a:rPr lang="de-DE" sz="1400" dirty="0">
+                <a:effectLst/>
+                <a:latin typeface="Calibri" panose="020F0502020204030204" pitchFamily="34" charset="0"/>
+                <a:ea typeface="Calibri" panose="020F0502020204030204" pitchFamily="34" charset="0"/>
+                <a:cs typeface="Times New Roman" panose="02020603050405020304" pitchFamily="18" charset="0"/>
+              </a:rPr>
+              <a:t>• Organisationale Anforderungen</a:t>
+            </a:r>
+          </a:p>
+          <a:p>
+            <a:pPr marL="0" indent="0">
+              <a:lnSpc>
+                <a:spcPct val="107000"/>
+              </a:lnSpc>
+              <a:spcAft>
+                <a:spcPts val="800"/>
+              </a:spcAft>
+              <a:buNone/>
+            </a:pPr>
+            <a:r>
+              <a:rPr lang="de-DE" sz="1200" dirty="0">
+                <a:effectLst/>
+                <a:latin typeface="Calibri" panose="020F0502020204030204" pitchFamily="34" charset="0"/>
+                <a:ea typeface="Calibri" panose="020F0502020204030204" pitchFamily="34" charset="0"/>
+                <a:cs typeface="Times New Roman" panose="02020603050405020304" pitchFamily="18" charset="0"/>
+              </a:rPr>
+              <a:t>Anforderungen folgen, wenn </a:t>
+            </a:r>
+            <a:r>
+              <a:rPr lang="de-DE" sz="1200" dirty="0" err="1">
+                <a:effectLst/>
+                <a:latin typeface="Calibri" panose="020F0502020204030204" pitchFamily="34" charset="0"/>
+                <a:ea typeface="Calibri" panose="020F0502020204030204" pitchFamily="34" charset="0"/>
+                <a:cs typeface="Times New Roman" panose="02020603050405020304" pitchFamily="18" charset="0"/>
+              </a:rPr>
+              <a:t>Gamificationaspekt</a:t>
+            </a:r>
+            <a:r>
+              <a:rPr lang="de-DE" sz="1200" dirty="0">
+                <a:effectLst/>
+                <a:latin typeface="Calibri" panose="020F0502020204030204" pitchFamily="34" charset="0"/>
+                <a:ea typeface="Calibri" panose="020F0502020204030204" pitchFamily="34" charset="0"/>
+                <a:cs typeface="Times New Roman" panose="02020603050405020304" pitchFamily="18" charset="0"/>
+              </a:rPr>
+              <a:t> ausgearbeitet wird.</a:t>
+            </a:r>
+          </a:p>
+          <a:p>
+            <a:endParaRPr lang="de-DE" dirty="0"/>
+          </a:p>
+        </p:txBody>
+      </p:sp>
+    </p:spTree>
+    <p:extLst>
+      <p:ext uri="{BB962C8B-B14F-4D97-AF65-F5344CB8AC3E}">
+        <p14:creationId xmlns:p14="http://schemas.microsoft.com/office/powerpoint/2010/main" val="808547792"/>
+      </p:ext>
+    </p:extLst>
+  </p:cSld>
+  <p:clrMapOvr>
+    <a:masterClrMapping/>
+  </p:clrMapOvr>
+</p:sld>
+</file>
+
+<file path=ppt/slides/slide21.xml><?xml version="1.0" encoding="utf-8"?>
+<p:sld xmlns:a="http://schemas.openxmlformats.org/drawingml/2006/main" xmlns:r="http://schemas.openxmlformats.org/officeDocument/2006/relationships" xmlns:p="http://schemas.openxmlformats.org/presentationml/2006/main">
+  <p:cSld>
+    <p:spTree>
+      <p:nvGrpSpPr>
+        <p:cNvPr id="1" name=""/>
+        <p:cNvGrpSpPr/>
+        <p:nvPr/>
+      </p:nvGrpSpPr>
+      <p:grpSpPr>
+        <a:xfrm>
+          <a:off x="0" y="0"/>
+          <a:ext cx="0" cy="0"/>
+          <a:chOff x="0" y="0"/>
+          <a:chExt cx="0" cy="0"/>
+        </a:xfrm>
+      </p:grpSpPr>
+      <p:sp>
+        <p:nvSpPr>
+          <p:cNvPr id="2" name="Titel 1">
+            <a:extLst>
+              <a:ext uri="{FF2B5EF4-FFF2-40B4-BE49-F238E27FC236}">
+                <a16:creationId xmlns:a16="http://schemas.microsoft.com/office/drawing/2014/main" id="{55041D1A-B0D8-F1EE-DC2C-456636A589E0}"/>
+              </a:ext>
+            </a:extLst>
+          </p:cNvPr>
+          <p:cNvSpPr>
+            <a:spLocks noGrp="1"/>
+          </p:cNvSpPr>
+          <p:nvPr>
+            <p:ph type="title"/>
+          </p:nvPr>
+        </p:nvSpPr>
+        <p:spPr/>
+        <p:txBody>
+          <a:bodyPr/>
+          <a:lstStyle/>
+          <a:p>
+            <a:pPr algn="ctr"/>
+            <a:r>
+              <a:rPr lang="de-DE" dirty="0"/>
+              <a:t>Anforderungsermittlung</a:t>
+            </a:r>
+          </a:p>
+        </p:txBody>
+      </p:sp>
+      <p:sp>
+        <p:nvSpPr>
+          <p:cNvPr id="3" name="Inhaltsplatzhalter 2">
+            <a:extLst>
+              <a:ext uri="{FF2B5EF4-FFF2-40B4-BE49-F238E27FC236}">
+                <a16:creationId xmlns:a16="http://schemas.microsoft.com/office/drawing/2014/main" id="{EF2F38AC-7DBF-8548-2601-710C70A687BF}"/>
+              </a:ext>
+            </a:extLst>
+          </p:cNvPr>
+          <p:cNvSpPr>
+            <a:spLocks noGrp="1"/>
+          </p:cNvSpPr>
+          <p:nvPr>
+            <p:ph idx="1"/>
+          </p:nvPr>
+        </p:nvSpPr>
+        <p:spPr/>
+        <p:txBody>
+          <a:bodyPr/>
+          <a:lstStyle/>
+          <a:p>
+            <a:pPr>
+              <a:lnSpc>
+                <a:spcPct val="107000"/>
+              </a:lnSpc>
+              <a:spcAft>
+                <a:spcPts val="800"/>
+              </a:spcAft>
+            </a:pPr>
+            <a:r>
+              <a:rPr lang="de-DE" sz="1400" dirty="0">
+                <a:effectLst/>
+                <a:latin typeface="Calibri" panose="020F0502020204030204" pitchFamily="34" charset="0"/>
+                <a:ea typeface="Calibri" panose="020F0502020204030204" pitchFamily="34" charset="0"/>
+                <a:cs typeface="Times New Roman" panose="02020603050405020304" pitchFamily="18" charset="0"/>
+              </a:rPr>
+              <a:t>• Qualitative Anforderungen</a:t>
+            </a:r>
+          </a:p>
+          <a:p>
+            <a:pPr marL="0" indent="0">
+              <a:lnSpc>
+                <a:spcPct val="107000"/>
+              </a:lnSpc>
+              <a:spcAft>
+                <a:spcPts val="800"/>
+              </a:spcAft>
+              <a:buNone/>
+            </a:pPr>
+            <a:r>
+              <a:rPr lang="de-DE" sz="1200" dirty="0">
+                <a:effectLst/>
+                <a:latin typeface="Calibri" panose="020F0502020204030204" pitchFamily="34" charset="0"/>
+                <a:ea typeface="Calibri" panose="020F0502020204030204" pitchFamily="34" charset="0"/>
+                <a:cs typeface="Calibri" panose="020F0502020204030204" pitchFamily="34" charset="0"/>
+              </a:rPr>
+              <a:t>[Q10] Das Speichern und Abrufen von Content muss für den Nutzer möglich sein.</a:t>
+            </a:r>
+            <a:endParaRPr lang="de-DE" sz="1200" dirty="0">
+              <a:effectLst/>
+              <a:latin typeface="Calibri" panose="020F0502020204030204" pitchFamily="34" charset="0"/>
+              <a:ea typeface="Calibri" panose="020F0502020204030204" pitchFamily="34" charset="0"/>
+              <a:cs typeface="Times New Roman" panose="02020603050405020304" pitchFamily="18" charset="0"/>
+            </a:endParaRPr>
+          </a:p>
+          <a:p>
+            <a:pPr marL="0" indent="0">
+              <a:lnSpc>
+                <a:spcPct val="107000"/>
+              </a:lnSpc>
+              <a:spcAft>
+                <a:spcPts val="800"/>
+              </a:spcAft>
+              <a:buNone/>
+            </a:pPr>
+            <a:r>
+              <a:rPr lang="de-DE" sz="1200" dirty="0">
+                <a:effectLst/>
+                <a:latin typeface="Calibri" panose="020F0502020204030204" pitchFamily="34" charset="0"/>
+                <a:ea typeface="Calibri" panose="020F0502020204030204" pitchFamily="34" charset="0"/>
+                <a:cs typeface="Calibri" panose="020F0502020204030204" pitchFamily="34" charset="0"/>
+              </a:rPr>
+              <a:t>[Q20] Die Benutzeroberfläche sollte so gestaltet sein, dass sie für Nutzer mit wenig technischem Vorwissen bedienbar ist.</a:t>
+            </a:r>
+            <a:endParaRPr lang="de-DE" sz="1200" dirty="0">
+              <a:effectLst/>
+              <a:latin typeface="Calibri" panose="020F0502020204030204" pitchFamily="34" charset="0"/>
+              <a:ea typeface="Calibri" panose="020F0502020204030204" pitchFamily="34" charset="0"/>
+              <a:cs typeface="Times New Roman" panose="02020603050405020304" pitchFamily="18" charset="0"/>
+            </a:endParaRPr>
+          </a:p>
+          <a:p>
+            <a:pPr marL="0" indent="0">
+              <a:lnSpc>
+                <a:spcPct val="107000"/>
+              </a:lnSpc>
+              <a:spcAft>
+                <a:spcPts val="800"/>
+              </a:spcAft>
+              <a:buNone/>
+            </a:pPr>
+            <a:r>
+              <a:rPr lang="de-DE" sz="1200" dirty="0">
+                <a:effectLst/>
+                <a:latin typeface="Calibri" panose="020F0502020204030204" pitchFamily="34" charset="0"/>
+                <a:ea typeface="Calibri" panose="020F0502020204030204" pitchFamily="34" charset="0"/>
+                <a:cs typeface="Calibri" panose="020F0502020204030204" pitchFamily="34" charset="0"/>
+              </a:rPr>
+              <a:t>[Q30] Datenschutz</a:t>
+            </a:r>
+            <a:endParaRPr lang="de-DE" sz="1200" dirty="0">
+              <a:effectLst/>
+              <a:latin typeface="Calibri" panose="020F0502020204030204" pitchFamily="34" charset="0"/>
+              <a:ea typeface="Calibri" panose="020F0502020204030204" pitchFamily="34" charset="0"/>
+              <a:cs typeface="Times New Roman" panose="02020603050405020304" pitchFamily="18" charset="0"/>
+            </a:endParaRPr>
+          </a:p>
+          <a:p>
+            <a:pPr marL="0" indent="0">
+              <a:buNone/>
+            </a:pPr>
+            <a:endParaRPr lang="de-DE" dirty="0"/>
+          </a:p>
+        </p:txBody>
+      </p:sp>
+    </p:spTree>
+    <p:extLst>
+      <p:ext uri="{BB962C8B-B14F-4D97-AF65-F5344CB8AC3E}">
+        <p14:creationId xmlns:p14="http://schemas.microsoft.com/office/powerpoint/2010/main" val="1048763182"/>
       </p:ext>
     </p:extLst>
   </p:cSld>

</xml_diff>

<commit_message>
Link zu Projektplan angepasst
</commit_message>
<xml_diff>
--- a/EPWS2223HausenKochZimmer Audit 1.pptx
+++ b/EPWS2223HausenKochZimmer Audit 1.pptx
@@ -7099,9 +7099,10 @@
           </a:p>
           <a:p>
             <a:r>
-              <a:rPr lang="de-DE" sz="1600" dirty="0"/>
-              <a:t>https://github.com/sebastiankoch10/EPWS2223HausenKochZimmer/wiki/Ausf%C3%BChrlicher-Projektplan</a:t>
-            </a:r>
+              <a:rPr lang="de-DE" sz="1600"/>
+              <a:t>https://github.com/sebastiankoch10/EPWS2223HausenKochZimmer/wiki/0.-Projektplan</a:t>
+            </a:r>
+            <a:endParaRPr lang="de-DE" sz="1600" dirty="0"/>
           </a:p>
         </p:txBody>
       </p:sp>

</xml_diff>